<commit_message>
small improvements - fixed css for solution 03 (no cursor styling needed) - updated powerpoint
</commit_message>
<xml_diff>
--- a/Presentatie/Front-End Development.pptx
+++ b/Presentatie/Front-End Development.pptx
@@ -5,7 +5,7 @@
     <p:sldMasterId id="2147483660" r:id="rId1"/>
   </p:sldMasterIdLst>
   <p:notesMasterIdLst>
-    <p:notesMasterId r:id="rId35"/>
+    <p:notesMasterId r:id="rId37"/>
   </p:notesMasterIdLst>
   <p:sldIdLst>
     <p:sldId id="256" r:id="rId2"/>
@@ -30,17 +30,19 @@
     <p:sldId id="277" r:id="rId21"/>
     <p:sldId id="262" r:id="rId22"/>
     <p:sldId id="263" r:id="rId23"/>
-    <p:sldId id="264" r:id="rId24"/>
-    <p:sldId id="267" r:id="rId25"/>
-    <p:sldId id="265" r:id="rId26"/>
-    <p:sldId id="266" r:id="rId27"/>
-    <p:sldId id="268" r:id="rId28"/>
-    <p:sldId id="269" r:id="rId29"/>
-    <p:sldId id="270" r:id="rId30"/>
-    <p:sldId id="271" r:id="rId31"/>
-    <p:sldId id="272" r:id="rId32"/>
-    <p:sldId id="273" r:id="rId33"/>
-    <p:sldId id="274" r:id="rId34"/>
+    <p:sldId id="289" r:id="rId24"/>
+    <p:sldId id="290" r:id="rId25"/>
+    <p:sldId id="264" r:id="rId26"/>
+    <p:sldId id="267" r:id="rId27"/>
+    <p:sldId id="265" r:id="rId28"/>
+    <p:sldId id="266" r:id="rId29"/>
+    <p:sldId id="268" r:id="rId30"/>
+    <p:sldId id="269" r:id="rId31"/>
+    <p:sldId id="270" r:id="rId32"/>
+    <p:sldId id="271" r:id="rId33"/>
+    <p:sldId id="272" r:id="rId34"/>
+    <p:sldId id="273" r:id="rId35"/>
+    <p:sldId id="274" r:id="rId36"/>
   </p:sldIdLst>
   <p:sldSz cx="12192000" cy="6858000"/>
   <p:notesSz cx="6858000" cy="9144000"/>
@@ -170,6 +172,8 @@
             <p14:sldId id="277"/>
             <p14:sldId id="262"/>
             <p14:sldId id="263"/>
+            <p14:sldId id="289"/>
+            <p14:sldId id="290"/>
             <p14:sldId id="264"/>
             <p14:sldId id="267"/>
             <p14:sldId id="265"/>
@@ -274,7 +278,7 @@
           <a:p>
             <a:fld id="{C5A381E3-FA85-4AE8-9B11-999D5E05561D}" type="datetimeFigureOut">
               <a:rPr lang="nl-NL" smtClean="0"/>
-              <a:t>23-11-2018</a:t>
+              <a:t>26-11-2018</a:t>
             </a:fld>
             <a:endParaRPr lang="nl-NL"/>
           </a:p>
@@ -791,7 +795,7 @@
           <a:p>
             <a:fld id="{A9AC6ED0-D734-4939-9338-F1A2206B4A78}" type="slidenum">
               <a:rPr lang="nl-NL" smtClean="0"/>
-              <a:t>33</a:t>
+              <a:t>35</a:t>
             </a:fld>
             <a:endParaRPr lang="nl-NL"/>
           </a:p>
@@ -9201,7 +9205,12 @@
             <p:ph idx="1"/>
           </p:nvPr>
         </p:nvSpPr>
-        <p:spPr/>
+        <p:spPr>
+          <a:xfrm>
+            <a:off x="2640000" y="1800002"/>
+            <a:ext cx="8584381" cy="1463152"/>
+          </a:xfrm>
+        </p:spPr>
         <p:txBody>
           <a:bodyPr/>
           <a:lstStyle/>
@@ -9227,13 +9236,10 @@
             <a:endParaRPr lang="nl-NL" dirty="0" smtClean="0"/>
           </a:p>
           <a:p>
+            <a:pPr marL="0" indent="0">
+              <a:buNone/>
+            </a:pPr>
             <a:endParaRPr lang="nl-NL" dirty="0" smtClean="0"/>
-          </a:p>
-          <a:p>
-            <a:endParaRPr lang="nl-NL" dirty="0" smtClean="0"/>
-          </a:p>
-          <a:p>
-            <a:endParaRPr lang="nl-NL" dirty="0"/>
           </a:p>
         </p:txBody>
       </p:sp>
@@ -9283,67 +9289,47 @@
           <a:lstStyle/>
           <a:p>
             <a:r>
-              <a:rPr lang="nl-NL" dirty="0"/>
-              <a:t>DOM </a:t>
-            </a:r>
-            <a:r>
-              <a:rPr lang="nl-NL" dirty="0" err="1"/>
-              <a:t>Manipulation</a:t>
+              <a:rPr lang="nl-NL" dirty="0" smtClean="0"/>
+              <a:t>DOM Model</a:t>
             </a:r>
             <a:endParaRPr lang="nl-NL" dirty="0"/>
           </a:p>
         </p:txBody>
       </p:sp>
-      <p:sp>
-        <p:nvSpPr>
-          <p:cNvPr id="5" name="Tijdelijke aanduiding voor inhoud 4"/>
-          <p:cNvSpPr>
-            <a:spLocks noGrp="1"/>
-          </p:cNvSpPr>
-          <p:nvPr>
-            <p:ph idx="1"/>
-          </p:nvPr>
-        </p:nvSpPr>
-        <p:spPr/>
-        <p:txBody>
-          <a:bodyPr/>
-          <a:lstStyle/>
-          <a:p>
-            <a:r>
-              <a:rPr lang="nl-NL" dirty="0" err="1" smtClean="0"/>
-              <a:t>Document.getelementbyid</a:t>
-            </a:r>
-            <a:r>
-              <a:rPr lang="nl-NL" dirty="0" smtClean="0"/>
-              <a:t>()</a:t>
-            </a:r>
-          </a:p>
-          <a:p>
-            <a:r>
-              <a:rPr lang="nl-NL" dirty="0" err="1" smtClean="0"/>
-              <a:t>Document.createElement</a:t>
-            </a:r>
-            <a:r>
-              <a:rPr lang="nl-NL" dirty="0" smtClean="0"/>
-              <a:t>()</a:t>
-            </a:r>
-          </a:p>
-          <a:p>
-            <a:r>
-              <a:rPr lang="nl-NL" dirty="0" err="1" smtClean="0"/>
-              <a:t>selectors</a:t>
-            </a:r>
-            <a:endParaRPr lang="nl-NL" dirty="0" smtClean="0"/>
-          </a:p>
-          <a:p>
-            <a:endParaRPr lang="nl-NL" dirty="0"/>
-          </a:p>
-        </p:txBody>
-      </p:sp>
+      <p:pic>
+        <p:nvPicPr>
+          <p:cNvPr id="2" name="Afbeelding 1"/>
+          <p:cNvPicPr>
+            <a:picLocks noChangeAspect="1"/>
+          </p:cNvPicPr>
+          <p:nvPr/>
+        </p:nvPicPr>
+        <p:blipFill>
+          <a:blip r:embed="rId2">
+            <a:extLst>
+              <a:ext uri="{28A0092B-C50C-407E-A947-70E740481C1C}">
+                <a14:useLocalDpi xmlns:a14="http://schemas.microsoft.com/office/drawing/2010/main" val="0"/>
+              </a:ext>
+            </a:extLst>
+          </a:blip>
+          <a:stretch>
+            <a:fillRect/>
+          </a:stretch>
+        </p:blipFill>
+        <p:spPr>
+          <a:xfrm>
+            <a:off x="891987" y="1610004"/>
+            <a:ext cx="9906000" cy="4391025"/>
+          </a:xfrm>
+          <a:prstGeom prst="rect">
+            <a:avLst/>
+          </a:prstGeom>
+        </p:spPr>
+      </p:pic>
     </p:spTree>
     <p:extLst>
       <p:ext uri="{BB962C8B-B14F-4D97-AF65-F5344CB8AC3E}">
-        <p14:creationId xmlns:p14="http://schemas.microsoft.com/office/powerpoint/2010/main" val="2742284615"/>
+        <p14:creationId xmlns:p14="http://schemas.microsoft.com/office/powerpoint/2010/main" val="3739044432"/>
       </p:ext>
     </p:extLst>
   </p:cSld>
@@ -9372,7 +9358,7 @@
       </p:grpSpPr>
       <p:sp>
         <p:nvSpPr>
-          <p:cNvPr id="2" name="Titel 1"/>
+          <p:cNvPr id="4" name="Titel 3"/>
           <p:cNvSpPr>
             <a:spLocks noGrp="1"/>
           </p:cNvSpPr>
@@ -9386,60 +9372,47 @@
           <a:lstStyle/>
           <a:p>
             <a:r>
-              <a:rPr lang="nl-NL" dirty="0" err="1" smtClean="0"/>
-              <a:t>Selectors</a:t>
+              <a:rPr lang="nl-NL" dirty="0" smtClean="0"/>
+              <a:t>DOM Model</a:t>
             </a:r>
             <a:endParaRPr lang="nl-NL" dirty="0"/>
           </a:p>
         </p:txBody>
       </p:sp>
-      <p:sp>
-        <p:nvSpPr>
-          <p:cNvPr id="3" name="Tijdelijke aanduiding voor inhoud 2"/>
-          <p:cNvSpPr>
-            <a:spLocks noGrp="1"/>
-          </p:cNvSpPr>
-          <p:nvPr>
-            <p:ph idx="1"/>
-          </p:nvPr>
-        </p:nvSpPr>
-        <p:spPr/>
-        <p:txBody>
-          <a:bodyPr/>
-          <a:lstStyle/>
-          <a:p>
-            <a:r>
-              <a:rPr lang="nl-NL" dirty="0"/>
-              <a:t>Document. </a:t>
-            </a:r>
-            <a:r>
-              <a:rPr lang="nl-NL" dirty="0" err="1"/>
-              <a:t>getElementsByClassName</a:t>
-            </a:r>
-            <a:r>
-              <a:rPr lang="nl-NL" dirty="0"/>
-              <a:t>()</a:t>
-            </a:r>
-          </a:p>
-          <a:p>
-            <a:r>
-              <a:rPr lang="nl-NL" dirty="0" err="1"/>
-              <a:t>document.querySelectorAll</a:t>
-            </a:r>
-            <a:r>
-              <a:rPr lang="nl-NL" dirty="0"/>
-              <a:t>()</a:t>
-            </a:r>
-          </a:p>
-          <a:p>
-            <a:endParaRPr lang="nl-NL" dirty="0"/>
-          </a:p>
-        </p:txBody>
-      </p:sp>
+      <p:pic>
+        <p:nvPicPr>
+          <p:cNvPr id="3" name="Afbeelding 2"/>
+          <p:cNvPicPr>
+            <a:picLocks noChangeAspect="1"/>
+          </p:cNvPicPr>
+          <p:nvPr/>
+        </p:nvPicPr>
+        <p:blipFill>
+          <a:blip r:embed="rId2">
+            <a:extLst>
+              <a:ext uri="{28A0092B-C50C-407E-A947-70E740481C1C}">
+                <a14:useLocalDpi xmlns:a14="http://schemas.microsoft.com/office/drawing/2010/main" val="0"/>
+              </a:ext>
+            </a:extLst>
+          </a:blip>
+          <a:stretch>
+            <a:fillRect/>
+          </a:stretch>
+        </p:blipFill>
+        <p:spPr>
+          <a:xfrm>
+            <a:off x="1143000" y="1753440"/>
+            <a:ext cx="9906000" cy="4391025"/>
+          </a:xfrm>
+          <a:prstGeom prst="rect">
+            <a:avLst/>
+          </a:prstGeom>
+        </p:spPr>
+      </p:pic>
     </p:spTree>
     <p:extLst>
       <p:ext uri="{BB962C8B-B14F-4D97-AF65-F5344CB8AC3E}">
-        <p14:creationId xmlns:p14="http://schemas.microsoft.com/office/powerpoint/2010/main" val="1313792103"/>
+        <p14:creationId xmlns:p14="http://schemas.microsoft.com/office/powerpoint/2010/main" val="1945810146"/>
       </p:ext>
     </p:extLst>
   </p:cSld>
@@ -9482,24 +9455,12 @@
           <a:lstStyle/>
           <a:p>
             <a:r>
+              <a:rPr lang="nl-NL" dirty="0"/>
+              <a:t>DOM </a:t>
+            </a:r>
+            <a:r>
               <a:rPr lang="nl-NL" dirty="0" err="1"/>
-              <a:t>Vanilla</a:t>
-            </a:r>
-            <a:r>
-              <a:rPr lang="nl-NL" dirty="0"/>
-              <a:t> JS </a:t>
-            </a:r>
-            <a:r>
-              <a:rPr lang="nl-NL" dirty="0" err="1"/>
-              <a:t>vs</a:t>
-            </a:r>
-            <a:r>
-              <a:rPr lang="nl-NL" dirty="0"/>
-              <a:t> </a:t>
-            </a:r>
-            <a:r>
-              <a:rPr lang="nl-NL" dirty="0" err="1"/>
-              <a:t>Jquery</a:t>
+              <a:t>Manipulation</a:t>
             </a:r>
             <a:endParaRPr lang="nl-NL" dirty="0"/>
           </a:p>
@@ -9521,68 +9482,88 @@
           <a:lstStyle/>
           <a:p>
             <a:r>
+              <a:rPr lang="nl-NL" dirty="0" smtClean="0"/>
+              <a:t>Als de DOM eenmaal klaar is met laden kunnen we zaken aanpassen</a:t>
+            </a:r>
+          </a:p>
+          <a:p>
+            <a:r>
+              <a:rPr lang="nl-NL" dirty="0" smtClean="0"/>
+              <a:t>Daarvoor zijn functies nodig om bestaande elementen op te zoeken:</a:t>
+            </a:r>
+          </a:p>
+          <a:p>
+            <a:pPr lvl="1"/>
+            <a:r>
               <a:rPr lang="nl-NL" dirty="0" err="1" smtClean="0"/>
-              <a:t>Vanilla</a:t>
-            </a:r>
-            <a:r>
-              <a:rPr lang="nl-NL" dirty="0" smtClean="0"/>
-              <a:t> JS: javascript zoals de browser het ‘out of </a:t>
-            </a:r>
+              <a:t>Document.getelementbyid</a:t>
+            </a:r>
+            <a:r>
+              <a:rPr lang="nl-NL" dirty="0" smtClean="0"/>
+              <a:t>()</a:t>
+            </a:r>
+          </a:p>
+          <a:p>
+            <a:pPr lvl="1"/>
+            <a:r>
+              <a:rPr lang="nl-NL" dirty="0" err="1"/>
+              <a:t>getElementsByClassName</a:t>
+            </a:r>
+            <a:r>
+              <a:rPr lang="nl-NL" dirty="0"/>
+              <a:t>()</a:t>
+            </a:r>
+          </a:p>
+          <a:p>
+            <a:pPr lvl="1"/>
             <a:r>
               <a:rPr lang="nl-NL" dirty="0" err="1" smtClean="0"/>
-              <a:t>the</a:t>
-            </a:r>
-            <a:r>
-              <a:rPr lang="nl-NL" dirty="0" smtClean="0"/>
-              <a:t> box’ ondersteunt</a:t>
-            </a:r>
-          </a:p>
-          <a:p>
-            <a:r>
-              <a:rPr lang="nl-NL" dirty="0" smtClean="0"/>
-              <a:t>Probleem: niet alle browsers kunnen evenveel</a:t>
-            </a:r>
-          </a:p>
-          <a:p>
-            <a:r>
-              <a:rPr lang="nl-NL" dirty="0" smtClean="0"/>
-              <a:t>Zie bijv. </a:t>
-            </a:r>
-            <a:r>
-              <a:rPr lang="nl-NL" dirty="0" smtClean="0">
-                <a:hlinkClick r:id="rId2"/>
-              </a:rPr>
-              <a:t>http://www.HTML5Test.com</a:t>
-            </a:r>
-            <a:r>
-              <a:rPr lang="nl-NL" dirty="0" smtClean="0"/>
-              <a:t> met verschillende browsers</a:t>
-            </a:r>
-          </a:p>
-          <a:p>
-            <a:r>
-              <a:rPr lang="nl-NL" dirty="0" smtClean="0"/>
-              <a:t>Oplossing:</a:t>
+              <a:t>Document.querySelector</a:t>
+            </a:r>
+            <a:r>
+              <a:rPr lang="nl-NL" dirty="0" smtClean="0"/>
+              <a:t>()</a:t>
             </a:r>
           </a:p>
           <a:p>
             <a:pPr lvl="1"/>
             <a:r>
               <a:rPr lang="nl-NL" dirty="0" err="1" smtClean="0"/>
-              <a:t>Jquery</a:t>
-            </a:r>
+              <a:t>Document.querySelectorAll</a:t>
+            </a:r>
+            <a:r>
+              <a:rPr lang="nl-NL" dirty="0" smtClean="0"/>
+              <a:t>()</a:t>
+            </a:r>
+          </a:p>
+          <a:p>
+            <a:pPr lvl="1"/>
+            <a:endParaRPr lang="nl-NL" dirty="0"/>
+          </a:p>
+          <a:p>
+            <a:r>
+              <a:rPr lang="nl-NL" dirty="0" smtClean="0"/>
+              <a:t>De parameters van deze functies variëren  maar kunnen samengenomen worden in de categorie “</a:t>
+            </a:r>
+            <a:r>
+              <a:rPr lang="nl-NL" dirty="0" err="1" smtClean="0"/>
+              <a:t>selectors</a:t>
+            </a:r>
+            <a:r>
+              <a:rPr lang="nl-NL" dirty="0" smtClean="0"/>
+              <a:t>”.</a:t>
+            </a:r>
+          </a:p>
+          <a:p>
             <a:endParaRPr lang="nl-NL" dirty="0" smtClean="0"/>
           </a:p>
           <a:p>
-            <a:pPr lvl="1"/>
-            <a:r>
-              <a:rPr lang="nl-NL" dirty="0" err="1" smtClean="0"/>
-              <a:t>Webpack</a:t>
-            </a:r>
+            <a:endParaRPr lang="nl-NL" dirty="0"/>
+          </a:p>
+          <a:p>
             <a:endParaRPr lang="nl-NL" dirty="0" smtClean="0"/>
           </a:p>
           <a:p>
-            <a:pPr lvl="1"/>
             <a:endParaRPr lang="nl-NL" dirty="0"/>
           </a:p>
         </p:txBody>
@@ -9590,7 +9571,7 @@
     </p:spTree>
     <p:extLst>
       <p:ext uri="{BB962C8B-B14F-4D97-AF65-F5344CB8AC3E}">
-        <p14:creationId xmlns:p14="http://schemas.microsoft.com/office/powerpoint/2010/main" val="3023698229"/>
+        <p14:creationId xmlns:p14="http://schemas.microsoft.com/office/powerpoint/2010/main" val="2742284615"/>
       </p:ext>
     </p:extLst>
   </p:cSld>
@@ -9619,7 +9600,7 @@
       </p:grpSpPr>
       <p:sp>
         <p:nvSpPr>
-          <p:cNvPr id="4" name="Titel 3"/>
+          <p:cNvPr id="2" name="Titel 1"/>
           <p:cNvSpPr>
             <a:spLocks noGrp="1"/>
           </p:cNvSpPr>
@@ -9633,23 +9614,16 @@
           <a:lstStyle/>
           <a:p>
             <a:r>
-              <a:rPr lang="nl-NL" dirty="0"/>
-              <a:t>CSS </a:t>
-            </a:r>
-            <a:r>
-              <a:rPr lang="nl-NL" dirty="0" err="1"/>
-              <a:t>vs</a:t>
-            </a:r>
-            <a:r>
-              <a:rPr lang="nl-NL" dirty="0"/>
-              <a:t> JS</a:t>
-            </a:r>
-          </a:p>
-        </p:txBody>
-      </p:sp>
-      <p:sp>
-        <p:nvSpPr>
-          <p:cNvPr id="5" name="Tijdelijke aanduiding voor inhoud 4"/>
+              <a:rPr lang="nl-NL" dirty="0" err="1" smtClean="0"/>
+              <a:t>Selectors</a:t>
+            </a:r>
+            <a:endParaRPr lang="nl-NL" dirty="0"/>
+          </a:p>
+        </p:txBody>
+      </p:sp>
+      <p:sp>
+        <p:nvSpPr>
+          <p:cNvPr id="3" name="Tijdelijke aanduiding voor inhoud 2"/>
           <p:cNvSpPr>
             <a:spLocks noGrp="1"/>
           </p:cNvSpPr>
@@ -9659,51 +9633,173 @@
         </p:nvSpPr>
         <p:spPr/>
         <p:txBody>
-          <a:bodyPr/>
+          <a:bodyPr>
+            <a:normAutofit/>
+          </a:bodyPr>
           <a:lstStyle/>
           <a:p>
             <a:r>
-              <a:rPr lang="nl-NL" dirty="0" smtClean="0"/>
-              <a:t>Animaties via CSS of JS/</a:t>
-            </a:r>
-            <a:r>
               <a:rPr lang="nl-NL" dirty="0" err="1" smtClean="0"/>
-              <a:t>jQuery</a:t>
+              <a:t>Selectors</a:t>
+            </a:r>
+            <a:r>
+              <a:rPr lang="nl-NL" dirty="0" smtClean="0"/>
+              <a:t> lijken sterk op hoe je CSS schrijft:</a:t>
+            </a:r>
+          </a:p>
+          <a:p>
+            <a:pPr lvl="1"/>
+            <a:r>
+              <a:rPr lang="nl-NL" dirty="0" smtClean="0"/>
+              <a:t>Alle elementen van een specifiek type: </a:t>
+            </a:r>
+            <a:r>
+              <a:rPr lang="nl-NL" dirty="0" smtClean="0">
+                <a:latin typeface="Courier New" panose="02070309020205020404" pitchFamily="49" charset="0"/>
+                <a:cs typeface="Courier New" panose="02070309020205020404" pitchFamily="49" charset="0"/>
+              </a:rPr>
+              <a:t>UL</a:t>
+            </a:r>
+          </a:p>
+          <a:p>
+            <a:pPr lvl="1"/>
+            <a:r>
+              <a:rPr lang="nl-NL" dirty="0" smtClean="0"/>
+              <a:t>Heeft een element een ID</a:t>
+            </a:r>
+            <a:r>
+              <a:rPr lang="nl-NL" dirty="0" smtClean="0">
+                <a:latin typeface="Courier New" panose="02070309020205020404" pitchFamily="49" charset="0"/>
+                <a:cs typeface="Courier New" panose="02070309020205020404" pitchFamily="49" charset="0"/>
+              </a:rPr>
+              <a:t>: #</a:t>
+            </a:r>
+            <a:r>
+              <a:rPr lang="nl-NL" dirty="0" err="1" smtClean="0">
+                <a:latin typeface="Courier New" panose="02070309020205020404" pitchFamily="49" charset="0"/>
+                <a:cs typeface="Courier New" panose="02070309020205020404" pitchFamily="49" charset="0"/>
+              </a:rPr>
+              <a:t>mijnid</a:t>
+            </a:r>
+            <a:endParaRPr lang="nl-NL" dirty="0" smtClean="0">
+              <a:latin typeface="Courier New" panose="02070309020205020404" pitchFamily="49" charset="0"/>
+              <a:cs typeface="Courier New" panose="02070309020205020404" pitchFamily="49" charset="0"/>
+            </a:endParaRPr>
+          </a:p>
+          <a:p>
+            <a:pPr lvl="1"/>
+            <a:r>
+              <a:rPr lang="nl-NL" dirty="0" smtClean="0"/>
+              <a:t>Heeft een (of meerdere elementen) een class: </a:t>
+            </a:r>
+            <a:r>
+              <a:rPr lang="nl-NL" dirty="0" smtClean="0">
+                <a:latin typeface="Courier New" panose="02070309020205020404" pitchFamily="49" charset="0"/>
+                <a:cs typeface="Courier New" panose="02070309020205020404" pitchFamily="49" charset="0"/>
+              </a:rPr>
+              <a:t>.</a:t>
+            </a:r>
+            <a:r>
+              <a:rPr lang="nl-NL" dirty="0" err="1" smtClean="0">
+                <a:latin typeface="Courier New" panose="02070309020205020404" pitchFamily="49" charset="0"/>
+                <a:cs typeface="Courier New" panose="02070309020205020404" pitchFamily="49" charset="0"/>
+              </a:rPr>
+              <a:t>myclass</a:t>
+            </a:r>
+            <a:endParaRPr lang="nl-NL" dirty="0" smtClean="0">
+              <a:latin typeface="Courier New" panose="02070309020205020404" pitchFamily="49" charset="0"/>
+              <a:cs typeface="Courier New" panose="02070309020205020404" pitchFamily="49" charset="0"/>
+            </a:endParaRPr>
+          </a:p>
+          <a:p>
+            <a:pPr lvl="1"/>
+            <a:r>
+              <a:rPr lang="nl-NL" dirty="0" smtClean="0"/>
+              <a:t>Kiezen tussen classes: </a:t>
+            </a:r>
+            <a:r>
+              <a:rPr lang="nl-NL" dirty="0">
+                <a:latin typeface="Courier New" panose="02070309020205020404" pitchFamily="49" charset="0"/>
+                <a:cs typeface="Courier New" panose="02070309020205020404" pitchFamily="49" charset="0"/>
+              </a:rPr>
+              <a:t>.</a:t>
+            </a:r>
+            <a:r>
+              <a:rPr lang="nl-NL" dirty="0" err="1" smtClean="0">
+                <a:latin typeface="Courier New" panose="02070309020205020404" pitchFamily="49" charset="0"/>
+                <a:cs typeface="Courier New" panose="02070309020205020404" pitchFamily="49" charset="0"/>
+              </a:rPr>
+              <a:t>myclass</a:t>
+            </a:r>
+            <a:r>
+              <a:rPr lang="nl-NL" dirty="0" smtClean="0">
+                <a:latin typeface="Courier New" panose="02070309020205020404" pitchFamily="49" charset="0"/>
+                <a:cs typeface="Courier New" panose="02070309020205020404" pitchFamily="49" charset="0"/>
+              </a:rPr>
+              <a:t>, .</a:t>
+            </a:r>
+            <a:r>
+              <a:rPr lang="nl-NL" dirty="0" err="1" smtClean="0">
+                <a:latin typeface="Courier New" panose="02070309020205020404" pitchFamily="49" charset="0"/>
+                <a:cs typeface="Courier New" panose="02070309020205020404" pitchFamily="49" charset="0"/>
+              </a:rPr>
+              <a:t>anotherclass</a:t>
+            </a:r>
+            <a:endParaRPr lang="nl-NL" dirty="0" smtClean="0"/>
+          </a:p>
+          <a:p>
+            <a:pPr lvl="1"/>
+            <a:r>
+              <a:rPr lang="nl-NL" dirty="0" smtClean="0"/>
+              <a:t>Wil je een ouder-kind relatie opgeven: UL &gt; LI</a:t>
+            </a:r>
+          </a:p>
+          <a:p>
+            <a:pPr lvl="1"/>
+            <a:r>
+              <a:rPr lang="nl-NL" smtClean="0">
+                <a:hlinkClick r:id="rId2"/>
+              </a:rPr>
+              <a:t>https</a:t>
+            </a:r>
+            <a:r>
+              <a:rPr lang="nl-NL" dirty="0">
+                <a:hlinkClick r:id="rId2"/>
+              </a:rPr>
+              <a:t>://</a:t>
+            </a:r>
+            <a:r>
+              <a:rPr lang="nl-NL" dirty="0" smtClean="0">
+                <a:hlinkClick r:id="rId2"/>
+              </a:rPr>
+              <a:t>www.w3schools.com/cssref/css_selectors.asp</a:t>
             </a:r>
             <a:r>
               <a:rPr lang="nl-NL" dirty="0" smtClean="0"/>
               <a:t> </a:t>
             </a:r>
-            <a:r>
-              <a:rPr lang="nl-NL" dirty="0" err="1" smtClean="0"/>
-              <a:t>etc</a:t>
-            </a:r>
             <a:endParaRPr lang="nl-NL" dirty="0" smtClean="0"/>
           </a:p>
           <a:p>
-            <a:r>
-              <a:rPr lang="nl-NL" dirty="0" smtClean="0"/>
-              <a:t>Performance</a:t>
-            </a:r>
-          </a:p>
-          <a:p>
-            <a:r>
-              <a:rPr lang="nl-NL" dirty="0" smtClean="0"/>
-              <a:t>Zie ook in Google Chrome, Developer Tools, “Memory” tab en start </a:t>
-            </a:r>
-            <a:r>
-              <a:rPr lang="nl-NL" dirty="0" err="1" smtClean="0"/>
-              <a:t>profiler</a:t>
-            </a:r>
-            <a:endParaRPr lang="nl-NL" dirty="0" smtClean="0"/>
-          </a:p>
-          <a:p>
-            <a:endParaRPr lang="nl-NL" dirty="0" smtClean="0"/>
-          </a:p>
-          <a:p>
-            <a:endParaRPr lang="nl-NL" dirty="0" smtClean="0"/>
-          </a:p>
-          <a:p>
+            <a:pPr marL="144000" lvl="1" indent="0">
+              <a:buNone/>
+            </a:pPr>
+            <a:r>
+              <a:rPr lang="nl-NL" dirty="0">
+                <a:hlinkClick r:id="rId3"/>
+              </a:rPr>
+              <a:t>https://</a:t>
+            </a:r>
+            <a:r>
+              <a:rPr lang="nl-NL" dirty="0" smtClean="0">
+                <a:hlinkClick r:id="rId3"/>
+              </a:rPr>
+              <a:t>developer.mozilla.org/en-US/docs/Web/API/Document_object_model/Locating_DOM_elements_using_selectors</a:t>
+            </a:r>
+            <a:r>
+              <a:rPr lang="nl-NL" dirty="0" smtClean="0"/>
+              <a:t> </a:t>
+            </a:r>
             <a:endParaRPr lang="nl-NL" dirty="0"/>
           </a:p>
         </p:txBody>
@@ -9711,7 +9807,7 @@
     </p:spTree>
     <p:extLst>
       <p:ext uri="{BB962C8B-B14F-4D97-AF65-F5344CB8AC3E}">
-        <p14:creationId xmlns:p14="http://schemas.microsoft.com/office/powerpoint/2010/main" val="3749883609"/>
+        <p14:creationId xmlns:p14="http://schemas.microsoft.com/office/powerpoint/2010/main" val="1313792103"/>
       </p:ext>
     </p:extLst>
   </p:cSld>
@@ -9740,7 +9836,7 @@
       </p:grpSpPr>
       <p:sp>
         <p:nvSpPr>
-          <p:cNvPr id="2" name="Titel 1"/>
+          <p:cNvPr id="4" name="Titel 3"/>
           <p:cNvSpPr>
             <a:spLocks noGrp="1"/>
           </p:cNvSpPr>
@@ -9754,8 +9850,24 @@
           <a:lstStyle/>
           <a:p>
             <a:r>
-              <a:rPr lang="nl-NL" dirty="0" smtClean="0"/>
-              <a:t>SVG &amp; Canvas</a:t>
+              <a:rPr lang="nl-NL" dirty="0" err="1"/>
+              <a:t>Vanilla</a:t>
+            </a:r>
+            <a:r>
+              <a:rPr lang="nl-NL" dirty="0"/>
+              <a:t> JS </a:t>
+            </a:r>
+            <a:r>
+              <a:rPr lang="nl-NL" dirty="0" err="1"/>
+              <a:t>vs</a:t>
+            </a:r>
+            <a:r>
+              <a:rPr lang="nl-NL" dirty="0"/>
+              <a:t> </a:t>
+            </a:r>
+            <a:r>
+              <a:rPr lang="nl-NL" dirty="0" err="1"/>
+              <a:t>Jquery</a:t>
             </a:r>
             <a:endParaRPr lang="nl-NL" dirty="0"/>
           </a:p>
@@ -9763,7 +9875,7 @@
       </p:sp>
       <p:sp>
         <p:nvSpPr>
-          <p:cNvPr id="3" name="Tijdelijke aanduiding voor inhoud 2"/>
+          <p:cNvPr id="5" name="Tijdelijke aanduiding voor inhoud 4"/>
           <p:cNvSpPr>
             <a:spLocks noGrp="1"/>
           </p:cNvSpPr>
@@ -9777,72 +9889,68 @@
           <a:lstStyle/>
           <a:p>
             <a:r>
-              <a:rPr lang="nl-NL" dirty="0" smtClean="0"/>
-              <a:t>Tekenen van objecten</a:t>
+              <a:rPr lang="nl-NL" dirty="0" err="1" smtClean="0"/>
+              <a:t>Vanilla</a:t>
+            </a:r>
+            <a:r>
+              <a:rPr lang="nl-NL" dirty="0" smtClean="0"/>
+              <a:t> JS: javascript zoals de browser het ‘out of </a:t>
+            </a:r>
+            <a:r>
+              <a:rPr lang="nl-NL" dirty="0" err="1" smtClean="0"/>
+              <a:t>the</a:t>
+            </a:r>
+            <a:r>
+              <a:rPr lang="nl-NL" dirty="0" smtClean="0"/>
+              <a:t> box’ ondersteunt</a:t>
+            </a:r>
+          </a:p>
+          <a:p>
+            <a:r>
+              <a:rPr lang="nl-NL" dirty="0" smtClean="0"/>
+              <a:t>Probleem: niet alle browsers kunnen evenveel</a:t>
+            </a:r>
+          </a:p>
+          <a:p>
+            <a:r>
+              <a:rPr lang="nl-NL" dirty="0" smtClean="0"/>
+              <a:t>Zie bijv. </a:t>
+            </a:r>
+            <a:r>
+              <a:rPr lang="nl-NL" dirty="0" smtClean="0">
+                <a:hlinkClick r:id="rId2"/>
+              </a:rPr>
+              <a:t>http://www.HTML5Test.com</a:t>
+            </a:r>
+            <a:r>
+              <a:rPr lang="nl-NL" dirty="0" smtClean="0"/>
+              <a:t> met verschillende browsers</a:t>
+            </a:r>
+          </a:p>
+          <a:p>
+            <a:r>
+              <a:rPr lang="nl-NL" dirty="0" smtClean="0"/>
+              <a:t>Oplossing:</a:t>
             </a:r>
           </a:p>
           <a:p>
             <a:pPr lvl="1"/>
             <a:r>
-              <a:rPr lang="nl-NL" dirty="0" smtClean="0"/>
-              <a:t>Canvas </a:t>
-            </a:r>
-            <a:r>
-              <a:rPr lang="nl-NL" dirty="0" smtClean="0">
-                <a:sym typeface="Wingdings" panose="05000000000000000000" pitchFamily="2" charset="2"/>
-              </a:rPr>
-              <a:t> javascript</a:t>
-            </a:r>
+              <a:rPr lang="nl-NL" dirty="0" err="1" smtClean="0"/>
+              <a:t>Jquery</a:t>
+            </a:r>
+            <a:endParaRPr lang="nl-NL" dirty="0" smtClean="0"/>
           </a:p>
           <a:p>
             <a:pPr lvl="1"/>
             <a:r>
-              <a:rPr lang="nl-NL" dirty="0" smtClean="0">
-                <a:sym typeface="Wingdings" panose="05000000000000000000" pitchFamily="2" charset="2"/>
-              </a:rPr>
-              <a:t>SVG  </a:t>
-            </a:r>
-            <a:r>
-              <a:rPr lang="nl-NL" dirty="0" err="1" smtClean="0">
-                <a:sym typeface="Wingdings" panose="05000000000000000000" pitchFamily="2" charset="2"/>
-              </a:rPr>
-              <a:t>xml</a:t>
-            </a:r>
-            <a:r>
-              <a:rPr lang="nl-NL" dirty="0" smtClean="0">
-                <a:sym typeface="Wingdings" panose="05000000000000000000" pitchFamily="2" charset="2"/>
-              </a:rPr>
-              <a:t>-tekst door browser opgebouwd</a:t>
-            </a:r>
-          </a:p>
-          <a:p>
-            <a:r>
-              <a:rPr lang="nl-NL" dirty="0" err="1" smtClean="0">
-                <a:sym typeface="Wingdings" panose="05000000000000000000" pitchFamily="2" charset="2"/>
-              </a:rPr>
-              <a:t>Frameworks</a:t>
-            </a:r>
-            <a:endParaRPr lang="nl-NL" dirty="0" smtClean="0">
-              <a:sym typeface="Wingdings" panose="05000000000000000000" pitchFamily="2" charset="2"/>
-            </a:endParaRPr>
-          </a:p>
-          <a:p>
-            <a:r>
-              <a:rPr lang="nl-NL" dirty="0" smtClean="0">
-                <a:sym typeface="Wingdings" panose="05000000000000000000" pitchFamily="2" charset="2"/>
-              </a:rPr>
-              <a:t>Leercurve</a:t>
-            </a:r>
-          </a:p>
-          <a:p>
-            <a:r>
-              <a:rPr lang="nl-NL" dirty="0" smtClean="0">
-                <a:sym typeface="Wingdings" panose="05000000000000000000" pitchFamily="2" charset="2"/>
-              </a:rPr>
-              <a:t>Voorbeelden</a:t>
-            </a:r>
-          </a:p>
-          <a:p>
+              <a:rPr lang="nl-NL" dirty="0" err="1" smtClean="0"/>
+              <a:t>Webpack</a:t>
+            </a:r>
+            <a:endParaRPr lang="nl-NL" dirty="0" smtClean="0"/>
+          </a:p>
+          <a:p>
+            <a:pPr lvl="1"/>
             <a:endParaRPr lang="nl-NL" dirty="0"/>
           </a:p>
         </p:txBody>
@@ -9850,7 +9958,7 @@
     </p:spTree>
     <p:extLst>
       <p:ext uri="{BB962C8B-B14F-4D97-AF65-F5344CB8AC3E}">
-        <p14:creationId xmlns:p14="http://schemas.microsoft.com/office/powerpoint/2010/main" val="2023804850"/>
+        <p14:creationId xmlns:p14="http://schemas.microsoft.com/office/powerpoint/2010/main" val="3023698229"/>
       </p:ext>
     </p:extLst>
   </p:cSld>
@@ -9879,7 +9987,7 @@
       </p:grpSpPr>
       <p:sp>
         <p:nvSpPr>
-          <p:cNvPr id="2" name="Titel 1"/>
+          <p:cNvPr id="4" name="Titel 3"/>
           <p:cNvSpPr>
             <a:spLocks noGrp="1"/>
           </p:cNvSpPr>
@@ -9893,16 +10001,23 @@
           <a:lstStyle/>
           <a:p>
             <a:r>
-              <a:rPr lang="nl-NL" dirty="0" smtClean="0"/>
-              <a:t>Templating</a:t>
-            </a:r>
-            <a:endParaRPr lang="nl-NL" dirty="0"/>
-          </a:p>
-        </p:txBody>
-      </p:sp>
-      <p:sp>
-        <p:nvSpPr>
-          <p:cNvPr id="3" name="Tijdelijke aanduiding voor inhoud 2"/>
+              <a:rPr lang="nl-NL" dirty="0"/>
+              <a:t>CSS </a:t>
+            </a:r>
+            <a:r>
+              <a:rPr lang="nl-NL" dirty="0" err="1"/>
+              <a:t>vs</a:t>
+            </a:r>
+            <a:r>
+              <a:rPr lang="nl-NL" dirty="0"/>
+              <a:t> JS</a:t>
+            </a:r>
+          </a:p>
+        </p:txBody>
+      </p:sp>
+      <p:sp>
+        <p:nvSpPr>
+          <p:cNvPr id="5" name="Tijdelijke aanduiding voor inhoud 4"/>
           <p:cNvSpPr>
             <a:spLocks noGrp="1"/>
           </p:cNvSpPr>
@@ -9915,14 +10030,56 @@
           <a:bodyPr/>
           <a:lstStyle/>
           <a:p>
-            <a:endParaRPr lang="nl-NL"/>
+            <a:r>
+              <a:rPr lang="nl-NL" dirty="0" smtClean="0"/>
+              <a:t>Animaties via CSS of JS/</a:t>
+            </a:r>
+            <a:r>
+              <a:rPr lang="nl-NL" dirty="0" err="1" smtClean="0"/>
+              <a:t>jQuery</a:t>
+            </a:r>
+            <a:r>
+              <a:rPr lang="nl-NL" dirty="0" smtClean="0"/>
+              <a:t> </a:t>
+            </a:r>
+            <a:r>
+              <a:rPr lang="nl-NL" dirty="0" err="1" smtClean="0"/>
+              <a:t>etc</a:t>
+            </a:r>
+            <a:endParaRPr lang="nl-NL" dirty="0" smtClean="0"/>
+          </a:p>
+          <a:p>
+            <a:r>
+              <a:rPr lang="nl-NL" dirty="0" smtClean="0"/>
+              <a:t>Performance</a:t>
+            </a:r>
+          </a:p>
+          <a:p>
+            <a:r>
+              <a:rPr lang="nl-NL" dirty="0" smtClean="0"/>
+              <a:t>Zie ook in Google Chrome, Developer Tools, “Memory” tab en start </a:t>
+            </a:r>
+            <a:r>
+              <a:rPr lang="nl-NL" dirty="0" err="1" smtClean="0"/>
+              <a:t>profiler</a:t>
+            </a:r>
+            <a:endParaRPr lang="nl-NL" dirty="0" smtClean="0"/>
+          </a:p>
+          <a:p>
+            <a:endParaRPr lang="nl-NL" dirty="0" smtClean="0"/>
+          </a:p>
+          <a:p>
+            <a:endParaRPr lang="nl-NL" dirty="0" smtClean="0"/>
+          </a:p>
+          <a:p>
+            <a:endParaRPr lang="nl-NL" dirty="0"/>
           </a:p>
         </p:txBody>
       </p:sp>
     </p:spTree>
     <p:extLst>
       <p:ext uri="{BB962C8B-B14F-4D97-AF65-F5344CB8AC3E}">
-        <p14:creationId xmlns:p14="http://schemas.microsoft.com/office/powerpoint/2010/main" val="3805239925"/>
+        <p14:creationId xmlns:p14="http://schemas.microsoft.com/office/powerpoint/2010/main" val="3749883609"/>
       </p:ext>
     </p:extLst>
   </p:cSld>
@@ -9951,7 +10108,7 @@
       </p:grpSpPr>
       <p:sp>
         <p:nvSpPr>
-          <p:cNvPr id="4" name="Titel 3"/>
+          <p:cNvPr id="2" name="Titel 1"/>
           <p:cNvSpPr>
             <a:spLocks noGrp="1"/>
           </p:cNvSpPr>
@@ -9966,7 +10123,7 @@
           <a:p>
             <a:r>
               <a:rPr lang="nl-NL" dirty="0" smtClean="0"/>
-              <a:t>Advanced Topics</a:t>
+              <a:t>SVG &amp; Canvas</a:t>
             </a:r>
             <a:endParaRPr lang="nl-NL" dirty="0"/>
           </a:p>
@@ -9974,65 +10131,84 @@
       </p:sp>
       <p:sp>
         <p:nvSpPr>
-          <p:cNvPr id="5" name="Tijdelijke aanduiding voor tekst 4"/>
-          <p:cNvSpPr>
-            <a:spLocks noGrp="1"/>
-          </p:cNvSpPr>
-          <p:nvPr>
-            <p:ph type="body" sz="quarter" idx="10"/>
-          </p:nvPr>
-        </p:nvSpPr>
-        <p:spPr>
-          <a:xfrm>
-            <a:off x="6096000" y="3483864"/>
-            <a:ext cx="4675200" cy="2938707"/>
-          </a:xfrm>
-        </p:spPr>
+          <p:cNvPr id="3" name="Tijdelijke aanduiding voor inhoud 2"/>
+          <p:cNvSpPr>
+            <a:spLocks noGrp="1"/>
+          </p:cNvSpPr>
+          <p:nvPr>
+            <p:ph idx="1"/>
+          </p:nvPr>
+        </p:nvSpPr>
+        <p:spPr/>
         <p:txBody>
           <a:bodyPr/>
           <a:lstStyle/>
           <a:p>
             <a:r>
               <a:rPr lang="nl-NL" dirty="0" smtClean="0"/>
-              <a:t>Data retrieval</a:t>
-            </a:r>
-          </a:p>
-          <a:p>
-            <a:r>
-              <a:rPr lang="nl-NL" dirty="0" smtClean="0"/>
-              <a:t>Data </a:t>
-            </a:r>
-            <a:r>
-              <a:rPr lang="nl-NL" dirty="0" err="1" smtClean="0"/>
-              <a:t>manipulation</a:t>
-            </a:r>
-            <a:endParaRPr lang="nl-NL" dirty="0" smtClean="0"/>
-          </a:p>
-          <a:p>
-            <a:r>
-              <a:rPr lang="nl-NL" dirty="0" smtClean="0"/>
-              <a:t>Data </a:t>
-            </a:r>
-            <a:r>
-              <a:rPr lang="nl-NL" dirty="0" err="1" smtClean="0"/>
-              <a:t>presentation</a:t>
-            </a:r>
-            <a:endParaRPr lang="nl-NL" dirty="0" smtClean="0"/>
-          </a:p>
-          <a:p>
-            <a:r>
-              <a:rPr lang="nl-NL" dirty="0" err="1" smtClean="0"/>
-              <a:t>Promises</a:t>
-            </a:r>
-            <a:r>
-              <a:rPr lang="nl-NL" dirty="0" smtClean="0"/>
-              <a:t> / </a:t>
-            </a:r>
-            <a:r>
-              <a:rPr lang="nl-NL" dirty="0" err="1" smtClean="0"/>
-              <a:t>Async</a:t>
-            </a:r>
-            <a:endParaRPr lang="nl-NL" dirty="0" smtClean="0"/>
+              <a:t>Tekenen van objecten</a:t>
+            </a:r>
+          </a:p>
+          <a:p>
+            <a:pPr lvl="1"/>
+            <a:r>
+              <a:rPr lang="nl-NL" dirty="0" smtClean="0"/>
+              <a:t>Canvas </a:t>
+            </a:r>
+            <a:r>
+              <a:rPr lang="nl-NL" dirty="0" smtClean="0">
+                <a:sym typeface="Wingdings" panose="05000000000000000000" pitchFamily="2" charset="2"/>
+              </a:rPr>
+              <a:t> javascript</a:t>
+            </a:r>
+          </a:p>
+          <a:p>
+            <a:pPr lvl="1"/>
+            <a:r>
+              <a:rPr lang="nl-NL" dirty="0" smtClean="0">
+                <a:sym typeface="Wingdings" panose="05000000000000000000" pitchFamily="2" charset="2"/>
+              </a:rPr>
+              <a:t>SVG  </a:t>
+            </a:r>
+            <a:r>
+              <a:rPr lang="nl-NL" dirty="0" err="1" smtClean="0">
+                <a:sym typeface="Wingdings" panose="05000000000000000000" pitchFamily="2" charset="2"/>
+              </a:rPr>
+              <a:t>xml</a:t>
+            </a:r>
+            <a:r>
+              <a:rPr lang="nl-NL" dirty="0" smtClean="0">
+                <a:sym typeface="Wingdings" panose="05000000000000000000" pitchFamily="2" charset="2"/>
+              </a:rPr>
+              <a:t>-tekst door browser opgebouwd</a:t>
+            </a:r>
+          </a:p>
+          <a:p>
+            <a:r>
+              <a:rPr lang="nl-NL" dirty="0" err="1" smtClean="0">
+                <a:sym typeface="Wingdings" panose="05000000000000000000" pitchFamily="2" charset="2"/>
+              </a:rPr>
+              <a:t>Frameworks</a:t>
+            </a:r>
+            <a:endParaRPr lang="nl-NL" dirty="0" smtClean="0">
+              <a:sym typeface="Wingdings" panose="05000000000000000000" pitchFamily="2" charset="2"/>
+            </a:endParaRPr>
+          </a:p>
+          <a:p>
+            <a:r>
+              <a:rPr lang="nl-NL" dirty="0" smtClean="0">
+                <a:sym typeface="Wingdings" panose="05000000000000000000" pitchFamily="2" charset="2"/>
+              </a:rPr>
+              <a:t>Leercurve</a:t>
+            </a:r>
+          </a:p>
+          <a:p>
+            <a:r>
+              <a:rPr lang="nl-NL" dirty="0" smtClean="0">
+                <a:sym typeface="Wingdings" panose="05000000000000000000" pitchFamily="2" charset="2"/>
+              </a:rPr>
+              <a:t>Voorbeelden</a:t>
+            </a:r>
           </a:p>
           <a:p>
             <a:endParaRPr lang="nl-NL" dirty="0"/>
@@ -10042,7 +10218,7 @@
     </p:spTree>
     <p:extLst>
       <p:ext uri="{BB962C8B-B14F-4D97-AF65-F5344CB8AC3E}">
-        <p14:creationId xmlns:p14="http://schemas.microsoft.com/office/powerpoint/2010/main" val="4052397656"/>
+        <p14:creationId xmlns:p14="http://schemas.microsoft.com/office/powerpoint/2010/main" val="2023804850"/>
       </p:ext>
     </p:extLst>
   </p:cSld>
@@ -10192,7 +10368,7 @@
       </p:grpSpPr>
       <p:sp>
         <p:nvSpPr>
-          <p:cNvPr id="4" name="Titel 3"/>
+          <p:cNvPr id="2" name="Titel 1"/>
           <p:cNvSpPr>
             <a:spLocks noGrp="1"/>
           </p:cNvSpPr>
@@ -10207,7 +10383,7 @@
           <a:p>
             <a:r>
               <a:rPr lang="nl-NL" dirty="0" smtClean="0"/>
-              <a:t>Data Retrieval</a:t>
+              <a:t>Templating</a:t>
             </a:r>
             <a:endParaRPr lang="nl-NL" dirty="0"/>
           </a:p>
@@ -10215,7 +10391,7 @@
       </p:sp>
       <p:sp>
         <p:nvSpPr>
-          <p:cNvPr id="5" name="Tijdelijke aanduiding voor inhoud 4"/>
+          <p:cNvPr id="3" name="Tijdelijke aanduiding voor inhoud 2"/>
           <p:cNvSpPr>
             <a:spLocks noGrp="1"/>
           </p:cNvSpPr>
@@ -10235,7 +10411,7 @@
     </p:spTree>
     <p:extLst>
       <p:ext uri="{BB962C8B-B14F-4D97-AF65-F5344CB8AC3E}">
-        <p14:creationId xmlns:p14="http://schemas.microsoft.com/office/powerpoint/2010/main" val="3776559738"/>
+        <p14:creationId xmlns:p14="http://schemas.microsoft.com/office/powerpoint/2010/main" val="3805239925"/>
       </p:ext>
     </p:extLst>
   </p:cSld>
@@ -10264,7 +10440,7 @@
       </p:grpSpPr>
       <p:sp>
         <p:nvSpPr>
-          <p:cNvPr id="2" name="Titel 1"/>
+          <p:cNvPr id="4" name="Titel 3"/>
           <p:cNvSpPr>
             <a:spLocks noGrp="1"/>
           </p:cNvSpPr>
@@ -10279,11 +10455,7 @@
           <a:p>
             <a:r>
               <a:rPr lang="nl-NL" dirty="0" smtClean="0"/>
-              <a:t>Data </a:t>
-            </a:r>
-            <a:r>
-              <a:rPr lang="nl-NL" dirty="0" err="1" smtClean="0"/>
-              <a:t>Manipulation</a:t>
+              <a:t>Advanced Topics</a:t>
             </a:r>
             <a:endParaRPr lang="nl-NL" dirty="0"/>
           </a:p>
@@ -10291,27 +10463,75 @@
       </p:sp>
       <p:sp>
         <p:nvSpPr>
-          <p:cNvPr id="3" name="Tijdelijke aanduiding voor inhoud 2"/>
-          <p:cNvSpPr>
-            <a:spLocks noGrp="1"/>
-          </p:cNvSpPr>
-          <p:nvPr>
-            <p:ph idx="1"/>
-          </p:nvPr>
-        </p:nvSpPr>
-        <p:spPr/>
+          <p:cNvPr id="5" name="Tijdelijke aanduiding voor tekst 4"/>
+          <p:cNvSpPr>
+            <a:spLocks noGrp="1"/>
+          </p:cNvSpPr>
+          <p:nvPr>
+            <p:ph type="body" sz="quarter" idx="10"/>
+          </p:nvPr>
+        </p:nvSpPr>
+        <p:spPr>
+          <a:xfrm>
+            <a:off x="6096000" y="3483864"/>
+            <a:ext cx="4675200" cy="2938707"/>
+          </a:xfrm>
+        </p:spPr>
         <p:txBody>
           <a:bodyPr/>
           <a:lstStyle/>
           <a:p>
-            <a:endParaRPr lang="nl-NL"/>
+            <a:r>
+              <a:rPr lang="nl-NL" dirty="0" smtClean="0"/>
+              <a:t>Data retrieval</a:t>
+            </a:r>
+          </a:p>
+          <a:p>
+            <a:r>
+              <a:rPr lang="nl-NL" dirty="0" smtClean="0"/>
+              <a:t>Data </a:t>
+            </a:r>
+            <a:r>
+              <a:rPr lang="nl-NL" dirty="0" err="1" smtClean="0"/>
+              <a:t>manipulation</a:t>
+            </a:r>
+            <a:endParaRPr lang="nl-NL" dirty="0" smtClean="0"/>
+          </a:p>
+          <a:p>
+            <a:r>
+              <a:rPr lang="nl-NL" dirty="0" smtClean="0"/>
+              <a:t>Data </a:t>
+            </a:r>
+            <a:r>
+              <a:rPr lang="nl-NL" dirty="0" err="1" smtClean="0"/>
+              <a:t>presentation</a:t>
+            </a:r>
+            <a:endParaRPr lang="nl-NL" dirty="0" smtClean="0"/>
+          </a:p>
+          <a:p>
+            <a:r>
+              <a:rPr lang="nl-NL" dirty="0" err="1" smtClean="0"/>
+              <a:t>Promises</a:t>
+            </a:r>
+            <a:r>
+              <a:rPr lang="nl-NL" dirty="0" smtClean="0"/>
+              <a:t> / </a:t>
+            </a:r>
+            <a:r>
+              <a:rPr lang="nl-NL" dirty="0" err="1" smtClean="0"/>
+              <a:t>Async</a:t>
+            </a:r>
+            <a:endParaRPr lang="nl-NL" dirty="0" smtClean="0"/>
+          </a:p>
+          <a:p>
+            <a:endParaRPr lang="nl-NL" dirty="0"/>
           </a:p>
         </p:txBody>
       </p:sp>
     </p:spTree>
     <p:extLst>
       <p:ext uri="{BB962C8B-B14F-4D97-AF65-F5344CB8AC3E}">
-        <p14:creationId xmlns:p14="http://schemas.microsoft.com/office/powerpoint/2010/main" val="3314037050"/>
+        <p14:creationId xmlns:p14="http://schemas.microsoft.com/office/powerpoint/2010/main" val="4052397656"/>
       </p:ext>
     </p:extLst>
   </p:cSld>
@@ -10340,6 +10560,154 @@
       </p:grpSpPr>
       <p:sp>
         <p:nvSpPr>
+          <p:cNvPr id="4" name="Titel 3"/>
+          <p:cNvSpPr>
+            <a:spLocks noGrp="1"/>
+          </p:cNvSpPr>
+          <p:nvPr>
+            <p:ph type="title"/>
+          </p:nvPr>
+        </p:nvSpPr>
+        <p:spPr/>
+        <p:txBody>
+          <a:bodyPr/>
+          <a:lstStyle/>
+          <a:p>
+            <a:r>
+              <a:rPr lang="nl-NL" dirty="0" smtClean="0"/>
+              <a:t>Data Retrieval</a:t>
+            </a:r>
+            <a:endParaRPr lang="nl-NL" dirty="0"/>
+          </a:p>
+        </p:txBody>
+      </p:sp>
+      <p:sp>
+        <p:nvSpPr>
+          <p:cNvPr id="5" name="Tijdelijke aanduiding voor inhoud 4"/>
+          <p:cNvSpPr>
+            <a:spLocks noGrp="1"/>
+          </p:cNvSpPr>
+          <p:nvPr>
+            <p:ph idx="1"/>
+          </p:nvPr>
+        </p:nvSpPr>
+        <p:spPr/>
+        <p:txBody>
+          <a:bodyPr/>
+          <a:lstStyle/>
+          <a:p>
+            <a:endParaRPr lang="nl-NL"/>
+          </a:p>
+        </p:txBody>
+      </p:sp>
+    </p:spTree>
+    <p:extLst>
+      <p:ext uri="{BB962C8B-B14F-4D97-AF65-F5344CB8AC3E}">
+        <p14:creationId xmlns:p14="http://schemas.microsoft.com/office/powerpoint/2010/main" val="3776559738"/>
+      </p:ext>
+    </p:extLst>
+  </p:cSld>
+  <p:clrMapOvr>
+    <a:masterClrMapping/>
+  </p:clrMapOvr>
+</p:sld>
+</file>
+
+<file path=ppt/slides/slide33.xml><?xml version="1.0" encoding="utf-8"?>
+<p:sld xmlns:a="http://schemas.openxmlformats.org/drawingml/2006/main" xmlns:r="http://schemas.openxmlformats.org/officeDocument/2006/relationships" xmlns:p="http://schemas.openxmlformats.org/presentationml/2006/main">
+  <p:cSld>
+    <p:spTree>
+      <p:nvGrpSpPr>
+        <p:cNvPr id="1" name=""/>
+        <p:cNvGrpSpPr/>
+        <p:nvPr/>
+      </p:nvGrpSpPr>
+      <p:grpSpPr>
+        <a:xfrm>
+          <a:off x="0" y="0"/>
+          <a:ext cx="0" cy="0"/>
+          <a:chOff x="0" y="0"/>
+          <a:chExt cx="0" cy="0"/>
+        </a:xfrm>
+      </p:grpSpPr>
+      <p:sp>
+        <p:nvSpPr>
+          <p:cNvPr id="2" name="Titel 1"/>
+          <p:cNvSpPr>
+            <a:spLocks noGrp="1"/>
+          </p:cNvSpPr>
+          <p:nvPr>
+            <p:ph type="title"/>
+          </p:nvPr>
+        </p:nvSpPr>
+        <p:spPr/>
+        <p:txBody>
+          <a:bodyPr/>
+          <a:lstStyle/>
+          <a:p>
+            <a:r>
+              <a:rPr lang="nl-NL" dirty="0" smtClean="0"/>
+              <a:t>Data </a:t>
+            </a:r>
+            <a:r>
+              <a:rPr lang="nl-NL" dirty="0" err="1" smtClean="0"/>
+              <a:t>Manipulation</a:t>
+            </a:r>
+            <a:endParaRPr lang="nl-NL" dirty="0"/>
+          </a:p>
+        </p:txBody>
+      </p:sp>
+      <p:sp>
+        <p:nvSpPr>
+          <p:cNvPr id="3" name="Tijdelijke aanduiding voor inhoud 2"/>
+          <p:cNvSpPr>
+            <a:spLocks noGrp="1"/>
+          </p:cNvSpPr>
+          <p:nvPr>
+            <p:ph idx="1"/>
+          </p:nvPr>
+        </p:nvSpPr>
+        <p:spPr/>
+        <p:txBody>
+          <a:bodyPr/>
+          <a:lstStyle/>
+          <a:p>
+            <a:endParaRPr lang="nl-NL"/>
+          </a:p>
+        </p:txBody>
+      </p:sp>
+    </p:spTree>
+    <p:extLst>
+      <p:ext uri="{BB962C8B-B14F-4D97-AF65-F5344CB8AC3E}">
+        <p14:creationId xmlns:p14="http://schemas.microsoft.com/office/powerpoint/2010/main" val="3314037050"/>
+      </p:ext>
+    </p:extLst>
+  </p:cSld>
+  <p:clrMapOvr>
+    <a:masterClrMapping/>
+  </p:clrMapOvr>
+</p:sld>
+</file>
+
+<file path=ppt/slides/slide34.xml><?xml version="1.0" encoding="utf-8"?>
+<p:sld xmlns:a="http://schemas.openxmlformats.org/drawingml/2006/main" xmlns:r="http://schemas.openxmlformats.org/officeDocument/2006/relationships" xmlns:p="http://schemas.openxmlformats.org/presentationml/2006/main">
+  <p:cSld>
+    <p:spTree>
+      <p:nvGrpSpPr>
+        <p:cNvPr id="1" name=""/>
+        <p:cNvGrpSpPr/>
+        <p:nvPr/>
+      </p:nvGrpSpPr>
+      <p:grpSpPr>
+        <a:xfrm>
+          <a:off x="0" y="0"/>
+          <a:ext cx="0" cy="0"/>
+          <a:chOff x="0" y="0"/>
+          <a:chExt cx="0" cy="0"/>
+        </a:xfrm>
+      </p:grpSpPr>
+      <p:sp>
+        <p:nvSpPr>
           <p:cNvPr id="2" name="Titel 1"/>
           <p:cNvSpPr>
             <a:spLocks noGrp="1"/>
@@ -10401,7 +10769,7 @@
 </p:sld>
 </file>
 
-<file path=ppt/slides/slide33.xml><?xml version="1.0" encoding="utf-8"?>
+<file path=ppt/slides/slide35.xml><?xml version="1.0" encoding="utf-8"?>
 <p:sld xmlns:a="http://schemas.openxmlformats.org/drawingml/2006/main" xmlns:r="http://schemas.openxmlformats.org/officeDocument/2006/relationships" xmlns:p="http://schemas.openxmlformats.org/presentationml/2006/main">
   <p:cSld>
     <p:spTree>

</xml_diff>

<commit_message>
updated PowerPoint for createElement and querySelectors
</commit_message>
<xml_diff>
--- a/Presentatie/Front-End Development.pptx
+++ b/Presentatie/Front-End Development.pptx
@@ -5,7 +5,7 @@
     <p:sldMasterId id="2147483660" r:id="rId1"/>
   </p:sldMasterIdLst>
   <p:notesMasterIdLst>
-    <p:notesMasterId r:id="rId37"/>
+    <p:notesMasterId r:id="rId38"/>
   </p:notesMasterIdLst>
   <p:sldIdLst>
     <p:sldId id="256" r:id="rId2"/>
@@ -34,15 +34,16 @@
     <p:sldId id="290" r:id="rId25"/>
     <p:sldId id="264" r:id="rId26"/>
     <p:sldId id="267" r:id="rId27"/>
-    <p:sldId id="265" r:id="rId28"/>
-    <p:sldId id="266" r:id="rId29"/>
-    <p:sldId id="268" r:id="rId30"/>
-    <p:sldId id="269" r:id="rId31"/>
-    <p:sldId id="270" r:id="rId32"/>
-    <p:sldId id="271" r:id="rId33"/>
-    <p:sldId id="272" r:id="rId34"/>
-    <p:sldId id="273" r:id="rId35"/>
-    <p:sldId id="274" r:id="rId36"/>
+    <p:sldId id="291" r:id="rId28"/>
+    <p:sldId id="265" r:id="rId29"/>
+    <p:sldId id="266" r:id="rId30"/>
+    <p:sldId id="268" r:id="rId31"/>
+    <p:sldId id="269" r:id="rId32"/>
+    <p:sldId id="270" r:id="rId33"/>
+    <p:sldId id="271" r:id="rId34"/>
+    <p:sldId id="272" r:id="rId35"/>
+    <p:sldId id="273" r:id="rId36"/>
+    <p:sldId id="274" r:id="rId37"/>
   </p:sldIdLst>
   <p:sldSz cx="12192000" cy="6858000"/>
   <p:notesSz cx="6858000" cy="9144000"/>
@@ -176,6 +177,7 @@
             <p14:sldId id="290"/>
             <p14:sldId id="264"/>
             <p14:sldId id="267"/>
+            <p14:sldId id="291"/>
             <p14:sldId id="265"/>
             <p14:sldId id="266"/>
             <p14:sldId id="268"/>
@@ -795,7 +797,7 @@
           <a:p>
             <a:fld id="{A9AC6ED0-D734-4939-9338-F1A2206B4A78}" type="slidenum">
               <a:rPr lang="nl-NL" smtClean="0"/>
-              <a:t>35</a:t>
+              <a:t>36</a:t>
             </a:fld>
             <a:endParaRPr lang="nl-NL"/>
           </a:p>
@@ -9253,6 +9255,13 @@
   <p:clrMapOvr>
     <a:masterClrMapping/>
   </p:clrMapOvr>
+  <p:timing>
+    <p:tnLst>
+      <p:par>
+        <p:cTn id="1" dur="indefinite" restart="never" nodeType="tmRoot"/>
+      </p:par>
+    </p:tnLst>
+  </p:timing>
 </p:sld>
 </file>
 
@@ -9336,6 +9345,13 @@
   <p:clrMapOvr>
     <a:masterClrMapping/>
   </p:clrMapOvr>
+  <p:timing>
+    <p:tnLst>
+      <p:par>
+        <p:cTn id="1" dur="indefinite" restart="never" nodeType="tmRoot"/>
+      </p:par>
+    </p:tnLst>
+  </p:timing>
 </p:sld>
 </file>
 
@@ -9419,6 +9435,13 @@
   <p:clrMapOvr>
     <a:masterClrMapping/>
   </p:clrMapOvr>
+  <p:timing>
+    <p:tnLst>
+      <p:par>
+        <p:cTn id="1" dur="indefinite" restart="never" nodeType="tmRoot"/>
+      </p:par>
+    </p:tnLst>
+  </p:timing>
 </p:sld>
 </file>
 
@@ -9496,7 +9519,7 @@
             <a:pPr lvl="1"/>
             <a:r>
               <a:rPr lang="nl-NL" dirty="0" err="1" smtClean="0"/>
-              <a:t>Document.getelementbyid</a:t>
+              <a:t>document.getElementById</a:t>
             </a:r>
             <a:r>
               <a:rPr lang="nl-NL" dirty="0" smtClean="0"/>
@@ -9507,18 +9530,27 @@
             <a:pPr lvl="1"/>
             <a:r>
               <a:rPr lang="nl-NL" dirty="0" err="1"/>
-              <a:t>getElementsByClassName</a:t>
-            </a:r>
-            <a:r>
-              <a:rPr lang="nl-NL" dirty="0"/>
+              <a:t>d</a:t>
+            </a:r>
+            <a:r>
+              <a:rPr lang="nl-NL" dirty="0" err="1" smtClean="0"/>
+              <a:t>ocument.getElementsByClassName</a:t>
+            </a:r>
+            <a:r>
+              <a:rPr lang="nl-NL" dirty="0" smtClean="0"/>
               <a:t>()</a:t>
             </a:r>
+            <a:endParaRPr lang="nl-NL" dirty="0"/>
           </a:p>
           <a:p>
             <a:pPr lvl="1"/>
             <a:r>
+              <a:rPr lang="nl-NL" dirty="0" err="1"/>
+              <a:t>d</a:t>
+            </a:r>
+            <a:r>
               <a:rPr lang="nl-NL" dirty="0" err="1" smtClean="0"/>
-              <a:t>Document.querySelector</a:t>
+              <a:t>ocument.querySelector</a:t>
             </a:r>
             <a:r>
               <a:rPr lang="nl-NL" dirty="0" smtClean="0"/>
@@ -9528,8 +9560,12 @@
           <a:p>
             <a:pPr lvl="1"/>
             <a:r>
+              <a:rPr lang="nl-NL" dirty="0" err="1"/>
+              <a:t>d</a:t>
+            </a:r>
+            <a:r>
               <a:rPr lang="nl-NL" dirty="0" err="1" smtClean="0"/>
-              <a:t>Document.querySelectorAll</a:t>
+              <a:t>ocument.querySelectorAll</a:t>
             </a:r>
             <a:r>
               <a:rPr lang="nl-NL" dirty="0" smtClean="0"/>
@@ -9538,6 +9574,14 @@
           </a:p>
           <a:p>
             <a:pPr lvl="1"/>
+            <a:r>
+              <a:rPr lang="nl-NL" dirty="0" err="1" smtClean="0"/>
+              <a:t>document.documentElement</a:t>
+            </a:r>
+            <a:r>
+              <a:rPr lang="nl-NL" dirty="0" smtClean="0"/>
+              <a:t> (let op; geen functie!)</a:t>
+            </a:r>
             <a:endParaRPr lang="nl-NL" dirty="0"/>
           </a:p>
           <a:p>
@@ -9578,6 +9622,13 @@
   <p:clrMapOvr>
     <a:masterClrMapping/>
   </p:clrMapOvr>
+  <p:timing>
+    <p:tnLst>
+      <p:par>
+        <p:cTn id="1" dur="indefinite" restart="never" nodeType="tmRoot"/>
+      </p:par>
+    </p:tnLst>
+  </p:timing>
 </p:sld>
 </file>
 
@@ -9757,7 +9808,7 @@
           <a:p>
             <a:pPr lvl="1"/>
             <a:r>
-              <a:rPr lang="nl-NL" smtClean="0">
+              <a:rPr lang="nl-NL" dirty="0" smtClean="0">
                 <a:hlinkClick r:id="rId2"/>
               </a:rPr>
               <a:t>https</a:t>
@@ -9778,7 +9829,6 @@
               <a:rPr lang="nl-NL" dirty="0" smtClean="0"/>
               <a:t> </a:t>
             </a:r>
-            <a:endParaRPr lang="nl-NL" dirty="0" smtClean="0"/>
           </a:p>
           <a:p>
             <a:pPr marL="144000" lvl="1" indent="0">
@@ -9814,6 +9864,13 @@
   <p:clrMapOvr>
     <a:masterClrMapping/>
   </p:clrMapOvr>
+  <p:timing>
+    <p:tnLst>
+      <p:par>
+        <p:cTn id="1" dur="indefinite" restart="never" nodeType="tmRoot"/>
+      </p:par>
+    </p:tnLst>
+  </p:timing>
 </p:sld>
 </file>
 
@@ -9836,7 +9893,7 @@
       </p:grpSpPr>
       <p:sp>
         <p:nvSpPr>
-          <p:cNvPr id="4" name="Titel 3"/>
+          <p:cNvPr id="2" name="Titel 1"/>
           <p:cNvSpPr>
             <a:spLocks noGrp="1"/>
           </p:cNvSpPr>
@@ -9850,24 +9907,8 @@
           <a:lstStyle/>
           <a:p>
             <a:r>
-              <a:rPr lang="nl-NL" dirty="0" err="1"/>
-              <a:t>Vanilla</a:t>
-            </a:r>
-            <a:r>
-              <a:rPr lang="nl-NL" dirty="0"/>
-              <a:t> JS </a:t>
-            </a:r>
-            <a:r>
-              <a:rPr lang="nl-NL" dirty="0" err="1"/>
-              <a:t>vs</a:t>
-            </a:r>
-            <a:r>
-              <a:rPr lang="nl-NL" dirty="0"/>
-              <a:t> </a:t>
-            </a:r>
-            <a:r>
-              <a:rPr lang="nl-NL" dirty="0" err="1"/>
-              <a:t>Jquery</a:t>
+              <a:rPr lang="nl-NL" dirty="0" smtClean="0"/>
+              <a:t>Het maken van een nieuw item</a:t>
             </a:r>
             <a:endParaRPr lang="nl-NL" dirty="0"/>
           </a:p>
@@ -9875,7 +9916,7 @@
       </p:sp>
       <p:sp>
         <p:nvSpPr>
-          <p:cNvPr id="5" name="Tijdelijke aanduiding voor inhoud 4"/>
+          <p:cNvPr id="3" name="Tijdelijke aanduiding voor inhoud 2"/>
           <p:cNvSpPr>
             <a:spLocks noGrp="1"/>
           </p:cNvSpPr>
@@ -9889,76 +9930,68 @@
           <a:lstStyle/>
           <a:p>
             <a:r>
-              <a:rPr lang="nl-NL" dirty="0" err="1" smtClean="0"/>
-              <a:t>Vanilla</a:t>
-            </a:r>
-            <a:r>
-              <a:rPr lang="nl-NL" dirty="0" smtClean="0"/>
-              <a:t> JS: javascript zoals de browser het ‘out of </a:t>
-            </a:r>
-            <a:r>
-              <a:rPr lang="nl-NL" dirty="0" err="1" smtClean="0"/>
-              <a:t>the</a:t>
-            </a:r>
-            <a:r>
-              <a:rPr lang="nl-NL" dirty="0" smtClean="0"/>
-              <a:t> box’ ondersteunt</a:t>
-            </a:r>
-          </a:p>
-          <a:p>
-            <a:r>
-              <a:rPr lang="nl-NL" dirty="0" smtClean="0"/>
-              <a:t>Probleem: niet alle browsers kunnen evenveel</a:t>
-            </a:r>
-          </a:p>
-          <a:p>
-            <a:r>
-              <a:rPr lang="nl-NL" dirty="0" smtClean="0"/>
-              <a:t>Zie bijv. </a:t>
+              <a:rPr lang="nl-NL" dirty="0" smtClean="0"/>
+              <a:t>Maak een nieuw item met </a:t>
+            </a:r>
+            <a:r>
+              <a:rPr lang="nl-NL" dirty="0" err="1" smtClean="0">
+                <a:latin typeface="Courier New" panose="02070309020205020404" pitchFamily="49" charset="0"/>
+                <a:cs typeface="Courier New" panose="02070309020205020404" pitchFamily="49" charset="0"/>
+              </a:rPr>
+              <a:t>document.createElement</a:t>
             </a:r>
             <a:r>
               <a:rPr lang="nl-NL" dirty="0" smtClean="0">
-                <a:hlinkClick r:id="rId2"/>
+                <a:latin typeface="Courier New" panose="02070309020205020404" pitchFamily="49" charset="0"/>
+                <a:cs typeface="Courier New" panose="02070309020205020404" pitchFamily="49" charset="0"/>
               </a:rPr>
-              <a:t>http://www.HTML5Test.com</a:t>
-            </a:r>
-            <a:r>
-              <a:rPr lang="nl-NL" dirty="0" smtClean="0"/>
-              <a:t> met verschillende browsers</a:t>
-            </a:r>
-          </a:p>
-          <a:p>
-            <a:r>
-              <a:rPr lang="nl-NL" dirty="0" smtClean="0"/>
-              <a:t>Oplossing:</a:t>
-            </a:r>
-          </a:p>
-          <a:p>
-            <a:pPr lvl="1"/>
-            <a:r>
-              <a:rPr lang="nl-NL" dirty="0" err="1" smtClean="0"/>
-              <a:t>Jquery</a:t>
-            </a:r>
-            <a:endParaRPr lang="nl-NL" dirty="0" smtClean="0"/>
-          </a:p>
-          <a:p>
-            <a:pPr lvl="1"/>
-            <a:r>
-              <a:rPr lang="nl-NL" dirty="0" err="1" smtClean="0"/>
-              <a:t>Webpack</a:t>
-            </a:r>
-            <a:endParaRPr lang="nl-NL" dirty="0" smtClean="0"/>
-          </a:p>
-          <a:p>
-            <a:pPr lvl="1"/>
-            <a:endParaRPr lang="nl-NL" dirty="0"/>
+              <a:t>()</a:t>
+            </a:r>
+          </a:p>
+          <a:p>
+            <a:r>
+              <a:rPr lang="nl-NL" dirty="0" smtClean="0"/>
+              <a:t>Voeg het toe aan een ander element met </a:t>
+            </a:r>
+            <a:r>
+              <a:rPr lang="nl-NL" dirty="0" err="1" smtClean="0">
+                <a:latin typeface="Courier New" panose="02070309020205020404" pitchFamily="49" charset="0"/>
+                <a:cs typeface="Courier New" panose="02070309020205020404" pitchFamily="49" charset="0"/>
+              </a:rPr>
+              <a:t>mijnobject.appendChild</a:t>
+            </a:r>
+            <a:r>
+              <a:rPr lang="nl-NL" dirty="0" smtClean="0">
+                <a:latin typeface="Courier New" panose="02070309020205020404" pitchFamily="49" charset="0"/>
+                <a:cs typeface="Courier New" panose="02070309020205020404" pitchFamily="49" charset="0"/>
+              </a:rPr>
+              <a:t>(</a:t>
+            </a:r>
+            <a:r>
+              <a:rPr lang="nl-NL" dirty="0" err="1" smtClean="0">
+                <a:latin typeface="Courier New" panose="02070309020205020404" pitchFamily="49" charset="0"/>
+                <a:cs typeface="Courier New" panose="02070309020205020404" pitchFamily="49" charset="0"/>
+              </a:rPr>
+              <a:t>nieuwObject</a:t>
+            </a:r>
+            <a:r>
+              <a:rPr lang="nl-NL" dirty="0" smtClean="0">
+                <a:latin typeface="Courier New" panose="02070309020205020404" pitchFamily="49" charset="0"/>
+                <a:cs typeface="Courier New" panose="02070309020205020404" pitchFamily="49" charset="0"/>
+              </a:rPr>
+              <a:t>)</a:t>
+            </a:r>
+            <a:endParaRPr lang="nl-NL" dirty="0">
+              <a:latin typeface="Courier New" panose="02070309020205020404" pitchFamily="49" charset="0"/>
+              <a:cs typeface="Courier New" panose="02070309020205020404" pitchFamily="49" charset="0"/>
+            </a:endParaRPr>
           </a:p>
         </p:txBody>
       </p:sp>
     </p:spTree>
     <p:extLst>
       <p:ext uri="{BB962C8B-B14F-4D97-AF65-F5344CB8AC3E}">
-        <p14:creationId xmlns:p14="http://schemas.microsoft.com/office/powerpoint/2010/main" val="3023698229"/>
+        <p14:creationId xmlns:p14="http://schemas.microsoft.com/office/powerpoint/2010/main" val="3459701139"/>
       </p:ext>
     </p:extLst>
   </p:cSld>
@@ -10001,8 +10034,12 @@
           <a:lstStyle/>
           <a:p>
             <a:r>
+              <a:rPr lang="nl-NL" dirty="0" err="1"/>
+              <a:t>Vanilla</a:t>
+            </a:r>
+            <a:r>
               <a:rPr lang="nl-NL" dirty="0"/>
-              <a:t>CSS </a:t>
+              <a:t> JS </a:t>
             </a:r>
             <a:r>
               <a:rPr lang="nl-NL" dirty="0" err="1"/>
@@ -10010,8 +10047,13 @@
             </a:r>
             <a:r>
               <a:rPr lang="nl-NL" dirty="0"/>
-              <a:t> JS</a:t>
-            </a:r>
+              <a:t> </a:t>
+            </a:r>
+            <a:r>
+              <a:rPr lang="nl-NL" dirty="0" err="1"/>
+              <a:t>Jquery</a:t>
+            </a:r>
+            <a:endParaRPr lang="nl-NL" dirty="0"/>
           </a:p>
         </p:txBody>
       </p:sp>
@@ -10031,47 +10073,68 @@
           <a:lstStyle/>
           <a:p>
             <a:r>
-              <a:rPr lang="nl-NL" dirty="0" smtClean="0"/>
-              <a:t>Animaties via CSS of JS/</a:t>
-            </a:r>
-            <a:r>
               <a:rPr lang="nl-NL" dirty="0" err="1" smtClean="0"/>
-              <a:t>jQuery</a:t>
-            </a:r>
-            <a:r>
-              <a:rPr lang="nl-NL" dirty="0" smtClean="0"/>
-              <a:t> </a:t>
+              <a:t>Vanilla</a:t>
+            </a:r>
+            <a:r>
+              <a:rPr lang="nl-NL" dirty="0" smtClean="0"/>
+              <a:t> JS: javascript zoals de browser het ‘out of </a:t>
             </a:r>
             <a:r>
               <a:rPr lang="nl-NL" dirty="0" err="1" smtClean="0"/>
-              <a:t>etc</a:t>
+              <a:t>the</a:t>
+            </a:r>
+            <a:r>
+              <a:rPr lang="nl-NL" dirty="0" smtClean="0"/>
+              <a:t> box’ ondersteunt</a:t>
+            </a:r>
+          </a:p>
+          <a:p>
+            <a:r>
+              <a:rPr lang="nl-NL" dirty="0" smtClean="0"/>
+              <a:t>Probleem: niet alle browsers kunnen evenveel</a:t>
+            </a:r>
+          </a:p>
+          <a:p>
+            <a:r>
+              <a:rPr lang="nl-NL" dirty="0" smtClean="0"/>
+              <a:t>Zie bijv. </a:t>
+            </a:r>
+            <a:r>
+              <a:rPr lang="nl-NL" dirty="0" smtClean="0">
+                <a:hlinkClick r:id="rId2"/>
+              </a:rPr>
+              <a:t>http://www.HTML5Test.com</a:t>
+            </a:r>
+            <a:r>
+              <a:rPr lang="nl-NL" dirty="0" smtClean="0"/>
+              <a:t> met verschillende browsers</a:t>
+            </a:r>
+          </a:p>
+          <a:p>
+            <a:r>
+              <a:rPr lang="nl-NL" dirty="0" smtClean="0"/>
+              <a:t>Oplossing:</a:t>
+            </a:r>
+          </a:p>
+          <a:p>
+            <a:pPr lvl="1"/>
+            <a:r>
+              <a:rPr lang="nl-NL" dirty="0" err="1" smtClean="0"/>
+              <a:t>Jquery</a:t>
             </a:r>
             <a:endParaRPr lang="nl-NL" dirty="0" smtClean="0"/>
           </a:p>
           <a:p>
-            <a:r>
-              <a:rPr lang="nl-NL" dirty="0" smtClean="0"/>
-              <a:t>Performance</a:t>
-            </a:r>
-          </a:p>
-          <a:p>
-            <a:r>
-              <a:rPr lang="nl-NL" dirty="0" smtClean="0"/>
-              <a:t>Zie ook in Google Chrome, Developer Tools, “Memory” tab en start </a:t>
-            </a:r>
+            <a:pPr lvl="1"/>
             <a:r>
               <a:rPr lang="nl-NL" dirty="0" err="1" smtClean="0"/>
-              <a:t>profiler</a:t>
+              <a:t>Webpack</a:t>
             </a:r>
             <a:endParaRPr lang="nl-NL" dirty="0" smtClean="0"/>
           </a:p>
           <a:p>
-            <a:endParaRPr lang="nl-NL" dirty="0" smtClean="0"/>
-          </a:p>
-          <a:p>
-            <a:endParaRPr lang="nl-NL" dirty="0" smtClean="0"/>
-          </a:p>
-          <a:p>
+            <a:pPr lvl="1"/>
             <a:endParaRPr lang="nl-NL" dirty="0"/>
           </a:p>
         </p:txBody>
@@ -10079,13 +10142,20 @@
     </p:spTree>
     <p:extLst>
       <p:ext uri="{BB962C8B-B14F-4D97-AF65-F5344CB8AC3E}">
-        <p14:creationId xmlns:p14="http://schemas.microsoft.com/office/powerpoint/2010/main" val="3749883609"/>
+        <p14:creationId xmlns:p14="http://schemas.microsoft.com/office/powerpoint/2010/main" val="3023698229"/>
       </p:ext>
     </p:extLst>
   </p:cSld>
   <p:clrMapOvr>
     <a:masterClrMapping/>
   </p:clrMapOvr>
+  <p:timing>
+    <p:tnLst>
+      <p:par>
+        <p:cTn id="1" dur="indefinite" restart="never" nodeType="tmRoot"/>
+      </p:par>
+    </p:tnLst>
+  </p:timing>
 </p:sld>
 </file>
 
@@ -10108,7 +10178,7 @@
       </p:grpSpPr>
       <p:sp>
         <p:nvSpPr>
-          <p:cNvPr id="2" name="Titel 1"/>
+          <p:cNvPr id="4" name="Titel 3"/>
           <p:cNvSpPr>
             <a:spLocks noGrp="1"/>
           </p:cNvSpPr>
@@ -10122,16 +10192,23 @@
           <a:lstStyle/>
           <a:p>
             <a:r>
-              <a:rPr lang="nl-NL" dirty="0" smtClean="0"/>
-              <a:t>SVG &amp; Canvas</a:t>
-            </a:r>
-            <a:endParaRPr lang="nl-NL" dirty="0"/>
-          </a:p>
-        </p:txBody>
-      </p:sp>
-      <p:sp>
-        <p:nvSpPr>
-          <p:cNvPr id="3" name="Tijdelijke aanduiding voor inhoud 2"/>
+              <a:rPr lang="nl-NL" dirty="0"/>
+              <a:t>CSS </a:t>
+            </a:r>
+            <a:r>
+              <a:rPr lang="nl-NL" dirty="0" err="1"/>
+              <a:t>vs</a:t>
+            </a:r>
+            <a:r>
+              <a:rPr lang="nl-NL" dirty="0"/>
+              <a:t> JS</a:t>
+            </a:r>
+          </a:p>
+        </p:txBody>
+      </p:sp>
+      <p:sp>
+        <p:nvSpPr>
+          <p:cNvPr id="5" name="Tijdelijke aanduiding voor inhoud 4"/>
           <p:cNvSpPr>
             <a:spLocks noGrp="1"/>
           </p:cNvSpPr>
@@ -10146,69 +10223,44 @@
           <a:p>
             <a:r>
               <a:rPr lang="nl-NL" dirty="0" smtClean="0"/>
-              <a:t>Tekenen van objecten</a:t>
-            </a:r>
-          </a:p>
-          <a:p>
-            <a:pPr lvl="1"/>
-            <a:r>
-              <a:rPr lang="nl-NL" dirty="0" smtClean="0"/>
-              <a:t>Canvas </a:t>
-            </a:r>
-            <a:r>
-              <a:rPr lang="nl-NL" dirty="0" smtClean="0">
-                <a:sym typeface="Wingdings" panose="05000000000000000000" pitchFamily="2" charset="2"/>
-              </a:rPr>
-              <a:t> javascript</a:t>
-            </a:r>
-          </a:p>
-          <a:p>
-            <a:pPr lvl="1"/>
-            <a:r>
-              <a:rPr lang="nl-NL" dirty="0" smtClean="0">
-                <a:sym typeface="Wingdings" panose="05000000000000000000" pitchFamily="2" charset="2"/>
-              </a:rPr>
-              <a:t>SVG  </a:t>
-            </a:r>
-            <a:r>
-              <a:rPr lang="nl-NL" dirty="0" err="1" smtClean="0">
-                <a:sym typeface="Wingdings" panose="05000000000000000000" pitchFamily="2" charset="2"/>
-              </a:rPr>
-              <a:t>xml</a:t>
-            </a:r>
-            <a:r>
-              <a:rPr lang="nl-NL" dirty="0" smtClean="0">
-                <a:sym typeface="Wingdings" panose="05000000000000000000" pitchFamily="2" charset="2"/>
-              </a:rPr>
-              <a:t>-tekst door browser opgebouwd</a:t>
-            </a:r>
-          </a:p>
-          <a:p>
-            <a:r>
-              <a:rPr lang="nl-NL" dirty="0" err="1" smtClean="0">
-                <a:sym typeface="Wingdings" panose="05000000000000000000" pitchFamily="2" charset="2"/>
-              </a:rPr>
-              <a:t>Frameworks</a:t>
-            </a:r>
-            <a:endParaRPr lang="nl-NL" dirty="0" smtClean="0">
-              <a:sym typeface="Wingdings" panose="05000000000000000000" pitchFamily="2" charset="2"/>
-            </a:endParaRPr>
-          </a:p>
-          <a:p>
-            <a:r>
-              <a:rPr lang="nl-NL" dirty="0" smtClean="0">
-                <a:sym typeface="Wingdings" panose="05000000000000000000" pitchFamily="2" charset="2"/>
-              </a:rPr>
-              <a:t>Leercurve</a:t>
-            </a:r>
-          </a:p>
-          <a:p>
-            <a:r>
-              <a:rPr lang="nl-NL" dirty="0" smtClean="0">
-                <a:sym typeface="Wingdings" panose="05000000000000000000" pitchFamily="2" charset="2"/>
-              </a:rPr>
-              <a:t>Voorbeelden</a:t>
-            </a:r>
+              <a:t>Animaties via CSS of JS/</a:t>
+            </a:r>
+            <a:r>
+              <a:rPr lang="nl-NL" dirty="0" err="1" smtClean="0"/>
+              <a:t>jQuery</a:t>
+            </a:r>
+            <a:r>
+              <a:rPr lang="nl-NL" dirty="0" smtClean="0"/>
+              <a:t> </a:t>
+            </a:r>
+            <a:r>
+              <a:rPr lang="nl-NL" dirty="0" err="1" smtClean="0"/>
+              <a:t>etc</a:t>
+            </a:r>
+            <a:endParaRPr lang="nl-NL" dirty="0" smtClean="0"/>
+          </a:p>
+          <a:p>
+            <a:r>
+              <a:rPr lang="nl-NL" dirty="0" smtClean="0"/>
+              <a:t>Performance</a:t>
+            </a:r>
+          </a:p>
+          <a:p>
+            <a:r>
+              <a:rPr lang="nl-NL" dirty="0" smtClean="0"/>
+              <a:t>Zie ook in Google Chrome, Developer Tools, “Memory” tab en start </a:t>
+            </a:r>
+            <a:r>
+              <a:rPr lang="nl-NL" dirty="0" err="1" smtClean="0"/>
+              <a:t>profiler</a:t>
+            </a:r>
+            <a:endParaRPr lang="nl-NL" dirty="0" smtClean="0"/>
+          </a:p>
+          <a:p>
+            <a:endParaRPr lang="nl-NL" dirty="0" smtClean="0"/>
+          </a:p>
+          <a:p>
+            <a:endParaRPr lang="nl-NL" dirty="0" smtClean="0"/>
           </a:p>
           <a:p>
             <a:endParaRPr lang="nl-NL" dirty="0"/>
@@ -10218,7 +10270,7 @@
     </p:spTree>
     <p:extLst>
       <p:ext uri="{BB962C8B-B14F-4D97-AF65-F5344CB8AC3E}">
-        <p14:creationId xmlns:p14="http://schemas.microsoft.com/office/powerpoint/2010/main" val="2023804850"/>
+        <p14:creationId xmlns:p14="http://schemas.microsoft.com/office/powerpoint/2010/main" val="3749883609"/>
       </p:ext>
     </p:extLst>
   </p:cSld>
@@ -10383,7 +10435,7 @@
           <a:p>
             <a:r>
               <a:rPr lang="nl-NL" dirty="0" smtClean="0"/>
-              <a:t>Templating</a:t>
+              <a:t>SVG &amp; Canvas</a:t>
             </a:r>
             <a:endParaRPr lang="nl-NL" dirty="0"/>
           </a:p>
@@ -10404,14 +10456,81 @@
           <a:bodyPr/>
           <a:lstStyle/>
           <a:p>
-            <a:endParaRPr lang="nl-NL"/>
+            <a:r>
+              <a:rPr lang="nl-NL" dirty="0" smtClean="0"/>
+              <a:t>Tekenen van objecten</a:t>
+            </a:r>
+          </a:p>
+          <a:p>
+            <a:pPr lvl="1"/>
+            <a:r>
+              <a:rPr lang="nl-NL" dirty="0" smtClean="0"/>
+              <a:t>Canvas </a:t>
+            </a:r>
+            <a:r>
+              <a:rPr lang="nl-NL" dirty="0" smtClean="0">
+                <a:sym typeface="Wingdings" panose="05000000000000000000" pitchFamily="2" charset="2"/>
+              </a:rPr>
+              <a:t> javascript</a:t>
+            </a:r>
+          </a:p>
+          <a:p>
+            <a:pPr lvl="1"/>
+            <a:r>
+              <a:rPr lang="nl-NL" dirty="0" smtClean="0">
+                <a:sym typeface="Wingdings" panose="05000000000000000000" pitchFamily="2" charset="2"/>
+              </a:rPr>
+              <a:t>SVG  </a:t>
+            </a:r>
+            <a:r>
+              <a:rPr lang="nl-NL" dirty="0" err="1" smtClean="0">
+                <a:sym typeface="Wingdings" panose="05000000000000000000" pitchFamily="2" charset="2"/>
+              </a:rPr>
+              <a:t>xml</a:t>
+            </a:r>
+            <a:r>
+              <a:rPr lang="nl-NL" dirty="0" smtClean="0">
+                <a:sym typeface="Wingdings" panose="05000000000000000000" pitchFamily="2" charset="2"/>
+              </a:rPr>
+              <a:t>-tekst door browser opgebouwd</a:t>
+            </a:r>
+          </a:p>
+          <a:p>
+            <a:r>
+              <a:rPr lang="nl-NL" dirty="0" err="1" smtClean="0">
+                <a:sym typeface="Wingdings" panose="05000000000000000000" pitchFamily="2" charset="2"/>
+              </a:rPr>
+              <a:t>Frameworks</a:t>
+            </a:r>
+            <a:endParaRPr lang="nl-NL" dirty="0" smtClean="0">
+              <a:sym typeface="Wingdings" panose="05000000000000000000" pitchFamily="2" charset="2"/>
+            </a:endParaRPr>
+          </a:p>
+          <a:p>
+            <a:r>
+              <a:rPr lang="nl-NL" dirty="0" smtClean="0">
+                <a:sym typeface="Wingdings" panose="05000000000000000000" pitchFamily="2" charset="2"/>
+              </a:rPr>
+              <a:t>Leercurve</a:t>
+            </a:r>
+          </a:p>
+          <a:p>
+            <a:r>
+              <a:rPr lang="nl-NL" dirty="0" smtClean="0">
+                <a:sym typeface="Wingdings" panose="05000000000000000000" pitchFamily="2" charset="2"/>
+              </a:rPr>
+              <a:t>Voorbeelden</a:t>
+            </a:r>
+          </a:p>
+          <a:p>
+            <a:endParaRPr lang="nl-NL" dirty="0"/>
           </a:p>
         </p:txBody>
       </p:sp>
     </p:spTree>
     <p:extLst>
       <p:ext uri="{BB962C8B-B14F-4D97-AF65-F5344CB8AC3E}">
-        <p14:creationId xmlns:p14="http://schemas.microsoft.com/office/powerpoint/2010/main" val="3805239925"/>
+        <p14:creationId xmlns:p14="http://schemas.microsoft.com/office/powerpoint/2010/main" val="2023804850"/>
       </p:ext>
     </p:extLst>
   </p:cSld>
@@ -10440,7 +10559,7 @@
       </p:grpSpPr>
       <p:sp>
         <p:nvSpPr>
-          <p:cNvPr id="4" name="Titel 3"/>
+          <p:cNvPr id="2" name="Titel 1"/>
           <p:cNvSpPr>
             <a:spLocks noGrp="1"/>
           </p:cNvSpPr>
@@ -10455,7 +10574,7 @@
           <a:p>
             <a:r>
               <a:rPr lang="nl-NL" dirty="0" smtClean="0"/>
-              <a:t>Advanced Topics</a:t>
+              <a:t>Templating</a:t>
             </a:r>
             <a:endParaRPr lang="nl-NL" dirty="0"/>
           </a:p>
@@ -10463,75 +10582,27 @@
       </p:sp>
       <p:sp>
         <p:nvSpPr>
-          <p:cNvPr id="5" name="Tijdelijke aanduiding voor tekst 4"/>
-          <p:cNvSpPr>
-            <a:spLocks noGrp="1"/>
-          </p:cNvSpPr>
-          <p:nvPr>
-            <p:ph type="body" sz="quarter" idx="10"/>
-          </p:nvPr>
-        </p:nvSpPr>
-        <p:spPr>
-          <a:xfrm>
-            <a:off x="6096000" y="3483864"/>
-            <a:ext cx="4675200" cy="2938707"/>
-          </a:xfrm>
-        </p:spPr>
+          <p:cNvPr id="3" name="Tijdelijke aanduiding voor inhoud 2"/>
+          <p:cNvSpPr>
+            <a:spLocks noGrp="1"/>
+          </p:cNvSpPr>
+          <p:nvPr>
+            <p:ph idx="1"/>
+          </p:nvPr>
+        </p:nvSpPr>
+        <p:spPr/>
         <p:txBody>
           <a:bodyPr/>
           <a:lstStyle/>
           <a:p>
-            <a:r>
-              <a:rPr lang="nl-NL" dirty="0" smtClean="0"/>
-              <a:t>Data retrieval</a:t>
-            </a:r>
-          </a:p>
-          <a:p>
-            <a:r>
-              <a:rPr lang="nl-NL" dirty="0" smtClean="0"/>
-              <a:t>Data </a:t>
-            </a:r>
-            <a:r>
-              <a:rPr lang="nl-NL" dirty="0" err="1" smtClean="0"/>
-              <a:t>manipulation</a:t>
-            </a:r>
-            <a:endParaRPr lang="nl-NL" dirty="0" smtClean="0"/>
-          </a:p>
-          <a:p>
-            <a:r>
-              <a:rPr lang="nl-NL" dirty="0" smtClean="0"/>
-              <a:t>Data </a:t>
-            </a:r>
-            <a:r>
-              <a:rPr lang="nl-NL" dirty="0" err="1" smtClean="0"/>
-              <a:t>presentation</a:t>
-            </a:r>
-            <a:endParaRPr lang="nl-NL" dirty="0" smtClean="0"/>
-          </a:p>
-          <a:p>
-            <a:r>
-              <a:rPr lang="nl-NL" dirty="0" err="1" smtClean="0"/>
-              <a:t>Promises</a:t>
-            </a:r>
-            <a:r>
-              <a:rPr lang="nl-NL" dirty="0" smtClean="0"/>
-              <a:t> / </a:t>
-            </a:r>
-            <a:r>
-              <a:rPr lang="nl-NL" dirty="0" err="1" smtClean="0"/>
-              <a:t>Async</a:t>
-            </a:r>
-            <a:endParaRPr lang="nl-NL" dirty="0" smtClean="0"/>
-          </a:p>
-          <a:p>
-            <a:endParaRPr lang="nl-NL" dirty="0"/>
+            <a:endParaRPr lang="nl-NL"/>
           </a:p>
         </p:txBody>
       </p:sp>
     </p:spTree>
     <p:extLst>
       <p:ext uri="{BB962C8B-B14F-4D97-AF65-F5344CB8AC3E}">
-        <p14:creationId xmlns:p14="http://schemas.microsoft.com/office/powerpoint/2010/main" val="4052397656"/>
+        <p14:creationId xmlns:p14="http://schemas.microsoft.com/office/powerpoint/2010/main" val="3805239925"/>
       </p:ext>
     </p:extLst>
   </p:cSld>
@@ -10575,7 +10646,7 @@
           <a:p>
             <a:r>
               <a:rPr lang="nl-NL" dirty="0" smtClean="0"/>
-              <a:t>Data Retrieval</a:t>
+              <a:t>Advanced Topics</a:t>
             </a:r>
             <a:endParaRPr lang="nl-NL" dirty="0"/>
           </a:p>
@@ -10583,27 +10654,75 @@
       </p:sp>
       <p:sp>
         <p:nvSpPr>
-          <p:cNvPr id="5" name="Tijdelijke aanduiding voor inhoud 4"/>
-          <p:cNvSpPr>
-            <a:spLocks noGrp="1"/>
-          </p:cNvSpPr>
-          <p:nvPr>
-            <p:ph idx="1"/>
-          </p:nvPr>
-        </p:nvSpPr>
-        <p:spPr/>
+          <p:cNvPr id="5" name="Tijdelijke aanduiding voor tekst 4"/>
+          <p:cNvSpPr>
+            <a:spLocks noGrp="1"/>
+          </p:cNvSpPr>
+          <p:nvPr>
+            <p:ph type="body" sz="quarter" idx="10"/>
+          </p:nvPr>
+        </p:nvSpPr>
+        <p:spPr>
+          <a:xfrm>
+            <a:off x="6096000" y="3483864"/>
+            <a:ext cx="4675200" cy="2938707"/>
+          </a:xfrm>
+        </p:spPr>
         <p:txBody>
           <a:bodyPr/>
           <a:lstStyle/>
           <a:p>
-            <a:endParaRPr lang="nl-NL"/>
+            <a:r>
+              <a:rPr lang="nl-NL" dirty="0" smtClean="0"/>
+              <a:t>Data retrieval</a:t>
+            </a:r>
+          </a:p>
+          <a:p>
+            <a:r>
+              <a:rPr lang="nl-NL" dirty="0" smtClean="0"/>
+              <a:t>Data </a:t>
+            </a:r>
+            <a:r>
+              <a:rPr lang="nl-NL" dirty="0" err="1" smtClean="0"/>
+              <a:t>manipulation</a:t>
+            </a:r>
+            <a:endParaRPr lang="nl-NL" dirty="0" smtClean="0"/>
+          </a:p>
+          <a:p>
+            <a:r>
+              <a:rPr lang="nl-NL" dirty="0" smtClean="0"/>
+              <a:t>Data </a:t>
+            </a:r>
+            <a:r>
+              <a:rPr lang="nl-NL" dirty="0" err="1" smtClean="0"/>
+              <a:t>presentation</a:t>
+            </a:r>
+            <a:endParaRPr lang="nl-NL" dirty="0" smtClean="0"/>
+          </a:p>
+          <a:p>
+            <a:r>
+              <a:rPr lang="nl-NL" dirty="0" err="1" smtClean="0"/>
+              <a:t>Promises</a:t>
+            </a:r>
+            <a:r>
+              <a:rPr lang="nl-NL" dirty="0" smtClean="0"/>
+              <a:t> / </a:t>
+            </a:r>
+            <a:r>
+              <a:rPr lang="nl-NL" dirty="0" err="1" smtClean="0"/>
+              <a:t>Async</a:t>
+            </a:r>
+            <a:endParaRPr lang="nl-NL" dirty="0" smtClean="0"/>
+          </a:p>
+          <a:p>
+            <a:endParaRPr lang="nl-NL" dirty="0"/>
           </a:p>
         </p:txBody>
       </p:sp>
     </p:spTree>
     <p:extLst>
       <p:ext uri="{BB962C8B-B14F-4D97-AF65-F5344CB8AC3E}">
-        <p14:creationId xmlns:p14="http://schemas.microsoft.com/office/powerpoint/2010/main" val="3776559738"/>
+        <p14:creationId xmlns:p14="http://schemas.microsoft.com/office/powerpoint/2010/main" val="4052397656"/>
       </p:ext>
     </p:extLst>
   </p:cSld>
@@ -10632,7 +10751,7 @@
       </p:grpSpPr>
       <p:sp>
         <p:nvSpPr>
-          <p:cNvPr id="2" name="Titel 1"/>
+          <p:cNvPr id="4" name="Titel 3"/>
           <p:cNvSpPr>
             <a:spLocks noGrp="1"/>
           </p:cNvSpPr>
@@ -10647,11 +10766,7 @@
           <a:p>
             <a:r>
               <a:rPr lang="nl-NL" dirty="0" smtClean="0"/>
-              <a:t>Data </a:t>
-            </a:r>
-            <a:r>
-              <a:rPr lang="nl-NL" dirty="0" err="1" smtClean="0"/>
-              <a:t>Manipulation</a:t>
+              <a:t>Data Retrieval</a:t>
             </a:r>
             <a:endParaRPr lang="nl-NL" dirty="0"/>
           </a:p>
@@ -10659,7 +10774,7 @@
       </p:sp>
       <p:sp>
         <p:nvSpPr>
-          <p:cNvPr id="3" name="Tijdelijke aanduiding voor inhoud 2"/>
+          <p:cNvPr id="5" name="Tijdelijke aanduiding voor inhoud 4"/>
           <p:cNvSpPr>
             <a:spLocks noGrp="1"/>
           </p:cNvSpPr>
@@ -10679,7 +10794,7 @@
     </p:spTree>
     <p:extLst>
       <p:ext uri="{BB962C8B-B14F-4D97-AF65-F5344CB8AC3E}">
-        <p14:creationId xmlns:p14="http://schemas.microsoft.com/office/powerpoint/2010/main" val="3314037050"/>
+        <p14:creationId xmlns:p14="http://schemas.microsoft.com/office/powerpoint/2010/main" val="3776559738"/>
       </p:ext>
     </p:extLst>
   </p:cSld>
@@ -10722,6 +10837,82 @@
           <a:lstStyle/>
           <a:p>
             <a:r>
+              <a:rPr lang="nl-NL" dirty="0" smtClean="0"/>
+              <a:t>Data </a:t>
+            </a:r>
+            <a:r>
+              <a:rPr lang="nl-NL" dirty="0" err="1" smtClean="0"/>
+              <a:t>Manipulation</a:t>
+            </a:r>
+            <a:endParaRPr lang="nl-NL" dirty="0"/>
+          </a:p>
+        </p:txBody>
+      </p:sp>
+      <p:sp>
+        <p:nvSpPr>
+          <p:cNvPr id="3" name="Tijdelijke aanduiding voor inhoud 2"/>
+          <p:cNvSpPr>
+            <a:spLocks noGrp="1"/>
+          </p:cNvSpPr>
+          <p:nvPr>
+            <p:ph idx="1"/>
+          </p:nvPr>
+        </p:nvSpPr>
+        <p:spPr/>
+        <p:txBody>
+          <a:bodyPr/>
+          <a:lstStyle/>
+          <a:p>
+            <a:endParaRPr lang="nl-NL"/>
+          </a:p>
+        </p:txBody>
+      </p:sp>
+    </p:spTree>
+    <p:extLst>
+      <p:ext uri="{BB962C8B-B14F-4D97-AF65-F5344CB8AC3E}">
+        <p14:creationId xmlns:p14="http://schemas.microsoft.com/office/powerpoint/2010/main" val="3314037050"/>
+      </p:ext>
+    </p:extLst>
+  </p:cSld>
+  <p:clrMapOvr>
+    <a:masterClrMapping/>
+  </p:clrMapOvr>
+</p:sld>
+</file>
+
+<file path=ppt/slides/slide35.xml><?xml version="1.0" encoding="utf-8"?>
+<p:sld xmlns:a="http://schemas.openxmlformats.org/drawingml/2006/main" xmlns:r="http://schemas.openxmlformats.org/officeDocument/2006/relationships" xmlns:p="http://schemas.openxmlformats.org/presentationml/2006/main">
+  <p:cSld>
+    <p:spTree>
+      <p:nvGrpSpPr>
+        <p:cNvPr id="1" name=""/>
+        <p:cNvGrpSpPr/>
+        <p:nvPr/>
+      </p:nvGrpSpPr>
+      <p:grpSpPr>
+        <a:xfrm>
+          <a:off x="0" y="0"/>
+          <a:ext cx="0" cy="0"/>
+          <a:chOff x="0" y="0"/>
+          <a:chExt cx="0" cy="0"/>
+        </a:xfrm>
+      </p:grpSpPr>
+      <p:sp>
+        <p:nvSpPr>
+          <p:cNvPr id="2" name="Titel 1"/>
+          <p:cNvSpPr>
+            <a:spLocks noGrp="1"/>
+          </p:cNvSpPr>
+          <p:nvPr>
+            <p:ph type="title"/>
+          </p:nvPr>
+        </p:nvSpPr>
+        <p:spPr/>
+        <p:txBody>
+          <a:bodyPr/>
+          <a:lstStyle/>
+          <a:p>
+            <a:r>
               <a:rPr lang="nl-NL" dirty="0" err="1" smtClean="0"/>
               <a:t>Promises</a:t>
             </a:r>
@@ -10769,7 +10960,7 @@
 </p:sld>
 </file>
 
-<file path=ppt/slides/slide35.xml><?xml version="1.0" encoding="utf-8"?>
+<file path=ppt/slides/slide36.xml><?xml version="1.0" encoding="utf-8"?>
 <p:sld xmlns:a="http://schemas.openxmlformats.org/drawingml/2006/main" xmlns:r="http://schemas.openxmlformats.org/officeDocument/2006/relationships" xmlns:p="http://schemas.openxmlformats.org/presentationml/2006/main">
   <p:cSld>
     <p:spTree>

</xml_diff>

<commit_message>
New Assignments - modules & classes
</commit_message>
<xml_diff>
--- a/Presentatie/Front-End Development.pptx
+++ b/Presentatie/Front-End Development.pptx
@@ -5,7 +5,7 @@
     <p:sldMasterId id="2147483660" r:id="rId1"/>
   </p:sldMasterIdLst>
   <p:notesMasterIdLst>
-    <p:notesMasterId r:id="rId38"/>
+    <p:notesMasterId r:id="rId34"/>
   </p:notesMasterIdLst>
   <p:sldIdLst>
     <p:sldId id="256" r:id="rId2"/>
@@ -39,11 +39,7 @@
     <p:sldId id="266" r:id="rId30"/>
     <p:sldId id="268" r:id="rId31"/>
     <p:sldId id="269" r:id="rId32"/>
-    <p:sldId id="270" r:id="rId33"/>
-    <p:sldId id="271" r:id="rId34"/>
-    <p:sldId id="272" r:id="rId35"/>
-    <p:sldId id="273" r:id="rId36"/>
-    <p:sldId id="274" r:id="rId37"/>
+    <p:sldId id="274" r:id="rId33"/>
   </p:sldIdLst>
   <p:sldSz cx="12192000" cy="6858000"/>
   <p:notesSz cx="6858000" cy="9144000"/>
@@ -182,10 +178,6 @@
             <p14:sldId id="266"/>
             <p14:sldId id="268"/>
             <p14:sldId id="269"/>
-            <p14:sldId id="270"/>
-            <p14:sldId id="271"/>
-            <p14:sldId id="272"/>
-            <p14:sldId id="273"/>
             <p14:sldId id="274"/>
           </p14:sldIdLst>
         </p14:section>
@@ -280,7 +272,7 @@
           <a:p>
             <a:fld id="{C5A381E3-FA85-4AE8-9B11-999D5E05561D}" type="datetimeFigureOut">
               <a:rPr lang="nl-NL" smtClean="0"/>
-              <a:t>26-11-2018</a:t>
+              <a:t>18-12-2018</a:t>
             </a:fld>
             <a:endParaRPr lang="nl-NL"/>
           </a:p>
@@ -797,7 +789,7 @@
           <a:p>
             <a:fld id="{A9AC6ED0-D734-4939-9338-F1A2206B4A78}" type="slidenum">
               <a:rPr lang="nl-NL" smtClean="0"/>
-              <a:t>36</a:t>
+              <a:t>32</a:t>
             </a:fld>
             <a:endParaRPr lang="nl-NL"/>
           </a:p>
@@ -10595,7 +10587,43 @@
           <a:bodyPr/>
           <a:lstStyle/>
           <a:p>
-            <a:endParaRPr lang="nl-NL"/>
+            <a:r>
+              <a:rPr lang="nl-NL" dirty="0" smtClean="0"/>
+              <a:t>HTML5 heeft een Template Tag</a:t>
+            </a:r>
+          </a:p>
+          <a:p>
+            <a:r>
+              <a:rPr lang="nl-NL" dirty="0">
+                <a:hlinkClick r:id="rId2"/>
+              </a:rPr>
+              <a:t>https://</a:t>
+            </a:r>
+            <a:r>
+              <a:rPr lang="nl-NL" dirty="0" smtClean="0">
+                <a:hlinkClick r:id="rId2"/>
+              </a:rPr>
+              <a:t>developer.mozilla.org/en-US/docs/Web/HTML/Element/template</a:t>
+            </a:r>
+            <a:endParaRPr lang="nl-NL" dirty="0" smtClean="0"/>
+          </a:p>
+          <a:p>
+            <a:r>
+              <a:rPr lang="nl-NL" dirty="0">
+                <a:hlinkClick r:id="rId3"/>
+              </a:rPr>
+              <a:t>https://</a:t>
+            </a:r>
+            <a:r>
+              <a:rPr lang="nl-NL" dirty="0" smtClean="0">
+                <a:hlinkClick r:id="rId3"/>
+              </a:rPr>
+              <a:t>www.w3schools.com/html/html5_intro.asp</a:t>
+            </a:r>
+            <a:endParaRPr lang="nl-NL" dirty="0" smtClean="0"/>
+          </a:p>
+          <a:p>
+            <a:endParaRPr lang="nl-NL" dirty="0"/>
           </a:p>
         </p:txBody>
       </p:sp>
@@ -10613,354 +10641,6 @@
 </file>
 
 <file path=ppt/slides/slide32.xml><?xml version="1.0" encoding="utf-8"?>
-<p:sld xmlns:a="http://schemas.openxmlformats.org/drawingml/2006/main" xmlns:r="http://schemas.openxmlformats.org/officeDocument/2006/relationships" xmlns:p="http://schemas.openxmlformats.org/presentationml/2006/main">
-  <p:cSld>
-    <p:spTree>
-      <p:nvGrpSpPr>
-        <p:cNvPr id="1" name=""/>
-        <p:cNvGrpSpPr/>
-        <p:nvPr/>
-      </p:nvGrpSpPr>
-      <p:grpSpPr>
-        <a:xfrm>
-          <a:off x="0" y="0"/>
-          <a:ext cx="0" cy="0"/>
-          <a:chOff x="0" y="0"/>
-          <a:chExt cx="0" cy="0"/>
-        </a:xfrm>
-      </p:grpSpPr>
-      <p:sp>
-        <p:nvSpPr>
-          <p:cNvPr id="4" name="Titel 3"/>
-          <p:cNvSpPr>
-            <a:spLocks noGrp="1"/>
-          </p:cNvSpPr>
-          <p:nvPr>
-            <p:ph type="title"/>
-          </p:nvPr>
-        </p:nvSpPr>
-        <p:spPr/>
-        <p:txBody>
-          <a:bodyPr/>
-          <a:lstStyle/>
-          <a:p>
-            <a:r>
-              <a:rPr lang="nl-NL" dirty="0" smtClean="0"/>
-              <a:t>Advanced Topics</a:t>
-            </a:r>
-            <a:endParaRPr lang="nl-NL" dirty="0"/>
-          </a:p>
-        </p:txBody>
-      </p:sp>
-      <p:sp>
-        <p:nvSpPr>
-          <p:cNvPr id="5" name="Tijdelijke aanduiding voor tekst 4"/>
-          <p:cNvSpPr>
-            <a:spLocks noGrp="1"/>
-          </p:cNvSpPr>
-          <p:nvPr>
-            <p:ph type="body" sz="quarter" idx="10"/>
-          </p:nvPr>
-        </p:nvSpPr>
-        <p:spPr>
-          <a:xfrm>
-            <a:off x="6096000" y="3483864"/>
-            <a:ext cx="4675200" cy="2938707"/>
-          </a:xfrm>
-        </p:spPr>
-        <p:txBody>
-          <a:bodyPr/>
-          <a:lstStyle/>
-          <a:p>
-            <a:r>
-              <a:rPr lang="nl-NL" dirty="0" smtClean="0"/>
-              <a:t>Data retrieval</a:t>
-            </a:r>
-          </a:p>
-          <a:p>
-            <a:r>
-              <a:rPr lang="nl-NL" dirty="0" smtClean="0"/>
-              <a:t>Data </a:t>
-            </a:r>
-            <a:r>
-              <a:rPr lang="nl-NL" dirty="0" err="1" smtClean="0"/>
-              <a:t>manipulation</a:t>
-            </a:r>
-            <a:endParaRPr lang="nl-NL" dirty="0" smtClean="0"/>
-          </a:p>
-          <a:p>
-            <a:r>
-              <a:rPr lang="nl-NL" dirty="0" smtClean="0"/>
-              <a:t>Data </a:t>
-            </a:r>
-            <a:r>
-              <a:rPr lang="nl-NL" dirty="0" err="1" smtClean="0"/>
-              <a:t>presentation</a:t>
-            </a:r>
-            <a:endParaRPr lang="nl-NL" dirty="0" smtClean="0"/>
-          </a:p>
-          <a:p>
-            <a:r>
-              <a:rPr lang="nl-NL" dirty="0" err="1" smtClean="0"/>
-              <a:t>Promises</a:t>
-            </a:r>
-            <a:r>
-              <a:rPr lang="nl-NL" dirty="0" smtClean="0"/>
-              <a:t> / </a:t>
-            </a:r>
-            <a:r>
-              <a:rPr lang="nl-NL" dirty="0" err="1" smtClean="0"/>
-              <a:t>Async</a:t>
-            </a:r>
-            <a:endParaRPr lang="nl-NL" dirty="0" smtClean="0"/>
-          </a:p>
-          <a:p>
-            <a:endParaRPr lang="nl-NL" dirty="0"/>
-          </a:p>
-        </p:txBody>
-      </p:sp>
-    </p:spTree>
-    <p:extLst>
-      <p:ext uri="{BB962C8B-B14F-4D97-AF65-F5344CB8AC3E}">
-        <p14:creationId xmlns:p14="http://schemas.microsoft.com/office/powerpoint/2010/main" val="4052397656"/>
-      </p:ext>
-    </p:extLst>
-  </p:cSld>
-  <p:clrMapOvr>
-    <a:masterClrMapping/>
-  </p:clrMapOvr>
-</p:sld>
-</file>
-
-<file path=ppt/slides/slide33.xml><?xml version="1.0" encoding="utf-8"?>
-<p:sld xmlns:a="http://schemas.openxmlformats.org/drawingml/2006/main" xmlns:r="http://schemas.openxmlformats.org/officeDocument/2006/relationships" xmlns:p="http://schemas.openxmlformats.org/presentationml/2006/main">
-  <p:cSld>
-    <p:spTree>
-      <p:nvGrpSpPr>
-        <p:cNvPr id="1" name=""/>
-        <p:cNvGrpSpPr/>
-        <p:nvPr/>
-      </p:nvGrpSpPr>
-      <p:grpSpPr>
-        <a:xfrm>
-          <a:off x="0" y="0"/>
-          <a:ext cx="0" cy="0"/>
-          <a:chOff x="0" y="0"/>
-          <a:chExt cx="0" cy="0"/>
-        </a:xfrm>
-      </p:grpSpPr>
-      <p:sp>
-        <p:nvSpPr>
-          <p:cNvPr id="4" name="Titel 3"/>
-          <p:cNvSpPr>
-            <a:spLocks noGrp="1"/>
-          </p:cNvSpPr>
-          <p:nvPr>
-            <p:ph type="title"/>
-          </p:nvPr>
-        </p:nvSpPr>
-        <p:spPr/>
-        <p:txBody>
-          <a:bodyPr/>
-          <a:lstStyle/>
-          <a:p>
-            <a:r>
-              <a:rPr lang="nl-NL" dirty="0" smtClean="0"/>
-              <a:t>Data Retrieval</a:t>
-            </a:r>
-            <a:endParaRPr lang="nl-NL" dirty="0"/>
-          </a:p>
-        </p:txBody>
-      </p:sp>
-      <p:sp>
-        <p:nvSpPr>
-          <p:cNvPr id="5" name="Tijdelijke aanduiding voor inhoud 4"/>
-          <p:cNvSpPr>
-            <a:spLocks noGrp="1"/>
-          </p:cNvSpPr>
-          <p:nvPr>
-            <p:ph idx="1"/>
-          </p:nvPr>
-        </p:nvSpPr>
-        <p:spPr/>
-        <p:txBody>
-          <a:bodyPr/>
-          <a:lstStyle/>
-          <a:p>
-            <a:endParaRPr lang="nl-NL"/>
-          </a:p>
-        </p:txBody>
-      </p:sp>
-    </p:spTree>
-    <p:extLst>
-      <p:ext uri="{BB962C8B-B14F-4D97-AF65-F5344CB8AC3E}">
-        <p14:creationId xmlns:p14="http://schemas.microsoft.com/office/powerpoint/2010/main" val="3776559738"/>
-      </p:ext>
-    </p:extLst>
-  </p:cSld>
-  <p:clrMapOvr>
-    <a:masterClrMapping/>
-  </p:clrMapOvr>
-</p:sld>
-</file>
-
-<file path=ppt/slides/slide34.xml><?xml version="1.0" encoding="utf-8"?>
-<p:sld xmlns:a="http://schemas.openxmlformats.org/drawingml/2006/main" xmlns:r="http://schemas.openxmlformats.org/officeDocument/2006/relationships" xmlns:p="http://schemas.openxmlformats.org/presentationml/2006/main">
-  <p:cSld>
-    <p:spTree>
-      <p:nvGrpSpPr>
-        <p:cNvPr id="1" name=""/>
-        <p:cNvGrpSpPr/>
-        <p:nvPr/>
-      </p:nvGrpSpPr>
-      <p:grpSpPr>
-        <a:xfrm>
-          <a:off x="0" y="0"/>
-          <a:ext cx="0" cy="0"/>
-          <a:chOff x="0" y="0"/>
-          <a:chExt cx="0" cy="0"/>
-        </a:xfrm>
-      </p:grpSpPr>
-      <p:sp>
-        <p:nvSpPr>
-          <p:cNvPr id="2" name="Titel 1"/>
-          <p:cNvSpPr>
-            <a:spLocks noGrp="1"/>
-          </p:cNvSpPr>
-          <p:nvPr>
-            <p:ph type="title"/>
-          </p:nvPr>
-        </p:nvSpPr>
-        <p:spPr/>
-        <p:txBody>
-          <a:bodyPr/>
-          <a:lstStyle/>
-          <a:p>
-            <a:r>
-              <a:rPr lang="nl-NL" dirty="0" smtClean="0"/>
-              <a:t>Data </a:t>
-            </a:r>
-            <a:r>
-              <a:rPr lang="nl-NL" dirty="0" err="1" smtClean="0"/>
-              <a:t>Manipulation</a:t>
-            </a:r>
-            <a:endParaRPr lang="nl-NL" dirty="0"/>
-          </a:p>
-        </p:txBody>
-      </p:sp>
-      <p:sp>
-        <p:nvSpPr>
-          <p:cNvPr id="3" name="Tijdelijke aanduiding voor inhoud 2"/>
-          <p:cNvSpPr>
-            <a:spLocks noGrp="1"/>
-          </p:cNvSpPr>
-          <p:nvPr>
-            <p:ph idx="1"/>
-          </p:nvPr>
-        </p:nvSpPr>
-        <p:spPr/>
-        <p:txBody>
-          <a:bodyPr/>
-          <a:lstStyle/>
-          <a:p>
-            <a:endParaRPr lang="nl-NL"/>
-          </a:p>
-        </p:txBody>
-      </p:sp>
-    </p:spTree>
-    <p:extLst>
-      <p:ext uri="{BB962C8B-B14F-4D97-AF65-F5344CB8AC3E}">
-        <p14:creationId xmlns:p14="http://schemas.microsoft.com/office/powerpoint/2010/main" val="3314037050"/>
-      </p:ext>
-    </p:extLst>
-  </p:cSld>
-  <p:clrMapOvr>
-    <a:masterClrMapping/>
-  </p:clrMapOvr>
-</p:sld>
-</file>
-
-<file path=ppt/slides/slide35.xml><?xml version="1.0" encoding="utf-8"?>
-<p:sld xmlns:a="http://schemas.openxmlformats.org/drawingml/2006/main" xmlns:r="http://schemas.openxmlformats.org/officeDocument/2006/relationships" xmlns:p="http://schemas.openxmlformats.org/presentationml/2006/main">
-  <p:cSld>
-    <p:spTree>
-      <p:nvGrpSpPr>
-        <p:cNvPr id="1" name=""/>
-        <p:cNvGrpSpPr/>
-        <p:nvPr/>
-      </p:nvGrpSpPr>
-      <p:grpSpPr>
-        <a:xfrm>
-          <a:off x="0" y="0"/>
-          <a:ext cx="0" cy="0"/>
-          <a:chOff x="0" y="0"/>
-          <a:chExt cx="0" cy="0"/>
-        </a:xfrm>
-      </p:grpSpPr>
-      <p:sp>
-        <p:nvSpPr>
-          <p:cNvPr id="2" name="Titel 1"/>
-          <p:cNvSpPr>
-            <a:spLocks noGrp="1"/>
-          </p:cNvSpPr>
-          <p:nvPr>
-            <p:ph type="title"/>
-          </p:nvPr>
-        </p:nvSpPr>
-        <p:spPr/>
-        <p:txBody>
-          <a:bodyPr/>
-          <a:lstStyle/>
-          <a:p>
-            <a:r>
-              <a:rPr lang="nl-NL" dirty="0" err="1" smtClean="0"/>
-              <a:t>Promises</a:t>
-            </a:r>
-            <a:r>
-              <a:rPr lang="nl-NL" dirty="0" smtClean="0"/>
-              <a:t> / </a:t>
-            </a:r>
-            <a:r>
-              <a:rPr lang="nl-NL" dirty="0" err="1" smtClean="0"/>
-              <a:t>ASync</a:t>
-            </a:r>
-            <a:endParaRPr lang="nl-NL" dirty="0"/>
-          </a:p>
-        </p:txBody>
-      </p:sp>
-      <p:sp>
-        <p:nvSpPr>
-          <p:cNvPr id="3" name="Tijdelijke aanduiding voor inhoud 2"/>
-          <p:cNvSpPr>
-            <a:spLocks noGrp="1"/>
-          </p:cNvSpPr>
-          <p:nvPr>
-            <p:ph idx="1"/>
-          </p:nvPr>
-        </p:nvSpPr>
-        <p:spPr/>
-        <p:txBody>
-          <a:bodyPr/>
-          <a:lstStyle/>
-          <a:p>
-            <a:endParaRPr lang="nl-NL" dirty="0"/>
-          </a:p>
-        </p:txBody>
-      </p:sp>
-    </p:spTree>
-    <p:extLst>
-      <p:ext uri="{BB962C8B-B14F-4D97-AF65-F5344CB8AC3E}">
-        <p14:creationId xmlns:p14="http://schemas.microsoft.com/office/powerpoint/2010/main" val="2198492123"/>
-      </p:ext>
-    </p:extLst>
-  </p:cSld>
-  <p:clrMapOvr>
-    <a:masterClrMapping/>
-  </p:clrMapOvr>
-</p:sld>
-</file>
-
-<file path=ppt/slides/slide36.xml><?xml version="1.0" encoding="utf-8"?>
 <p:sld xmlns:a="http://schemas.openxmlformats.org/drawingml/2006/main" xmlns:r="http://schemas.openxmlformats.org/officeDocument/2006/relationships" xmlns:p="http://schemas.openxmlformats.org/presentationml/2006/main">
   <p:cSld>
     <p:spTree>

</xml_diff>

<commit_message>
Kleine aanpassing in de presentatie
</commit_message>
<xml_diff>
--- a/Presentatie/Front-End Development.pptx
+++ b/Presentatie/Front-End Development.pptx
@@ -5,44 +5,45 @@
     <p:sldMasterId id="2147483660" r:id="rId1"/>
   </p:sldMasterIdLst>
   <p:notesMasterIdLst>
-    <p:notesMasterId r:id="rId37"/>
+    <p:notesMasterId r:id="rId38"/>
   </p:notesMasterIdLst>
   <p:sldIdLst>
     <p:sldId id="256" r:id="rId2"/>
-    <p:sldId id="257" r:id="rId3"/>
-    <p:sldId id="258" r:id="rId4"/>
-    <p:sldId id="259" r:id="rId5"/>
-    <p:sldId id="260" r:id="rId6"/>
-    <p:sldId id="292" r:id="rId7"/>
-    <p:sldId id="293" r:id="rId8"/>
-    <p:sldId id="261" r:id="rId9"/>
-    <p:sldId id="276" r:id="rId10"/>
-    <p:sldId id="294" r:id="rId11"/>
-    <p:sldId id="275" r:id="rId12"/>
-    <p:sldId id="278" r:id="rId13"/>
-    <p:sldId id="279" r:id="rId14"/>
-    <p:sldId id="280" r:id="rId15"/>
-    <p:sldId id="281" r:id="rId16"/>
-    <p:sldId id="282" r:id="rId17"/>
-    <p:sldId id="283" r:id="rId18"/>
-    <p:sldId id="284" r:id="rId19"/>
-    <p:sldId id="288" r:id="rId20"/>
-    <p:sldId id="285" r:id="rId21"/>
-    <p:sldId id="286" r:id="rId22"/>
-    <p:sldId id="287" r:id="rId23"/>
-    <p:sldId id="277" r:id="rId24"/>
-    <p:sldId id="262" r:id="rId25"/>
-    <p:sldId id="263" r:id="rId26"/>
-    <p:sldId id="289" r:id="rId27"/>
-    <p:sldId id="290" r:id="rId28"/>
-    <p:sldId id="264" r:id="rId29"/>
-    <p:sldId id="267" r:id="rId30"/>
-    <p:sldId id="291" r:id="rId31"/>
-    <p:sldId id="265" r:id="rId32"/>
-    <p:sldId id="266" r:id="rId33"/>
-    <p:sldId id="268" r:id="rId34"/>
-    <p:sldId id="269" r:id="rId35"/>
-    <p:sldId id="274" r:id="rId36"/>
+    <p:sldId id="295" r:id="rId3"/>
+    <p:sldId id="257" r:id="rId4"/>
+    <p:sldId id="258" r:id="rId5"/>
+    <p:sldId id="259" r:id="rId6"/>
+    <p:sldId id="260" r:id="rId7"/>
+    <p:sldId id="292" r:id="rId8"/>
+    <p:sldId id="293" r:id="rId9"/>
+    <p:sldId id="261" r:id="rId10"/>
+    <p:sldId id="276" r:id="rId11"/>
+    <p:sldId id="294" r:id="rId12"/>
+    <p:sldId id="275" r:id="rId13"/>
+    <p:sldId id="278" r:id="rId14"/>
+    <p:sldId id="279" r:id="rId15"/>
+    <p:sldId id="280" r:id="rId16"/>
+    <p:sldId id="281" r:id="rId17"/>
+    <p:sldId id="282" r:id="rId18"/>
+    <p:sldId id="283" r:id="rId19"/>
+    <p:sldId id="284" r:id="rId20"/>
+    <p:sldId id="288" r:id="rId21"/>
+    <p:sldId id="285" r:id="rId22"/>
+    <p:sldId id="286" r:id="rId23"/>
+    <p:sldId id="287" r:id="rId24"/>
+    <p:sldId id="277" r:id="rId25"/>
+    <p:sldId id="262" r:id="rId26"/>
+    <p:sldId id="263" r:id="rId27"/>
+    <p:sldId id="289" r:id="rId28"/>
+    <p:sldId id="290" r:id="rId29"/>
+    <p:sldId id="264" r:id="rId30"/>
+    <p:sldId id="267" r:id="rId31"/>
+    <p:sldId id="291" r:id="rId32"/>
+    <p:sldId id="265" r:id="rId33"/>
+    <p:sldId id="266" r:id="rId34"/>
+    <p:sldId id="268" r:id="rId35"/>
+    <p:sldId id="269" r:id="rId36"/>
+    <p:sldId id="274" r:id="rId37"/>
   </p:sldIdLst>
   <p:sldSz cx="12192000" cy="6858000"/>
   <p:notesSz cx="6858000" cy="9144000"/>
@@ -147,6 +148,7 @@
         <p14:section name="Standaardsectie" id="{1398E4E2-9E28-4562-BE0C-E270A560BA2A}">
           <p14:sldIdLst>
             <p14:sldId id="256"/>
+            <p14:sldId id="295"/>
           </p14:sldIdLst>
         </p14:section>
         <p14:section name="Algemeen" id="{C204DCB9-0C39-46C1-AE5B-4234D36EF3C9}">
@@ -278,7 +280,7 @@
           <a:p>
             <a:fld id="{C5A381E3-FA85-4AE8-9B11-999D5E05561D}" type="datetimeFigureOut">
               <a:rPr lang="nl-NL" smtClean="0"/>
-              <a:t>26-10-2020</a:t>
+              <a:t>23-11-2020</a:t>
             </a:fld>
             <a:endParaRPr lang="nl-NL"/>
           </a:p>
@@ -626,7 +628,7 @@
           <a:p>
             <a:fld id="{A9AC6ED0-D734-4939-9338-F1A2206B4A78}" type="slidenum">
               <a:rPr lang="nl-NL" smtClean="0"/>
-              <a:t>3</a:t>
+              <a:t>4</a:t>
             </a:fld>
             <a:endParaRPr lang="nl-NL"/>
           </a:p>
@@ -732,7 +734,7 @@
           <a:p>
             <a:fld id="{A9AC6ED0-D734-4939-9338-F1A2206B4A78}" type="slidenum">
               <a:rPr lang="nl-NL" smtClean="0"/>
-              <a:t>19</a:t>
+              <a:t>20</a:t>
             </a:fld>
             <a:endParaRPr lang="nl-NL"/>
           </a:p>
@@ -816,7 +818,7 @@
           <a:p>
             <a:fld id="{A9AC6ED0-D734-4939-9338-F1A2206B4A78}" type="slidenum">
               <a:rPr lang="nl-NL" smtClean="0"/>
-              <a:t>22</a:t>
+              <a:t>23</a:t>
             </a:fld>
             <a:endParaRPr lang="nl-NL"/>
           </a:p>
@@ -900,7 +902,7 @@
           <a:p>
             <a:fld id="{A9AC6ED0-D734-4939-9338-F1A2206B4A78}" type="slidenum">
               <a:rPr lang="nl-NL" smtClean="0"/>
-              <a:t>23</a:t>
+              <a:t>24</a:t>
             </a:fld>
             <a:endParaRPr lang="nl-NL"/>
           </a:p>
@@ -984,7 +986,7 @@
           <a:p>
             <a:fld id="{A9AC6ED0-D734-4939-9338-F1A2206B4A78}" type="slidenum">
               <a:rPr lang="nl-NL" smtClean="0"/>
-              <a:t>35</a:t>
+              <a:t>36</a:t>
             </a:fld>
             <a:endParaRPr lang="nl-NL"/>
           </a:p>
@@ -1084,7 +1086,7 @@
           <a:p>
             <a:fld id="{A9AC6ED0-D734-4939-9338-F1A2206B4A78}" type="slidenum">
               <a:rPr lang="nl-NL" smtClean="0"/>
-              <a:t>4</a:t>
+              <a:t>5</a:t>
             </a:fld>
             <a:endParaRPr lang="nl-NL"/>
           </a:p>
@@ -1184,7 +1186,7 @@
           <a:p>
             <a:fld id="{A9AC6ED0-D734-4939-9338-F1A2206B4A78}" type="slidenum">
               <a:rPr lang="nl-NL" smtClean="0"/>
-              <a:t>5</a:t>
+              <a:t>6</a:t>
             </a:fld>
             <a:endParaRPr lang="nl-NL"/>
           </a:p>
@@ -1268,7 +1270,7 @@
           <a:p>
             <a:fld id="{A9AC6ED0-D734-4939-9338-F1A2206B4A78}" type="slidenum">
               <a:rPr lang="nl-NL" smtClean="0"/>
-              <a:t>6</a:t>
+              <a:t>7</a:t>
             </a:fld>
             <a:endParaRPr lang="nl-NL"/>
           </a:p>
@@ -1352,7 +1354,7 @@
           <a:p>
             <a:fld id="{A9AC6ED0-D734-4939-9338-F1A2206B4A78}" type="slidenum">
               <a:rPr lang="nl-NL" smtClean="0"/>
-              <a:t>7</a:t>
+              <a:t>8</a:t>
             </a:fld>
             <a:endParaRPr lang="nl-NL"/>
           </a:p>
@@ -1436,7 +1438,7 @@
           <a:p>
             <a:fld id="{A9AC6ED0-D734-4939-9338-F1A2206B4A78}" type="slidenum">
               <a:rPr lang="nl-NL" smtClean="0"/>
-              <a:t>8</a:t>
+              <a:t>9</a:t>
             </a:fld>
             <a:endParaRPr lang="nl-NL"/>
           </a:p>
@@ -1520,7 +1522,7 @@
           <a:p>
             <a:fld id="{A9AC6ED0-D734-4939-9338-F1A2206B4A78}" type="slidenum">
               <a:rPr lang="nl-NL" smtClean="0"/>
-              <a:t>11</a:t>
+              <a:t>12</a:t>
             </a:fld>
             <a:endParaRPr lang="nl-NL"/>
           </a:p>
@@ -1610,7 +1612,7 @@
           <a:p>
             <a:fld id="{A9AC6ED0-D734-4939-9338-F1A2206B4A78}" type="slidenum">
               <a:rPr lang="nl-NL" smtClean="0"/>
-              <a:t>14</a:t>
+              <a:t>15</a:t>
             </a:fld>
             <a:endParaRPr lang="nl-NL"/>
           </a:p>
@@ -1694,7 +1696,7 @@
           <a:p>
             <a:fld id="{A9AC6ED0-D734-4939-9338-F1A2206B4A78}" type="slidenum">
               <a:rPr lang="nl-NL" smtClean="0"/>
-              <a:t>17</a:t>
+              <a:t>18</a:t>
             </a:fld>
             <a:endParaRPr lang="nl-NL"/>
           </a:p>
@@ -7497,6 +7499,125 @@
       </p:grpSpPr>
       <p:sp>
         <p:nvSpPr>
+          <p:cNvPr id="4" name="Titel 3"/>
+          <p:cNvSpPr>
+            <a:spLocks noGrp="1"/>
+          </p:cNvSpPr>
+          <p:nvPr>
+            <p:ph type="title"/>
+          </p:nvPr>
+        </p:nvSpPr>
+        <p:spPr/>
+        <p:txBody>
+          <a:bodyPr/>
+          <a:lstStyle/>
+          <a:p>
+            <a:r>
+              <a:rPr lang="nl-NL" dirty="0"/>
+              <a:t>Code &amp; Information</a:t>
+            </a:r>
+          </a:p>
+        </p:txBody>
+      </p:sp>
+      <p:sp>
+        <p:nvSpPr>
+          <p:cNvPr id="5" name="Tijdelijke aanduiding voor inhoud 4"/>
+          <p:cNvSpPr>
+            <a:spLocks noGrp="1"/>
+          </p:cNvSpPr>
+          <p:nvPr>
+            <p:ph idx="1"/>
+          </p:nvPr>
+        </p:nvSpPr>
+        <p:spPr/>
+        <p:txBody>
+          <a:bodyPr/>
+          <a:lstStyle/>
+          <a:p>
+            <a:r>
+              <a:rPr lang="nl-NL" dirty="0"/>
+              <a:t>Git </a:t>
+            </a:r>
+            <a:r>
+              <a:rPr lang="nl-NL" dirty="0" err="1"/>
+              <a:t>clone</a:t>
+            </a:r>
+            <a:endParaRPr lang="nl-NL" dirty="0"/>
+          </a:p>
+          <a:p>
+            <a:pPr lvl="1"/>
+            <a:r>
+              <a:rPr lang="nl-NL" dirty="0">
+                <a:hlinkClick r:id="rId2"/>
+              </a:rPr>
+              <a:t>https://github.com/NHLStenden/Flex-WebDevelopment-FrontEndDevelopment.git</a:t>
+            </a:r>
+            <a:r>
+              <a:rPr lang="nl-NL" dirty="0"/>
+              <a:t> </a:t>
+            </a:r>
+          </a:p>
+          <a:p>
+            <a:r>
+              <a:rPr lang="nl-NL" dirty="0"/>
+              <a:t>README.md</a:t>
+            </a:r>
+          </a:p>
+          <a:p>
+            <a:pPr lvl="1"/>
+            <a:r>
+              <a:rPr lang="nl-NL" dirty="0"/>
+              <a:t>Inzien via GitHub</a:t>
+            </a:r>
+          </a:p>
+          <a:p>
+            <a:pPr lvl="1"/>
+            <a:r>
+              <a:rPr lang="nl-NL" dirty="0"/>
+              <a:t>Installeer .md-viewer in je IDE</a:t>
+            </a:r>
+          </a:p>
+          <a:p>
+            <a:pPr lvl="1"/>
+            <a:endParaRPr lang="nl-NL" dirty="0"/>
+          </a:p>
+          <a:p>
+            <a:endParaRPr lang="nl-NL" dirty="0"/>
+          </a:p>
+        </p:txBody>
+      </p:sp>
+    </p:spTree>
+    <p:extLst>
+      <p:ext uri="{BB962C8B-B14F-4D97-AF65-F5344CB8AC3E}">
+        <p14:creationId xmlns:p14="http://schemas.microsoft.com/office/powerpoint/2010/main" val="365649523"/>
+      </p:ext>
+    </p:extLst>
+  </p:cSld>
+  <p:clrMapOvr>
+    <a:masterClrMapping/>
+  </p:clrMapOvr>
+</p:sld>
+</file>
+
+<file path=ppt/slides/slide11.xml><?xml version="1.0" encoding="utf-8"?>
+<p:sld xmlns:a="http://schemas.openxmlformats.org/drawingml/2006/main" xmlns:r="http://schemas.openxmlformats.org/officeDocument/2006/relationships" xmlns:p="http://schemas.openxmlformats.org/presentationml/2006/main">
+  <p:cSld>
+    <p:spTree>
+      <p:nvGrpSpPr>
+        <p:cNvPr id="1" name=""/>
+        <p:cNvGrpSpPr/>
+        <p:nvPr/>
+      </p:nvGrpSpPr>
+      <p:grpSpPr>
+        <a:xfrm>
+          <a:off x="0" y="0"/>
+          <a:ext cx="0" cy="0"/>
+          <a:chOff x="0" y="0"/>
+          <a:chExt cx="0" cy="0"/>
+        </a:xfrm>
+      </p:grpSpPr>
+      <p:sp>
+        <p:nvSpPr>
           <p:cNvPr id="2" name="Titel 1">
             <a:extLst>
               <a:ext uri="{FF2B5EF4-FFF2-40B4-BE49-F238E27FC236}">
@@ -7815,67 +7936,6 @@
 </p:sld>
 </file>
 
-<file path=ppt/slides/slide11.xml><?xml version="1.0" encoding="utf-8"?>
-<p:sld xmlns:a="http://schemas.openxmlformats.org/drawingml/2006/main" xmlns:r="http://schemas.openxmlformats.org/officeDocument/2006/relationships" xmlns:p="http://schemas.openxmlformats.org/presentationml/2006/main">
-  <p:cSld>
-    <p:spTree>
-      <p:nvGrpSpPr>
-        <p:cNvPr id="1" name=""/>
-        <p:cNvGrpSpPr/>
-        <p:nvPr/>
-      </p:nvGrpSpPr>
-      <p:grpSpPr>
-        <a:xfrm>
-          <a:off x="0" y="0"/>
-          <a:ext cx="0" cy="0"/>
-          <a:chOff x="0" y="0"/>
-          <a:chExt cx="0" cy="0"/>
-        </a:xfrm>
-      </p:grpSpPr>
-      <p:sp>
-        <p:nvSpPr>
-          <p:cNvPr id="4" name="Titel 3"/>
-          <p:cNvSpPr>
-            <a:spLocks noGrp="1"/>
-          </p:cNvSpPr>
-          <p:nvPr>
-            <p:ph type="title"/>
-          </p:nvPr>
-        </p:nvSpPr>
-        <p:spPr>
-          <a:xfrm>
-            <a:off x="2462518" y="1490472"/>
-            <a:ext cx="8815082" cy="1993392"/>
-          </a:xfrm>
-        </p:spPr>
-        <p:txBody>
-          <a:bodyPr/>
-          <a:lstStyle/>
-          <a:p>
-            <a:r>
-              <a:rPr lang="nl-NL" dirty="0" err="1"/>
-              <a:t>What</a:t>
-            </a:r>
-            <a:r>
-              <a:rPr lang="nl-NL" dirty="0"/>
-              <a:t> is Front-End Development?</a:t>
-            </a:r>
-          </a:p>
-        </p:txBody>
-      </p:sp>
-    </p:spTree>
-    <p:extLst>
-      <p:ext uri="{BB962C8B-B14F-4D97-AF65-F5344CB8AC3E}">
-        <p14:creationId xmlns:p14="http://schemas.microsoft.com/office/powerpoint/2010/main" val="2884444833"/>
-      </p:ext>
-    </p:extLst>
-  </p:cSld>
-  <p:clrMapOvr>
-    <a:masterClrMapping/>
-  </p:clrMapOvr>
-</p:sld>
-</file>
-
 <file path=ppt/slides/slide12.xml><?xml version="1.0" encoding="utf-8"?>
 <p:sld xmlns:a="http://schemas.openxmlformats.org/drawingml/2006/main" xmlns:r="http://schemas.openxmlformats.org/officeDocument/2006/relationships" xmlns:p="http://schemas.openxmlformats.org/presentationml/2006/main">
   <p:cSld>
@@ -7903,7 +7963,12 @@
             <p:ph type="title"/>
           </p:nvPr>
         </p:nvSpPr>
-        <p:spPr/>
+        <p:spPr>
+          <a:xfrm>
+            <a:off x="2462518" y="1490472"/>
+            <a:ext cx="8815082" cy="1993392"/>
+          </a:xfrm>
+        </p:spPr>
         <p:txBody>
           <a:bodyPr/>
           <a:lstStyle/>
@@ -7916,119 +7981,13 @@
               <a:rPr lang="nl-NL" dirty="0"/>
               <a:t> is Front-End Development?</a:t>
             </a:r>
-          </a:p>
-        </p:txBody>
-      </p:sp>
-      <p:sp>
-        <p:nvSpPr>
-          <p:cNvPr id="5" name="Tijdelijke aanduiding voor inhoud 4"/>
-          <p:cNvSpPr>
-            <a:spLocks noGrp="1"/>
-          </p:cNvSpPr>
-          <p:nvPr>
-            <p:ph idx="1"/>
-          </p:nvPr>
-        </p:nvSpPr>
-        <p:spPr/>
-        <p:txBody>
-          <a:bodyPr/>
-          <a:lstStyle/>
-          <a:p>
-            <a:r>
-              <a:rPr lang="nl-NL" dirty="0"/>
-              <a:t>De browser (“</a:t>
-            </a:r>
-            <a:r>
-              <a:rPr lang="nl-NL" dirty="0" err="1"/>
-              <a:t>client</a:t>
-            </a:r>
-            <a:r>
-              <a:rPr lang="nl-NL" dirty="0"/>
-              <a:t>”) krijgt een belangrijkere rol</a:t>
-            </a:r>
-          </a:p>
-          <a:p>
-            <a:r>
-              <a:rPr lang="nl-NL" dirty="0"/>
-              <a:t>Een extract van een online vacature voor FE-Developer:</a:t>
-            </a:r>
-          </a:p>
-          <a:p>
-            <a:pPr lvl="1"/>
-            <a:r>
-              <a:rPr lang="nl-NL" sz="1800" dirty="0"/>
-              <a:t>Een front-end </a:t>
-            </a:r>
-            <a:r>
-              <a:rPr lang="nl-NL" sz="1800" dirty="0" err="1"/>
-              <a:t>developer</a:t>
-            </a:r>
-            <a:r>
-              <a:rPr lang="nl-NL" sz="1800" dirty="0"/>
-              <a:t> (ook wel front-end programmeur of front-end ontwikkelaar) is iemand die verantwoordelijk is voor de technische kant van het front-end (de voorkant) van een applicatie, website of programma. Hij zorgt in feite voor de verbinding tussen het design en de programmatuur die nodig is om het te laten functioneren. Veel front-end </a:t>
-            </a:r>
-            <a:r>
-              <a:rPr lang="nl-NL" sz="1800" dirty="0" err="1"/>
-              <a:t>developers</a:t>
-            </a:r>
-            <a:r>
-              <a:rPr lang="nl-NL" sz="1800" dirty="0"/>
-              <a:t> hebben zich gespecialiseerd in een bepaald </a:t>
-            </a:r>
-            <a:r>
-              <a:rPr lang="nl-NL" sz="1800" dirty="0" err="1"/>
-              <a:t>framework</a:t>
-            </a:r>
-            <a:r>
-              <a:rPr lang="nl-NL" sz="1800" dirty="0"/>
-              <a:t> of een specifieke programmeertaal, zodat er bijvoorbeeld .NET-</a:t>
-            </a:r>
-            <a:r>
-              <a:rPr lang="nl-NL" sz="1800" dirty="0" err="1"/>
-              <a:t>developers</a:t>
-            </a:r>
-            <a:r>
-              <a:rPr lang="nl-NL" sz="1800" dirty="0"/>
-              <a:t>, PHP-</a:t>
-            </a:r>
-            <a:r>
-              <a:rPr lang="nl-NL" sz="1800" dirty="0" err="1"/>
-              <a:t>developers</a:t>
-            </a:r>
-            <a:r>
-              <a:rPr lang="nl-NL" sz="1800" dirty="0"/>
-              <a:t>, Java-</a:t>
-            </a:r>
-            <a:r>
-              <a:rPr lang="nl-NL" sz="1800" dirty="0" err="1"/>
-              <a:t>developers</a:t>
-            </a:r>
-            <a:r>
-              <a:rPr lang="nl-NL" sz="1800" dirty="0"/>
-              <a:t> en C++ </a:t>
-            </a:r>
-            <a:r>
-              <a:rPr lang="nl-NL" sz="1800" dirty="0" err="1"/>
-              <a:t>developers</a:t>
-            </a:r>
-            <a:r>
-              <a:rPr lang="nl-NL" sz="1800" dirty="0"/>
-              <a:t> zijn</a:t>
-            </a:r>
-          </a:p>
-          <a:p>
-            <a:pPr lvl="1"/>
-            <a:endParaRPr lang="nl-NL" sz="1800" dirty="0"/>
-          </a:p>
-          <a:p>
-            <a:endParaRPr lang="nl-NL" sz="1800" dirty="0"/>
           </a:p>
         </p:txBody>
       </p:sp>
     </p:spTree>
     <p:extLst>
       <p:ext uri="{BB962C8B-B14F-4D97-AF65-F5344CB8AC3E}">
-        <p14:creationId xmlns:p14="http://schemas.microsoft.com/office/powerpoint/2010/main" val="4001887719"/>
+        <p14:creationId xmlns:p14="http://schemas.microsoft.com/office/powerpoint/2010/main" val="2884444833"/>
       </p:ext>
     </p:extLst>
   </p:cSld>
@@ -8057,7 +8016,7 @@
       </p:grpSpPr>
       <p:sp>
         <p:nvSpPr>
-          <p:cNvPr id="2" name="Titel 1"/>
+          <p:cNvPr id="4" name="Titel 3"/>
           <p:cNvSpPr>
             <a:spLocks noGrp="1"/>
           </p:cNvSpPr>
@@ -8071,15 +8030,19 @@
           <a:lstStyle/>
           <a:p>
             <a:r>
-              <a:rPr lang="nl-NL" dirty="0"/>
-              <a:t>Mogelijke onderdelen</a:t>
-            </a:r>
-          </a:p>
-        </p:txBody>
-      </p:sp>
-      <p:sp>
-        <p:nvSpPr>
-          <p:cNvPr id="3" name="Tijdelijke aanduiding voor inhoud 2"/>
+              <a:rPr lang="nl-NL" dirty="0" err="1"/>
+              <a:t>What</a:t>
+            </a:r>
+            <a:r>
+              <a:rPr lang="nl-NL" dirty="0"/>
+              <a:t> is Front-End Development?</a:t>
+            </a:r>
+          </a:p>
+        </p:txBody>
+      </p:sp>
+      <p:sp>
+        <p:nvSpPr>
+          <p:cNvPr id="5" name="Tijdelijke aanduiding voor inhoud 4"/>
           <p:cNvSpPr>
             <a:spLocks noGrp="1"/>
           </p:cNvSpPr>
@@ -8089,222 +8052,104 @@
         </p:nvSpPr>
         <p:spPr/>
         <p:txBody>
-          <a:bodyPr>
-            <a:normAutofit fontScale="70000" lnSpcReduction="20000"/>
-          </a:bodyPr>
+          <a:bodyPr/>
           <a:lstStyle/>
           <a:p>
             <a:r>
               <a:rPr lang="nl-NL" dirty="0"/>
-              <a:t>Toegang tot sensors / </a:t>
+              <a:t>De browser (“</a:t>
             </a:r>
             <a:r>
               <a:rPr lang="nl-NL" dirty="0" err="1"/>
-              <a:t>devices</a:t>
-            </a:r>
-            <a:endParaRPr lang="nl-NL" dirty="0"/>
+              <a:t>client</a:t>
+            </a:r>
+            <a:r>
+              <a:rPr lang="nl-NL" dirty="0"/>
+              <a:t>”) krijgt een belangrijkere rol</a:t>
+            </a:r>
+          </a:p>
+          <a:p>
+            <a:r>
+              <a:rPr lang="nl-NL" dirty="0"/>
+              <a:t>Een extract van een online vacature voor FE-Developer:</a:t>
+            </a:r>
           </a:p>
           <a:p>
             <a:pPr lvl="1"/>
             <a:r>
-              <a:rPr lang="nl-NL" dirty="0"/>
-              <a:t>GPS</a:t>
+              <a:rPr lang="nl-NL" sz="1800" dirty="0"/>
+              <a:t>Een front-end </a:t>
+            </a:r>
+            <a:r>
+              <a:rPr lang="nl-NL" sz="1800" dirty="0" err="1"/>
+              <a:t>developer</a:t>
+            </a:r>
+            <a:r>
+              <a:rPr lang="nl-NL" sz="1800" dirty="0"/>
+              <a:t> (ook wel front-end programmeur of front-end ontwikkelaar) is iemand die verantwoordelijk is voor de technische kant van het front-end (de voorkant) van een applicatie, website of programma. Hij zorgt in feite voor de verbinding tussen het design en de programmatuur die nodig is om het te laten functioneren. Veel front-end </a:t>
+            </a:r>
+            <a:r>
+              <a:rPr lang="nl-NL" sz="1800" dirty="0" err="1"/>
+              <a:t>developers</a:t>
+            </a:r>
+            <a:r>
+              <a:rPr lang="nl-NL" sz="1800" dirty="0"/>
+              <a:t> hebben zich gespecialiseerd in een bepaald </a:t>
+            </a:r>
+            <a:r>
+              <a:rPr lang="nl-NL" sz="1800" dirty="0" err="1"/>
+              <a:t>framework</a:t>
+            </a:r>
+            <a:r>
+              <a:rPr lang="nl-NL" sz="1800" dirty="0"/>
+              <a:t> of een specifieke programmeertaal, zodat er bijvoorbeeld .NET-</a:t>
+            </a:r>
+            <a:r>
+              <a:rPr lang="nl-NL" sz="1800" dirty="0" err="1"/>
+              <a:t>developers</a:t>
+            </a:r>
+            <a:r>
+              <a:rPr lang="nl-NL" sz="1800" dirty="0"/>
+              <a:t>, PHP-</a:t>
+            </a:r>
+            <a:r>
+              <a:rPr lang="nl-NL" sz="1800" dirty="0" err="1"/>
+              <a:t>developers</a:t>
+            </a:r>
+            <a:r>
+              <a:rPr lang="nl-NL" sz="1800" dirty="0"/>
+              <a:t>, Java-</a:t>
+            </a:r>
+            <a:r>
+              <a:rPr lang="nl-NL" sz="1800" dirty="0" err="1"/>
+              <a:t>developers</a:t>
+            </a:r>
+            <a:r>
+              <a:rPr lang="nl-NL" sz="1800" dirty="0"/>
+              <a:t> en C++ </a:t>
+            </a:r>
+            <a:r>
+              <a:rPr lang="nl-NL" sz="1800" dirty="0" err="1"/>
+              <a:t>developers</a:t>
+            </a:r>
+            <a:r>
+              <a:rPr lang="nl-NL" sz="1800" dirty="0"/>
+              <a:t> zijn</a:t>
             </a:r>
           </a:p>
           <a:p>
             <a:pPr lvl="1"/>
-            <a:r>
-              <a:rPr lang="nl-NL" dirty="0"/>
-              <a:t>Camera</a:t>
-            </a:r>
-          </a:p>
-          <a:p>
-            <a:r>
-              <a:rPr lang="nl-NL" dirty="0"/>
-              <a:t>Uitvoering van code in je browser </a:t>
-            </a:r>
-            <a:r>
-              <a:rPr lang="nl-NL" dirty="0" err="1"/>
-              <a:t>ipv</a:t>
-            </a:r>
-            <a:r>
-              <a:rPr lang="nl-NL" dirty="0"/>
-              <a:t> op de server</a:t>
-            </a:r>
-          </a:p>
-          <a:p>
-            <a:pPr lvl="1"/>
-            <a:r>
-              <a:rPr lang="nl-NL" dirty="0"/>
-              <a:t>Javascript</a:t>
-            </a:r>
-          </a:p>
-          <a:p>
-            <a:pPr lvl="1"/>
-            <a:r>
-              <a:rPr lang="nl-NL" dirty="0"/>
-              <a:t>Web Assembly (</a:t>
-            </a:r>
-            <a:r>
-              <a:rPr lang="nl-NL" i="1" dirty="0"/>
-              <a:t>nieuw</a:t>
-            </a:r>
-            <a:r>
-              <a:rPr lang="nl-NL" dirty="0"/>
-              <a:t>)</a:t>
-            </a:r>
-          </a:p>
-          <a:p>
-            <a:r>
-              <a:rPr lang="nl-NL" dirty="0"/>
-              <a:t>Grote rol voor opmaak</a:t>
-            </a:r>
-          </a:p>
-          <a:p>
-            <a:pPr lvl="1"/>
-            <a:r>
-              <a:rPr lang="nl-NL" dirty="0"/>
-              <a:t>Canvas</a:t>
-            </a:r>
-          </a:p>
-          <a:p>
-            <a:pPr lvl="1"/>
-            <a:r>
-              <a:rPr lang="nl-NL" dirty="0"/>
-              <a:t>SVG</a:t>
-            </a:r>
-          </a:p>
-          <a:p>
-            <a:pPr lvl="1"/>
-            <a:r>
-              <a:rPr lang="nl-NL" dirty="0"/>
-              <a:t>CSS (SASS, LESS)</a:t>
-            </a:r>
-          </a:p>
-          <a:p>
-            <a:pPr lvl="1"/>
-            <a:r>
-              <a:rPr lang="nl-NL" dirty="0"/>
-              <a:t>3d (</a:t>
-            </a:r>
-            <a:r>
-              <a:rPr lang="nl-NL" dirty="0" err="1"/>
-              <a:t>WebGL</a:t>
-            </a:r>
-            <a:r>
-              <a:rPr lang="nl-NL" dirty="0"/>
-              <a:t>)</a:t>
-            </a:r>
-          </a:p>
-          <a:p>
-            <a:pPr lvl="1"/>
-            <a:r>
-              <a:rPr lang="nl-NL" dirty="0"/>
-              <a:t>Animaties</a:t>
-            </a:r>
-          </a:p>
-          <a:p>
-            <a:r>
-              <a:rPr lang="nl-NL" dirty="0"/>
-              <a:t>Veel gebruikte technieken</a:t>
-            </a:r>
-          </a:p>
-          <a:p>
-            <a:pPr lvl="1"/>
-            <a:r>
-              <a:rPr lang="nl-NL" dirty="0"/>
-              <a:t>Component </a:t>
-            </a:r>
-            <a:r>
-              <a:rPr lang="nl-NL" dirty="0" err="1"/>
-              <a:t>based</a:t>
-            </a:r>
-            <a:r>
-              <a:rPr lang="nl-NL" dirty="0"/>
-              <a:t> design</a:t>
-            </a:r>
-          </a:p>
-          <a:p>
-            <a:pPr lvl="1"/>
-            <a:r>
-              <a:rPr lang="nl-NL" dirty="0"/>
-              <a:t>Just-in-time gegevens ophalen (AJAX)</a:t>
-            </a:r>
-          </a:p>
-          <a:p>
-            <a:pPr lvl="1"/>
-            <a:r>
-              <a:rPr lang="nl-NL" dirty="0"/>
-              <a:t>Single Page Application (SPA)</a:t>
-            </a:r>
-          </a:p>
-          <a:p>
-            <a:pPr lvl="1"/>
-            <a:r>
-              <a:rPr lang="nl-NL" dirty="0" err="1"/>
-              <a:t>Transpiling</a:t>
-            </a:r>
-            <a:endParaRPr lang="nl-NL" dirty="0"/>
-          </a:p>
-          <a:p>
-            <a:r>
-              <a:rPr lang="nl-NL" dirty="0"/>
-              <a:t>Gebruik van </a:t>
-            </a:r>
-            <a:r>
-              <a:rPr lang="nl-NL" dirty="0" err="1"/>
-              <a:t>frameworks</a:t>
-            </a:r>
-            <a:endParaRPr lang="nl-NL" dirty="0"/>
-          </a:p>
-          <a:p>
-            <a:pPr lvl="1"/>
-            <a:r>
-              <a:rPr lang="nl-NL" dirty="0" err="1"/>
-              <a:t>JQuery</a:t>
-            </a:r>
-            <a:endParaRPr lang="nl-NL" dirty="0"/>
-          </a:p>
-          <a:p>
-            <a:pPr lvl="1"/>
-            <a:r>
-              <a:rPr lang="nl-NL" dirty="0" err="1"/>
-              <a:t>Angular</a:t>
-            </a:r>
-            <a:endParaRPr lang="nl-NL" dirty="0"/>
-          </a:p>
-          <a:p>
-            <a:pPr lvl="1"/>
-            <a:r>
-              <a:rPr lang="nl-NL" dirty="0" err="1"/>
-              <a:t>React</a:t>
-            </a:r>
-            <a:endParaRPr lang="nl-NL" dirty="0"/>
-          </a:p>
-          <a:p>
-            <a:pPr lvl="1"/>
-            <a:r>
-              <a:rPr lang="nl-NL" dirty="0"/>
-              <a:t>Bootstrap</a:t>
-            </a:r>
-          </a:p>
-          <a:p>
-            <a:pPr lvl="1"/>
-            <a:r>
-              <a:rPr lang="nl-NL" dirty="0" err="1"/>
-              <a:t>Materialize</a:t>
-            </a:r>
-            <a:endParaRPr lang="nl-NL" dirty="0"/>
-          </a:p>
-          <a:p>
-            <a:endParaRPr lang="nl-NL" dirty="0"/>
+            <a:endParaRPr lang="nl-NL" sz="1800" dirty="0"/>
+          </a:p>
+          <a:p>
+            <a:endParaRPr lang="nl-NL" sz="1800" dirty="0"/>
           </a:p>
         </p:txBody>
       </p:sp>
     </p:spTree>
     <p:extLst>
       <p:ext uri="{BB962C8B-B14F-4D97-AF65-F5344CB8AC3E}">
-        <p14:creationId xmlns:p14="http://schemas.microsoft.com/office/powerpoint/2010/main" val="76829005"/>
+        <p14:creationId xmlns:p14="http://schemas.microsoft.com/office/powerpoint/2010/main" val="4001887719"/>
       </p:ext>
     </p:extLst>
   </p:cSld>
@@ -8348,6 +8193,282 @@
           <a:p>
             <a:r>
               <a:rPr lang="nl-NL" dirty="0"/>
+              <a:t>Mogelijke onderdelen</a:t>
+            </a:r>
+          </a:p>
+        </p:txBody>
+      </p:sp>
+      <p:sp>
+        <p:nvSpPr>
+          <p:cNvPr id="3" name="Tijdelijke aanduiding voor inhoud 2"/>
+          <p:cNvSpPr>
+            <a:spLocks noGrp="1"/>
+          </p:cNvSpPr>
+          <p:nvPr>
+            <p:ph idx="1"/>
+          </p:nvPr>
+        </p:nvSpPr>
+        <p:spPr/>
+        <p:txBody>
+          <a:bodyPr>
+            <a:normAutofit fontScale="70000" lnSpcReduction="20000"/>
+          </a:bodyPr>
+          <a:lstStyle/>
+          <a:p>
+            <a:r>
+              <a:rPr lang="nl-NL" dirty="0"/>
+              <a:t>Toegang tot sensors / </a:t>
+            </a:r>
+            <a:r>
+              <a:rPr lang="nl-NL" dirty="0" err="1"/>
+              <a:t>devices</a:t>
+            </a:r>
+            <a:endParaRPr lang="nl-NL" dirty="0"/>
+          </a:p>
+          <a:p>
+            <a:pPr lvl="1"/>
+            <a:r>
+              <a:rPr lang="nl-NL" dirty="0"/>
+              <a:t>GPS</a:t>
+            </a:r>
+          </a:p>
+          <a:p>
+            <a:pPr lvl="1"/>
+            <a:r>
+              <a:rPr lang="nl-NL" dirty="0"/>
+              <a:t>Camera</a:t>
+            </a:r>
+          </a:p>
+          <a:p>
+            <a:r>
+              <a:rPr lang="nl-NL" dirty="0"/>
+              <a:t>Uitvoering van code in je browser </a:t>
+            </a:r>
+            <a:r>
+              <a:rPr lang="nl-NL" dirty="0" err="1"/>
+              <a:t>ipv</a:t>
+            </a:r>
+            <a:r>
+              <a:rPr lang="nl-NL" dirty="0"/>
+              <a:t> op de server</a:t>
+            </a:r>
+          </a:p>
+          <a:p>
+            <a:pPr lvl="1"/>
+            <a:r>
+              <a:rPr lang="nl-NL" dirty="0"/>
+              <a:t>Javascript</a:t>
+            </a:r>
+          </a:p>
+          <a:p>
+            <a:pPr lvl="1"/>
+            <a:r>
+              <a:rPr lang="nl-NL" dirty="0"/>
+              <a:t>Web Assembly (</a:t>
+            </a:r>
+            <a:r>
+              <a:rPr lang="nl-NL" i="1" dirty="0"/>
+              <a:t>nieuw</a:t>
+            </a:r>
+            <a:r>
+              <a:rPr lang="nl-NL" dirty="0"/>
+              <a:t>)</a:t>
+            </a:r>
+          </a:p>
+          <a:p>
+            <a:r>
+              <a:rPr lang="nl-NL" dirty="0"/>
+              <a:t>Grote rol voor opmaak</a:t>
+            </a:r>
+          </a:p>
+          <a:p>
+            <a:pPr lvl="1"/>
+            <a:r>
+              <a:rPr lang="nl-NL" dirty="0"/>
+              <a:t>Canvas</a:t>
+            </a:r>
+          </a:p>
+          <a:p>
+            <a:pPr lvl="1"/>
+            <a:r>
+              <a:rPr lang="nl-NL" dirty="0"/>
+              <a:t>SVG</a:t>
+            </a:r>
+          </a:p>
+          <a:p>
+            <a:pPr lvl="1"/>
+            <a:r>
+              <a:rPr lang="nl-NL" dirty="0"/>
+              <a:t>CSS (SASS, LESS)</a:t>
+            </a:r>
+          </a:p>
+          <a:p>
+            <a:pPr lvl="1"/>
+            <a:r>
+              <a:rPr lang="nl-NL" dirty="0"/>
+              <a:t>3d (</a:t>
+            </a:r>
+            <a:r>
+              <a:rPr lang="nl-NL" dirty="0" err="1"/>
+              <a:t>WebGL</a:t>
+            </a:r>
+            <a:r>
+              <a:rPr lang="nl-NL" dirty="0"/>
+              <a:t>)</a:t>
+            </a:r>
+          </a:p>
+          <a:p>
+            <a:pPr lvl="1"/>
+            <a:r>
+              <a:rPr lang="nl-NL" dirty="0"/>
+              <a:t>Animaties</a:t>
+            </a:r>
+          </a:p>
+          <a:p>
+            <a:r>
+              <a:rPr lang="nl-NL" dirty="0"/>
+              <a:t>Veel gebruikte technieken</a:t>
+            </a:r>
+          </a:p>
+          <a:p>
+            <a:pPr lvl="1"/>
+            <a:r>
+              <a:rPr lang="nl-NL" dirty="0"/>
+              <a:t>Component </a:t>
+            </a:r>
+            <a:r>
+              <a:rPr lang="nl-NL" dirty="0" err="1"/>
+              <a:t>based</a:t>
+            </a:r>
+            <a:r>
+              <a:rPr lang="nl-NL" dirty="0"/>
+              <a:t> design</a:t>
+            </a:r>
+          </a:p>
+          <a:p>
+            <a:pPr lvl="1"/>
+            <a:r>
+              <a:rPr lang="nl-NL" dirty="0"/>
+              <a:t>Just-in-time gegevens ophalen (AJAX)</a:t>
+            </a:r>
+          </a:p>
+          <a:p>
+            <a:pPr lvl="1"/>
+            <a:r>
+              <a:rPr lang="nl-NL" dirty="0"/>
+              <a:t>Single Page Application (SPA)</a:t>
+            </a:r>
+          </a:p>
+          <a:p>
+            <a:pPr lvl="1"/>
+            <a:r>
+              <a:rPr lang="nl-NL" dirty="0" err="1"/>
+              <a:t>Transpiling</a:t>
+            </a:r>
+            <a:endParaRPr lang="nl-NL" dirty="0"/>
+          </a:p>
+          <a:p>
+            <a:r>
+              <a:rPr lang="nl-NL" dirty="0"/>
+              <a:t>Gebruik van </a:t>
+            </a:r>
+            <a:r>
+              <a:rPr lang="nl-NL" dirty="0" err="1"/>
+              <a:t>frameworks</a:t>
+            </a:r>
+            <a:endParaRPr lang="nl-NL" dirty="0"/>
+          </a:p>
+          <a:p>
+            <a:pPr lvl="1"/>
+            <a:r>
+              <a:rPr lang="nl-NL" dirty="0" err="1"/>
+              <a:t>JQuery</a:t>
+            </a:r>
+            <a:endParaRPr lang="nl-NL" dirty="0"/>
+          </a:p>
+          <a:p>
+            <a:pPr lvl="1"/>
+            <a:r>
+              <a:rPr lang="nl-NL" dirty="0" err="1"/>
+              <a:t>Angular</a:t>
+            </a:r>
+            <a:endParaRPr lang="nl-NL" dirty="0"/>
+          </a:p>
+          <a:p>
+            <a:pPr lvl="1"/>
+            <a:r>
+              <a:rPr lang="nl-NL" dirty="0" err="1"/>
+              <a:t>React</a:t>
+            </a:r>
+            <a:endParaRPr lang="nl-NL" dirty="0"/>
+          </a:p>
+          <a:p>
+            <a:pPr lvl="1"/>
+            <a:r>
+              <a:rPr lang="nl-NL" dirty="0"/>
+              <a:t>Bootstrap</a:t>
+            </a:r>
+          </a:p>
+          <a:p>
+            <a:pPr lvl="1"/>
+            <a:r>
+              <a:rPr lang="nl-NL" dirty="0" err="1"/>
+              <a:t>Materialize</a:t>
+            </a:r>
+            <a:endParaRPr lang="nl-NL" dirty="0"/>
+          </a:p>
+          <a:p>
+            <a:endParaRPr lang="nl-NL" dirty="0"/>
+          </a:p>
+        </p:txBody>
+      </p:sp>
+    </p:spTree>
+    <p:extLst>
+      <p:ext uri="{BB962C8B-B14F-4D97-AF65-F5344CB8AC3E}">
+        <p14:creationId xmlns:p14="http://schemas.microsoft.com/office/powerpoint/2010/main" val="76829005"/>
+      </p:ext>
+    </p:extLst>
+  </p:cSld>
+  <p:clrMapOvr>
+    <a:masterClrMapping/>
+  </p:clrMapOvr>
+</p:sld>
+</file>
+
+<file path=ppt/slides/slide15.xml><?xml version="1.0" encoding="utf-8"?>
+<p:sld xmlns:a="http://schemas.openxmlformats.org/drawingml/2006/main" xmlns:r="http://schemas.openxmlformats.org/officeDocument/2006/relationships" xmlns:p="http://schemas.openxmlformats.org/presentationml/2006/main">
+  <p:cSld>
+    <p:spTree>
+      <p:nvGrpSpPr>
+        <p:cNvPr id="1" name=""/>
+        <p:cNvGrpSpPr/>
+        <p:nvPr/>
+      </p:nvGrpSpPr>
+      <p:grpSpPr>
+        <a:xfrm>
+          <a:off x="0" y="0"/>
+          <a:ext cx="0" cy="0"/>
+          <a:chOff x="0" y="0"/>
+          <a:chExt cx="0" cy="0"/>
+        </a:xfrm>
+      </p:grpSpPr>
+      <p:sp>
+        <p:nvSpPr>
+          <p:cNvPr id="2" name="Titel 1"/>
+          <p:cNvSpPr>
+            <a:spLocks noGrp="1"/>
+          </p:cNvSpPr>
+          <p:nvPr>
+            <p:ph type="title"/>
+          </p:nvPr>
+        </p:nvSpPr>
+        <p:spPr/>
+        <p:txBody>
+          <a:bodyPr/>
+          <a:lstStyle/>
+          <a:p>
+            <a:r>
+              <a:rPr lang="nl-NL" dirty="0"/>
               <a:t>De </a:t>
             </a:r>
             <a:r>
@@ -8453,7 +8574,7 @@
 </p:sld>
 </file>
 
-<file path=ppt/slides/slide15.xml><?xml version="1.0" encoding="utf-8"?>
+<file path=ppt/slides/slide16.xml><?xml version="1.0" encoding="utf-8"?>
 <p:sld xmlns:a="http://schemas.openxmlformats.org/drawingml/2006/main" xmlns:r="http://schemas.openxmlformats.org/officeDocument/2006/relationships" xmlns:p="http://schemas.openxmlformats.org/presentationml/2006/main">
   <p:cSld>
     <p:spTree>
@@ -8558,7 +8679,7 @@
 </p:sld>
 </file>
 
-<file path=ppt/slides/slide16.xml><?xml version="1.0" encoding="utf-8"?>
+<file path=ppt/slides/slide17.xml><?xml version="1.0" encoding="utf-8"?>
 <p:sld xmlns:a="http://schemas.openxmlformats.org/drawingml/2006/main" xmlns:r="http://schemas.openxmlformats.org/officeDocument/2006/relationships" xmlns:p="http://schemas.openxmlformats.org/presentationml/2006/main">
   <p:cSld>
     <p:spTree>
@@ -8663,7 +8784,7 @@
 </p:sld>
 </file>
 
-<file path=ppt/slides/slide17.xml><?xml version="1.0" encoding="utf-8"?>
+<file path=ppt/slides/slide18.xml><?xml version="1.0" encoding="utf-8"?>
 <p:sld xmlns:a="http://schemas.openxmlformats.org/drawingml/2006/main" xmlns:r="http://schemas.openxmlformats.org/officeDocument/2006/relationships" xmlns:p="http://schemas.openxmlformats.org/presentationml/2006/main">
   <p:cSld>
     <p:spTree>
@@ -8768,7 +8889,7 @@
 </p:sld>
 </file>
 
-<file path=ppt/slides/slide18.xml><?xml version="1.0" encoding="utf-8"?>
+<file path=ppt/slides/slide19.xml><?xml version="1.0" encoding="utf-8"?>
 <p:sld xmlns:a="http://schemas.openxmlformats.org/drawingml/2006/main" xmlns:r="http://schemas.openxmlformats.org/officeDocument/2006/relationships" xmlns:p="http://schemas.openxmlformats.org/presentationml/2006/main">
   <p:cSld>
     <p:spTree>
@@ -8883,7 +9004,130 @@
 </p:sld>
 </file>
 
-<file path=ppt/slides/slide19.xml><?xml version="1.0" encoding="utf-8"?>
+<file path=ppt/slides/slide2.xml><?xml version="1.0" encoding="utf-8"?>
+<p:sld xmlns:a="http://schemas.openxmlformats.org/drawingml/2006/main" xmlns:r="http://schemas.openxmlformats.org/officeDocument/2006/relationships" xmlns:p="http://schemas.openxmlformats.org/presentationml/2006/main">
+  <p:cSld>
+    <p:spTree>
+      <p:nvGrpSpPr>
+        <p:cNvPr id="1" name=""/>
+        <p:cNvGrpSpPr/>
+        <p:nvPr/>
+      </p:nvGrpSpPr>
+      <p:grpSpPr>
+        <a:xfrm>
+          <a:off x="0" y="0"/>
+          <a:ext cx="0" cy="0"/>
+          <a:chOff x="0" y="0"/>
+          <a:chExt cx="0" cy="0"/>
+        </a:xfrm>
+      </p:grpSpPr>
+      <p:sp>
+        <p:nvSpPr>
+          <p:cNvPr id="2" name="Tijdelijke aanduiding voor afbeelding 1">
+            <a:extLst>
+              <a:ext uri="{FF2B5EF4-FFF2-40B4-BE49-F238E27FC236}">
+                <a16:creationId xmlns:a16="http://schemas.microsoft.com/office/drawing/2014/main" id="{45DAC9F6-3738-4460-8688-6326A9BE3FE6}"/>
+              </a:ext>
+            </a:extLst>
+          </p:cNvPr>
+          <p:cNvSpPr>
+            <a:spLocks noGrp="1"/>
+          </p:cNvSpPr>
+          <p:nvPr>
+            <p:ph type="pic" sz="quarter" idx="10"/>
+          </p:nvPr>
+        </p:nvSpPr>
+        <p:spPr/>
+      </p:sp>
+      <p:sp>
+        <p:nvSpPr>
+          <p:cNvPr id="3" name="Titel 2">
+            <a:extLst>
+              <a:ext uri="{FF2B5EF4-FFF2-40B4-BE49-F238E27FC236}">
+                <a16:creationId xmlns:a16="http://schemas.microsoft.com/office/drawing/2014/main" id="{9A45B11F-5214-4B9D-8CB6-7FCD1631B189}"/>
+              </a:ext>
+            </a:extLst>
+          </p:cNvPr>
+          <p:cNvSpPr>
+            <a:spLocks noGrp="1"/>
+          </p:cNvSpPr>
+          <p:nvPr>
+            <p:ph type="ctrTitle"/>
+          </p:nvPr>
+        </p:nvSpPr>
+        <p:spPr/>
+        <p:txBody>
+          <a:bodyPr/>
+          <a:lstStyle/>
+          <a:p>
+            <a:endParaRPr lang="nl-NL"/>
+          </a:p>
+        </p:txBody>
+      </p:sp>
+      <p:sp>
+        <p:nvSpPr>
+          <p:cNvPr id="4" name="Ondertitel 3">
+            <a:extLst>
+              <a:ext uri="{FF2B5EF4-FFF2-40B4-BE49-F238E27FC236}">
+                <a16:creationId xmlns:a16="http://schemas.microsoft.com/office/drawing/2014/main" id="{382C83AC-5D3A-4B0A-80CF-45CB817DD86B}"/>
+              </a:ext>
+            </a:extLst>
+          </p:cNvPr>
+          <p:cNvSpPr>
+            <a:spLocks noGrp="1"/>
+          </p:cNvSpPr>
+          <p:nvPr>
+            <p:ph type="subTitle" idx="1"/>
+          </p:nvPr>
+        </p:nvSpPr>
+        <p:spPr/>
+        <p:txBody>
+          <a:bodyPr/>
+          <a:lstStyle/>
+          <a:p>
+            <a:endParaRPr lang="nl-NL"/>
+          </a:p>
+        </p:txBody>
+      </p:sp>
+      <p:sp>
+        <p:nvSpPr>
+          <p:cNvPr id="5" name="Tijdelijke aanduiding voor tekst 4">
+            <a:extLst>
+              <a:ext uri="{FF2B5EF4-FFF2-40B4-BE49-F238E27FC236}">
+                <a16:creationId xmlns:a16="http://schemas.microsoft.com/office/drawing/2014/main" id="{4BC0AFAE-23FE-4BE4-878D-AB8587E157CC}"/>
+              </a:ext>
+            </a:extLst>
+          </p:cNvPr>
+          <p:cNvSpPr>
+            <a:spLocks noGrp="1"/>
+          </p:cNvSpPr>
+          <p:nvPr>
+            <p:ph type="body" sz="quarter" idx="13"/>
+          </p:nvPr>
+        </p:nvSpPr>
+        <p:spPr/>
+        <p:txBody>
+          <a:bodyPr/>
+          <a:lstStyle/>
+          <a:p>
+            <a:endParaRPr lang="nl-NL"/>
+          </a:p>
+        </p:txBody>
+      </p:sp>
+    </p:spTree>
+    <p:extLst>
+      <p:ext uri="{BB962C8B-B14F-4D97-AF65-F5344CB8AC3E}">
+        <p14:creationId xmlns:p14="http://schemas.microsoft.com/office/powerpoint/2010/main" val="1364180950"/>
+      </p:ext>
+    </p:extLst>
+  </p:cSld>
+  <p:clrMapOvr>
+    <a:masterClrMapping/>
+  </p:clrMapOvr>
+</p:sld>
+</file>
+
+<file path=ppt/slides/slide20.xml><?xml version="1.0" encoding="utf-8"?>
 <p:sld xmlns:a="http://schemas.openxmlformats.org/drawingml/2006/main" xmlns:r="http://schemas.openxmlformats.org/officeDocument/2006/relationships" xmlns:p="http://schemas.openxmlformats.org/presentationml/2006/main">
   <p:cSld>
     <p:spTree>
@@ -8967,97 +9211,7 @@
 </p:sld>
 </file>
 
-<file path=ppt/slides/slide2.xml><?xml version="1.0" encoding="utf-8"?>
-<p:sld xmlns:a="http://schemas.openxmlformats.org/drawingml/2006/main" xmlns:r="http://schemas.openxmlformats.org/officeDocument/2006/relationships" xmlns:p="http://schemas.openxmlformats.org/presentationml/2006/main">
-  <p:cSld>
-    <p:spTree>
-      <p:nvGrpSpPr>
-        <p:cNvPr id="1" name=""/>
-        <p:cNvGrpSpPr/>
-        <p:nvPr/>
-      </p:nvGrpSpPr>
-      <p:grpSpPr>
-        <a:xfrm>
-          <a:off x="0" y="0"/>
-          <a:ext cx="0" cy="0"/>
-          <a:chOff x="0" y="0"/>
-          <a:chExt cx="0" cy="0"/>
-        </a:xfrm>
-      </p:grpSpPr>
-      <p:sp>
-        <p:nvSpPr>
-          <p:cNvPr id="3" name="Titel 2"/>
-          <p:cNvSpPr>
-            <a:spLocks noGrp="1"/>
-          </p:cNvSpPr>
-          <p:nvPr>
-            <p:ph type="title"/>
-          </p:nvPr>
-        </p:nvSpPr>
-        <p:spPr/>
-        <p:txBody>
-          <a:bodyPr/>
-          <a:lstStyle/>
-          <a:p>
-            <a:r>
-              <a:rPr lang="nl-NL" dirty="0"/>
-              <a:t>Algemeen</a:t>
-            </a:r>
-          </a:p>
-        </p:txBody>
-      </p:sp>
-      <p:sp>
-        <p:nvSpPr>
-          <p:cNvPr id="6" name="Tijdelijke aanduiding voor tekst 5"/>
-          <p:cNvSpPr>
-            <a:spLocks noGrp="1"/>
-          </p:cNvSpPr>
-          <p:nvPr>
-            <p:ph type="body" sz="quarter" idx="10"/>
-          </p:nvPr>
-        </p:nvSpPr>
-        <p:spPr>
-          <a:xfrm>
-            <a:off x="6096000" y="3483864"/>
-            <a:ext cx="4675200" cy="2884279"/>
-          </a:xfrm>
-        </p:spPr>
-        <p:txBody>
-          <a:bodyPr/>
-          <a:lstStyle/>
-          <a:p>
-            <a:r>
-              <a:rPr lang="nl-NL" dirty="0"/>
-              <a:t>Verschil Front-End / </a:t>
-            </a:r>
-            <a:r>
-              <a:rPr lang="nl-NL" dirty="0" err="1"/>
-              <a:t>Back-End</a:t>
-            </a:r>
-            <a:r>
-              <a:rPr lang="nl-NL" dirty="0"/>
-              <a:t> versus Traditioneel</a:t>
-            </a:r>
-          </a:p>
-          <a:p>
-            <a:endParaRPr lang="nl-NL" dirty="0"/>
-          </a:p>
-        </p:txBody>
-      </p:sp>
-    </p:spTree>
-    <p:extLst>
-      <p:ext uri="{BB962C8B-B14F-4D97-AF65-F5344CB8AC3E}">
-        <p14:creationId xmlns:p14="http://schemas.microsoft.com/office/powerpoint/2010/main" val="1087083312"/>
-      </p:ext>
-    </p:extLst>
-  </p:cSld>
-  <p:clrMapOvr>
-    <a:masterClrMapping/>
-  </p:clrMapOvr>
-</p:sld>
-</file>
-
-<file path=ppt/slides/slide20.xml><?xml version="1.0" encoding="utf-8"?>
+<file path=ppt/slides/slide21.xml><?xml version="1.0" encoding="utf-8"?>
 <p:sld xmlns:a="http://schemas.openxmlformats.org/drawingml/2006/main" xmlns:r="http://schemas.openxmlformats.org/officeDocument/2006/relationships" xmlns:p="http://schemas.openxmlformats.org/presentationml/2006/main">
   <p:cSld>
     <p:spTree>
@@ -9144,206 +9298,6 @@
 </p:sld>
 </file>
 
-<file path=ppt/slides/slide21.xml><?xml version="1.0" encoding="utf-8"?>
-<p:sld xmlns:a="http://schemas.openxmlformats.org/drawingml/2006/main" xmlns:r="http://schemas.openxmlformats.org/officeDocument/2006/relationships" xmlns:p="http://schemas.openxmlformats.org/presentationml/2006/main">
-  <p:cSld>
-    <p:spTree>
-      <p:nvGrpSpPr>
-        <p:cNvPr id="1" name=""/>
-        <p:cNvGrpSpPr/>
-        <p:nvPr/>
-      </p:nvGrpSpPr>
-      <p:grpSpPr>
-        <a:xfrm>
-          <a:off x="0" y="0"/>
-          <a:ext cx="0" cy="0"/>
-          <a:chOff x="0" y="0"/>
-          <a:chExt cx="0" cy="0"/>
-        </a:xfrm>
-      </p:grpSpPr>
-      <p:sp>
-        <p:nvSpPr>
-          <p:cNvPr id="2" name="Titel 1"/>
-          <p:cNvSpPr>
-            <a:spLocks noGrp="1"/>
-          </p:cNvSpPr>
-          <p:nvPr>
-            <p:ph type="title"/>
-          </p:nvPr>
-        </p:nvSpPr>
-        <p:spPr/>
-        <p:txBody>
-          <a:bodyPr/>
-          <a:lstStyle/>
-          <a:p>
-            <a:r>
-              <a:rPr lang="nl-NL" dirty="0"/>
-              <a:t>Hoe werkt het web?</a:t>
-            </a:r>
-          </a:p>
-        </p:txBody>
-      </p:sp>
-      <p:sp>
-        <p:nvSpPr>
-          <p:cNvPr id="6" name="Tijdelijke aanduiding voor inhoud 5"/>
-          <p:cNvSpPr>
-            <a:spLocks noGrp="1"/>
-          </p:cNvSpPr>
-          <p:nvPr>
-            <p:ph idx="1"/>
-          </p:nvPr>
-        </p:nvSpPr>
-        <p:spPr/>
-        <p:txBody>
-          <a:bodyPr>
-            <a:normAutofit fontScale="92500" lnSpcReduction="20000"/>
-          </a:bodyPr>
-          <a:lstStyle/>
-          <a:p>
-            <a:r>
-              <a:rPr lang="nl-NL" dirty="0"/>
-              <a:t>Jij typt een URL</a:t>
-            </a:r>
-          </a:p>
-          <a:p>
-            <a:r>
-              <a:rPr lang="nl-NL" dirty="0"/>
-              <a:t>URL wordt omgezet naar een IP-adres</a:t>
-            </a:r>
-          </a:p>
-          <a:p>
-            <a:r>
-              <a:rPr lang="nl-NL" dirty="0"/>
-              <a:t>Browser stuurt een HTTP GET-verzoek </a:t>
-            </a:r>
-          </a:p>
-          <a:p>
-            <a:pPr lvl="1"/>
-            <a:r>
-              <a:rPr lang="nl-NL" dirty="0"/>
-              <a:t>Host</a:t>
-            </a:r>
-          </a:p>
-          <a:p>
-            <a:pPr lvl="1"/>
-            <a:r>
-              <a:rPr lang="nl-NL" dirty="0" err="1"/>
-              <a:t>Path</a:t>
-            </a:r>
-            <a:endParaRPr lang="nl-NL" dirty="0"/>
-          </a:p>
-          <a:p>
-            <a:pPr lvl="1"/>
-            <a:r>
-              <a:rPr lang="nl-NL" dirty="0"/>
-              <a:t>Query-variabele</a:t>
-            </a:r>
-          </a:p>
-          <a:p>
-            <a:pPr lvl="1"/>
-            <a:r>
-              <a:rPr lang="nl-NL" dirty="0"/>
-              <a:t>Webserver stuurt response</a:t>
-            </a:r>
-          </a:p>
-          <a:p>
-            <a:pPr lvl="2"/>
-            <a:r>
-              <a:rPr lang="nl-NL" dirty="0"/>
-              <a:t>Status (200, 401, 404, 301 </a:t>
-            </a:r>
-            <a:r>
-              <a:rPr lang="nl-NL" dirty="0" err="1"/>
-              <a:t>etc</a:t>
-            </a:r>
-            <a:r>
-              <a:rPr lang="nl-NL" dirty="0"/>
-              <a:t>)</a:t>
-            </a:r>
-          </a:p>
-          <a:p>
-            <a:pPr lvl="2"/>
-            <a:r>
-              <a:rPr lang="nl-NL" dirty="0"/>
-              <a:t>Inhoud (html)</a:t>
-            </a:r>
-          </a:p>
-          <a:p>
-            <a:pPr lvl="1"/>
-            <a:r>
-              <a:rPr lang="nl-NL" dirty="0"/>
-              <a:t>Browser analyseert de inhoud (HTML body)</a:t>
-            </a:r>
-          </a:p>
-          <a:p>
-            <a:r>
-              <a:rPr lang="nl-NL" dirty="0"/>
-              <a:t>Ontbrekende bestanden worden opgehaald zoals:</a:t>
-            </a:r>
-          </a:p>
-          <a:p>
-            <a:pPr lvl="1"/>
-            <a:r>
-              <a:rPr lang="nl-NL" dirty="0"/>
-              <a:t>CSS</a:t>
-            </a:r>
-          </a:p>
-          <a:p>
-            <a:pPr lvl="1"/>
-            <a:r>
-              <a:rPr lang="nl-NL" dirty="0"/>
-              <a:t>Javascript</a:t>
-            </a:r>
-          </a:p>
-          <a:p>
-            <a:pPr lvl="1"/>
-            <a:r>
-              <a:rPr lang="nl-NL" dirty="0"/>
-              <a:t>Audio/video</a:t>
-            </a:r>
-          </a:p>
-          <a:p>
-            <a:r>
-              <a:rPr lang="nl-NL" dirty="0"/>
-              <a:t>Per bestand wordt weer een status (200, 401,404 </a:t>
-            </a:r>
-            <a:r>
-              <a:rPr lang="nl-NL" dirty="0" err="1"/>
-              <a:t>etc</a:t>
-            </a:r>
-            <a:r>
-              <a:rPr lang="nl-NL" dirty="0"/>
-              <a:t>)+ inhoud teruggestuurd</a:t>
-            </a:r>
-          </a:p>
-          <a:p>
-            <a:r>
-              <a:rPr lang="nl-NL" dirty="0"/>
-              <a:t>Browser voert actieve inhoud uit (Javascript)</a:t>
-            </a:r>
-          </a:p>
-          <a:p>
-            <a:endParaRPr lang="nl-NL" dirty="0"/>
-          </a:p>
-          <a:p>
-            <a:pPr lvl="1"/>
-            <a:endParaRPr lang="nl-NL" dirty="0"/>
-          </a:p>
-        </p:txBody>
-      </p:sp>
-    </p:spTree>
-    <p:extLst>
-      <p:ext uri="{BB962C8B-B14F-4D97-AF65-F5344CB8AC3E}">
-        <p14:creationId xmlns:p14="http://schemas.microsoft.com/office/powerpoint/2010/main" val="2696949712"/>
-      </p:ext>
-    </p:extLst>
-  </p:cSld>
-  <p:clrMapOvr>
-    <a:masterClrMapping/>
-  </p:clrMapOvr>
-</p:sld>
-</file>
-
 <file path=ppt/slides/slide22.xml><?xml version="1.0" encoding="utf-8"?>
 <p:sld xmlns:a="http://schemas.openxmlformats.org/drawingml/2006/main" xmlns:r="http://schemas.openxmlformats.org/officeDocument/2006/relationships" xmlns:p="http://schemas.openxmlformats.org/presentationml/2006/main">
   <p:cSld>
@@ -9377,127 +9331,164 @@
           <a:lstStyle/>
           <a:p>
             <a:r>
-              <a:rPr lang="nl-NL" dirty="0" err="1"/>
-              <a:t>Sequence</a:t>
-            </a:r>
-            <a:r>
-              <a:rPr lang="nl-NL" dirty="0"/>
-              <a:t> diagram</a:t>
-            </a:r>
-          </a:p>
-        </p:txBody>
-      </p:sp>
-      <p:pic>
-        <p:nvPicPr>
-          <p:cNvPr id="5" name="Afbeelding 4"/>
-          <p:cNvPicPr>
-            <a:picLocks noChangeAspect="1"/>
-          </p:cNvPicPr>
-          <p:nvPr/>
-        </p:nvPicPr>
-        <p:blipFill>
-          <a:blip r:embed="rId3"/>
-          <a:stretch>
-            <a:fillRect/>
-          </a:stretch>
-        </p:blipFill>
-        <p:spPr>
-          <a:xfrm>
-            <a:off x="319252" y="1650616"/>
-            <a:ext cx="8610600" cy="4733925"/>
-          </a:xfrm>
-          <a:prstGeom prst="rect">
-            <a:avLst/>
-          </a:prstGeom>
-        </p:spPr>
-      </p:pic>
-      <p:sp>
-        <p:nvSpPr>
-          <p:cNvPr id="3" name="Tekstvak 2"/>
-          <p:cNvSpPr txBox="1"/>
-          <p:nvPr/>
-        </p:nvSpPr>
-        <p:spPr>
-          <a:xfrm>
-            <a:off x="8986345" y="1566041"/>
-            <a:ext cx="3132083" cy="1754326"/>
-          </a:xfrm>
-          <a:prstGeom prst="rect">
-            <a:avLst/>
-          </a:prstGeom>
-          <a:noFill/>
-        </p:spPr>
-        <p:txBody>
-          <a:bodyPr wrap="square" rtlCol="0">
-            <a:spAutoFit/>
+              <a:rPr lang="nl-NL" dirty="0"/>
+              <a:t>Hoe werkt het web?</a:t>
+            </a:r>
+          </a:p>
+        </p:txBody>
+      </p:sp>
+      <p:sp>
+        <p:nvSpPr>
+          <p:cNvPr id="6" name="Tijdelijke aanduiding voor inhoud 5"/>
+          <p:cNvSpPr>
+            <a:spLocks noGrp="1"/>
+          </p:cNvSpPr>
+          <p:nvPr>
+            <p:ph idx="1"/>
+          </p:nvPr>
+        </p:nvSpPr>
+        <p:spPr/>
+        <p:txBody>
+          <a:bodyPr>
+            <a:normAutofit fontScale="92500" lnSpcReduction="20000"/>
           </a:bodyPr>
           <a:lstStyle/>
           <a:p>
-            <a:pPr marL="342900" indent="-342900">
-              <a:buFont typeface="+mj-lt"/>
-              <a:buAutoNum type="arabicPeriod"/>
-            </a:pPr>
-            <a:r>
-              <a:rPr lang="nl-NL" dirty="0"/>
-              <a:t>Haal hoofd document op</a:t>
-            </a:r>
-          </a:p>
-          <a:p>
-            <a:pPr marL="342900" indent="-342900">
-              <a:buFont typeface="+mj-lt"/>
-              <a:buAutoNum type="arabicPeriod"/>
-            </a:pPr>
-            <a:r>
-              <a:rPr lang="nl-NL" dirty="0"/>
-              <a:t>Analyseer HTML</a:t>
-            </a:r>
-          </a:p>
-          <a:p>
-            <a:pPr marL="342900" indent="-342900">
-              <a:buFont typeface="+mj-lt"/>
-              <a:buAutoNum type="arabicPeriod"/>
-            </a:pPr>
-            <a:r>
-              <a:rPr lang="nl-NL" dirty="0"/>
-              <a:t>Ophalen index.css</a:t>
-            </a:r>
-          </a:p>
-          <a:p>
-            <a:pPr marL="342900" indent="-342900">
-              <a:buFont typeface="+mj-lt"/>
-              <a:buAutoNum type="arabicPeriod"/>
-            </a:pPr>
-            <a:r>
-              <a:rPr lang="nl-NL" dirty="0"/>
-              <a:t>Ophalen calendar.css</a:t>
-            </a:r>
-          </a:p>
-          <a:p>
-            <a:pPr marL="342900" indent="-342900">
-              <a:buFont typeface="+mj-lt"/>
-              <a:buAutoNum type="arabicPeriod"/>
-            </a:pPr>
-            <a:r>
-              <a:rPr lang="nl-NL" dirty="0"/>
-              <a:t>Ophalen afbeeldingen</a:t>
-            </a:r>
-          </a:p>
-          <a:p>
-            <a:pPr marL="342900" indent="-342900">
-              <a:buFont typeface="+mj-lt"/>
-              <a:buAutoNum type="arabicPeriod"/>
-            </a:pPr>
-            <a:r>
-              <a:rPr lang="nl-NL" dirty="0"/>
-              <a:t>Ophalen javascript</a:t>
-            </a:r>
+            <a:r>
+              <a:rPr lang="nl-NL" dirty="0"/>
+              <a:t>Jij typt een URL</a:t>
+            </a:r>
+          </a:p>
+          <a:p>
+            <a:r>
+              <a:rPr lang="nl-NL" dirty="0"/>
+              <a:t>URL wordt omgezet naar een IP-adres</a:t>
+            </a:r>
+          </a:p>
+          <a:p>
+            <a:r>
+              <a:rPr lang="nl-NL" dirty="0"/>
+              <a:t>Browser stuurt een HTTP GET-verzoek </a:t>
+            </a:r>
+          </a:p>
+          <a:p>
+            <a:pPr lvl="1"/>
+            <a:r>
+              <a:rPr lang="nl-NL" dirty="0"/>
+              <a:t>Host</a:t>
+            </a:r>
+          </a:p>
+          <a:p>
+            <a:pPr lvl="1"/>
+            <a:r>
+              <a:rPr lang="nl-NL" dirty="0" err="1"/>
+              <a:t>Path</a:t>
+            </a:r>
+            <a:endParaRPr lang="nl-NL" dirty="0"/>
+          </a:p>
+          <a:p>
+            <a:pPr lvl="1"/>
+            <a:r>
+              <a:rPr lang="nl-NL" dirty="0"/>
+              <a:t>Query-variabele</a:t>
+            </a:r>
+          </a:p>
+          <a:p>
+            <a:pPr lvl="1"/>
+            <a:r>
+              <a:rPr lang="nl-NL" dirty="0"/>
+              <a:t>Webserver stuurt response</a:t>
+            </a:r>
+          </a:p>
+          <a:p>
+            <a:pPr lvl="2"/>
+            <a:r>
+              <a:rPr lang="nl-NL" dirty="0"/>
+              <a:t>Status (200, 401, 404, 301 </a:t>
+            </a:r>
+            <a:r>
+              <a:rPr lang="nl-NL" dirty="0" err="1"/>
+              <a:t>etc</a:t>
+            </a:r>
+            <a:r>
+              <a:rPr lang="nl-NL" dirty="0"/>
+              <a:t>)</a:t>
+            </a:r>
+          </a:p>
+          <a:p>
+            <a:pPr lvl="2"/>
+            <a:r>
+              <a:rPr lang="nl-NL" dirty="0"/>
+              <a:t>Inhoud (html)</a:t>
+            </a:r>
+          </a:p>
+          <a:p>
+            <a:pPr lvl="1"/>
+            <a:r>
+              <a:rPr lang="nl-NL" dirty="0"/>
+              <a:t>Browser analyseert de inhoud (HTML body)</a:t>
+            </a:r>
+          </a:p>
+          <a:p>
+            <a:r>
+              <a:rPr lang="nl-NL" dirty="0"/>
+              <a:t>Ontbrekende bestanden worden opgehaald zoals:</a:t>
+            </a:r>
+          </a:p>
+          <a:p>
+            <a:pPr lvl="1"/>
+            <a:r>
+              <a:rPr lang="nl-NL" dirty="0"/>
+              <a:t>CSS</a:t>
+            </a:r>
+          </a:p>
+          <a:p>
+            <a:pPr lvl="1"/>
+            <a:r>
+              <a:rPr lang="nl-NL" dirty="0"/>
+              <a:t>Javascript</a:t>
+            </a:r>
+          </a:p>
+          <a:p>
+            <a:pPr lvl="1"/>
+            <a:r>
+              <a:rPr lang="nl-NL" dirty="0"/>
+              <a:t>Audio/video</a:t>
+            </a:r>
+          </a:p>
+          <a:p>
+            <a:r>
+              <a:rPr lang="nl-NL" dirty="0"/>
+              <a:t>Per bestand wordt weer een status (200, 401,404 </a:t>
+            </a:r>
+            <a:r>
+              <a:rPr lang="nl-NL" dirty="0" err="1"/>
+              <a:t>etc</a:t>
+            </a:r>
+            <a:r>
+              <a:rPr lang="nl-NL" dirty="0"/>
+              <a:t>)+ inhoud teruggestuurd</a:t>
+            </a:r>
+          </a:p>
+          <a:p>
+            <a:r>
+              <a:rPr lang="nl-NL" dirty="0"/>
+              <a:t>Browser voert actieve inhoud uit (Javascript)</a:t>
+            </a:r>
+          </a:p>
+          <a:p>
+            <a:endParaRPr lang="nl-NL" dirty="0"/>
+          </a:p>
+          <a:p>
+            <a:pPr lvl="1"/>
+            <a:endParaRPr lang="nl-NL" dirty="0"/>
           </a:p>
         </p:txBody>
       </p:sp>
     </p:spTree>
     <p:extLst>
       <p:ext uri="{BB962C8B-B14F-4D97-AF65-F5344CB8AC3E}">
-        <p14:creationId xmlns:p14="http://schemas.microsoft.com/office/powerpoint/2010/main" val="2683648144"/>
+        <p14:creationId xmlns:p14="http://schemas.microsoft.com/office/powerpoint/2010/main" val="2696949712"/>
       </p:ext>
     </p:extLst>
   </p:cSld>
@@ -9526,7 +9517,7 @@
       </p:grpSpPr>
       <p:sp>
         <p:nvSpPr>
-          <p:cNvPr id="4" name="Titel 3"/>
+          <p:cNvPr id="2" name="Titel 1"/>
           <p:cNvSpPr>
             <a:spLocks noGrp="1"/>
           </p:cNvSpPr>
@@ -9540,123 +9531,127 @@
           <a:lstStyle/>
           <a:p>
             <a:r>
-              <a:rPr lang="nl-NL" dirty="0"/>
-              <a:t>The Basics</a:t>
-            </a:r>
-          </a:p>
-        </p:txBody>
-      </p:sp>
-      <p:sp>
-        <p:nvSpPr>
-          <p:cNvPr id="5" name="Tijdelijke aanduiding voor tekst 4"/>
-          <p:cNvSpPr>
-            <a:spLocks noGrp="1"/>
-          </p:cNvSpPr>
-          <p:nvPr>
-            <p:ph type="body" sz="quarter" idx="10"/>
-          </p:nvPr>
-        </p:nvSpPr>
+              <a:rPr lang="nl-NL" dirty="0" err="1"/>
+              <a:t>Sequence</a:t>
+            </a:r>
+            <a:r>
+              <a:rPr lang="nl-NL" dirty="0"/>
+              <a:t> diagram</a:t>
+            </a:r>
+          </a:p>
+        </p:txBody>
+      </p:sp>
+      <p:pic>
+        <p:nvPicPr>
+          <p:cNvPr id="5" name="Afbeelding 4"/>
+          <p:cNvPicPr>
+            <a:picLocks noChangeAspect="1"/>
+          </p:cNvPicPr>
+          <p:nvPr/>
+        </p:nvPicPr>
+        <p:blipFill>
+          <a:blip r:embed="rId3"/>
+          <a:stretch>
+            <a:fillRect/>
+          </a:stretch>
+        </p:blipFill>
         <p:spPr>
           <a:xfrm>
-            <a:off x="6096000" y="3483864"/>
-            <a:ext cx="4675200" cy="2710107"/>
-          </a:xfrm>
-        </p:spPr>
-        <p:txBody>
-          <a:bodyPr/>
+            <a:off x="319252" y="1650616"/>
+            <a:ext cx="8610600" cy="4733925"/>
+          </a:xfrm>
+          <a:prstGeom prst="rect">
+            <a:avLst/>
+          </a:prstGeom>
+        </p:spPr>
+      </p:pic>
+      <p:sp>
+        <p:nvSpPr>
+          <p:cNvPr id="3" name="Tekstvak 2"/>
+          <p:cNvSpPr txBox="1"/>
+          <p:nvPr/>
+        </p:nvSpPr>
+        <p:spPr>
+          <a:xfrm>
+            <a:off x="8986345" y="1566041"/>
+            <a:ext cx="3132083" cy="1754326"/>
+          </a:xfrm>
+          <a:prstGeom prst="rect">
+            <a:avLst/>
+          </a:prstGeom>
+          <a:noFill/>
+        </p:spPr>
+        <p:txBody>
+          <a:bodyPr wrap="square" rtlCol="0">
+            <a:spAutoFit/>
+          </a:bodyPr>
           <a:lstStyle/>
           <a:p>
-            <a:r>
-              <a:rPr lang="nl-NL" dirty="0"/>
-              <a:t>Basic </a:t>
-            </a:r>
-            <a:r>
-              <a:rPr lang="nl-NL" dirty="0" err="1"/>
-              <a:t>client</a:t>
-            </a:r>
-            <a:r>
-              <a:rPr lang="nl-NL" dirty="0"/>
-              <a:t> output</a:t>
-            </a:r>
-          </a:p>
-          <a:p>
-            <a:r>
-              <a:rPr lang="nl-NL" dirty="0"/>
-              <a:t>DOM model</a:t>
-            </a:r>
-          </a:p>
-          <a:p>
-            <a:r>
-              <a:rPr lang="nl-NL" dirty="0"/>
-              <a:t>DOM </a:t>
-            </a:r>
-            <a:r>
-              <a:rPr lang="nl-NL" dirty="0" err="1"/>
-              <a:t>Manipulation</a:t>
-            </a:r>
-            <a:endParaRPr lang="nl-NL" dirty="0"/>
-          </a:p>
-          <a:p>
-            <a:r>
-              <a:rPr lang="nl-NL" dirty="0" err="1"/>
-              <a:t>Vanilla</a:t>
-            </a:r>
-            <a:r>
-              <a:rPr lang="nl-NL" dirty="0"/>
-              <a:t> JS </a:t>
-            </a:r>
-            <a:r>
-              <a:rPr lang="nl-NL" dirty="0" err="1"/>
-              <a:t>vs</a:t>
-            </a:r>
-            <a:r>
-              <a:rPr lang="nl-NL" dirty="0"/>
-              <a:t> </a:t>
-            </a:r>
-            <a:r>
-              <a:rPr lang="nl-NL" dirty="0" err="1"/>
-              <a:t>Jquery</a:t>
-            </a:r>
-            <a:endParaRPr lang="nl-NL" dirty="0"/>
-          </a:p>
-          <a:p>
-            <a:r>
-              <a:rPr lang="nl-NL" dirty="0"/>
-              <a:t>CSS </a:t>
-            </a:r>
-            <a:r>
-              <a:rPr lang="nl-NL" dirty="0" err="1"/>
-              <a:t>vs</a:t>
-            </a:r>
-            <a:r>
-              <a:rPr lang="nl-NL" dirty="0"/>
-              <a:t> JS</a:t>
-            </a:r>
-          </a:p>
-          <a:p>
-            <a:r>
-              <a:rPr lang="nl-NL" dirty="0"/>
-              <a:t>SVG &amp; canvas</a:t>
-            </a:r>
-          </a:p>
-          <a:p>
-            <a:r>
-              <a:rPr lang="nl-NL" dirty="0"/>
-              <a:t>Templating</a:t>
-            </a:r>
-          </a:p>
-          <a:p>
-            <a:pPr marL="0" indent="0">
-              <a:buNone/>
+            <a:pPr marL="342900" indent="-342900">
+              <a:buFont typeface="+mj-lt"/>
+              <a:buAutoNum type="arabicPeriod"/>
             </a:pPr>
-            <a:endParaRPr lang="nl-NL" dirty="0"/>
+            <a:r>
+              <a:rPr lang="nl-NL" dirty="0"/>
+              <a:t>Haal hoofd document op</a:t>
+            </a:r>
+          </a:p>
+          <a:p>
+            <a:pPr marL="342900" indent="-342900">
+              <a:buFont typeface="+mj-lt"/>
+              <a:buAutoNum type="arabicPeriod"/>
+            </a:pPr>
+            <a:r>
+              <a:rPr lang="nl-NL" dirty="0"/>
+              <a:t>Analyseer HTML</a:t>
+            </a:r>
+          </a:p>
+          <a:p>
+            <a:pPr marL="342900" indent="-342900">
+              <a:buFont typeface="+mj-lt"/>
+              <a:buAutoNum type="arabicPeriod"/>
+            </a:pPr>
+            <a:r>
+              <a:rPr lang="nl-NL" dirty="0"/>
+              <a:t>Ophalen index.css</a:t>
+            </a:r>
+          </a:p>
+          <a:p>
+            <a:pPr marL="342900" indent="-342900">
+              <a:buFont typeface="+mj-lt"/>
+              <a:buAutoNum type="arabicPeriod"/>
+            </a:pPr>
+            <a:r>
+              <a:rPr lang="nl-NL" dirty="0"/>
+              <a:t>Ophalen calendar.css</a:t>
+            </a:r>
+          </a:p>
+          <a:p>
+            <a:pPr marL="342900" indent="-342900">
+              <a:buFont typeface="+mj-lt"/>
+              <a:buAutoNum type="arabicPeriod"/>
+            </a:pPr>
+            <a:r>
+              <a:rPr lang="nl-NL" dirty="0"/>
+              <a:t>Ophalen afbeeldingen</a:t>
+            </a:r>
+          </a:p>
+          <a:p>
+            <a:pPr marL="342900" indent="-342900">
+              <a:buFont typeface="+mj-lt"/>
+              <a:buAutoNum type="arabicPeriod"/>
+            </a:pPr>
+            <a:r>
+              <a:rPr lang="nl-NL" dirty="0"/>
+              <a:t>Ophalen javascript</a:t>
+            </a:r>
           </a:p>
         </p:txBody>
       </p:sp>
     </p:spTree>
     <p:extLst>
       <p:ext uri="{BB962C8B-B14F-4D97-AF65-F5344CB8AC3E}">
-        <p14:creationId xmlns:p14="http://schemas.microsoft.com/office/powerpoint/2010/main" val="1520110584"/>
+        <p14:creationId xmlns:p14="http://schemas.microsoft.com/office/powerpoint/2010/main" val="2683648144"/>
       </p:ext>
     </p:extLst>
   </p:cSld>
@@ -9700,75 +9695,114 @@
           <a:p>
             <a:r>
               <a:rPr lang="nl-NL" dirty="0"/>
-              <a:t>Basic Client Output</a:t>
-            </a:r>
-          </a:p>
-        </p:txBody>
-      </p:sp>
-      <p:sp>
-        <p:nvSpPr>
-          <p:cNvPr id="5" name="Tijdelijke aanduiding voor inhoud 4"/>
+              <a:t>The Basics</a:t>
+            </a:r>
+          </a:p>
+        </p:txBody>
+      </p:sp>
+      <p:sp>
+        <p:nvSpPr>
+          <p:cNvPr id="5" name="Tijdelijke aanduiding voor tekst 4"/>
           <p:cNvSpPr>
             <a:spLocks noGrp="1"/>
           </p:cNvSpPr>
           <p:nvPr>
-            <p:ph idx="1"/>
-          </p:nvPr>
-        </p:nvSpPr>
-        <p:spPr/>
+            <p:ph type="body" sz="quarter" idx="10"/>
+          </p:nvPr>
+        </p:nvSpPr>
+        <p:spPr>
+          <a:xfrm>
+            <a:off x="6096000" y="3483864"/>
+            <a:ext cx="4675200" cy="2710107"/>
+          </a:xfrm>
+        </p:spPr>
         <p:txBody>
           <a:bodyPr/>
           <a:lstStyle/>
           <a:p>
             <a:r>
+              <a:rPr lang="nl-NL" dirty="0"/>
+              <a:t>Basic </a:t>
+            </a:r>
+            <a:r>
               <a:rPr lang="nl-NL" dirty="0" err="1"/>
-              <a:t>Document.write</a:t>
-            </a:r>
-            <a:r>
-              <a:rPr lang="nl-NL" dirty="0"/>
-              <a:t>(….)</a:t>
-            </a:r>
-          </a:p>
-          <a:p>
-            <a:r>
-              <a:rPr lang="nl-NL" dirty="0">
-                <a:hlinkClick r:id="rId2"/>
-              </a:rPr>
-              <a:t>https://github.com/NHLStenden/Flex-WebDevelopment-FrontEndDevelopment/tree/master/WebDevelopment/content/examples/Fase01</a:t>
+              <a:t>client</a:t>
+            </a:r>
+            <a:r>
+              <a:rPr lang="nl-NL" dirty="0"/>
+              <a:t> output</a:t>
+            </a:r>
+          </a:p>
+          <a:p>
+            <a:r>
+              <a:rPr lang="nl-NL" dirty="0"/>
+              <a:t>DOM model</a:t>
+            </a:r>
+          </a:p>
+          <a:p>
+            <a:r>
+              <a:rPr lang="nl-NL" dirty="0"/>
+              <a:t>DOM </a:t>
+            </a:r>
+            <a:r>
+              <a:rPr lang="nl-NL" dirty="0" err="1"/>
+              <a:t>Manipulation</a:t>
             </a:r>
             <a:endParaRPr lang="nl-NL" dirty="0"/>
           </a:p>
           <a:p>
+            <a:r>
+              <a:rPr lang="nl-NL" dirty="0" err="1"/>
+              <a:t>Vanilla</a:t>
+            </a:r>
+            <a:r>
+              <a:rPr lang="nl-NL" dirty="0"/>
+              <a:t> JS </a:t>
+            </a:r>
+            <a:r>
+              <a:rPr lang="nl-NL" dirty="0" err="1"/>
+              <a:t>vs</a:t>
+            </a:r>
+            <a:r>
+              <a:rPr lang="nl-NL" dirty="0"/>
+              <a:t> </a:t>
+            </a:r>
+            <a:r>
+              <a:rPr lang="nl-NL" dirty="0" err="1"/>
+              <a:t>Jquery</a:t>
+            </a:r>
             <a:endParaRPr lang="nl-NL" dirty="0"/>
           </a:p>
           <a:p>
             <a:r>
-              <a:rPr lang="nl-NL" dirty="0">
-                <a:hlinkClick r:id="rId3"/>
-              </a:rPr>
-              <a:t>https://github.com/NHLStenden/Flex-WebDevelopment-FrontEndDevelopment/tree/master/WebDevelopment/content/assignments/01</a:t>
-            </a:r>
-            <a:endParaRPr lang="nl-NL" dirty="0"/>
-          </a:p>
-          <a:p>
-            <a:endParaRPr lang="nl-NL" dirty="0"/>
-          </a:p>
-          <a:p>
-            <a:r>
-              <a:rPr lang="nl-NL">
-                <a:hlinkClick r:id="rId4"/>
-              </a:rPr>
-              <a:t>https://github.com/NHLStenden/Flex-WebDevelopment-FrontEndDevelopment/tree/master/WebDevelopment/content/solutions/opdracht01</a:t>
-            </a:r>
-            <a:endParaRPr lang="nl-NL"/>
-          </a:p>
-          <a:p>
-            <a:endParaRPr lang="nl-NL" dirty="0"/>
-          </a:p>
-          <a:p>
-            <a:endParaRPr lang="nl-NL" dirty="0"/>
-          </a:p>
-          <a:p>
+              <a:rPr lang="nl-NL" dirty="0"/>
+              <a:t>CSS </a:t>
+            </a:r>
+            <a:r>
+              <a:rPr lang="nl-NL" dirty="0" err="1"/>
+              <a:t>vs</a:t>
+            </a:r>
+            <a:r>
+              <a:rPr lang="nl-NL" dirty="0"/>
+              <a:t> JS</a:t>
+            </a:r>
+          </a:p>
+          <a:p>
+            <a:r>
+              <a:rPr lang="nl-NL" dirty="0"/>
+              <a:t>SVG &amp; canvas</a:t>
+            </a:r>
+          </a:p>
+          <a:p>
+            <a:r>
+              <a:rPr lang="nl-NL" dirty="0"/>
+              <a:t>Templating</a:t>
+            </a:r>
+          </a:p>
+          <a:p>
+            <a:pPr marL="0" indent="0">
+              <a:buNone/>
+            </a:pPr>
             <a:endParaRPr lang="nl-NL" dirty="0"/>
           </a:p>
         </p:txBody>
@@ -9776,7 +9810,7 @@
     </p:spTree>
     <p:extLst>
       <p:ext uri="{BB962C8B-B14F-4D97-AF65-F5344CB8AC3E}">
-        <p14:creationId xmlns:p14="http://schemas.microsoft.com/office/powerpoint/2010/main" val="1871689718"/>
+        <p14:creationId xmlns:p14="http://schemas.microsoft.com/office/powerpoint/2010/main" val="1520110584"/>
       </p:ext>
     </p:extLst>
   </p:cSld>
@@ -9820,7 +9854,7 @@
           <a:p>
             <a:r>
               <a:rPr lang="nl-NL" dirty="0"/>
-              <a:t>DOM Model</a:t>
+              <a:t>Basic Client Output</a:t>
             </a:r>
           </a:p>
         </p:txBody>
@@ -9835,19 +9869,18 @@
             <p:ph idx="1"/>
           </p:nvPr>
         </p:nvSpPr>
-        <p:spPr>
-          <a:xfrm>
-            <a:off x="2640000" y="1800002"/>
-            <a:ext cx="8584381" cy="1463152"/>
-          </a:xfrm>
-        </p:spPr>
+        <p:spPr/>
         <p:txBody>
           <a:bodyPr/>
           <a:lstStyle/>
           <a:p>
             <a:r>
-              <a:rPr lang="nl-NL" dirty="0"/>
-              <a:t>Document Object Model</a:t>
+              <a:rPr lang="nl-NL" dirty="0" err="1"/>
+              <a:t>Document.write</a:t>
+            </a:r>
+            <a:r>
+              <a:rPr lang="nl-NL" dirty="0"/>
+              <a:t>(….)</a:t>
             </a:r>
           </a:p>
           <a:p>
@@ -9855,14 +9888,41 @@
               <a:rPr lang="nl-NL" dirty="0">
                 <a:hlinkClick r:id="rId2"/>
               </a:rPr>
-              <a:t>https://github.com/NHLStenden/Flex-WebDevelopment-FrontEndDevelopment/tree/master/WebDevelopment/content/examples/Fase02</a:t>
+              <a:t>https://github.com/NHLStenden/Flex-WebDevelopment-FrontEndDevelopment/tree/master/WebDevelopment/content/examples/Fase01</a:t>
             </a:r>
             <a:endParaRPr lang="nl-NL" dirty="0"/>
           </a:p>
           <a:p>
-            <a:pPr marL="0" indent="0">
-              <a:buNone/>
-            </a:pPr>
+            <a:endParaRPr lang="nl-NL" dirty="0"/>
+          </a:p>
+          <a:p>
+            <a:r>
+              <a:rPr lang="nl-NL" dirty="0">
+                <a:hlinkClick r:id="rId3"/>
+              </a:rPr>
+              <a:t>https://github.com/NHLStenden/Flex-WebDevelopment-FrontEndDevelopment/tree/master/WebDevelopment/content/assignments/01</a:t>
+            </a:r>
+            <a:endParaRPr lang="nl-NL" dirty="0"/>
+          </a:p>
+          <a:p>
+            <a:endParaRPr lang="nl-NL" dirty="0"/>
+          </a:p>
+          <a:p>
+            <a:r>
+              <a:rPr lang="nl-NL">
+                <a:hlinkClick r:id="rId4"/>
+              </a:rPr>
+              <a:t>https://github.com/NHLStenden/Flex-WebDevelopment-FrontEndDevelopment/tree/master/WebDevelopment/content/solutions/opdracht01</a:t>
+            </a:r>
+            <a:endParaRPr lang="nl-NL"/>
+          </a:p>
+          <a:p>
+            <a:endParaRPr lang="nl-NL" dirty="0"/>
+          </a:p>
+          <a:p>
+            <a:endParaRPr lang="nl-NL" dirty="0"/>
+          </a:p>
+          <a:p>
             <a:endParaRPr lang="nl-NL" dirty="0"/>
           </a:p>
         </p:txBody>
@@ -9870,7 +9930,7 @@
     </p:spTree>
     <p:extLst>
       <p:ext uri="{BB962C8B-B14F-4D97-AF65-F5344CB8AC3E}">
-        <p14:creationId xmlns:p14="http://schemas.microsoft.com/office/powerpoint/2010/main" val="458481042"/>
+        <p14:creationId xmlns:p14="http://schemas.microsoft.com/office/powerpoint/2010/main" val="1871689718"/>
       </p:ext>
     </p:extLst>
   </p:cSld>
@@ -9919,40 +9979,52 @@
           </a:p>
         </p:txBody>
       </p:sp>
-      <p:pic>
-        <p:nvPicPr>
-          <p:cNvPr id="2" name="Afbeelding 1"/>
-          <p:cNvPicPr>
-            <a:picLocks noChangeAspect="1"/>
-          </p:cNvPicPr>
-          <p:nvPr/>
-        </p:nvPicPr>
-        <p:blipFill>
-          <a:blip r:embed="rId2">
-            <a:extLst>
-              <a:ext uri="{28A0092B-C50C-407E-A947-70E740481C1C}">
-                <a14:useLocalDpi xmlns:a14="http://schemas.microsoft.com/office/drawing/2010/main" val="0"/>
-              </a:ext>
-            </a:extLst>
-          </a:blip>
-          <a:stretch>
-            <a:fillRect/>
-          </a:stretch>
-        </p:blipFill>
+      <p:sp>
+        <p:nvSpPr>
+          <p:cNvPr id="5" name="Tijdelijke aanduiding voor inhoud 4"/>
+          <p:cNvSpPr>
+            <a:spLocks noGrp="1"/>
+          </p:cNvSpPr>
+          <p:nvPr>
+            <p:ph idx="1"/>
+          </p:nvPr>
+        </p:nvSpPr>
         <p:spPr>
           <a:xfrm>
-            <a:off x="891987" y="1610004"/>
-            <a:ext cx="9906000" cy="4391025"/>
-          </a:xfrm>
-          <a:prstGeom prst="rect">
-            <a:avLst/>
-          </a:prstGeom>
-        </p:spPr>
-      </p:pic>
+            <a:off x="2640000" y="1800002"/>
+            <a:ext cx="8584381" cy="1463152"/>
+          </a:xfrm>
+        </p:spPr>
+        <p:txBody>
+          <a:bodyPr/>
+          <a:lstStyle/>
+          <a:p>
+            <a:r>
+              <a:rPr lang="nl-NL" dirty="0"/>
+              <a:t>Document Object Model</a:t>
+            </a:r>
+          </a:p>
+          <a:p>
+            <a:r>
+              <a:rPr lang="nl-NL" dirty="0">
+                <a:hlinkClick r:id="rId2"/>
+              </a:rPr>
+              <a:t>https://github.com/NHLStenden/Flex-WebDevelopment-FrontEndDevelopment/tree/master/WebDevelopment/content/examples/Fase02</a:t>
+            </a:r>
+            <a:endParaRPr lang="nl-NL" dirty="0"/>
+          </a:p>
+          <a:p>
+            <a:pPr marL="0" indent="0">
+              <a:buNone/>
+            </a:pPr>
+            <a:endParaRPr lang="nl-NL" dirty="0"/>
+          </a:p>
+        </p:txBody>
+      </p:sp>
     </p:spTree>
     <p:extLst>
       <p:ext uri="{BB962C8B-B14F-4D97-AF65-F5344CB8AC3E}">
-        <p14:creationId xmlns:p14="http://schemas.microsoft.com/office/powerpoint/2010/main" val="3739044432"/>
+        <p14:creationId xmlns:p14="http://schemas.microsoft.com/office/powerpoint/2010/main" val="458481042"/>
       </p:ext>
     </p:extLst>
   </p:cSld>
@@ -10003,7 +10075,7 @@
       </p:sp>
       <p:pic>
         <p:nvPicPr>
-          <p:cNvPr id="3" name="Afbeelding 2"/>
+          <p:cNvPr id="2" name="Afbeelding 1"/>
           <p:cNvPicPr>
             <a:picLocks noChangeAspect="1"/>
           </p:cNvPicPr>
@@ -10023,7 +10095,7 @@
         </p:blipFill>
         <p:spPr>
           <a:xfrm>
-            <a:off x="1143000" y="1753440"/>
+            <a:off x="891987" y="1610004"/>
             <a:ext cx="9906000" cy="4391025"/>
           </a:xfrm>
           <a:prstGeom prst="rect">
@@ -10034,7 +10106,7 @@
     </p:spTree>
     <p:extLst>
       <p:ext uri="{BB962C8B-B14F-4D97-AF65-F5344CB8AC3E}">
-        <p14:creationId xmlns:p14="http://schemas.microsoft.com/office/powerpoint/2010/main" val="1945810146"/>
+        <p14:creationId xmlns:p14="http://schemas.microsoft.com/office/powerpoint/2010/main" val="3739044432"/>
       </p:ext>
     </p:extLst>
   </p:cSld>
@@ -10078,129 +10150,45 @@
           <a:p>
             <a:r>
               <a:rPr lang="nl-NL" dirty="0"/>
-              <a:t>DOM </a:t>
-            </a:r>
-            <a:r>
-              <a:rPr lang="nl-NL" dirty="0" err="1"/>
-              <a:t>Manipulation</a:t>
-            </a:r>
-            <a:endParaRPr lang="nl-NL" dirty="0"/>
-          </a:p>
-        </p:txBody>
-      </p:sp>
-      <p:sp>
-        <p:nvSpPr>
-          <p:cNvPr id="5" name="Tijdelijke aanduiding voor inhoud 4"/>
-          <p:cNvSpPr>
-            <a:spLocks noGrp="1"/>
-          </p:cNvSpPr>
-          <p:nvPr>
-            <p:ph idx="1"/>
-          </p:nvPr>
-        </p:nvSpPr>
-        <p:spPr/>
-        <p:txBody>
-          <a:bodyPr/>
-          <a:lstStyle/>
-          <a:p>
-            <a:r>
-              <a:rPr lang="nl-NL" dirty="0"/>
-              <a:t>Als de DOM eenmaal klaar is met laden kunnen we zaken aanpassen</a:t>
-            </a:r>
-          </a:p>
-          <a:p>
-            <a:r>
-              <a:rPr lang="nl-NL" dirty="0"/>
-              <a:t>Daarvoor zijn functies nodig om bestaande elementen op te zoeken:</a:t>
-            </a:r>
-          </a:p>
-          <a:p>
-            <a:pPr lvl="1"/>
-            <a:r>
-              <a:rPr lang="nl-NL" dirty="0" err="1"/>
-              <a:t>document.getElementById</a:t>
-            </a:r>
-            <a:r>
-              <a:rPr lang="nl-NL" dirty="0"/>
-              <a:t>()</a:t>
-            </a:r>
-          </a:p>
-          <a:p>
-            <a:pPr lvl="1"/>
-            <a:r>
-              <a:rPr lang="nl-NL" dirty="0" err="1"/>
-              <a:t>document.getElementsByClassName</a:t>
-            </a:r>
-            <a:r>
-              <a:rPr lang="nl-NL" dirty="0"/>
-              <a:t>()</a:t>
-            </a:r>
-          </a:p>
-          <a:p>
-            <a:pPr lvl="1"/>
-            <a:r>
-              <a:rPr lang="nl-NL" dirty="0" err="1"/>
-              <a:t>document.querySelector</a:t>
-            </a:r>
-            <a:r>
-              <a:rPr lang="nl-NL" dirty="0"/>
-              <a:t>()</a:t>
-            </a:r>
-          </a:p>
-          <a:p>
-            <a:pPr lvl="1"/>
-            <a:r>
-              <a:rPr lang="nl-NL" dirty="0" err="1"/>
-              <a:t>document.querySelectorAll</a:t>
-            </a:r>
-            <a:r>
-              <a:rPr lang="nl-NL" dirty="0"/>
-              <a:t>()</a:t>
-            </a:r>
-          </a:p>
-          <a:p>
-            <a:pPr lvl="1"/>
-            <a:r>
-              <a:rPr lang="nl-NL" dirty="0" err="1"/>
-              <a:t>document.documentElement</a:t>
-            </a:r>
-            <a:r>
-              <a:rPr lang="nl-NL" dirty="0"/>
-              <a:t> (let op; geen functie!)</a:t>
-            </a:r>
-          </a:p>
-          <a:p>
-            <a:r>
-              <a:rPr lang="nl-NL" dirty="0"/>
-              <a:t>De parameters van deze functies variëren  maar kunnen samengenomen worden in de categorie “</a:t>
-            </a:r>
-            <a:r>
-              <a:rPr lang="nl-NL" dirty="0" err="1"/>
-              <a:t>selectors</a:t>
-            </a:r>
-            <a:r>
-              <a:rPr lang="nl-NL" dirty="0"/>
-              <a:t>”.</a:t>
-            </a:r>
-          </a:p>
-          <a:p>
-            <a:endParaRPr lang="nl-NL" dirty="0"/>
-          </a:p>
-          <a:p>
-            <a:endParaRPr lang="nl-NL" dirty="0"/>
-          </a:p>
-          <a:p>
-            <a:endParaRPr lang="nl-NL" dirty="0"/>
-          </a:p>
-          <a:p>
-            <a:endParaRPr lang="nl-NL" dirty="0"/>
-          </a:p>
-        </p:txBody>
-      </p:sp>
+              <a:t>DOM Model</a:t>
+            </a:r>
+          </a:p>
+        </p:txBody>
+      </p:sp>
+      <p:pic>
+        <p:nvPicPr>
+          <p:cNvPr id="3" name="Afbeelding 2"/>
+          <p:cNvPicPr>
+            <a:picLocks noChangeAspect="1"/>
+          </p:cNvPicPr>
+          <p:nvPr/>
+        </p:nvPicPr>
+        <p:blipFill>
+          <a:blip r:embed="rId2">
+            <a:extLst>
+              <a:ext uri="{28A0092B-C50C-407E-A947-70E740481C1C}">
+                <a14:useLocalDpi xmlns:a14="http://schemas.microsoft.com/office/drawing/2010/main" val="0"/>
+              </a:ext>
+            </a:extLst>
+          </a:blip>
+          <a:stretch>
+            <a:fillRect/>
+          </a:stretch>
+        </p:blipFill>
+        <p:spPr>
+          <a:xfrm>
+            <a:off x="1143000" y="1753440"/>
+            <a:ext cx="9906000" cy="4391025"/>
+          </a:xfrm>
+          <a:prstGeom prst="rect">
+            <a:avLst/>
+          </a:prstGeom>
+        </p:spPr>
+      </p:pic>
     </p:spTree>
     <p:extLst>
       <p:ext uri="{BB962C8B-B14F-4D97-AF65-F5344CB8AC3E}">
-        <p14:creationId xmlns:p14="http://schemas.microsoft.com/office/powerpoint/2010/main" val="2742284615"/>
+        <p14:creationId xmlns:p14="http://schemas.microsoft.com/office/powerpoint/2010/main" val="1945810146"/>
       </p:ext>
     </p:extLst>
   </p:cSld>
@@ -10229,7 +10217,7 @@
       </p:grpSpPr>
       <p:sp>
         <p:nvSpPr>
-          <p:cNvPr id="2" name="Titel 1"/>
+          <p:cNvPr id="4" name="Titel 3"/>
           <p:cNvSpPr>
             <a:spLocks noGrp="1"/>
           </p:cNvSpPr>
@@ -10243,8 +10231,12 @@
           <a:lstStyle/>
           <a:p>
             <a:r>
+              <a:rPr lang="nl-NL" dirty="0"/>
+              <a:t>DOM </a:t>
+            </a:r>
+            <a:r>
               <a:rPr lang="nl-NL" dirty="0" err="1"/>
-              <a:t>Selectors</a:t>
+              <a:t>Manipulation</a:t>
             </a:r>
             <a:endParaRPr lang="nl-NL" dirty="0"/>
           </a:p>
@@ -10252,7 +10244,7 @@
       </p:sp>
       <p:sp>
         <p:nvSpPr>
-          <p:cNvPr id="3" name="Tijdelijke aanduiding voor inhoud 2"/>
+          <p:cNvPr id="5" name="Tijdelijke aanduiding voor inhoud 4"/>
           <p:cNvSpPr>
             <a:spLocks noGrp="1"/>
           </p:cNvSpPr>
@@ -10262,161 +10254,107 @@
         </p:nvSpPr>
         <p:spPr/>
         <p:txBody>
-          <a:bodyPr>
-            <a:normAutofit/>
-          </a:bodyPr>
+          <a:bodyPr/>
           <a:lstStyle/>
           <a:p>
             <a:r>
+              <a:rPr lang="nl-NL" dirty="0"/>
+              <a:t>Als de DOM eenmaal klaar is met laden kunnen we zaken aanpassen</a:t>
+            </a:r>
+          </a:p>
+          <a:p>
+            <a:r>
+              <a:rPr lang="nl-NL" dirty="0"/>
+              <a:t>Daarvoor zijn functies nodig om bestaande elementen op te zoeken:</a:t>
+            </a:r>
+          </a:p>
+          <a:p>
+            <a:pPr lvl="1"/>
+            <a:r>
               <a:rPr lang="nl-NL" dirty="0" err="1"/>
-              <a:t>Selectors</a:t>
-            </a:r>
-            <a:r>
-              <a:rPr lang="nl-NL" dirty="0"/>
-              <a:t> lijken sterk op hoe je CSS schrijft:</a:t>
+              <a:t>document.getElementById</a:t>
+            </a:r>
+            <a:r>
+              <a:rPr lang="nl-NL" dirty="0"/>
+              <a:t>()</a:t>
             </a:r>
           </a:p>
           <a:p>
             <a:pPr lvl="1"/>
             <a:r>
-              <a:rPr lang="nl-NL" dirty="0"/>
-              <a:t>Alle elementen van een specifiek type: </a:t>
-            </a:r>
-            <a:r>
-              <a:rPr lang="nl-NL" dirty="0">
-                <a:latin typeface="Courier New" panose="02070309020205020404" pitchFamily="49" charset="0"/>
-                <a:cs typeface="Courier New" panose="02070309020205020404" pitchFamily="49" charset="0"/>
-              </a:rPr>
-              <a:t>UL</a:t>
+              <a:rPr lang="nl-NL" dirty="0" err="1"/>
+              <a:t>document.getElementsByClassName</a:t>
+            </a:r>
+            <a:r>
+              <a:rPr lang="nl-NL" dirty="0"/>
+              <a:t>()</a:t>
             </a:r>
           </a:p>
           <a:p>
             <a:pPr lvl="1"/>
             <a:r>
-              <a:rPr lang="nl-NL" dirty="0"/>
-              <a:t>Heeft een element een ID</a:t>
-            </a:r>
-            <a:r>
-              <a:rPr lang="nl-NL" dirty="0">
-                <a:latin typeface="Courier New" panose="02070309020205020404" pitchFamily="49" charset="0"/>
-                <a:cs typeface="Courier New" panose="02070309020205020404" pitchFamily="49" charset="0"/>
-              </a:rPr>
-              <a:t>: #</a:t>
-            </a:r>
-            <a:r>
-              <a:rPr lang="nl-NL" dirty="0" err="1">
-                <a:latin typeface="Courier New" panose="02070309020205020404" pitchFamily="49" charset="0"/>
-                <a:cs typeface="Courier New" panose="02070309020205020404" pitchFamily="49" charset="0"/>
-              </a:rPr>
-              <a:t>mijnid</a:t>
-            </a:r>
-            <a:endParaRPr lang="nl-NL" dirty="0">
-              <a:latin typeface="Courier New" panose="02070309020205020404" pitchFamily="49" charset="0"/>
-              <a:cs typeface="Courier New" panose="02070309020205020404" pitchFamily="49" charset="0"/>
-            </a:endParaRPr>
+              <a:rPr lang="nl-NL" dirty="0" err="1"/>
+              <a:t>document.querySelector</a:t>
+            </a:r>
+            <a:r>
+              <a:rPr lang="nl-NL" dirty="0"/>
+              <a:t>()</a:t>
+            </a:r>
           </a:p>
           <a:p>
             <a:pPr lvl="1"/>
             <a:r>
-              <a:rPr lang="nl-NL" dirty="0"/>
-              <a:t>Heeft een (of meerdere elementen) een class: </a:t>
-            </a:r>
-            <a:r>
-              <a:rPr lang="nl-NL" dirty="0">
-                <a:latin typeface="Courier New" panose="02070309020205020404" pitchFamily="49" charset="0"/>
-                <a:cs typeface="Courier New" panose="02070309020205020404" pitchFamily="49" charset="0"/>
-              </a:rPr>
-              <a:t>.</a:t>
-            </a:r>
-            <a:r>
-              <a:rPr lang="nl-NL" dirty="0" err="1">
-                <a:latin typeface="Courier New" panose="02070309020205020404" pitchFamily="49" charset="0"/>
-                <a:cs typeface="Courier New" panose="02070309020205020404" pitchFamily="49" charset="0"/>
-              </a:rPr>
-              <a:t>myclass</a:t>
-            </a:r>
-            <a:endParaRPr lang="nl-NL" dirty="0">
-              <a:latin typeface="Courier New" panose="02070309020205020404" pitchFamily="49" charset="0"/>
-              <a:cs typeface="Courier New" panose="02070309020205020404" pitchFamily="49" charset="0"/>
-            </a:endParaRPr>
+              <a:rPr lang="nl-NL" dirty="0" err="1"/>
+              <a:t>document.querySelectorAll</a:t>
+            </a:r>
+            <a:r>
+              <a:rPr lang="nl-NL" dirty="0"/>
+              <a:t>()</a:t>
+            </a:r>
           </a:p>
           <a:p>
             <a:pPr lvl="1"/>
             <a:r>
-              <a:rPr lang="nl-NL" dirty="0"/>
-              <a:t>Kiezen tussen classes: </a:t>
-            </a:r>
-            <a:r>
-              <a:rPr lang="nl-NL" dirty="0">
-                <a:latin typeface="Courier New" panose="02070309020205020404" pitchFamily="49" charset="0"/>
-                <a:cs typeface="Courier New" panose="02070309020205020404" pitchFamily="49" charset="0"/>
-              </a:rPr>
-              <a:t>.</a:t>
-            </a:r>
-            <a:r>
-              <a:rPr lang="nl-NL" dirty="0" err="1">
-                <a:latin typeface="Courier New" panose="02070309020205020404" pitchFamily="49" charset="0"/>
-                <a:cs typeface="Courier New" panose="02070309020205020404" pitchFamily="49" charset="0"/>
-              </a:rPr>
-              <a:t>myclass</a:t>
-            </a:r>
-            <a:r>
-              <a:rPr lang="nl-NL" dirty="0">
-                <a:latin typeface="Courier New" panose="02070309020205020404" pitchFamily="49" charset="0"/>
-                <a:cs typeface="Courier New" panose="02070309020205020404" pitchFamily="49" charset="0"/>
-              </a:rPr>
-              <a:t>, .</a:t>
-            </a:r>
-            <a:r>
-              <a:rPr lang="nl-NL" dirty="0" err="1">
-                <a:latin typeface="Courier New" panose="02070309020205020404" pitchFamily="49" charset="0"/>
-                <a:cs typeface="Courier New" panose="02070309020205020404" pitchFamily="49" charset="0"/>
-              </a:rPr>
-              <a:t>anotherclass</a:t>
-            </a:r>
+              <a:rPr lang="nl-NL" dirty="0" err="1"/>
+              <a:t>document.documentElement</a:t>
+            </a:r>
+            <a:r>
+              <a:rPr lang="nl-NL" dirty="0"/>
+              <a:t> (let op; geen functie!)</a:t>
+            </a:r>
+          </a:p>
+          <a:p>
+            <a:r>
+              <a:rPr lang="nl-NL" dirty="0"/>
+              <a:t>De parameters van deze functies variëren  maar kunnen samengenomen worden in de categorie “</a:t>
+            </a:r>
+            <a:r>
+              <a:rPr lang="nl-NL" dirty="0" err="1"/>
+              <a:t>selectors</a:t>
+            </a:r>
+            <a:r>
+              <a:rPr lang="nl-NL" dirty="0"/>
+              <a:t>”.</a:t>
+            </a:r>
+          </a:p>
+          <a:p>
             <a:endParaRPr lang="nl-NL" dirty="0"/>
           </a:p>
           <a:p>
-            <a:pPr lvl="1"/>
-            <a:r>
-              <a:rPr lang="nl-NL" dirty="0"/>
-              <a:t>Wil je een ouder-kind relatie opgeven: UL &gt; LI</a:t>
-            </a:r>
-          </a:p>
-          <a:p>
-            <a:pPr lvl="1"/>
-            <a:r>
-              <a:rPr lang="nl-NL" dirty="0">
-                <a:hlinkClick r:id="rId2"/>
-              </a:rPr>
-              <a:t>https://www.w3schools.com/cssref/css_selectors.asp</a:t>
-            </a:r>
-            <a:r>
-              <a:rPr lang="nl-NL" dirty="0"/>
-              <a:t> </a:t>
-            </a:r>
-          </a:p>
-          <a:p>
-            <a:pPr marL="144000" lvl="1" indent="0">
-              <a:buNone/>
-            </a:pPr>
-            <a:r>
-              <a:rPr lang="nl-NL" dirty="0">
-                <a:hlinkClick r:id="rId3"/>
-              </a:rPr>
-              <a:t>https://developer.mozilla.org/en-US/docs/Web/API/Document_object_model/Locating_DOM_elements_using_selectors</a:t>
-            </a:r>
-            <a:r>
-              <a:rPr lang="nl-NL" dirty="0"/>
-              <a:t> </a:t>
-            </a:r>
+            <a:endParaRPr lang="nl-NL" dirty="0"/>
+          </a:p>
+          <a:p>
+            <a:endParaRPr lang="nl-NL" dirty="0"/>
+          </a:p>
+          <a:p>
+            <a:endParaRPr lang="nl-NL" dirty="0"/>
           </a:p>
         </p:txBody>
       </p:sp>
     </p:spTree>
     <p:extLst>
       <p:ext uri="{BB962C8B-B14F-4D97-AF65-F5344CB8AC3E}">
-        <p14:creationId xmlns:p14="http://schemas.microsoft.com/office/powerpoint/2010/main" val="1313792103"/>
+        <p14:creationId xmlns:p14="http://schemas.microsoft.com/office/powerpoint/2010/main" val="2742284615"/>
       </p:ext>
     </p:extLst>
   </p:cSld>
@@ -10445,7 +10383,7 @@
       </p:grpSpPr>
       <p:sp>
         <p:nvSpPr>
-          <p:cNvPr id="5" name="Titel 4"/>
+          <p:cNvPr id="3" name="Titel 2"/>
           <p:cNvSpPr>
             <a:spLocks noGrp="1"/>
           </p:cNvSpPr>
@@ -10460,83 +10398,53 @@
           <a:p>
             <a:r>
               <a:rPr lang="nl-NL" dirty="0"/>
-              <a:t>Verschil Front-end / </a:t>
+              <a:t>Algemeen</a:t>
+            </a:r>
+          </a:p>
+        </p:txBody>
+      </p:sp>
+      <p:sp>
+        <p:nvSpPr>
+          <p:cNvPr id="6" name="Tijdelijke aanduiding voor tekst 5"/>
+          <p:cNvSpPr>
+            <a:spLocks noGrp="1"/>
+          </p:cNvSpPr>
+          <p:nvPr>
+            <p:ph type="body" sz="quarter" idx="10"/>
+          </p:nvPr>
+        </p:nvSpPr>
+        <p:spPr>
+          <a:xfrm>
+            <a:off x="6096000" y="3483864"/>
+            <a:ext cx="4675200" cy="2884279"/>
+          </a:xfrm>
+        </p:spPr>
+        <p:txBody>
+          <a:bodyPr/>
+          <a:lstStyle/>
+          <a:p>
+            <a:r>
+              <a:rPr lang="nl-NL" dirty="0"/>
+              <a:t>Verschil Front-End / </a:t>
             </a:r>
             <a:r>
               <a:rPr lang="nl-NL" dirty="0" err="1"/>
-              <a:t>Back-end</a:t>
-            </a:r>
-            <a:r>
-              <a:rPr lang="nl-NL" dirty="0"/>
-              <a:t> versus traditioneel</a:t>
-            </a:r>
-          </a:p>
-        </p:txBody>
-      </p:sp>
-      <p:pic>
-        <p:nvPicPr>
-          <p:cNvPr id="8" name="Afbeelding 7"/>
-          <p:cNvPicPr>
-            <a:picLocks noChangeAspect="1"/>
-          </p:cNvPicPr>
-          <p:nvPr/>
-        </p:nvPicPr>
-        <p:blipFill>
-          <a:blip r:embed="rId3">
-            <a:extLst>
-              <a:ext uri="{28A0092B-C50C-407E-A947-70E740481C1C}">
-                <a14:useLocalDpi xmlns:a14="http://schemas.microsoft.com/office/drawing/2010/main" val="0"/>
-              </a:ext>
-            </a:extLst>
-          </a:blip>
-          <a:stretch>
-            <a:fillRect/>
-          </a:stretch>
-        </p:blipFill>
-        <p:spPr>
-          <a:xfrm>
-            <a:off x="895350" y="1757362"/>
-            <a:ext cx="4610100" cy="3343275"/>
-          </a:xfrm>
-          <a:prstGeom prst="rect">
-            <a:avLst/>
-          </a:prstGeom>
-        </p:spPr>
-      </p:pic>
-      <p:pic>
-        <p:nvPicPr>
-          <p:cNvPr id="9" name="Afbeelding 8"/>
-          <p:cNvPicPr>
-            <a:picLocks noChangeAspect="1"/>
-          </p:cNvPicPr>
-          <p:nvPr/>
-        </p:nvPicPr>
-        <p:blipFill>
-          <a:blip r:embed="rId4">
-            <a:extLst>
-              <a:ext uri="{28A0092B-C50C-407E-A947-70E740481C1C}">
-                <a14:useLocalDpi xmlns:a14="http://schemas.microsoft.com/office/drawing/2010/main" val="0"/>
-              </a:ext>
-            </a:extLst>
-          </a:blip>
-          <a:stretch>
-            <a:fillRect/>
-          </a:stretch>
-        </p:blipFill>
-        <p:spPr>
-          <a:xfrm>
-            <a:off x="6411325" y="1546772"/>
-            <a:ext cx="3914775" cy="4391025"/>
-          </a:xfrm>
-          <a:prstGeom prst="rect">
-            <a:avLst/>
-          </a:prstGeom>
-        </p:spPr>
-      </p:pic>
+              <a:t>Back-End</a:t>
+            </a:r>
+            <a:r>
+              <a:rPr lang="nl-NL" dirty="0"/>
+              <a:t> versus Traditioneel</a:t>
+            </a:r>
+          </a:p>
+          <a:p>
+            <a:endParaRPr lang="nl-NL" dirty="0"/>
+          </a:p>
+        </p:txBody>
+      </p:sp>
     </p:spTree>
     <p:extLst>
       <p:ext uri="{BB962C8B-B14F-4D97-AF65-F5344CB8AC3E}">
-        <p14:creationId xmlns:p14="http://schemas.microsoft.com/office/powerpoint/2010/main" val="3623483014"/>
+        <p14:creationId xmlns:p14="http://schemas.microsoft.com/office/powerpoint/2010/main" val="1087083312"/>
       </p:ext>
     </p:extLst>
   </p:cSld>
@@ -10579,9 +10487,10 @@
           <a:lstStyle/>
           <a:p>
             <a:r>
-              <a:rPr lang="nl-NL" dirty="0"/>
-              <a:t>Het maken van een nieuw item</a:t>
-            </a:r>
+              <a:rPr lang="nl-NL" dirty="0" err="1"/>
+              <a:t>Selectors</a:t>
+            </a:r>
+            <a:endParaRPr lang="nl-NL" dirty="0"/>
           </a:p>
         </p:txBody>
       </p:sp>
@@ -10597,60 +10506,153 @@
         </p:nvSpPr>
         <p:spPr/>
         <p:txBody>
-          <a:bodyPr/>
+          <a:bodyPr>
+            <a:normAutofit/>
+          </a:bodyPr>
           <a:lstStyle/>
           <a:p>
             <a:r>
-              <a:rPr lang="nl-NL" dirty="0"/>
-              <a:t>Maak een nieuw item met </a:t>
+              <a:rPr lang="nl-NL" dirty="0" err="1"/>
+              <a:t>Selectors</a:t>
+            </a:r>
+            <a:r>
+              <a:rPr lang="nl-NL" dirty="0"/>
+              <a:t> lijken sterk op hoe je CSS schrijft:</a:t>
+            </a:r>
+          </a:p>
+          <a:p>
+            <a:pPr lvl="1"/>
+            <a:r>
+              <a:rPr lang="nl-NL" dirty="0"/>
+              <a:t>Alle elementen van een specifiek type: </a:t>
+            </a:r>
+            <a:r>
+              <a:rPr lang="nl-NL" dirty="0">
+                <a:latin typeface="Courier New" panose="02070309020205020404" pitchFamily="49" charset="0"/>
+                <a:cs typeface="Courier New" panose="02070309020205020404" pitchFamily="49" charset="0"/>
+              </a:rPr>
+              <a:t>UL</a:t>
+            </a:r>
+          </a:p>
+          <a:p>
+            <a:pPr lvl="1"/>
+            <a:r>
+              <a:rPr lang="nl-NL" dirty="0"/>
+              <a:t>Heeft een element een ID</a:t>
+            </a:r>
+            <a:r>
+              <a:rPr lang="nl-NL" dirty="0">
+                <a:latin typeface="Courier New" panose="02070309020205020404" pitchFamily="49" charset="0"/>
+                <a:cs typeface="Courier New" panose="02070309020205020404" pitchFamily="49" charset="0"/>
+              </a:rPr>
+              <a:t>: #</a:t>
             </a:r>
             <a:r>
               <a:rPr lang="nl-NL" dirty="0" err="1">
                 <a:latin typeface="Courier New" panose="02070309020205020404" pitchFamily="49" charset="0"/>
                 <a:cs typeface="Courier New" panose="02070309020205020404" pitchFamily="49" charset="0"/>
               </a:rPr>
-              <a:t>document.createElement</a:t>
+              <a:t>mijnid</a:t>
+            </a:r>
+            <a:endParaRPr lang="nl-NL" dirty="0">
+              <a:latin typeface="Courier New" panose="02070309020205020404" pitchFamily="49" charset="0"/>
+              <a:cs typeface="Courier New" panose="02070309020205020404" pitchFamily="49" charset="0"/>
+            </a:endParaRPr>
+          </a:p>
+          <a:p>
+            <a:pPr lvl="1"/>
+            <a:r>
+              <a:rPr lang="nl-NL" dirty="0"/>
+              <a:t>Heeft een (of meerdere elementen) een class: </a:t>
             </a:r>
             <a:r>
               <a:rPr lang="nl-NL" dirty="0">
                 <a:latin typeface="Courier New" panose="02070309020205020404" pitchFamily="49" charset="0"/>
                 <a:cs typeface="Courier New" panose="02070309020205020404" pitchFamily="49" charset="0"/>
               </a:rPr>
-              <a:t>()</a:t>
-            </a:r>
-          </a:p>
-          <a:p>
-            <a:r>
-              <a:rPr lang="nl-NL" dirty="0"/>
-              <a:t>Voeg het toe aan een ander element met </a:t>
+              <a:t>.</a:t>
             </a:r>
             <a:r>
               <a:rPr lang="nl-NL" dirty="0" err="1">
                 <a:latin typeface="Courier New" panose="02070309020205020404" pitchFamily="49" charset="0"/>
                 <a:cs typeface="Courier New" panose="02070309020205020404" pitchFamily="49" charset="0"/>
               </a:rPr>
-              <a:t>mijnobject.appendChild</a:t>
+              <a:t>myclass</a:t>
+            </a:r>
+            <a:endParaRPr lang="nl-NL" dirty="0">
+              <a:latin typeface="Courier New" panose="02070309020205020404" pitchFamily="49" charset="0"/>
+              <a:cs typeface="Courier New" panose="02070309020205020404" pitchFamily="49" charset="0"/>
+            </a:endParaRPr>
+          </a:p>
+          <a:p>
+            <a:pPr lvl="1"/>
+            <a:r>
+              <a:rPr lang="nl-NL" dirty="0"/>
+              <a:t>Kiezen tussen classes: </a:t>
             </a:r>
             <a:r>
               <a:rPr lang="nl-NL" dirty="0">
                 <a:latin typeface="Courier New" panose="02070309020205020404" pitchFamily="49" charset="0"/>
                 <a:cs typeface="Courier New" panose="02070309020205020404" pitchFamily="49" charset="0"/>
               </a:rPr>
-              <a:t>(</a:t>
+              <a:t>.</a:t>
             </a:r>
             <a:r>
               <a:rPr lang="nl-NL" dirty="0" err="1">
                 <a:latin typeface="Courier New" panose="02070309020205020404" pitchFamily="49" charset="0"/>
                 <a:cs typeface="Courier New" panose="02070309020205020404" pitchFamily="49" charset="0"/>
               </a:rPr>
-              <a:t>nieuwObject</a:t>
+              <a:t>myclass</a:t>
             </a:r>
             <a:r>
               <a:rPr lang="nl-NL" dirty="0">
                 <a:latin typeface="Courier New" panose="02070309020205020404" pitchFamily="49" charset="0"/>
                 <a:cs typeface="Courier New" panose="02070309020205020404" pitchFamily="49" charset="0"/>
               </a:rPr>
-              <a:t>)</a:t>
+              <a:t>, .</a:t>
+            </a:r>
+            <a:r>
+              <a:rPr lang="nl-NL" dirty="0" err="1">
+                <a:latin typeface="Courier New" panose="02070309020205020404" pitchFamily="49" charset="0"/>
+                <a:cs typeface="Courier New" panose="02070309020205020404" pitchFamily="49" charset="0"/>
+              </a:rPr>
+              <a:t>anotherclass</a:t>
+            </a:r>
+            <a:endParaRPr lang="nl-NL" dirty="0"/>
+          </a:p>
+          <a:p>
+            <a:pPr lvl="1"/>
+            <a:r>
+              <a:rPr lang="nl-NL" dirty="0"/>
+              <a:t>Wil je een ouder-kind relatie opgeven: UL &gt; LI</a:t>
+            </a:r>
+          </a:p>
+          <a:p>
+            <a:pPr lvl="1"/>
+            <a:r>
+              <a:rPr lang="nl-NL" dirty="0">
+                <a:hlinkClick r:id="rId2"/>
+              </a:rPr>
+              <a:t>https://www.w3schools.com/cssref/css_selectors.asp</a:t>
+            </a:r>
+            <a:r>
+              <a:rPr lang="nl-NL" dirty="0"/>
+              <a:t> </a:t>
+            </a:r>
+          </a:p>
+          <a:p>
+            <a:pPr marL="144000" lvl="1" indent="0">
+              <a:buNone/>
+            </a:pPr>
+            <a:r>
+              <a:rPr lang="nl-NL" dirty="0">
+                <a:hlinkClick r:id="rId3"/>
+              </a:rPr>
+              <a:t>https://developer.mozilla.org/en-US/docs/Web/API/Document_object_model/Locating_DOM_elements_using_selectors</a:t>
+            </a:r>
+            <a:r>
+              <a:rPr lang="nl-NL" dirty="0"/>
+              <a:t> </a:t>
             </a:r>
           </a:p>
         </p:txBody>
@@ -10658,7 +10660,7 @@
     </p:spTree>
     <p:extLst>
       <p:ext uri="{BB962C8B-B14F-4D97-AF65-F5344CB8AC3E}">
-        <p14:creationId xmlns:p14="http://schemas.microsoft.com/office/powerpoint/2010/main" val="3459701139"/>
+        <p14:creationId xmlns:p14="http://schemas.microsoft.com/office/powerpoint/2010/main" val="1313792103"/>
       </p:ext>
     </p:extLst>
   </p:cSld>
@@ -10687,7 +10689,7 @@
       </p:grpSpPr>
       <p:sp>
         <p:nvSpPr>
-          <p:cNvPr id="4" name="Titel 3"/>
+          <p:cNvPr id="2" name="Titel 1"/>
           <p:cNvSpPr>
             <a:spLocks noGrp="1"/>
           </p:cNvSpPr>
@@ -10701,32 +10703,15 @@
           <a:lstStyle/>
           <a:p>
             <a:r>
-              <a:rPr lang="nl-NL" dirty="0" err="1"/>
-              <a:t>Vanilla</a:t>
-            </a:r>
-            <a:r>
-              <a:rPr lang="nl-NL" dirty="0"/>
-              <a:t> JS </a:t>
-            </a:r>
-            <a:r>
-              <a:rPr lang="nl-NL" dirty="0" err="1"/>
-              <a:t>vs</a:t>
-            </a:r>
-            <a:r>
-              <a:rPr lang="nl-NL" dirty="0"/>
-              <a:t> </a:t>
-            </a:r>
-            <a:r>
-              <a:rPr lang="nl-NL" dirty="0" err="1"/>
-              <a:t>Jquery</a:t>
-            </a:r>
-            <a:endParaRPr lang="nl-NL" dirty="0"/>
-          </a:p>
-        </p:txBody>
-      </p:sp>
-      <p:sp>
-        <p:nvSpPr>
-          <p:cNvPr id="5" name="Tijdelijke aanduiding voor inhoud 4"/>
+              <a:rPr lang="nl-NL" dirty="0"/>
+              <a:t>Het maken van een nieuw item</a:t>
+            </a:r>
+          </a:p>
+        </p:txBody>
+      </p:sp>
+      <p:sp>
+        <p:nvSpPr>
+          <p:cNvPr id="3" name="Tijdelijke aanduiding voor inhoud 2"/>
           <p:cNvSpPr>
             <a:spLocks noGrp="1"/>
           </p:cNvSpPr>
@@ -10740,76 +10725,64 @@
           <a:lstStyle/>
           <a:p>
             <a:r>
-              <a:rPr lang="nl-NL" dirty="0" err="1"/>
-              <a:t>Vanilla</a:t>
-            </a:r>
-            <a:r>
-              <a:rPr lang="nl-NL" dirty="0"/>
-              <a:t> JS: javascript zoals de browser het ‘out of </a:t>
-            </a:r>
-            <a:r>
-              <a:rPr lang="nl-NL" dirty="0" err="1"/>
-              <a:t>the</a:t>
-            </a:r>
-            <a:r>
-              <a:rPr lang="nl-NL" dirty="0"/>
-              <a:t> box’ ondersteunt</a:t>
-            </a:r>
-          </a:p>
-          <a:p>
-            <a:r>
-              <a:rPr lang="nl-NL" dirty="0"/>
-              <a:t>Probleem: niet alle browsers kunnen evenveel</a:t>
-            </a:r>
-          </a:p>
-          <a:p>
-            <a:r>
-              <a:rPr lang="nl-NL" dirty="0"/>
-              <a:t>Zie bijv. </a:t>
+              <a:rPr lang="nl-NL" dirty="0"/>
+              <a:t>Maak een nieuw item met </a:t>
+            </a:r>
+            <a:r>
+              <a:rPr lang="nl-NL" dirty="0" err="1">
+                <a:latin typeface="Courier New" panose="02070309020205020404" pitchFamily="49" charset="0"/>
+                <a:cs typeface="Courier New" panose="02070309020205020404" pitchFamily="49" charset="0"/>
+              </a:rPr>
+              <a:t>document.createElement</a:t>
             </a:r>
             <a:r>
               <a:rPr lang="nl-NL" dirty="0">
-                <a:hlinkClick r:id="rId2"/>
+                <a:latin typeface="Courier New" panose="02070309020205020404" pitchFamily="49" charset="0"/>
+                <a:cs typeface="Courier New" panose="02070309020205020404" pitchFamily="49" charset="0"/>
               </a:rPr>
-              <a:t>http://www.HTML5Test.com</a:t>
-            </a:r>
-            <a:r>
-              <a:rPr lang="nl-NL" dirty="0"/>
-              <a:t> met verschillende browsers</a:t>
-            </a:r>
-          </a:p>
-          <a:p>
-            <a:r>
-              <a:rPr lang="nl-NL" dirty="0"/>
-              <a:t>Oplossing:</a:t>
-            </a:r>
-          </a:p>
-          <a:p>
-            <a:pPr lvl="1"/>
-            <a:r>
-              <a:rPr lang="nl-NL" dirty="0" err="1"/>
-              <a:t>Jquery</a:t>
-            </a:r>
-            <a:endParaRPr lang="nl-NL" dirty="0"/>
-          </a:p>
-          <a:p>
-            <a:pPr lvl="1"/>
-            <a:r>
-              <a:rPr lang="nl-NL" dirty="0" err="1"/>
-              <a:t>Webpack</a:t>
-            </a:r>
-            <a:endParaRPr lang="nl-NL" dirty="0"/>
-          </a:p>
-          <a:p>
-            <a:pPr lvl="1"/>
-            <a:endParaRPr lang="nl-NL" dirty="0"/>
+              <a:t>()</a:t>
+            </a:r>
+          </a:p>
+          <a:p>
+            <a:r>
+              <a:rPr lang="nl-NL" dirty="0"/>
+              <a:t>Voeg het toe aan een ander element met </a:t>
+            </a:r>
+            <a:r>
+              <a:rPr lang="nl-NL" dirty="0" err="1">
+                <a:latin typeface="Courier New" panose="02070309020205020404" pitchFamily="49" charset="0"/>
+                <a:cs typeface="Courier New" panose="02070309020205020404" pitchFamily="49" charset="0"/>
+              </a:rPr>
+              <a:t>mijnobject.appendChild</a:t>
+            </a:r>
+            <a:r>
+              <a:rPr lang="nl-NL" dirty="0">
+                <a:latin typeface="Courier New" panose="02070309020205020404" pitchFamily="49" charset="0"/>
+                <a:cs typeface="Courier New" panose="02070309020205020404" pitchFamily="49" charset="0"/>
+              </a:rPr>
+              <a:t>(</a:t>
+            </a:r>
+            <a:r>
+              <a:rPr lang="nl-NL" dirty="0" err="1">
+                <a:latin typeface="Courier New" panose="02070309020205020404" pitchFamily="49" charset="0"/>
+                <a:cs typeface="Courier New" panose="02070309020205020404" pitchFamily="49" charset="0"/>
+              </a:rPr>
+              <a:t>nieuwObject</a:t>
+            </a:r>
+            <a:r>
+              <a:rPr lang="nl-NL" dirty="0">
+                <a:latin typeface="Courier New" panose="02070309020205020404" pitchFamily="49" charset="0"/>
+                <a:cs typeface="Courier New" panose="02070309020205020404" pitchFamily="49" charset="0"/>
+              </a:rPr>
+              <a:t>)</a:t>
+            </a:r>
           </a:p>
         </p:txBody>
       </p:sp>
     </p:spTree>
     <p:extLst>
       <p:ext uri="{BB962C8B-B14F-4D97-AF65-F5344CB8AC3E}">
-        <p14:creationId xmlns:p14="http://schemas.microsoft.com/office/powerpoint/2010/main" val="3023698229"/>
+        <p14:creationId xmlns:p14="http://schemas.microsoft.com/office/powerpoint/2010/main" val="3459701139"/>
       </p:ext>
     </p:extLst>
   </p:cSld>
@@ -10852,8 +10825,12 @@
           <a:lstStyle/>
           <a:p>
             <a:r>
-              <a:rPr lang="nl-NL" dirty="0"/>
-              <a:t>CSS </a:t>
+              <a:rPr lang="nl-NL" dirty="0" err="1"/>
+              <a:t>Vanilla</a:t>
+            </a:r>
+            <a:r>
+              <a:rPr lang="nl-NL" dirty="0"/>
+              <a:t> JS </a:t>
             </a:r>
             <a:r>
               <a:rPr lang="nl-NL" dirty="0" err="1"/>
@@ -10861,8 +10838,13 @@
             </a:r>
             <a:r>
               <a:rPr lang="nl-NL" dirty="0"/>
-              <a:t> JS</a:t>
-            </a:r>
+              <a:t> </a:t>
+            </a:r>
+            <a:r>
+              <a:rPr lang="nl-NL" dirty="0" err="1"/>
+              <a:t>Jquery</a:t>
+            </a:r>
+            <a:endParaRPr lang="nl-NL" dirty="0"/>
           </a:p>
         </p:txBody>
       </p:sp>
@@ -10882,47 +10864,68 @@
           <a:lstStyle/>
           <a:p>
             <a:r>
-              <a:rPr lang="nl-NL" dirty="0"/>
-              <a:t>Animaties via CSS of JS/</a:t>
-            </a:r>
-            <a:r>
               <a:rPr lang="nl-NL" dirty="0" err="1"/>
-              <a:t>jQuery</a:t>
-            </a:r>
-            <a:r>
-              <a:rPr lang="nl-NL" dirty="0"/>
-              <a:t> </a:t>
+              <a:t>Vanilla</a:t>
+            </a:r>
+            <a:r>
+              <a:rPr lang="nl-NL" dirty="0"/>
+              <a:t> JS: javascript zoals de browser het ‘out of </a:t>
             </a:r>
             <a:r>
               <a:rPr lang="nl-NL" dirty="0" err="1"/>
-              <a:t>etc</a:t>
+              <a:t>the</a:t>
+            </a:r>
+            <a:r>
+              <a:rPr lang="nl-NL" dirty="0"/>
+              <a:t> box’ ondersteunt</a:t>
+            </a:r>
+          </a:p>
+          <a:p>
+            <a:r>
+              <a:rPr lang="nl-NL" dirty="0"/>
+              <a:t>Probleem: niet alle browsers kunnen evenveel</a:t>
+            </a:r>
+          </a:p>
+          <a:p>
+            <a:r>
+              <a:rPr lang="nl-NL" dirty="0"/>
+              <a:t>Zie bijv. </a:t>
+            </a:r>
+            <a:r>
+              <a:rPr lang="nl-NL" dirty="0">
+                <a:hlinkClick r:id="rId2"/>
+              </a:rPr>
+              <a:t>http://www.HTML5Test.com</a:t>
+            </a:r>
+            <a:r>
+              <a:rPr lang="nl-NL" dirty="0"/>
+              <a:t> met verschillende browsers</a:t>
+            </a:r>
+          </a:p>
+          <a:p>
+            <a:r>
+              <a:rPr lang="nl-NL" dirty="0"/>
+              <a:t>Oplossing:</a:t>
+            </a:r>
+          </a:p>
+          <a:p>
+            <a:pPr lvl="1"/>
+            <a:r>
+              <a:rPr lang="nl-NL" dirty="0" err="1"/>
+              <a:t>Jquery</a:t>
             </a:r>
             <a:endParaRPr lang="nl-NL" dirty="0"/>
           </a:p>
           <a:p>
-            <a:r>
-              <a:rPr lang="nl-NL" dirty="0"/>
-              <a:t>Performance</a:t>
-            </a:r>
-          </a:p>
-          <a:p>
-            <a:r>
-              <a:rPr lang="nl-NL" dirty="0"/>
-              <a:t>Zie ook in Google Chrome, Developer Tools, “Memory” tab en start </a:t>
-            </a:r>
+            <a:pPr lvl="1"/>
             <a:r>
               <a:rPr lang="nl-NL" dirty="0" err="1"/>
-              <a:t>profiler</a:t>
+              <a:t>Webpack</a:t>
             </a:r>
             <a:endParaRPr lang="nl-NL" dirty="0"/>
           </a:p>
           <a:p>
-            <a:endParaRPr lang="nl-NL" dirty="0"/>
-          </a:p>
-          <a:p>
-            <a:endParaRPr lang="nl-NL" dirty="0"/>
-          </a:p>
-          <a:p>
+            <a:pPr lvl="1"/>
             <a:endParaRPr lang="nl-NL" dirty="0"/>
           </a:p>
         </p:txBody>
@@ -10930,7 +10933,7 @@
     </p:spTree>
     <p:extLst>
       <p:ext uri="{BB962C8B-B14F-4D97-AF65-F5344CB8AC3E}">
-        <p14:creationId xmlns:p14="http://schemas.microsoft.com/office/powerpoint/2010/main" val="3749883609"/>
+        <p14:creationId xmlns:p14="http://schemas.microsoft.com/office/powerpoint/2010/main" val="3023698229"/>
       </p:ext>
     </p:extLst>
   </p:cSld>
@@ -10959,7 +10962,7 @@
       </p:grpSpPr>
       <p:sp>
         <p:nvSpPr>
-          <p:cNvPr id="2" name="Titel 1"/>
+          <p:cNvPr id="4" name="Titel 3"/>
           <p:cNvSpPr>
             <a:spLocks noGrp="1"/>
           </p:cNvSpPr>
@@ -10974,14 +10977,22 @@
           <a:p>
             <a:r>
               <a:rPr lang="nl-NL" dirty="0"/>
-              <a:t>SVG &amp; Canvas</a:t>
-            </a:r>
-          </a:p>
-        </p:txBody>
-      </p:sp>
-      <p:sp>
-        <p:nvSpPr>
-          <p:cNvPr id="3" name="Tijdelijke aanduiding voor inhoud 2"/>
+              <a:t>CSS </a:t>
+            </a:r>
+            <a:r>
+              <a:rPr lang="nl-NL" dirty="0" err="1"/>
+              <a:t>vs</a:t>
+            </a:r>
+            <a:r>
+              <a:rPr lang="nl-NL" dirty="0"/>
+              <a:t> JS</a:t>
+            </a:r>
+          </a:p>
+        </p:txBody>
+      </p:sp>
+      <p:sp>
+        <p:nvSpPr>
+          <p:cNvPr id="5" name="Tijdelijke aanduiding voor inhoud 4"/>
           <p:cNvSpPr>
             <a:spLocks noGrp="1"/>
           </p:cNvSpPr>
@@ -10996,69 +11007,44 @@
           <a:p>
             <a:r>
               <a:rPr lang="nl-NL" dirty="0"/>
-              <a:t>Tekenen van objecten</a:t>
-            </a:r>
-          </a:p>
-          <a:p>
-            <a:pPr lvl="1"/>
-            <a:r>
-              <a:rPr lang="nl-NL" dirty="0"/>
-              <a:t>Canvas </a:t>
-            </a:r>
-            <a:r>
-              <a:rPr lang="nl-NL" dirty="0">
-                <a:sym typeface="Wingdings" panose="05000000000000000000" pitchFamily="2" charset="2"/>
-              </a:rPr>
-              <a:t> javascript</a:t>
-            </a:r>
-          </a:p>
-          <a:p>
-            <a:pPr lvl="1"/>
-            <a:r>
-              <a:rPr lang="nl-NL" dirty="0">
-                <a:sym typeface="Wingdings" panose="05000000000000000000" pitchFamily="2" charset="2"/>
-              </a:rPr>
-              <a:t>SVG  </a:t>
-            </a:r>
-            <a:r>
-              <a:rPr lang="nl-NL" dirty="0" err="1">
-                <a:sym typeface="Wingdings" panose="05000000000000000000" pitchFamily="2" charset="2"/>
-              </a:rPr>
-              <a:t>xml</a:t>
-            </a:r>
-            <a:r>
-              <a:rPr lang="nl-NL" dirty="0">
-                <a:sym typeface="Wingdings" panose="05000000000000000000" pitchFamily="2" charset="2"/>
-              </a:rPr>
-              <a:t>-tekst door browser opgebouwd</a:t>
-            </a:r>
-          </a:p>
-          <a:p>
-            <a:r>
-              <a:rPr lang="nl-NL" dirty="0" err="1">
-                <a:sym typeface="Wingdings" panose="05000000000000000000" pitchFamily="2" charset="2"/>
-              </a:rPr>
-              <a:t>Frameworks</a:t>
-            </a:r>
-            <a:endParaRPr lang="nl-NL" dirty="0">
-              <a:sym typeface="Wingdings" panose="05000000000000000000" pitchFamily="2" charset="2"/>
-            </a:endParaRPr>
-          </a:p>
-          <a:p>
-            <a:r>
-              <a:rPr lang="nl-NL" dirty="0">
-                <a:sym typeface="Wingdings" panose="05000000000000000000" pitchFamily="2" charset="2"/>
-              </a:rPr>
-              <a:t>Leercurve</a:t>
-            </a:r>
-          </a:p>
-          <a:p>
-            <a:r>
-              <a:rPr lang="nl-NL" dirty="0">
-                <a:sym typeface="Wingdings" panose="05000000000000000000" pitchFamily="2" charset="2"/>
-              </a:rPr>
-              <a:t>Voorbeelden</a:t>
-            </a:r>
+              <a:t>Animaties via CSS of JS/</a:t>
+            </a:r>
+            <a:r>
+              <a:rPr lang="nl-NL" dirty="0" err="1"/>
+              <a:t>jQuery</a:t>
+            </a:r>
+            <a:r>
+              <a:rPr lang="nl-NL" dirty="0"/>
+              <a:t> </a:t>
+            </a:r>
+            <a:r>
+              <a:rPr lang="nl-NL" dirty="0" err="1"/>
+              <a:t>etc</a:t>
+            </a:r>
+            <a:endParaRPr lang="nl-NL" dirty="0"/>
+          </a:p>
+          <a:p>
+            <a:r>
+              <a:rPr lang="nl-NL" dirty="0"/>
+              <a:t>Performance</a:t>
+            </a:r>
+          </a:p>
+          <a:p>
+            <a:r>
+              <a:rPr lang="nl-NL" dirty="0"/>
+              <a:t>Zie ook in Google Chrome, Developer Tools, “Memory” tab en start </a:t>
+            </a:r>
+            <a:r>
+              <a:rPr lang="nl-NL" dirty="0" err="1"/>
+              <a:t>profiler</a:t>
+            </a:r>
+            <a:endParaRPr lang="nl-NL" dirty="0"/>
+          </a:p>
+          <a:p>
+            <a:endParaRPr lang="nl-NL" dirty="0"/>
+          </a:p>
+          <a:p>
+            <a:endParaRPr lang="nl-NL" dirty="0"/>
           </a:p>
           <a:p>
             <a:endParaRPr lang="nl-NL" dirty="0"/>
@@ -11068,7 +11054,7 @@
     </p:spTree>
     <p:extLst>
       <p:ext uri="{BB962C8B-B14F-4D97-AF65-F5344CB8AC3E}">
-        <p14:creationId xmlns:p14="http://schemas.microsoft.com/office/powerpoint/2010/main" val="2023804850"/>
+        <p14:creationId xmlns:p14="http://schemas.microsoft.com/office/powerpoint/2010/main" val="3749883609"/>
       </p:ext>
     </p:extLst>
   </p:cSld>
@@ -11112,6 +11098,144 @@
           <a:p>
             <a:r>
               <a:rPr lang="nl-NL" dirty="0"/>
+              <a:t>SVG &amp; Canvas</a:t>
+            </a:r>
+          </a:p>
+        </p:txBody>
+      </p:sp>
+      <p:sp>
+        <p:nvSpPr>
+          <p:cNvPr id="3" name="Tijdelijke aanduiding voor inhoud 2"/>
+          <p:cNvSpPr>
+            <a:spLocks noGrp="1"/>
+          </p:cNvSpPr>
+          <p:nvPr>
+            <p:ph idx="1"/>
+          </p:nvPr>
+        </p:nvSpPr>
+        <p:spPr/>
+        <p:txBody>
+          <a:bodyPr/>
+          <a:lstStyle/>
+          <a:p>
+            <a:r>
+              <a:rPr lang="nl-NL" dirty="0"/>
+              <a:t>Tekenen van objecten</a:t>
+            </a:r>
+          </a:p>
+          <a:p>
+            <a:pPr lvl="1"/>
+            <a:r>
+              <a:rPr lang="nl-NL" dirty="0"/>
+              <a:t>Canvas </a:t>
+            </a:r>
+            <a:r>
+              <a:rPr lang="nl-NL" dirty="0">
+                <a:sym typeface="Wingdings" panose="05000000000000000000" pitchFamily="2" charset="2"/>
+              </a:rPr>
+              <a:t> javascript</a:t>
+            </a:r>
+          </a:p>
+          <a:p>
+            <a:pPr lvl="1"/>
+            <a:r>
+              <a:rPr lang="nl-NL" dirty="0">
+                <a:sym typeface="Wingdings" panose="05000000000000000000" pitchFamily="2" charset="2"/>
+              </a:rPr>
+              <a:t>SVG  </a:t>
+            </a:r>
+            <a:r>
+              <a:rPr lang="nl-NL" dirty="0" err="1">
+                <a:sym typeface="Wingdings" panose="05000000000000000000" pitchFamily="2" charset="2"/>
+              </a:rPr>
+              <a:t>xml</a:t>
+            </a:r>
+            <a:r>
+              <a:rPr lang="nl-NL" dirty="0">
+                <a:sym typeface="Wingdings" panose="05000000000000000000" pitchFamily="2" charset="2"/>
+              </a:rPr>
+              <a:t>-tekst door browser opgebouwd</a:t>
+            </a:r>
+          </a:p>
+          <a:p>
+            <a:r>
+              <a:rPr lang="nl-NL" dirty="0" err="1">
+                <a:sym typeface="Wingdings" panose="05000000000000000000" pitchFamily="2" charset="2"/>
+              </a:rPr>
+              <a:t>Frameworks</a:t>
+            </a:r>
+            <a:endParaRPr lang="nl-NL" dirty="0">
+              <a:sym typeface="Wingdings" panose="05000000000000000000" pitchFamily="2" charset="2"/>
+            </a:endParaRPr>
+          </a:p>
+          <a:p>
+            <a:r>
+              <a:rPr lang="nl-NL" dirty="0">
+                <a:sym typeface="Wingdings" panose="05000000000000000000" pitchFamily="2" charset="2"/>
+              </a:rPr>
+              <a:t>Leercurve</a:t>
+            </a:r>
+          </a:p>
+          <a:p>
+            <a:r>
+              <a:rPr lang="nl-NL" dirty="0">
+                <a:sym typeface="Wingdings" panose="05000000000000000000" pitchFamily="2" charset="2"/>
+              </a:rPr>
+              <a:t>Voorbeelden</a:t>
+            </a:r>
+          </a:p>
+          <a:p>
+            <a:endParaRPr lang="nl-NL" dirty="0"/>
+          </a:p>
+        </p:txBody>
+      </p:sp>
+    </p:spTree>
+    <p:extLst>
+      <p:ext uri="{BB962C8B-B14F-4D97-AF65-F5344CB8AC3E}">
+        <p14:creationId xmlns:p14="http://schemas.microsoft.com/office/powerpoint/2010/main" val="2023804850"/>
+      </p:ext>
+    </p:extLst>
+  </p:cSld>
+  <p:clrMapOvr>
+    <a:masterClrMapping/>
+  </p:clrMapOvr>
+</p:sld>
+</file>
+
+<file path=ppt/slides/slide35.xml><?xml version="1.0" encoding="utf-8"?>
+<p:sld xmlns:a="http://schemas.openxmlformats.org/drawingml/2006/main" xmlns:r="http://schemas.openxmlformats.org/officeDocument/2006/relationships" xmlns:p="http://schemas.openxmlformats.org/presentationml/2006/main">
+  <p:cSld>
+    <p:spTree>
+      <p:nvGrpSpPr>
+        <p:cNvPr id="1" name=""/>
+        <p:cNvGrpSpPr/>
+        <p:nvPr/>
+      </p:nvGrpSpPr>
+      <p:grpSpPr>
+        <a:xfrm>
+          <a:off x="0" y="0"/>
+          <a:ext cx="0" cy="0"/>
+          <a:chOff x="0" y="0"/>
+          <a:chExt cx="0" cy="0"/>
+        </a:xfrm>
+      </p:grpSpPr>
+      <p:sp>
+        <p:nvSpPr>
+          <p:cNvPr id="2" name="Titel 1"/>
+          <p:cNvSpPr>
+            <a:spLocks noGrp="1"/>
+          </p:cNvSpPr>
+          <p:nvPr>
+            <p:ph type="title"/>
+          </p:nvPr>
+        </p:nvSpPr>
+        <p:spPr/>
+        <p:txBody>
+          <a:bodyPr/>
+          <a:lstStyle/>
+          <a:p>
+            <a:r>
+              <a:rPr lang="nl-NL" dirty="0"/>
               <a:t>Templating</a:t>
             </a:r>
           </a:p>
@@ -11173,7 +11297,7 @@
 </p:sld>
 </file>
 
-<file path=ppt/slides/slide35.xml><?xml version="1.0" encoding="utf-8"?>
+<file path=ppt/slides/slide36.xml><?xml version="1.0" encoding="utf-8"?>
 <p:sld xmlns:a="http://schemas.openxmlformats.org/drawingml/2006/main" xmlns:r="http://schemas.openxmlformats.org/officeDocument/2006/relationships" xmlns:p="http://schemas.openxmlformats.org/presentationml/2006/main">
   <p:cSld>
     <p:spTree>
@@ -11306,7 +11430,15 @@
           <a:p>
             <a:r>
               <a:rPr lang="nl-NL" dirty="0"/>
-              <a:t>Traditioneel</a:t>
+              <a:t>Verschil Front-end / </a:t>
+            </a:r>
+            <a:r>
+              <a:rPr lang="nl-NL" dirty="0" err="1"/>
+              <a:t>Back-end</a:t>
+            </a:r>
+            <a:r>
+              <a:rPr lang="nl-NL" dirty="0"/>
+              <a:t> versus traditioneel</a:t>
             </a:r>
           </a:p>
         </p:txBody>
@@ -11341,173 +11473,40 @@
           </a:prstGeom>
         </p:spPr>
       </p:pic>
-      <p:sp>
-        <p:nvSpPr>
-          <p:cNvPr id="2" name="Tekstvak 1"/>
-          <p:cNvSpPr txBox="1"/>
+      <p:pic>
+        <p:nvPicPr>
+          <p:cNvPr id="9" name="Afbeelding 8"/>
+          <p:cNvPicPr>
+            <a:picLocks noChangeAspect="1"/>
+          </p:cNvPicPr>
           <p:nvPr/>
-        </p:nvSpPr>
+        </p:nvPicPr>
+        <p:blipFill>
+          <a:blip r:embed="rId4">
+            <a:extLst>
+              <a:ext uri="{28A0092B-C50C-407E-A947-70E740481C1C}">
+                <a14:useLocalDpi xmlns:a14="http://schemas.microsoft.com/office/drawing/2010/main" val="0"/>
+              </a:ext>
+            </a:extLst>
+          </a:blip>
+          <a:stretch>
+            <a:fillRect/>
+          </a:stretch>
+        </p:blipFill>
         <p:spPr>
           <a:xfrm>
-            <a:off x="6139543" y="2035629"/>
-            <a:ext cx="5943600" cy="3693319"/>
+            <a:off x="6411325" y="1546772"/>
+            <a:ext cx="3914775" cy="4391025"/>
           </a:xfrm>
           <a:prstGeom prst="rect">
             <a:avLst/>
           </a:prstGeom>
-          <a:noFill/>
-        </p:spPr>
-        <p:txBody>
-          <a:bodyPr wrap="square" rtlCol="0">
-            <a:spAutoFit/>
-          </a:bodyPr>
-          <a:lstStyle/>
-          <a:p>
-            <a:pPr marL="342900" indent="-342900">
-              <a:buFont typeface="+mj-lt"/>
-              <a:buAutoNum type="arabicPeriod"/>
-            </a:pPr>
-            <a:r>
-              <a:rPr lang="nl-NL" dirty="0"/>
-              <a:t>Client vraagt URL op</a:t>
-            </a:r>
-          </a:p>
-          <a:p>
-            <a:pPr marL="342900" indent="-342900">
-              <a:buFont typeface="+mj-lt"/>
-              <a:buAutoNum type="arabicPeriod"/>
-            </a:pPr>
-            <a:r>
-              <a:rPr lang="nl-NL" dirty="0"/>
-              <a:t>Server maakt documenten</a:t>
-            </a:r>
-          </a:p>
-          <a:p>
-            <a:pPr marL="800100" lvl="1" indent="-342900">
-              <a:buFont typeface="+mj-lt"/>
-              <a:buAutoNum type="alphaLcParenR"/>
-            </a:pPr>
-            <a:r>
-              <a:rPr lang="nl-NL" dirty="0"/>
-              <a:t>HTML (structuur) inclusief representatie van gegevens</a:t>
-            </a:r>
-          </a:p>
-          <a:p>
-            <a:pPr marL="800100" lvl="1" indent="-342900">
-              <a:buFont typeface="+mj-lt"/>
-              <a:buAutoNum type="alphaLcParenR"/>
-            </a:pPr>
-            <a:r>
-              <a:rPr lang="nl-NL" dirty="0"/>
-              <a:t>CSS (Opmaak)</a:t>
-            </a:r>
-          </a:p>
-          <a:p>
-            <a:pPr marL="800100" lvl="1" indent="-342900">
-              <a:buFont typeface="+mj-lt"/>
-              <a:buAutoNum type="alphaLcParenR"/>
-            </a:pPr>
-            <a:r>
-              <a:rPr lang="nl-NL" dirty="0"/>
-              <a:t>Javascript (actieve inhoud)</a:t>
-            </a:r>
-          </a:p>
-          <a:p>
-            <a:pPr marL="342900" indent="-342900">
-              <a:buFont typeface="+mj-lt"/>
-              <a:buAutoNum type="arabicPeriod"/>
-            </a:pPr>
-            <a:r>
-              <a:rPr lang="nl-NL" dirty="0"/>
-              <a:t>Client ontvangt documenten en maakt pagina op</a:t>
-            </a:r>
-          </a:p>
-          <a:p>
-            <a:pPr marL="342900" indent="-342900">
-              <a:buFont typeface="+mj-lt"/>
-              <a:buAutoNum type="arabicPeriod"/>
-            </a:pPr>
-            <a:r>
-              <a:rPr lang="nl-NL" dirty="0"/>
-              <a:t>Gebruiker heeft interactie</a:t>
-            </a:r>
-          </a:p>
-          <a:p>
-            <a:pPr marL="342900" indent="-342900">
-              <a:buFont typeface="+mj-lt"/>
-              <a:buAutoNum type="arabicPeriod"/>
-            </a:pPr>
-            <a:r>
-              <a:rPr lang="nl-NL" dirty="0"/>
-              <a:t>Door interactie navigatie naar nieuwe URL</a:t>
-            </a:r>
-          </a:p>
-          <a:p>
-            <a:pPr marL="342900" indent="-342900">
-              <a:buFont typeface="+mj-lt"/>
-              <a:buAutoNum type="arabicPeriod"/>
-            </a:pPr>
-            <a:r>
-              <a:rPr lang="nl-NL" dirty="0"/>
-              <a:t>…. </a:t>
-            </a:r>
-            <a:r>
-              <a:rPr lang="nl-NL" dirty="0" err="1"/>
-              <a:t>Repeat</a:t>
-            </a:r>
-            <a:r>
-              <a:rPr lang="nl-NL" dirty="0"/>
-              <a:t> </a:t>
-            </a:r>
-            <a:r>
-              <a:rPr lang="nl-NL" dirty="0" err="1"/>
-              <a:t>from</a:t>
-            </a:r>
-            <a:r>
-              <a:rPr lang="nl-NL" dirty="0"/>
-              <a:t> step 1</a:t>
-            </a:r>
-          </a:p>
-          <a:p>
-            <a:pPr marL="342900" indent="-342900">
-              <a:buFont typeface="+mj-lt"/>
-              <a:buAutoNum type="arabicPeriod"/>
-            </a:pPr>
-            <a:endParaRPr lang="nl-NL" dirty="0"/>
-          </a:p>
-          <a:p>
-            <a:r>
-              <a:rPr lang="nl-NL" dirty="0"/>
-              <a:t>Soms wat geavanceerder met AJAX (</a:t>
-            </a:r>
-            <a:r>
-              <a:rPr lang="nl-NL" dirty="0" err="1"/>
-              <a:t>Asynchronous</a:t>
-            </a:r>
-            <a:r>
-              <a:rPr lang="nl-NL" dirty="0"/>
-              <a:t> Javascript </a:t>
-            </a:r>
-            <a:r>
-              <a:rPr lang="nl-NL" dirty="0" err="1"/>
-              <a:t>and</a:t>
-            </a:r>
-            <a:r>
-              <a:rPr lang="nl-NL" dirty="0"/>
-              <a:t> XML) of </a:t>
-            </a:r>
-            <a:r>
-              <a:rPr lang="nl-NL" dirty="0" err="1"/>
-              <a:t>XMLHttpRequests</a:t>
-            </a:r>
-            <a:endParaRPr lang="nl-NL" dirty="0"/>
-          </a:p>
-        </p:txBody>
-      </p:sp>
+        </p:spPr>
+      </p:pic>
     </p:spTree>
     <p:extLst>
       <p:ext uri="{BB962C8B-B14F-4D97-AF65-F5344CB8AC3E}">
-        <p14:creationId xmlns:p14="http://schemas.microsoft.com/office/powerpoint/2010/main" val="2247677817"/>
+        <p14:creationId xmlns:p14="http://schemas.microsoft.com/office/powerpoint/2010/main" val="3623483014"/>
       </p:ext>
     </p:extLst>
   </p:cSld>
@@ -11551,6 +11550,251 @@
           <a:p>
             <a:r>
               <a:rPr lang="nl-NL" dirty="0"/>
+              <a:t>Traditioneel</a:t>
+            </a:r>
+          </a:p>
+        </p:txBody>
+      </p:sp>
+      <p:pic>
+        <p:nvPicPr>
+          <p:cNvPr id="8" name="Afbeelding 7"/>
+          <p:cNvPicPr>
+            <a:picLocks noChangeAspect="1"/>
+          </p:cNvPicPr>
+          <p:nvPr/>
+        </p:nvPicPr>
+        <p:blipFill>
+          <a:blip r:embed="rId3">
+            <a:extLst>
+              <a:ext uri="{28A0092B-C50C-407E-A947-70E740481C1C}">
+                <a14:useLocalDpi xmlns:a14="http://schemas.microsoft.com/office/drawing/2010/main" val="0"/>
+              </a:ext>
+            </a:extLst>
+          </a:blip>
+          <a:stretch>
+            <a:fillRect/>
+          </a:stretch>
+        </p:blipFill>
+        <p:spPr>
+          <a:xfrm>
+            <a:off x="895350" y="1757362"/>
+            <a:ext cx="4610100" cy="3343275"/>
+          </a:xfrm>
+          <a:prstGeom prst="rect">
+            <a:avLst/>
+          </a:prstGeom>
+        </p:spPr>
+      </p:pic>
+      <p:sp>
+        <p:nvSpPr>
+          <p:cNvPr id="2" name="Tekstvak 1"/>
+          <p:cNvSpPr txBox="1"/>
+          <p:nvPr/>
+        </p:nvSpPr>
+        <p:spPr>
+          <a:xfrm>
+            <a:off x="6139543" y="2035629"/>
+            <a:ext cx="5943600" cy="3693319"/>
+          </a:xfrm>
+          <a:prstGeom prst="rect">
+            <a:avLst/>
+          </a:prstGeom>
+          <a:noFill/>
+        </p:spPr>
+        <p:txBody>
+          <a:bodyPr wrap="square" rtlCol="0">
+            <a:spAutoFit/>
+          </a:bodyPr>
+          <a:lstStyle/>
+          <a:p>
+            <a:pPr marL="342900" indent="-342900">
+              <a:buFont typeface="+mj-lt"/>
+              <a:buAutoNum type="arabicPeriod"/>
+            </a:pPr>
+            <a:r>
+              <a:rPr lang="nl-NL" dirty="0"/>
+              <a:t>Client vraagt URL op</a:t>
+            </a:r>
+          </a:p>
+          <a:p>
+            <a:pPr marL="342900" indent="-342900">
+              <a:buFont typeface="+mj-lt"/>
+              <a:buAutoNum type="arabicPeriod"/>
+            </a:pPr>
+            <a:r>
+              <a:rPr lang="nl-NL" dirty="0"/>
+              <a:t>Server maakt documenten</a:t>
+            </a:r>
+          </a:p>
+          <a:p>
+            <a:pPr marL="800100" lvl="1" indent="-342900">
+              <a:buFont typeface="+mj-lt"/>
+              <a:buAutoNum type="alphaLcParenR"/>
+            </a:pPr>
+            <a:r>
+              <a:rPr lang="nl-NL" dirty="0"/>
+              <a:t>HTML (structuur) inclusief representatie van gegevens</a:t>
+            </a:r>
+          </a:p>
+          <a:p>
+            <a:pPr marL="800100" lvl="1" indent="-342900">
+              <a:buFont typeface="+mj-lt"/>
+              <a:buAutoNum type="alphaLcParenR"/>
+            </a:pPr>
+            <a:r>
+              <a:rPr lang="nl-NL" dirty="0"/>
+              <a:t>CSS (Opmaak)</a:t>
+            </a:r>
+          </a:p>
+          <a:p>
+            <a:pPr marL="800100" lvl="1" indent="-342900">
+              <a:buFont typeface="+mj-lt"/>
+              <a:buAutoNum type="alphaLcParenR"/>
+            </a:pPr>
+            <a:r>
+              <a:rPr lang="nl-NL" dirty="0"/>
+              <a:t>Javascript (actieve inhoud)</a:t>
+            </a:r>
+          </a:p>
+          <a:p>
+            <a:pPr marL="342900" indent="-342900">
+              <a:buFont typeface="+mj-lt"/>
+              <a:buAutoNum type="arabicPeriod"/>
+            </a:pPr>
+            <a:r>
+              <a:rPr lang="nl-NL" dirty="0"/>
+              <a:t>Client ontvangt documenten en maakt pagina op</a:t>
+            </a:r>
+          </a:p>
+          <a:p>
+            <a:pPr marL="342900" indent="-342900">
+              <a:buFont typeface="+mj-lt"/>
+              <a:buAutoNum type="arabicPeriod"/>
+            </a:pPr>
+            <a:r>
+              <a:rPr lang="nl-NL" dirty="0"/>
+              <a:t>Gebruiker heeft interactie</a:t>
+            </a:r>
+          </a:p>
+          <a:p>
+            <a:pPr marL="342900" indent="-342900">
+              <a:buFont typeface="+mj-lt"/>
+              <a:buAutoNum type="arabicPeriod"/>
+            </a:pPr>
+            <a:r>
+              <a:rPr lang="nl-NL" dirty="0"/>
+              <a:t>Door interactie navigatie naar nieuwe URL</a:t>
+            </a:r>
+          </a:p>
+          <a:p>
+            <a:pPr marL="342900" indent="-342900">
+              <a:buFont typeface="+mj-lt"/>
+              <a:buAutoNum type="arabicPeriod"/>
+            </a:pPr>
+            <a:r>
+              <a:rPr lang="nl-NL" dirty="0"/>
+              <a:t>…. </a:t>
+            </a:r>
+            <a:r>
+              <a:rPr lang="nl-NL" dirty="0" err="1"/>
+              <a:t>Repeat</a:t>
+            </a:r>
+            <a:r>
+              <a:rPr lang="nl-NL" dirty="0"/>
+              <a:t> </a:t>
+            </a:r>
+            <a:r>
+              <a:rPr lang="nl-NL" dirty="0" err="1"/>
+              <a:t>from</a:t>
+            </a:r>
+            <a:r>
+              <a:rPr lang="nl-NL" dirty="0"/>
+              <a:t> step 1</a:t>
+            </a:r>
+          </a:p>
+          <a:p>
+            <a:pPr marL="342900" indent="-342900">
+              <a:buFont typeface="+mj-lt"/>
+              <a:buAutoNum type="arabicPeriod"/>
+            </a:pPr>
+            <a:endParaRPr lang="nl-NL" dirty="0"/>
+          </a:p>
+          <a:p>
+            <a:r>
+              <a:rPr lang="nl-NL" dirty="0"/>
+              <a:t>Soms wat geavanceerder met AJAX (</a:t>
+            </a:r>
+            <a:r>
+              <a:rPr lang="nl-NL" dirty="0" err="1"/>
+              <a:t>Asynchronous</a:t>
+            </a:r>
+            <a:r>
+              <a:rPr lang="nl-NL" dirty="0"/>
+              <a:t> Javascript </a:t>
+            </a:r>
+            <a:r>
+              <a:rPr lang="nl-NL" dirty="0" err="1"/>
+              <a:t>and</a:t>
+            </a:r>
+            <a:r>
+              <a:rPr lang="nl-NL" dirty="0"/>
+              <a:t> XML) of </a:t>
+            </a:r>
+            <a:r>
+              <a:rPr lang="nl-NL" dirty="0" err="1"/>
+              <a:t>XMLHttpRequests</a:t>
+            </a:r>
+            <a:endParaRPr lang="nl-NL" dirty="0"/>
+          </a:p>
+        </p:txBody>
+      </p:sp>
+    </p:spTree>
+    <p:extLst>
+      <p:ext uri="{BB962C8B-B14F-4D97-AF65-F5344CB8AC3E}">
+        <p14:creationId xmlns:p14="http://schemas.microsoft.com/office/powerpoint/2010/main" val="2247677817"/>
+      </p:ext>
+    </p:extLst>
+  </p:cSld>
+  <p:clrMapOvr>
+    <a:masterClrMapping/>
+  </p:clrMapOvr>
+</p:sld>
+</file>
+
+<file path=ppt/slides/slide6.xml><?xml version="1.0" encoding="utf-8"?>
+<p:sld xmlns:a="http://schemas.openxmlformats.org/drawingml/2006/main" xmlns:r="http://schemas.openxmlformats.org/officeDocument/2006/relationships" xmlns:p="http://schemas.openxmlformats.org/presentationml/2006/main">
+  <p:cSld>
+    <p:spTree>
+      <p:nvGrpSpPr>
+        <p:cNvPr id="1" name=""/>
+        <p:cNvGrpSpPr/>
+        <p:nvPr/>
+      </p:nvGrpSpPr>
+      <p:grpSpPr>
+        <a:xfrm>
+          <a:off x="0" y="0"/>
+          <a:ext cx="0" cy="0"/>
+          <a:chOff x="0" y="0"/>
+          <a:chExt cx="0" cy="0"/>
+        </a:xfrm>
+      </p:grpSpPr>
+      <p:sp>
+        <p:nvSpPr>
+          <p:cNvPr id="5" name="Titel 4"/>
+          <p:cNvSpPr>
+            <a:spLocks noGrp="1"/>
+          </p:cNvSpPr>
+          <p:nvPr>
+            <p:ph type="title"/>
+          </p:nvPr>
+        </p:nvSpPr>
+        <p:spPr/>
+        <p:txBody>
+          <a:bodyPr/>
+          <a:lstStyle/>
+          <a:p>
+            <a:r>
+              <a:rPr lang="nl-NL" dirty="0"/>
               <a:t>Front-end development</a:t>
             </a:r>
           </a:p>
@@ -11796,7 +12040,7 @@
 </p:sld>
 </file>
 
-<file path=ppt/slides/slide6.xml><?xml version="1.0" encoding="utf-8"?>
+<file path=ppt/slides/slide7.xml><?xml version="1.0" encoding="utf-8"?>
 <p:sld xmlns:a="http://schemas.openxmlformats.org/drawingml/2006/main" xmlns:r="http://schemas.openxmlformats.org/officeDocument/2006/relationships" xmlns:p="http://schemas.openxmlformats.org/presentationml/2006/main">
   <p:cSld>
     <p:spTree>
@@ -13264,7 +13508,7 @@
 </p:sld>
 </file>
 
-<file path=ppt/slides/slide7.xml><?xml version="1.0" encoding="utf-8"?>
+<file path=ppt/slides/slide8.xml><?xml version="1.0" encoding="utf-8"?>
 <p:sld xmlns:a="http://schemas.openxmlformats.org/drawingml/2006/main" xmlns:r="http://schemas.openxmlformats.org/officeDocument/2006/relationships" xmlns:p="http://schemas.openxmlformats.org/presentationml/2006/main">
   <p:cSld>
     <p:spTree>
@@ -14655,97 +14899,6 @@
 </p:sld>
 </file>
 
-<file path=ppt/slides/slide8.xml><?xml version="1.0" encoding="utf-8"?>
-<p:sld xmlns:a="http://schemas.openxmlformats.org/drawingml/2006/main" xmlns:r="http://schemas.openxmlformats.org/officeDocument/2006/relationships" xmlns:p="http://schemas.openxmlformats.org/presentationml/2006/main">
-  <p:cSld>
-    <p:spTree>
-      <p:nvGrpSpPr>
-        <p:cNvPr id="1" name=""/>
-        <p:cNvGrpSpPr/>
-        <p:nvPr/>
-      </p:nvGrpSpPr>
-      <p:grpSpPr>
-        <a:xfrm>
-          <a:off x="0" y="0"/>
-          <a:ext cx="0" cy="0"/>
-          <a:chOff x="0" y="0"/>
-          <a:chExt cx="0" cy="0"/>
-        </a:xfrm>
-      </p:grpSpPr>
-      <p:sp>
-        <p:nvSpPr>
-          <p:cNvPr id="4" name="Titel 3"/>
-          <p:cNvSpPr>
-            <a:spLocks noGrp="1"/>
-          </p:cNvSpPr>
-          <p:nvPr>
-            <p:ph type="title"/>
-          </p:nvPr>
-        </p:nvSpPr>
-        <p:spPr/>
-        <p:txBody>
-          <a:bodyPr/>
-          <a:lstStyle/>
-          <a:p>
-            <a:r>
-              <a:rPr lang="nl-NL" dirty="0"/>
-              <a:t>The Code</a:t>
-            </a:r>
-          </a:p>
-        </p:txBody>
-      </p:sp>
-      <p:sp>
-        <p:nvSpPr>
-          <p:cNvPr id="5" name="Tijdelijke aanduiding voor tekst 4"/>
-          <p:cNvSpPr>
-            <a:spLocks noGrp="1"/>
-          </p:cNvSpPr>
-          <p:nvPr>
-            <p:ph type="body" sz="quarter" idx="10"/>
-          </p:nvPr>
-        </p:nvSpPr>
-        <p:spPr>
-          <a:xfrm>
-            <a:off x="6096000" y="3483864"/>
-            <a:ext cx="4675200" cy="2710107"/>
-          </a:xfrm>
-        </p:spPr>
-        <p:txBody>
-          <a:bodyPr/>
-          <a:lstStyle/>
-          <a:p>
-            <a:r>
-              <a:rPr lang="nl-NL" dirty="0"/>
-              <a:t>Git Hub</a:t>
-            </a:r>
-          </a:p>
-          <a:p>
-            <a:r>
-              <a:rPr lang="nl-NL" dirty="0"/>
-              <a:t>Code &amp; Information</a:t>
-            </a:r>
-          </a:p>
-          <a:p>
-            <a:pPr marL="0" indent="0">
-              <a:buNone/>
-            </a:pPr>
-            <a:endParaRPr lang="nl-NL" dirty="0"/>
-          </a:p>
-        </p:txBody>
-      </p:sp>
-    </p:spTree>
-    <p:extLst>
-      <p:ext uri="{BB962C8B-B14F-4D97-AF65-F5344CB8AC3E}">
-        <p14:creationId xmlns:p14="http://schemas.microsoft.com/office/powerpoint/2010/main" val="799259018"/>
-      </p:ext>
-    </p:extLst>
-  </p:cSld>
-  <p:clrMapOvr>
-    <a:masterClrMapping/>
-  </p:clrMapOvr>
-</p:sld>
-</file>
-
 <file path=ppt/slides/slide9.xml><?xml version="1.0" encoding="utf-8"?>
 <p:sld xmlns:a="http://schemas.openxmlformats.org/drawingml/2006/main" xmlns:r="http://schemas.openxmlformats.org/officeDocument/2006/relationships" xmlns:p="http://schemas.openxmlformats.org/presentationml/2006/main">
   <p:cSld>
@@ -14780,74 +14933,46 @@
           <a:p>
             <a:r>
               <a:rPr lang="nl-NL" dirty="0"/>
-              <a:t>Code &amp; Information</a:t>
-            </a:r>
-          </a:p>
-        </p:txBody>
-      </p:sp>
-      <p:sp>
-        <p:nvSpPr>
-          <p:cNvPr id="5" name="Tijdelijke aanduiding voor inhoud 4"/>
+              <a:t>The Code</a:t>
+            </a:r>
+          </a:p>
+        </p:txBody>
+      </p:sp>
+      <p:sp>
+        <p:nvSpPr>
+          <p:cNvPr id="5" name="Tijdelijke aanduiding voor tekst 4"/>
           <p:cNvSpPr>
             <a:spLocks noGrp="1"/>
           </p:cNvSpPr>
           <p:nvPr>
-            <p:ph idx="1"/>
-          </p:nvPr>
-        </p:nvSpPr>
-        <p:spPr/>
+            <p:ph type="body" sz="quarter" idx="10"/>
+          </p:nvPr>
+        </p:nvSpPr>
+        <p:spPr>
+          <a:xfrm>
+            <a:off x="6096000" y="3483864"/>
+            <a:ext cx="4675200" cy="2710107"/>
+          </a:xfrm>
+        </p:spPr>
         <p:txBody>
           <a:bodyPr/>
           <a:lstStyle/>
           <a:p>
             <a:r>
               <a:rPr lang="nl-NL" dirty="0"/>
-              <a:t>Git </a:t>
-            </a:r>
-            <a:r>
-              <a:rPr lang="nl-NL" dirty="0" err="1"/>
-              <a:t>clone</a:t>
-            </a:r>
-            <a:endParaRPr lang="nl-NL" dirty="0"/>
-          </a:p>
-          <a:p>
-            <a:pPr lvl="1"/>
-            <a:r>
-              <a:rPr lang="nl-NL" dirty="0">
-                <a:hlinkClick r:id="rId2"/>
-              </a:rPr>
-              <a:t>https://github.com/NHLStenden/Flex-WebDevelopment-FrontEndDevelopment.git</a:t>
-            </a:r>
-            <a:r>
-              <a:rPr lang="nl-NL" dirty="0"/>
-              <a:t> </a:t>
-            </a:r>
-          </a:p>
-          <a:p>
-            <a:r>
-              <a:rPr lang="nl-NL" dirty="0"/>
-              <a:t>README.md</a:t>
-            </a:r>
-          </a:p>
-          <a:p>
-            <a:pPr lvl="1"/>
-            <a:r>
-              <a:rPr lang="nl-NL" dirty="0"/>
-              <a:t>Inzien via GitHub</a:t>
-            </a:r>
-          </a:p>
-          <a:p>
-            <a:pPr lvl="1"/>
-            <a:r>
-              <a:rPr lang="nl-NL" dirty="0"/>
-              <a:t>Installeer .md-viewer in je IDE</a:t>
-            </a:r>
-          </a:p>
-          <a:p>
-            <a:pPr lvl="1"/>
-            <a:endParaRPr lang="nl-NL" dirty="0"/>
-          </a:p>
-          <a:p>
+              <a:t>Git Hub</a:t>
+            </a:r>
+          </a:p>
+          <a:p>
+            <a:r>
+              <a:rPr lang="nl-NL" dirty="0"/>
+              <a:t>Code &amp; Information</a:t>
+            </a:r>
+          </a:p>
+          <a:p>
+            <a:pPr marL="0" indent="0">
+              <a:buNone/>
+            </a:pPr>
             <a:endParaRPr lang="nl-NL" dirty="0"/>
           </a:p>
         </p:txBody>
@@ -14855,7 +14980,7 @@
     </p:spTree>
     <p:extLst>
       <p:ext uri="{BB962C8B-B14F-4D97-AF65-F5344CB8AC3E}">
-        <p14:creationId xmlns:p14="http://schemas.microsoft.com/office/powerpoint/2010/main" val="365649523"/>
+        <p14:creationId xmlns:p14="http://schemas.microsoft.com/office/powerpoint/2010/main" val="799259018"/>
       </p:ext>
     </p:extLst>
   </p:cSld>

</xml_diff>

<commit_message>
Nieuwe presentatie en coding voorbeelden
</commit_message>
<xml_diff>
--- a/Presentatie/Front-End Development.pptx
+++ b/Presentatie/Front-End Development.pptx
@@ -5,7 +5,7 @@
     <p:sldMasterId id="2147483660" r:id="rId1"/>
   </p:sldMasterIdLst>
   <p:notesMasterIdLst>
-    <p:notesMasterId r:id="rId38"/>
+    <p:notesMasterId r:id="rId41"/>
   </p:notesMasterIdLst>
   <p:sldIdLst>
     <p:sldId id="256" r:id="rId2"/>
@@ -40,10 +40,13 @@
     <p:sldId id="267" r:id="rId31"/>
     <p:sldId id="291" r:id="rId32"/>
     <p:sldId id="265" r:id="rId33"/>
-    <p:sldId id="266" r:id="rId34"/>
-    <p:sldId id="268" r:id="rId35"/>
-    <p:sldId id="269" r:id="rId36"/>
-    <p:sldId id="274" r:id="rId37"/>
+    <p:sldId id="298" r:id="rId34"/>
+    <p:sldId id="296" r:id="rId35"/>
+    <p:sldId id="297" r:id="rId36"/>
+    <p:sldId id="266" r:id="rId37"/>
+    <p:sldId id="268" r:id="rId38"/>
+    <p:sldId id="269" r:id="rId39"/>
+    <p:sldId id="274" r:id="rId40"/>
   </p:sldIdLst>
   <p:sldSz cx="12192000" cy="6858000"/>
   <p:notesSz cx="6858000" cy="9144000"/>
@@ -183,6 +186,9 @@
             <p14:sldId id="267"/>
             <p14:sldId id="291"/>
             <p14:sldId id="265"/>
+            <p14:sldId id="298"/>
+            <p14:sldId id="296"/>
+            <p14:sldId id="297"/>
             <p14:sldId id="266"/>
             <p14:sldId id="268"/>
             <p14:sldId id="269"/>
@@ -280,7 +286,7 @@
           <a:p>
             <a:fld id="{C5A381E3-FA85-4AE8-9B11-999D5E05561D}" type="datetimeFigureOut">
               <a:rPr lang="nl-NL" smtClean="0"/>
-              <a:t>23-11-2020</a:t>
+              <a:t>30-11-2020</a:t>
             </a:fld>
             <a:endParaRPr lang="nl-NL"/>
           </a:p>
@@ -986,7 +992,7 @@
           <a:p>
             <a:fld id="{A9AC6ED0-D734-4939-9338-F1A2206B4A78}" type="slidenum">
               <a:rPr lang="nl-NL" smtClean="0"/>
-              <a:t>36</a:t>
+              <a:t>39</a:t>
             </a:fld>
             <a:endParaRPr lang="nl-NL"/>
           </a:p>
@@ -10962,7 +10968,13 @@
       </p:grpSpPr>
       <p:sp>
         <p:nvSpPr>
-          <p:cNvPr id="4" name="Titel 3"/>
+          <p:cNvPr id="4" name="Titel 3">
+            <a:extLst>
+              <a:ext uri="{FF2B5EF4-FFF2-40B4-BE49-F238E27FC236}">
+                <a16:creationId xmlns:a16="http://schemas.microsoft.com/office/drawing/2014/main" id="{B6E29D38-A62F-4B74-B288-AB0B7BF9EA15}"/>
+              </a:ext>
+            </a:extLst>
+          </p:cNvPr>
           <p:cNvSpPr>
             <a:spLocks noGrp="1"/>
           </p:cNvSpPr>
@@ -10977,27 +10989,26 @@
           <a:p>
             <a:r>
               <a:rPr lang="nl-NL" dirty="0"/>
-              <a:t>CSS </a:t>
-            </a:r>
-            <a:r>
-              <a:rPr lang="nl-NL" dirty="0" err="1"/>
-              <a:t>vs</a:t>
-            </a:r>
-            <a:r>
-              <a:rPr lang="nl-NL" dirty="0"/>
-              <a:t> JS</a:t>
-            </a:r>
-          </a:p>
-        </p:txBody>
-      </p:sp>
-      <p:sp>
-        <p:nvSpPr>
-          <p:cNvPr id="5" name="Tijdelijke aanduiding voor inhoud 4"/>
+              <a:t>Asynchrone functies</a:t>
+            </a:r>
+            <a:endParaRPr lang="en-NL" dirty="0"/>
+          </a:p>
+        </p:txBody>
+      </p:sp>
+      <p:sp>
+        <p:nvSpPr>
+          <p:cNvPr id="5" name="Tijdelijke aanduiding voor tekst 4">
+            <a:extLst>
+              <a:ext uri="{FF2B5EF4-FFF2-40B4-BE49-F238E27FC236}">
+                <a16:creationId xmlns:a16="http://schemas.microsoft.com/office/drawing/2014/main" id="{5CFF4A4F-6735-43E3-B465-07DAAABF0AF7}"/>
+              </a:ext>
+            </a:extLst>
+          </p:cNvPr>
           <p:cNvSpPr>
             <a:spLocks noGrp="1"/>
           </p:cNvSpPr>
           <p:nvPr>
-            <p:ph idx="1"/>
+            <p:ph type="body" sz="quarter" idx="10"/>
           </p:nvPr>
         </p:nvSpPr>
         <p:spPr/>
@@ -11007,46 +11018,20 @@
           <a:p>
             <a:r>
               <a:rPr lang="nl-NL" dirty="0"/>
-              <a:t>Animaties via CSS of JS/</a:t>
-            </a:r>
+              <a:t>Asynchrone functies</a:t>
+            </a:r>
+          </a:p>
+          <a:p>
+            <a:r>
+              <a:rPr lang="nl-NL" dirty="0"/>
+              <a:t>HTTP-calls</a:t>
+            </a:r>
+          </a:p>
+          <a:p>
             <a:r>
               <a:rPr lang="nl-NL" dirty="0" err="1"/>
-              <a:t>jQuery</a:t>
-            </a:r>
-            <a:r>
-              <a:rPr lang="nl-NL" dirty="0"/>
-              <a:t> </a:t>
-            </a:r>
-            <a:r>
-              <a:rPr lang="nl-NL" dirty="0" err="1"/>
-              <a:t>etc</a:t>
-            </a:r>
-            <a:endParaRPr lang="nl-NL" dirty="0"/>
-          </a:p>
-          <a:p>
-            <a:r>
-              <a:rPr lang="nl-NL" dirty="0"/>
-              <a:t>Performance</a:t>
-            </a:r>
-          </a:p>
-          <a:p>
-            <a:r>
-              <a:rPr lang="nl-NL" dirty="0"/>
-              <a:t>Zie ook in Google Chrome, Developer Tools, “Memory” tab en start </a:t>
-            </a:r>
-            <a:r>
-              <a:rPr lang="nl-NL" dirty="0" err="1"/>
-              <a:t>profiler</a:t>
-            </a:r>
-            <a:endParaRPr lang="nl-NL" dirty="0"/>
-          </a:p>
-          <a:p>
-            <a:endParaRPr lang="nl-NL" dirty="0"/>
-          </a:p>
-          <a:p>
-            <a:endParaRPr lang="nl-NL" dirty="0"/>
-          </a:p>
-          <a:p>
+              <a:t>Promises</a:t>
+            </a:r>
             <a:endParaRPr lang="nl-NL" dirty="0"/>
           </a:p>
         </p:txBody>
@@ -11054,7 +11039,7 @@
     </p:spTree>
     <p:extLst>
       <p:ext uri="{BB962C8B-B14F-4D97-AF65-F5344CB8AC3E}">
-        <p14:creationId xmlns:p14="http://schemas.microsoft.com/office/powerpoint/2010/main" val="3749883609"/>
+        <p14:creationId xmlns:p14="http://schemas.microsoft.com/office/powerpoint/2010/main" val="1070384188"/>
       </p:ext>
     </p:extLst>
   </p:cSld>
@@ -11083,7 +11068,13 @@
       </p:grpSpPr>
       <p:sp>
         <p:nvSpPr>
-          <p:cNvPr id="2" name="Titel 1"/>
+          <p:cNvPr id="2" name="Titel 1">
+            <a:extLst>
+              <a:ext uri="{FF2B5EF4-FFF2-40B4-BE49-F238E27FC236}">
+                <a16:creationId xmlns:a16="http://schemas.microsoft.com/office/drawing/2014/main" id="{FB9F0529-BBF5-4760-A086-20135F9DAE80}"/>
+              </a:ext>
+            </a:extLst>
+          </p:cNvPr>
           <p:cNvSpPr>
             <a:spLocks noGrp="1"/>
           </p:cNvSpPr>
@@ -11098,14 +11089,21 @@
           <a:p>
             <a:r>
               <a:rPr lang="nl-NL" dirty="0"/>
-              <a:t>SVG &amp; Canvas</a:t>
-            </a:r>
-          </a:p>
-        </p:txBody>
-      </p:sp>
-      <p:sp>
-        <p:nvSpPr>
-          <p:cNvPr id="3" name="Tijdelijke aanduiding voor inhoud 2"/>
+              <a:t>Asynchrone functies</a:t>
+            </a:r>
+            <a:endParaRPr lang="en-NL" dirty="0"/>
+          </a:p>
+        </p:txBody>
+      </p:sp>
+      <p:sp>
+        <p:nvSpPr>
+          <p:cNvPr id="3" name="Tijdelijke aanduiding voor inhoud 2">
+            <a:extLst>
+              <a:ext uri="{FF2B5EF4-FFF2-40B4-BE49-F238E27FC236}">
+                <a16:creationId xmlns:a16="http://schemas.microsoft.com/office/drawing/2014/main" id="{063752D4-2CD4-40D6-A7BD-C58FC4297045}"/>
+              </a:ext>
+            </a:extLst>
+          </p:cNvPr>
           <p:cNvSpPr>
             <a:spLocks noGrp="1"/>
           </p:cNvSpPr>
@@ -11113,86 +11111,138 @@
             <p:ph idx="1"/>
           </p:nvPr>
         </p:nvSpPr>
-        <p:spPr/>
+        <p:spPr>
+          <a:xfrm>
+            <a:off x="21457" y="1558263"/>
+            <a:ext cx="5706682" cy="4989682"/>
+          </a:xfrm>
+        </p:spPr>
         <p:txBody>
           <a:bodyPr/>
           <a:lstStyle/>
           <a:p>
             <a:r>
               <a:rPr lang="nl-NL" dirty="0"/>
-              <a:t>Tekenen van objecten</a:t>
+              <a:t>Asynchroon:</a:t>
             </a:r>
           </a:p>
           <a:p>
             <a:pPr lvl="1"/>
             <a:r>
               <a:rPr lang="nl-NL" dirty="0"/>
-              <a:t>Canvas </a:t>
+              <a:t>Het antwoord van een functie-aanroep komt niet meteen maar ‘later’.</a:t>
+            </a:r>
+          </a:p>
+          <a:p>
+            <a:pPr lvl="1"/>
+            <a:r>
+              <a:rPr lang="nl-NL" dirty="0"/>
+              <a:t>De functie stopt meteen </a:t>
+            </a:r>
+          </a:p>
+          <a:p>
+            <a:pPr lvl="1"/>
+            <a:r>
+              <a:rPr lang="nl-NL" dirty="0"/>
+              <a:t>Je geeft een ‘</a:t>
+            </a:r>
+            <a:r>
+              <a:rPr lang="nl-NL" dirty="0" err="1"/>
+              <a:t>callback</a:t>
+            </a:r>
+            <a:r>
+              <a:rPr lang="nl-NL" dirty="0"/>
+              <a:t>’ functie mee</a:t>
+            </a:r>
+          </a:p>
+          <a:p>
+            <a:pPr lvl="1"/>
+            <a:r>
+              <a:rPr lang="nl-NL" dirty="0"/>
+              <a:t>“Callback </a:t>
+            </a:r>
+            <a:r>
+              <a:rPr lang="nl-NL" dirty="0" err="1"/>
+              <a:t>hell</a:t>
+            </a:r>
+            <a:r>
+              <a:rPr lang="nl-NL" dirty="0"/>
+              <a:t>” </a:t>
             </a:r>
             <a:r>
               <a:rPr lang="nl-NL" dirty="0">
                 <a:sym typeface="Wingdings" panose="05000000000000000000" pitchFamily="2" charset="2"/>
               </a:rPr>
-              <a:t> javascript</a:t>
-            </a:r>
-          </a:p>
-          <a:p>
-            <a:pPr lvl="1"/>
+              <a:t> stapelen van </a:t>
+            </a:r>
+            <a:r>
+              <a:rPr lang="nl-NL" dirty="0" err="1">
+                <a:sym typeface="Wingdings" panose="05000000000000000000" pitchFamily="2" charset="2"/>
+              </a:rPr>
+              <a:t>callbacks</a:t>
+            </a:r>
             <a:r>
               <a:rPr lang="nl-NL" dirty="0">
                 <a:sym typeface="Wingdings" panose="05000000000000000000" pitchFamily="2" charset="2"/>
               </a:rPr>
-              <a:t>SVG  </a:t>
+              <a:t> in </a:t>
             </a:r>
             <a:r>
               <a:rPr lang="nl-NL" dirty="0" err="1">
                 <a:sym typeface="Wingdings" panose="05000000000000000000" pitchFamily="2" charset="2"/>
               </a:rPr>
-              <a:t>xml</a:t>
-            </a:r>
-            <a:r>
-              <a:rPr lang="nl-NL" dirty="0">
-                <a:sym typeface="Wingdings" panose="05000000000000000000" pitchFamily="2" charset="2"/>
-              </a:rPr>
-              <a:t>-tekst door browser opgebouwd</a:t>
-            </a:r>
-          </a:p>
-          <a:p>
-            <a:r>
-              <a:rPr lang="nl-NL" dirty="0" err="1">
-                <a:sym typeface="Wingdings" panose="05000000000000000000" pitchFamily="2" charset="2"/>
-              </a:rPr>
-              <a:t>Frameworks</a:t>
+              <a:t>callbacks</a:t>
             </a:r>
             <a:endParaRPr lang="nl-NL" dirty="0">
               <a:sym typeface="Wingdings" panose="05000000000000000000" pitchFamily="2" charset="2"/>
             </a:endParaRPr>
           </a:p>
           <a:p>
-            <a:r>
-              <a:rPr lang="nl-NL" dirty="0">
-                <a:sym typeface="Wingdings" panose="05000000000000000000" pitchFamily="2" charset="2"/>
-              </a:rPr>
-              <a:t>Leercurve</a:t>
-            </a:r>
-          </a:p>
-          <a:p>
-            <a:r>
-              <a:rPr lang="nl-NL" dirty="0">
-                <a:sym typeface="Wingdings" panose="05000000000000000000" pitchFamily="2" charset="2"/>
-              </a:rPr>
-              <a:t>Voorbeelden</a:t>
-            </a:r>
-          </a:p>
-          <a:p>
-            <a:endParaRPr lang="nl-NL" dirty="0"/>
-          </a:p>
-        </p:txBody>
-      </p:sp>
+            <a:pPr lvl="1"/>
+            <a:endParaRPr lang="en-NL" dirty="0"/>
+          </a:p>
+        </p:txBody>
+      </p:sp>
+      <p:pic>
+        <p:nvPicPr>
+          <p:cNvPr id="7" name="Afbeelding 6">
+            <a:extLst>
+              <a:ext uri="{FF2B5EF4-FFF2-40B4-BE49-F238E27FC236}">
+                <a16:creationId xmlns:a16="http://schemas.microsoft.com/office/drawing/2014/main" id="{7A0C1268-953A-4277-BF98-76A719AC01F4}"/>
+              </a:ext>
+            </a:extLst>
+          </p:cNvPr>
+          <p:cNvPicPr>
+            <a:picLocks noChangeAspect="1"/>
+          </p:cNvPicPr>
+          <p:nvPr/>
+        </p:nvPicPr>
+        <p:blipFill>
+          <a:blip r:embed="rId2">
+            <a:extLst>
+              <a:ext uri="{28A0092B-C50C-407E-A947-70E740481C1C}">
+                <a14:useLocalDpi xmlns:a14="http://schemas.microsoft.com/office/drawing/2010/main" val="0"/>
+              </a:ext>
+            </a:extLst>
+          </a:blip>
+          <a:stretch>
+            <a:fillRect/>
+          </a:stretch>
+        </p:blipFill>
+        <p:spPr>
+          <a:xfrm>
+            <a:off x="7150868" y="685800"/>
+            <a:ext cx="5019675" cy="5743575"/>
+          </a:xfrm>
+          <a:prstGeom prst="rect">
+            <a:avLst/>
+          </a:prstGeom>
+        </p:spPr>
+      </p:pic>
     </p:spTree>
     <p:extLst>
       <p:ext uri="{BB962C8B-B14F-4D97-AF65-F5344CB8AC3E}">
-        <p14:creationId xmlns:p14="http://schemas.microsoft.com/office/powerpoint/2010/main" val="2023804850"/>
+        <p14:creationId xmlns:p14="http://schemas.microsoft.com/office/powerpoint/2010/main" val="4228017389"/>
       </p:ext>
     </p:extLst>
   </p:cSld>
@@ -11221,6 +11271,360 @@
       </p:grpSpPr>
       <p:sp>
         <p:nvSpPr>
+          <p:cNvPr id="2" name="Titel 1">
+            <a:extLst>
+              <a:ext uri="{FF2B5EF4-FFF2-40B4-BE49-F238E27FC236}">
+                <a16:creationId xmlns:a16="http://schemas.microsoft.com/office/drawing/2014/main" id="{AF21F949-7BC4-4EA1-B308-EA5491F06C4D}"/>
+              </a:ext>
+            </a:extLst>
+          </p:cNvPr>
+          <p:cNvSpPr>
+            <a:spLocks noGrp="1"/>
+          </p:cNvSpPr>
+          <p:nvPr>
+            <p:ph type="title"/>
+          </p:nvPr>
+        </p:nvSpPr>
+        <p:spPr/>
+        <p:txBody>
+          <a:bodyPr/>
+          <a:lstStyle/>
+          <a:p>
+            <a:r>
+              <a:rPr lang="nl-NL" dirty="0"/>
+              <a:t>Callback ellende</a:t>
+            </a:r>
+            <a:endParaRPr lang="en-NL" dirty="0"/>
+          </a:p>
+        </p:txBody>
+      </p:sp>
+      <p:pic>
+        <p:nvPicPr>
+          <p:cNvPr id="5" name="Afbeelding 4">
+            <a:extLst>
+              <a:ext uri="{FF2B5EF4-FFF2-40B4-BE49-F238E27FC236}">
+                <a16:creationId xmlns:a16="http://schemas.microsoft.com/office/drawing/2014/main" id="{DB46DA79-5BE2-43F4-B0CF-188EE3CFB0AD}"/>
+              </a:ext>
+            </a:extLst>
+          </p:cNvPr>
+          <p:cNvPicPr>
+            <a:picLocks noChangeAspect="1"/>
+          </p:cNvPicPr>
+          <p:nvPr/>
+        </p:nvPicPr>
+        <p:blipFill>
+          <a:blip r:embed="rId2">
+            <a:extLst>
+              <a:ext uri="{28A0092B-C50C-407E-A947-70E740481C1C}">
+                <a14:useLocalDpi xmlns:a14="http://schemas.microsoft.com/office/drawing/2010/main" val="0"/>
+              </a:ext>
+            </a:extLst>
+          </a:blip>
+          <a:stretch>
+            <a:fillRect/>
+          </a:stretch>
+        </p:blipFill>
+        <p:spPr>
+          <a:xfrm>
+            <a:off x="968159" y="1498848"/>
+            <a:ext cx="9896967" cy="4673352"/>
+          </a:xfrm>
+          <a:prstGeom prst="rect">
+            <a:avLst/>
+          </a:prstGeom>
+        </p:spPr>
+      </p:pic>
+    </p:spTree>
+    <p:extLst>
+      <p:ext uri="{BB962C8B-B14F-4D97-AF65-F5344CB8AC3E}">
+        <p14:creationId xmlns:p14="http://schemas.microsoft.com/office/powerpoint/2010/main" val="2087133407"/>
+      </p:ext>
+    </p:extLst>
+  </p:cSld>
+  <p:clrMapOvr>
+    <a:masterClrMapping/>
+  </p:clrMapOvr>
+</p:sld>
+</file>
+
+<file path=ppt/slides/slide36.xml><?xml version="1.0" encoding="utf-8"?>
+<p:sld xmlns:a="http://schemas.openxmlformats.org/drawingml/2006/main" xmlns:r="http://schemas.openxmlformats.org/officeDocument/2006/relationships" xmlns:p="http://schemas.openxmlformats.org/presentationml/2006/main">
+  <p:cSld>
+    <p:spTree>
+      <p:nvGrpSpPr>
+        <p:cNvPr id="1" name=""/>
+        <p:cNvGrpSpPr/>
+        <p:nvPr/>
+      </p:nvGrpSpPr>
+      <p:grpSpPr>
+        <a:xfrm>
+          <a:off x="0" y="0"/>
+          <a:ext cx="0" cy="0"/>
+          <a:chOff x="0" y="0"/>
+          <a:chExt cx="0" cy="0"/>
+        </a:xfrm>
+      </p:grpSpPr>
+      <p:sp>
+        <p:nvSpPr>
+          <p:cNvPr id="4" name="Titel 3"/>
+          <p:cNvSpPr>
+            <a:spLocks noGrp="1"/>
+          </p:cNvSpPr>
+          <p:nvPr>
+            <p:ph type="title"/>
+          </p:nvPr>
+        </p:nvSpPr>
+        <p:spPr/>
+        <p:txBody>
+          <a:bodyPr/>
+          <a:lstStyle/>
+          <a:p>
+            <a:r>
+              <a:rPr lang="nl-NL" dirty="0"/>
+              <a:t>CSS </a:t>
+            </a:r>
+            <a:r>
+              <a:rPr lang="nl-NL" dirty="0" err="1"/>
+              <a:t>vs</a:t>
+            </a:r>
+            <a:r>
+              <a:rPr lang="nl-NL" dirty="0"/>
+              <a:t> JS</a:t>
+            </a:r>
+          </a:p>
+        </p:txBody>
+      </p:sp>
+      <p:sp>
+        <p:nvSpPr>
+          <p:cNvPr id="5" name="Tijdelijke aanduiding voor inhoud 4"/>
+          <p:cNvSpPr>
+            <a:spLocks noGrp="1"/>
+          </p:cNvSpPr>
+          <p:nvPr>
+            <p:ph idx="1"/>
+          </p:nvPr>
+        </p:nvSpPr>
+        <p:spPr/>
+        <p:txBody>
+          <a:bodyPr/>
+          <a:lstStyle/>
+          <a:p>
+            <a:r>
+              <a:rPr lang="nl-NL" dirty="0"/>
+              <a:t>Animaties via CSS of JS/</a:t>
+            </a:r>
+            <a:r>
+              <a:rPr lang="nl-NL" dirty="0" err="1"/>
+              <a:t>jQuery</a:t>
+            </a:r>
+            <a:r>
+              <a:rPr lang="nl-NL" dirty="0"/>
+              <a:t> </a:t>
+            </a:r>
+            <a:r>
+              <a:rPr lang="nl-NL" dirty="0" err="1"/>
+              <a:t>etc</a:t>
+            </a:r>
+            <a:endParaRPr lang="nl-NL" dirty="0"/>
+          </a:p>
+          <a:p>
+            <a:r>
+              <a:rPr lang="nl-NL" dirty="0"/>
+              <a:t>Performance</a:t>
+            </a:r>
+          </a:p>
+          <a:p>
+            <a:r>
+              <a:rPr lang="nl-NL" dirty="0"/>
+              <a:t>Zie ook in Google Chrome, Developer Tools, “Memory” tab en start </a:t>
+            </a:r>
+            <a:r>
+              <a:rPr lang="nl-NL" dirty="0" err="1"/>
+              <a:t>profiler</a:t>
+            </a:r>
+            <a:endParaRPr lang="nl-NL" dirty="0"/>
+          </a:p>
+          <a:p>
+            <a:endParaRPr lang="nl-NL" dirty="0"/>
+          </a:p>
+          <a:p>
+            <a:endParaRPr lang="nl-NL" dirty="0"/>
+          </a:p>
+          <a:p>
+            <a:endParaRPr lang="nl-NL" dirty="0"/>
+          </a:p>
+        </p:txBody>
+      </p:sp>
+    </p:spTree>
+    <p:extLst>
+      <p:ext uri="{BB962C8B-B14F-4D97-AF65-F5344CB8AC3E}">
+        <p14:creationId xmlns:p14="http://schemas.microsoft.com/office/powerpoint/2010/main" val="3749883609"/>
+      </p:ext>
+    </p:extLst>
+  </p:cSld>
+  <p:clrMapOvr>
+    <a:masterClrMapping/>
+  </p:clrMapOvr>
+</p:sld>
+</file>
+
+<file path=ppt/slides/slide37.xml><?xml version="1.0" encoding="utf-8"?>
+<p:sld xmlns:a="http://schemas.openxmlformats.org/drawingml/2006/main" xmlns:r="http://schemas.openxmlformats.org/officeDocument/2006/relationships" xmlns:p="http://schemas.openxmlformats.org/presentationml/2006/main">
+  <p:cSld>
+    <p:spTree>
+      <p:nvGrpSpPr>
+        <p:cNvPr id="1" name=""/>
+        <p:cNvGrpSpPr/>
+        <p:nvPr/>
+      </p:nvGrpSpPr>
+      <p:grpSpPr>
+        <a:xfrm>
+          <a:off x="0" y="0"/>
+          <a:ext cx="0" cy="0"/>
+          <a:chOff x="0" y="0"/>
+          <a:chExt cx="0" cy="0"/>
+        </a:xfrm>
+      </p:grpSpPr>
+      <p:sp>
+        <p:nvSpPr>
+          <p:cNvPr id="2" name="Titel 1"/>
+          <p:cNvSpPr>
+            <a:spLocks noGrp="1"/>
+          </p:cNvSpPr>
+          <p:nvPr>
+            <p:ph type="title"/>
+          </p:nvPr>
+        </p:nvSpPr>
+        <p:spPr/>
+        <p:txBody>
+          <a:bodyPr/>
+          <a:lstStyle/>
+          <a:p>
+            <a:r>
+              <a:rPr lang="nl-NL" dirty="0"/>
+              <a:t>SVG &amp; Canvas</a:t>
+            </a:r>
+          </a:p>
+        </p:txBody>
+      </p:sp>
+      <p:sp>
+        <p:nvSpPr>
+          <p:cNvPr id="3" name="Tijdelijke aanduiding voor inhoud 2"/>
+          <p:cNvSpPr>
+            <a:spLocks noGrp="1"/>
+          </p:cNvSpPr>
+          <p:nvPr>
+            <p:ph idx="1"/>
+          </p:nvPr>
+        </p:nvSpPr>
+        <p:spPr/>
+        <p:txBody>
+          <a:bodyPr/>
+          <a:lstStyle/>
+          <a:p>
+            <a:r>
+              <a:rPr lang="nl-NL" dirty="0"/>
+              <a:t>Tekenen van objecten</a:t>
+            </a:r>
+          </a:p>
+          <a:p>
+            <a:pPr lvl="1"/>
+            <a:r>
+              <a:rPr lang="nl-NL" dirty="0"/>
+              <a:t>Canvas </a:t>
+            </a:r>
+            <a:r>
+              <a:rPr lang="nl-NL" dirty="0">
+                <a:sym typeface="Wingdings" panose="05000000000000000000" pitchFamily="2" charset="2"/>
+              </a:rPr>
+              <a:t> javascript</a:t>
+            </a:r>
+          </a:p>
+          <a:p>
+            <a:pPr lvl="1"/>
+            <a:r>
+              <a:rPr lang="nl-NL" dirty="0">
+                <a:sym typeface="Wingdings" panose="05000000000000000000" pitchFamily="2" charset="2"/>
+              </a:rPr>
+              <a:t>SVG  </a:t>
+            </a:r>
+            <a:r>
+              <a:rPr lang="nl-NL" dirty="0" err="1">
+                <a:sym typeface="Wingdings" panose="05000000000000000000" pitchFamily="2" charset="2"/>
+              </a:rPr>
+              <a:t>xml</a:t>
+            </a:r>
+            <a:r>
+              <a:rPr lang="nl-NL" dirty="0">
+                <a:sym typeface="Wingdings" panose="05000000000000000000" pitchFamily="2" charset="2"/>
+              </a:rPr>
+              <a:t>-tekst door browser opgebouwd</a:t>
+            </a:r>
+          </a:p>
+          <a:p>
+            <a:r>
+              <a:rPr lang="nl-NL" dirty="0" err="1">
+                <a:sym typeface="Wingdings" panose="05000000000000000000" pitchFamily="2" charset="2"/>
+              </a:rPr>
+              <a:t>Frameworks</a:t>
+            </a:r>
+            <a:endParaRPr lang="nl-NL" dirty="0">
+              <a:sym typeface="Wingdings" panose="05000000000000000000" pitchFamily="2" charset="2"/>
+            </a:endParaRPr>
+          </a:p>
+          <a:p>
+            <a:r>
+              <a:rPr lang="nl-NL" dirty="0">
+                <a:sym typeface="Wingdings" panose="05000000000000000000" pitchFamily="2" charset="2"/>
+              </a:rPr>
+              <a:t>Leercurve</a:t>
+            </a:r>
+          </a:p>
+          <a:p>
+            <a:r>
+              <a:rPr lang="nl-NL" dirty="0">
+                <a:sym typeface="Wingdings" panose="05000000000000000000" pitchFamily="2" charset="2"/>
+              </a:rPr>
+              <a:t>Voorbeelden</a:t>
+            </a:r>
+          </a:p>
+          <a:p>
+            <a:endParaRPr lang="nl-NL" dirty="0"/>
+          </a:p>
+        </p:txBody>
+      </p:sp>
+    </p:spTree>
+    <p:extLst>
+      <p:ext uri="{BB962C8B-B14F-4D97-AF65-F5344CB8AC3E}">
+        <p14:creationId xmlns:p14="http://schemas.microsoft.com/office/powerpoint/2010/main" val="2023804850"/>
+      </p:ext>
+    </p:extLst>
+  </p:cSld>
+  <p:clrMapOvr>
+    <a:masterClrMapping/>
+  </p:clrMapOvr>
+</p:sld>
+</file>
+
+<file path=ppt/slides/slide38.xml><?xml version="1.0" encoding="utf-8"?>
+<p:sld xmlns:a="http://schemas.openxmlformats.org/drawingml/2006/main" xmlns:r="http://schemas.openxmlformats.org/officeDocument/2006/relationships" xmlns:p="http://schemas.openxmlformats.org/presentationml/2006/main">
+  <p:cSld>
+    <p:spTree>
+      <p:nvGrpSpPr>
+        <p:cNvPr id="1" name=""/>
+        <p:cNvGrpSpPr/>
+        <p:nvPr/>
+      </p:nvGrpSpPr>
+      <p:grpSpPr>
+        <a:xfrm>
+          <a:off x="0" y="0"/>
+          <a:ext cx="0" cy="0"/>
+          <a:chOff x="0" y="0"/>
+          <a:chExt cx="0" cy="0"/>
+        </a:xfrm>
+      </p:grpSpPr>
+      <p:sp>
+        <p:nvSpPr>
           <p:cNvPr id="2" name="Titel 1"/>
           <p:cNvSpPr>
             <a:spLocks noGrp="1"/>
@@ -11297,7 +11701,7 @@
 </p:sld>
 </file>
 
-<file path=ppt/slides/slide36.xml><?xml version="1.0" encoding="utf-8"?>
+<file path=ppt/slides/slide39.xml><?xml version="1.0" encoding="utf-8"?>
 <p:sld xmlns:a="http://schemas.openxmlformats.org/drawingml/2006/main" xmlns:r="http://schemas.openxmlformats.org/officeDocument/2006/relationships" xmlns:p="http://schemas.openxmlformats.org/presentationml/2006/main">
   <p:cSld>
     <p:spTree>

</xml_diff>

<commit_message>
Nieuwe presentatie + afbeeldingen + originelen (drawio)
</commit_message>
<xml_diff>
--- a/Presentatie/Front-End Development.pptx
+++ b/Presentatie/Front-End Development.pptx
@@ -5,7 +5,7 @@
     <p:sldMasterId id="2147483660" r:id="rId1"/>
   </p:sldMasterIdLst>
   <p:notesMasterIdLst>
-    <p:notesMasterId r:id="rId41"/>
+    <p:notesMasterId r:id="rId45"/>
   </p:notesMasterIdLst>
   <p:sldIdLst>
     <p:sldId id="256" r:id="rId2"/>
@@ -43,10 +43,14 @@
     <p:sldId id="298" r:id="rId34"/>
     <p:sldId id="296" r:id="rId35"/>
     <p:sldId id="297" r:id="rId36"/>
-    <p:sldId id="266" r:id="rId37"/>
-    <p:sldId id="268" r:id="rId38"/>
-    <p:sldId id="269" r:id="rId39"/>
-    <p:sldId id="274" r:id="rId40"/>
+    <p:sldId id="300" r:id="rId37"/>
+    <p:sldId id="301" r:id="rId38"/>
+    <p:sldId id="303" r:id="rId39"/>
+    <p:sldId id="299" r:id="rId40"/>
+    <p:sldId id="266" r:id="rId41"/>
+    <p:sldId id="268" r:id="rId42"/>
+    <p:sldId id="269" r:id="rId43"/>
+    <p:sldId id="274" r:id="rId44"/>
   </p:sldIdLst>
   <p:sldSz cx="12192000" cy="6858000"/>
   <p:notesSz cx="6858000" cy="9144000"/>
@@ -189,6 +193,10 @@
             <p14:sldId id="298"/>
             <p14:sldId id="296"/>
             <p14:sldId id="297"/>
+            <p14:sldId id="300"/>
+            <p14:sldId id="301"/>
+            <p14:sldId id="303"/>
+            <p14:sldId id="299"/>
             <p14:sldId id="266"/>
             <p14:sldId id="268"/>
             <p14:sldId id="269"/>
@@ -971,7 +979,7 @@
           <a:bodyPr/>
           <a:lstStyle/>
           <a:p>
-            <a:endParaRPr lang="nl-NL" dirty="0"/>
+            <a:endParaRPr lang="en-NL" dirty="0"/>
           </a:p>
         </p:txBody>
       </p:sp>
@@ -982,7 +990,7 @@
             <a:spLocks noGrp="1"/>
           </p:cNvSpPr>
           <p:nvPr>
-            <p:ph type="sldNum" sz="quarter" idx="10"/>
+            <p:ph type="sldNum" sz="quarter" idx="5"/>
           </p:nvPr>
         </p:nvSpPr>
         <p:spPr/>
@@ -992,7 +1000,91 @@
           <a:p>
             <a:fld id="{A9AC6ED0-D734-4939-9338-F1A2206B4A78}" type="slidenum">
               <a:rPr lang="nl-NL" smtClean="0"/>
-              <a:t>39</a:t>
+              <a:t>38</a:t>
+            </a:fld>
+            <a:endParaRPr lang="nl-NL"/>
+          </a:p>
+        </p:txBody>
+      </p:sp>
+    </p:spTree>
+    <p:extLst>
+      <p:ext uri="{BB962C8B-B14F-4D97-AF65-F5344CB8AC3E}">
+        <p14:creationId xmlns:p14="http://schemas.microsoft.com/office/powerpoint/2010/main" val="227949096"/>
+      </p:ext>
+    </p:extLst>
+  </p:cSld>
+  <p:clrMapOvr>
+    <a:masterClrMapping/>
+  </p:clrMapOvr>
+</p:notes>
+</file>
+
+<file path=ppt/notesSlides/notesSlide14.xml><?xml version="1.0" encoding="utf-8"?>
+<p:notes xmlns:a="http://schemas.openxmlformats.org/drawingml/2006/main" xmlns:r="http://schemas.openxmlformats.org/officeDocument/2006/relationships" xmlns:p="http://schemas.openxmlformats.org/presentationml/2006/main">
+  <p:cSld>
+    <p:spTree>
+      <p:nvGrpSpPr>
+        <p:cNvPr id="1" name=""/>
+        <p:cNvGrpSpPr/>
+        <p:nvPr/>
+      </p:nvGrpSpPr>
+      <p:grpSpPr>
+        <a:xfrm>
+          <a:off x="0" y="0"/>
+          <a:ext cx="0" cy="0"/>
+          <a:chOff x="0" y="0"/>
+          <a:chExt cx="0" cy="0"/>
+        </a:xfrm>
+      </p:grpSpPr>
+      <p:sp>
+        <p:nvSpPr>
+          <p:cNvPr id="2" name="Tijdelijke aanduiding voor dia-afbeelding 1"/>
+          <p:cNvSpPr>
+            <a:spLocks noGrp="1" noRot="1" noChangeAspect="1"/>
+          </p:cNvSpPr>
+          <p:nvPr>
+            <p:ph type="sldImg"/>
+          </p:nvPr>
+        </p:nvSpPr>
+        <p:spPr/>
+      </p:sp>
+      <p:sp>
+        <p:nvSpPr>
+          <p:cNvPr id="3" name="Tijdelijke aanduiding voor notities 2"/>
+          <p:cNvSpPr>
+            <a:spLocks noGrp="1"/>
+          </p:cNvSpPr>
+          <p:nvPr>
+            <p:ph type="body" idx="1"/>
+          </p:nvPr>
+        </p:nvSpPr>
+        <p:spPr/>
+        <p:txBody>
+          <a:bodyPr/>
+          <a:lstStyle/>
+          <a:p>
+            <a:endParaRPr lang="nl-NL" dirty="0"/>
+          </a:p>
+        </p:txBody>
+      </p:sp>
+      <p:sp>
+        <p:nvSpPr>
+          <p:cNvPr id="4" name="Tijdelijke aanduiding voor dianummer 3"/>
+          <p:cNvSpPr>
+            <a:spLocks noGrp="1"/>
+          </p:cNvSpPr>
+          <p:nvPr>
+            <p:ph type="sldNum" sz="quarter" idx="10"/>
+          </p:nvPr>
+        </p:nvSpPr>
+        <p:spPr/>
+        <p:txBody>
+          <a:bodyPr/>
+          <a:lstStyle/>
+          <a:p>
+            <a:fld id="{A9AC6ED0-D734-4939-9338-F1A2206B4A78}" type="slidenum">
+              <a:rPr lang="nl-NL" smtClean="0"/>
+              <a:t>43</a:t>
             </a:fld>
             <a:endParaRPr lang="nl-NL"/>
           </a:p>
@@ -11366,7 +11458,13 @@
       </p:grpSpPr>
       <p:sp>
         <p:nvSpPr>
-          <p:cNvPr id="4" name="Titel 3"/>
+          <p:cNvPr id="2" name="Titel 1">
+            <a:extLst>
+              <a:ext uri="{FF2B5EF4-FFF2-40B4-BE49-F238E27FC236}">
+                <a16:creationId xmlns:a16="http://schemas.microsoft.com/office/drawing/2014/main" id="{EDA92863-520A-4594-AC7A-97B265A61D3A}"/>
+              </a:ext>
+            </a:extLst>
+          </p:cNvPr>
           <p:cNvSpPr>
             <a:spLocks noGrp="1"/>
           </p:cNvSpPr>
@@ -11380,23 +11478,22 @@
           <a:lstStyle/>
           <a:p>
             <a:r>
-              <a:rPr lang="nl-NL" dirty="0"/>
-              <a:t>CSS </a:t>
-            </a:r>
-            <a:r>
               <a:rPr lang="nl-NL" dirty="0" err="1"/>
-              <a:t>vs</a:t>
-            </a:r>
-            <a:r>
-              <a:rPr lang="nl-NL" dirty="0"/>
-              <a:t> JS</a:t>
-            </a:r>
-          </a:p>
-        </p:txBody>
-      </p:sp>
-      <p:sp>
-        <p:nvSpPr>
-          <p:cNvPr id="5" name="Tijdelijke aanduiding voor inhoud 4"/>
+              <a:t>Promises</a:t>
+            </a:r>
+            <a:endParaRPr lang="en-NL" dirty="0"/>
+          </a:p>
+        </p:txBody>
+      </p:sp>
+      <p:sp>
+        <p:nvSpPr>
+          <p:cNvPr id="3" name="Tijdelijke aanduiding voor inhoud 2">
+            <a:extLst>
+              <a:ext uri="{FF2B5EF4-FFF2-40B4-BE49-F238E27FC236}">
+                <a16:creationId xmlns:a16="http://schemas.microsoft.com/office/drawing/2014/main" id="{AD86462B-9871-4420-8B03-604AA3B0C3F7}"/>
+              </a:ext>
+            </a:extLst>
+          </p:cNvPr>
           <p:cNvSpPr>
             <a:spLocks noGrp="1"/>
           </p:cNvSpPr>
@@ -11410,55 +11507,150 @@
           <a:lstStyle/>
           <a:p>
             <a:r>
-              <a:rPr lang="nl-NL" dirty="0"/>
-              <a:t>Animaties via CSS of JS/</a:t>
-            </a:r>
-            <a:r>
               <a:rPr lang="nl-NL" dirty="0" err="1"/>
-              <a:t>jQuery</a:t>
+              <a:t>Promise</a:t>
             </a:r>
             <a:r>
               <a:rPr lang="nl-NL" dirty="0"/>
               <a:t> </a:t>
             </a:r>
             <a:r>
-              <a:rPr lang="nl-NL" dirty="0" err="1"/>
-              <a:t>etc</a:t>
-            </a:r>
-            <a:endParaRPr lang="nl-NL" dirty="0"/>
-          </a:p>
-          <a:p>
-            <a:r>
-              <a:rPr lang="nl-NL" dirty="0"/>
-              <a:t>Performance</a:t>
-            </a:r>
-          </a:p>
-          <a:p>
-            <a:r>
-              <a:rPr lang="nl-NL" dirty="0"/>
-              <a:t>Zie ook in Google Chrome, Developer Tools, “Memory” tab en start </a:t>
-            </a:r>
-            <a:r>
-              <a:rPr lang="nl-NL" dirty="0" err="1"/>
-              <a:t>profiler</a:t>
-            </a:r>
-            <a:endParaRPr lang="nl-NL" dirty="0"/>
-          </a:p>
-          <a:p>
-            <a:endParaRPr lang="nl-NL" dirty="0"/>
-          </a:p>
-          <a:p>
-            <a:endParaRPr lang="nl-NL" dirty="0"/>
-          </a:p>
-          <a:p>
-            <a:endParaRPr lang="nl-NL" dirty="0"/>
+              <a:rPr lang="nl-NL" dirty="0">
+                <a:sym typeface="Wingdings" panose="05000000000000000000" pitchFamily="2" charset="2"/>
+              </a:rPr>
+              <a:t> belofte</a:t>
+            </a:r>
+          </a:p>
+          <a:p>
+            <a:r>
+              <a:rPr lang="nl-NL" dirty="0">
+                <a:sym typeface="Wingdings" panose="05000000000000000000" pitchFamily="2" charset="2"/>
+              </a:rPr>
+              <a:t>Manier om asynchrone code uit te voeren</a:t>
+            </a:r>
+          </a:p>
+          <a:p>
+            <a:r>
+              <a:rPr lang="nl-NL" dirty="0">
+                <a:sym typeface="Wingdings" panose="05000000000000000000" pitchFamily="2" charset="2"/>
+              </a:rPr>
+              <a:t>Werking</a:t>
+            </a:r>
+          </a:p>
+          <a:p>
+            <a:pPr lvl="1"/>
+            <a:r>
+              <a:rPr lang="nl-NL" dirty="0">
+                <a:sym typeface="Wingdings" panose="05000000000000000000" pitchFamily="2" charset="2"/>
+              </a:rPr>
+              <a:t>Maak een </a:t>
+            </a:r>
+            <a:r>
+              <a:rPr lang="nl-NL" dirty="0" err="1">
+                <a:sym typeface="Wingdings" panose="05000000000000000000" pitchFamily="2" charset="2"/>
+              </a:rPr>
+              <a:t>Promise</a:t>
+            </a:r>
+            <a:r>
+              <a:rPr lang="nl-NL" dirty="0">
+                <a:sym typeface="Wingdings" panose="05000000000000000000" pitchFamily="2" charset="2"/>
+              </a:rPr>
+              <a:t> object</a:t>
+            </a:r>
+          </a:p>
+          <a:p>
+            <a:pPr lvl="1"/>
+            <a:r>
+              <a:rPr lang="nl-NL" dirty="0">
+                <a:sym typeface="Wingdings" panose="05000000000000000000" pitchFamily="2" charset="2"/>
+              </a:rPr>
+              <a:t>Specificeer een functie die de code uitvoert</a:t>
+            </a:r>
+          </a:p>
+          <a:p>
+            <a:pPr lvl="1"/>
+            <a:r>
+              <a:rPr lang="nl-NL" dirty="0">
+                <a:sym typeface="Wingdings" panose="05000000000000000000" pitchFamily="2" charset="2"/>
+              </a:rPr>
+              <a:t>Geef mogelijkheden om de succes-functie en fout-functie uit te voeren</a:t>
+            </a:r>
+          </a:p>
+          <a:p>
+            <a:r>
+              <a:rPr lang="nl-NL" dirty="0">
+                <a:sym typeface="Wingdings" panose="05000000000000000000" pitchFamily="2" charset="2"/>
+              </a:rPr>
+              <a:t>De aanroepende partij bepaalt de </a:t>
+            </a:r>
+            <a:r>
+              <a:rPr lang="nl-NL" dirty="0" err="1">
+                <a:sym typeface="Wingdings" panose="05000000000000000000" pitchFamily="2" charset="2"/>
+              </a:rPr>
+              <a:t>success</a:t>
+            </a:r>
+            <a:r>
+              <a:rPr lang="nl-NL" dirty="0">
+                <a:sym typeface="Wingdings" panose="05000000000000000000" pitchFamily="2" charset="2"/>
+              </a:rPr>
+              <a:t>- en fout-functie op een later moment</a:t>
+            </a:r>
+          </a:p>
+          <a:p>
+            <a:r>
+              <a:rPr lang="nl-NL" dirty="0" err="1">
+                <a:sym typeface="Wingdings" panose="05000000000000000000" pitchFamily="2" charset="2"/>
+              </a:rPr>
+              <a:t>Success</a:t>
+            </a:r>
+            <a:r>
+              <a:rPr lang="nl-NL" dirty="0">
+                <a:sym typeface="Wingdings" panose="05000000000000000000" pitchFamily="2" charset="2"/>
+              </a:rPr>
+              <a:t>-functie noemen we ‘</a:t>
+            </a:r>
+            <a:r>
+              <a:rPr lang="nl-NL" dirty="0" err="1">
+                <a:sym typeface="Wingdings" panose="05000000000000000000" pitchFamily="2" charset="2"/>
+              </a:rPr>
+              <a:t>Resolve</a:t>
+            </a:r>
+            <a:r>
+              <a:rPr lang="nl-NL" dirty="0">
+                <a:sym typeface="Wingdings" panose="05000000000000000000" pitchFamily="2" charset="2"/>
+              </a:rPr>
+              <a:t>’-functie</a:t>
+            </a:r>
+          </a:p>
+          <a:p>
+            <a:r>
+              <a:rPr lang="nl-NL" dirty="0">
+                <a:sym typeface="Wingdings" panose="05000000000000000000" pitchFamily="2" charset="2"/>
+              </a:rPr>
+              <a:t>Fout-functie noemen we ‘</a:t>
+            </a:r>
+            <a:r>
+              <a:rPr lang="nl-NL" dirty="0" err="1">
+                <a:sym typeface="Wingdings" panose="05000000000000000000" pitchFamily="2" charset="2"/>
+              </a:rPr>
+              <a:t>Reject</a:t>
+            </a:r>
+            <a:r>
+              <a:rPr lang="nl-NL" dirty="0">
+                <a:sym typeface="Wingdings" panose="05000000000000000000" pitchFamily="2" charset="2"/>
+              </a:rPr>
+              <a:t>’-functie</a:t>
+            </a:r>
+          </a:p>
+          <a:p>
+            <a:endParaRPr lang="en-NL" dirty="0"/>
           </a:p>
         </p:txBody>
       </p:sp>
     </p:spTree>
     <p:extLst>
       <p:ext uri="{BB962C8B-B14F-4D97-AF65-F5344CB8AC3E}">
-        <p14:creationId xmlns:p14="http://schemas.microsoft.com/office/powerpoint/2010/main" val="3749883609"/>
+        <p14:creationId xmlns:p14="http://schemas.microsoft.com/office/powerpoint/2010/main" val="3698691666"/>
       </p:ext>
     </p:extLst>
   </p:cSld>
@@ -11487,7 +11679,13 @@
       </p:grpSpPr>
       <p:sp>
         <p:nvSpPr>
-          <p:cNvPr id="2" name="Titel 1"/>
+          <p:cNvPr id="2" name="Titel 1">
+            <a:extLst>
+              <a:ext uri="{FF2B5EF4-FFF2-40B4-BE49-F238E27FC236}">
+                <a16:creationId xmlns:a16="http://schemas.microsoft.com/office/drawing/2014/main" id="{8BA8B11B-545E-4AAA-8437-5E9FB96F0B94}"/>
+              </a:ext>
+            </a:extLst>
+          </p:cNvPr>
           <p:cNvSpPr>
             <a:spLocks noGrp="1"/>
           </p:cNvSpPr>
@@ -11501,102 +11699,321 @@
           <a:lstStyle/>
           <a:p>
             <a:r>
-              <a:rPr lang="nl-NL" dirty="0"/>
-              <a:t>SVG &amp; Canvas</a:t>
-            </a:r>
-          </a:p>
-        </p:txBody>
-      </p:sp>
-      <p:sp>
-        <p:nvSpPr>
-          <p:cNvPr id="3" name="Tijdelijke aanduiding voor inhoud 2"/>
-          <p:cNvSpPr>
-            <a:spLocks noGrp="1"/>
-          </p:cNvSpPr>
-          <p:nvPr>
-            <p:ph idx="1"/>
-          </p:nvPr>
-        </p:nvSpPr>
-        <p:spPr/>
-        <p:txBody>
-          <a:bodyPr/>
+              <a:rPr lang="nl-NL" dirty="0" err="1"/>
+              <a:t>Promises</a:t>
+            </a:r>
+            <a:r>
+              <a:rPr lang="nl-NL" dirty="0"/>
+              <a:t> - </a:t>
+            </a:r>
+            <a:r>
+              <a:rPr lang="nl-NL" dirty="0" err="1"/>
+              <a:t>Resolved</a:t>
+            </a:r>
+            <a:endParaRPr lang="en-NL" dirty="0"/>
+          </a:p>
+        </p:txBody>
+      </p:sp>
+      <p:sp>
+        <p:nvSpPr>
+          <p:cNvPr id="6" name="Tekstvak 5">
+            <a:extLst>
+              <a:ext uri="{FF2B5EF4-FFF2-40B4-BE49-F238E27FC236}">
+                <a16:creationId xmlns:a16="http://schemas.microsoft.com/office/drawing/2014/main" id="{D466CFCB-73BB-4B6D-9CB2-619E1DB7E896}"/>
+              </a:ext>
+            </a:extLst>
+          </p:cNvPr>
+          <p:cNvSpPr txBox="1"/>
+          <p:nvPr/>
+        </p:nvSpPr>
+        <p:spPr>
+          <a:xfrm>
+            <a:off x="283779" y="1755228"/>
+            <a:ext cx="5997320" cy="4801314"/>
+          </a:xfrm>
+          <a:prstGeom prst="rect">
+            <a:avLst/>
+          </a:prstGeom>
+          <a:noFill/>
+        </p:spPr>
+        <p:txBody>
+          <a:bodyPr wrap="square" rtlCol="0">
+            <a:spAutoFit/>
+          </a:bodyPr>
           <a:lstStyle/>
           <a:p>
-            <a:r>
-              <a:rPr lang="nl-NL" dirty="0"/>
-              <a:t>Tekenen van objecten</a:t>
-            </a:r>
-          </a:p>
-          <a:p>
-            <a:pPr lvl="1"/>
-            <a:r>
-              <a:rPr lang="nl-NL" dirty="0"/>
-              <a:t>Canvas </a:t>
-            </a:r>
-            <a:r>
-              <a:rPr lang="nl-NL" dirty="0">
-                <a:sym typeface="Wingdings" panose="05000000000000000000" pitchFamily="2" charset="2"/>
+            <a:pPr marL="342900" indent="-342900">
+              <a:buFont typeface="+mj-lt"/>
+              <a:buAutoNum type="arabicPeriod"/>
+            </a:pPr>
+            <a:r>
+              <a:rPr lang="nl-NL" dirty="0"/>
+              <a:t>Maak een nieuwe instantie van de </a:t>
+            </a:r>
+            <a:r>
+              <a:rPr lang="nl-NL" dirty="0" err="1"/>
+              <a:t>promise</a:t>
+            </a:r>
+            <a:endParaRPr lang="nl-NL" dirty="0"/>
+          </a:p>
+          <a:p>
+            <a:pPr marL="342900" indent="-342900">
+              <a:buFont typeface="+mj-lt"/>
+              <a:buAutoNum type="arabicPeriod"/>
+            </a:pPr>
+            <a:r>
+              <a:rPr lang="nl-NL" dirty="0"/>
+              <a:t>Geef de functie op die uitgevoerd moet worden (</a:t>
+            </a:r>
+            <a:r>
+              <a:rPr lang="nl-NL" i="1" dirty="0" err="1"/>
+              <a:t>Promise</a:t>
+            </a:r>
+            <a:r>
+              <a:rPr lang="nl-NL" i="1" dirty="0"/>
+              <a:t> body </a:t>
+            </a:r>
+            <a:r>
+              <a:rPr lang="nl-NL" i="1" dirty="0" err="1"/>
+              <a:t>function</a:t>
+            </a:r>
+            <a:r>
+              <a:rPr lang="nl-NL" dirty="0"/>
+              <a:t>)</a:t>
+            </a:r>
+          </a:p>
+          <a:p>
+            <a:pPr marL="342900" indent="-342900">
+              <a:buFont typeface="+mj-lt"/>
+              <a:buAutoNum type="arabicPeriod"/>
+            </a:pPr>
+            <a:r>
+              <a:rPr lang="nl-NL" dirty="0"/>
+              <a:t>De </a:t>
+            </a:r>
+            <a:r>
+              <a:rPr lang="nl-NL" dirty="0" err="1"/>
+              <a:t>Promise</a:t>
+            </a:r>
+            <a:r>
+              <a:rPr lang="nl-NL" dirty="0"/>
+              <a:t>-body functie wordt aangeroepen met twee parameters:</a:t>
+            </a:r>
+          </a:p>
+          <a:p>
+            <a:pPr marL="800100" lvl="1" indent="-342900">
+              <a:buFont typeface="+mj-lt"/>
+              <a:buAutoNum type="arabicPeriod"/>
+            </a:pPr>
+            <a:r>
+              <a:rPr lang="nl-NL" dirty="0"/>
+              <a:t>Een functie voor het afhandelen van data in geval van </a:t>
+            </a:r>
+            <a:r>
+              <a:rPr lang="nl-NL" dirty="0" err="1"/>
+              <a:t>success</a:t>
+            </a:r>
+            <a:r>
+              <a:rPr lang="nl-NL" dirty="0"/>
+              <a:t> (‘</a:t>
+            </a:r>
+            <a:r>
+              <a:rPr lang="nl-NL" dirty="0" err="1"/>
+              <a:t>resolve</a:t>
+            </a:r>
+            <a:r>
+              <a:rPr lang="nl-NL" dirty="0"/>
+              <a:t>’)</a:t>
+            </a:r>
+          </a:p>
+          <a:p>
+            <a:pPr marL="800100" lvl="1" indent="-342900">
+              <a:buFont typeface="+mj-lt"/>
+              <a:buAutoNum type="arabicPeriod"/>
+            </a:pPr>
+            <a:r>
+              <a:rPr lang="nl-NL" dirty="0"/>
+              <a:t>Een functie voor het afhandelen van data in geval van falen (‘</a:t>
+            </a:r>
+            <a:r>
+              <a:rPr lang="nl-NL" dirty="0" err="1"/>
+              <a:t>reject</a:t>
+            </a:r>
+            <a:r>
+              <a:rPr lang="nl-NL" dirty="0"/>
+              <a:t>’)</a:t>
+            </a:r>
+          </a:p>
+          <a:p>
+            <a:pPr marL="342900" indent="-342900">
+              <a:buFont typeface="+mj-lt"/>
+              <a:buAutoNum type="arabicPeriod"/>
+            </a:pPr>
+            <a:r>
+              <a:rPr lang="nl-NL" dirty="0"/>
+              <a:t>Wacht op het resultaat (</a:t>
+            </a:r>
+            <a:r>
+              <a:rPr lang="nl-NL" sz="1400" dirty="0" err="1">
+                <a:latin typeface="Courier New" panose="02070309020205020404" pitchFamily="49" charset="0"/>
+                <a:cs typeface="Courier New" panose="02070309020205020404" pitchFamily="49" charset="0"/>
               </a:rPr>
-              <a:t> javascript</a:t>
-            </a:r>
-          </a:p>
-          <a:p>
-            <a:pPr lvl="1"/>
-            <a:r>
-              <a:rPr lang="nl-NL" dirty="0">
-                <a:sym typeface="Wingdings" panose="05000000000000000000" pitchFamily="2" charset="2"/>
+              <a:t>myPromise.then</a:t>
+            </a:r>
+            <a:r>
+              <a:rPr lang="nl-NL" dirty="0"/>
+              <a:t>) van de uitvoering en specificeer twee functies:</a:t>
+            </a:r>
+          </a:p>
+          <a:p>
+            <a:pPr marL="800100" lvl="1" indent="-342900">
+              <a:buFont typeface="+mj-lt"/>
+              <a:buAutoNum type="arabicPeriod"/>
+            </a:pPr>
+            <a:r>
+              <a:rPr lang="nl-NL" dirty="0" err="1"/>
+              <a:t>Resolve</a:t>
+            </a:r>
+            <a:r>
+              <a:rPr lang="nl-NL" dirty="0"/>
+              <a:t>  (</a:t>
+            </a:r>
+            <a:r>
+              <a:rPr lang="nl-NL" i="1" dirty="0" err="1"/>
+              <a:t>inline</a:t>
+            </a:r>
+            <a:r>
+              <a:rPr lang="nl-NL" i="1" dirty="0"/>
+              <a:t> anonieme functie</a:t>
+            </a:r>
+            <a:r>
+              <a:rPr lang="nl-NL" dirty="0"/>
+              <a:t>)</a:t>
+            </a:r>
+          </a:p>
+          <a:p>
+            <a:pPr marL="800100" lvl="1" indent="-342900">
+              <a:buFont typeface="+mj-lt"/>
+              <a:buAutoNum type="arabicPeriod"/>
+            </a:pPr>
+            <a:r>
+              <a:rPr lang="nl-NL" dirty="0" err="1"/>
+              <a:t>Reject</a:t>
+            </a:r>
+            <a:r>
+              <a:rPr lang="nl-NL" dirty="0"/>
+              <a:t> (</a:t>
+            </a:r>
+            <a:r>
+              <a:rPr lang="nl-NL" i="1" dirty="0" err="1"/>
+              <a:t>inline</a:t>
+            </a:r>
+            <a:r>
+              <a:rPr lang="nl-NL" i="1"/>
+              <a:t> anonieme functie</a:t>
+            </a:r>
+            <a:r>
+              <a:rPr lang="nl-NL"/>
+              <a:t>)</a:t>
+            </a:r>
+            <a:endParaRPr lang="nl-NL" dirty="0"/>
+          </a:p>
+          <a:p>
+            <a:pPr marL="342900" indent="-342900">
+              <a:buFont typeface="+mj-lt"/>
+              <a:buAutoNum type="arabicPeriod"/>
+            </a:pPr>
+            <a:r>
+              <a:rPr lang="nl-NL" dirty="0"/>
+              <a:t>Afhankelijk van het resultaat (</a:t>
+            </a:r>
+            <a:r>
+              <a:rPr lang="nl-NL" b="1" dirty="0" err="1"/>
+              <a:t>resolve</a:t>
+            </a:r>
+            <a:r>
+              <a:rPr lang="nl-NL" dirty="0"/>
+              <a:t> of </a:t>
+            </a:r>
+            <a:r>
+              <a:rPr lang="nl-NL" dirty="0" err="1"/>
+              <a:t>reject</a:t>
+            </a:r>
+            <a:r>
+              <a:rPr lang="nl-NL" dirty="0"/>
+              <a:t>) wordt de juiste functie aangeroepen en de gegevens die de </a:t>
+            </a:r>
+            <a:r>
+              <a:rPr lang="nl-NL" i="1" dirty="0" err="1"/>
+              <a:t>Promise</a:t>
+            </a:r>
+            <a:r>
+              <a:rPr lang="nl-NL" i="1" dirty="0"/>
+              <a:t> Body </a:t>
+            </a:r>
+            <a:r>
+              <a:rPr lang="nl-NL" i="1" dirty="0" err="1"/>
+              <a:t>Function</a:t>
+            </a:r>
+            <a:r>
+              <a:rPr lang="nl-NL" dirty="0"/>
+              <a:t> heeft bepaald worden (</a:t>
+            </a:r>
+            <a:r>
+              <a:rPr lang="nl-NL" sz="1400" dirty="0">
+                <a:latin typeface="Courier New" panose="02070309020205020404" pitchFamily="49" charset="0"/>
+                <a:cs typeface="Courier New" panose="02070309020205020404" pitchFamily="49" charset="0"/>
               </a:rPr>
-              <a:t>SVG  </a:t>
-            </a:r>
-            <a:r>
-              <a:rPr lang="nl-NL" dirty="0" err="1">
-                <a:sym typeface="Wingdings" panose="05000000000000000000" pitchFamily="2" charset="2"/>
-              </a:rPr>
-              <a:t>xml</a:t>
-            </a:r>
-            <a:r>
-              <a:rPr lang="nl-NL" dirty="0">
-                <a:sym typeface="Wingdings" panose="05000000000000000000" pitchFamily="2" charset="2"/>
-              </a:rPr>
-              <a:t>-tekst door browser opgebouwd</a:t>
-            </a:r>
-          </a:p>
-          <a:p>
-            <a:r>
-              <a:rPr lang="nl-NL" dirty="0" err="1">
-                <a:sym typeface="Wingdings" panose="05000000000000000000" pitchFamily="2" charset="2"/>
-              </a:rPr>
-              <a:t>Frameworks</a:t>
-            </a:r>
-            <a:endParaRPr lang="nl-NL" dirty="0">
-              <a:sym typeface="Wingdings" panose="05000000000000000000" pitchFamily="2" charset="2"/>
-            </a:endParaRPr>
-          </a:p>
-          <a:p>
-            <a:r>
-              <a:rPr lang="nl-NL" dirty="0">
-                <a:sym typeface="Wingdings" panose="05000000000000000000" pitchFamily="2" charset="2"/>
-              </a:rPr>
-              <a:t>Leercurve</a:t>
-            </a:r>
-          </a:p>
-          <a:p>
-            <a:r>
-              <a:rPr lang="nl-NL" dirty="0">
-                <a:sym typeface="Wingdings" panose="05000000000000000000" pitchFamily="2" charset="2"/>
-              </a:rPr>
-              <a:t>Voorbeelden</a:t>
-            </a:r>
-          </a:p>
-          <a:p>
-            <a:endParaRPr lang="nl-NL" dirty="0"/>
-          </a:p>
-        </p:txBody>
-      </p:sp>
+              <a:t>12345</a:t>
+            </a:r>
+            <a:r>
+              <a:rPr lang="nl-NL" dirty="0"/>
+              <a:t>) meegegeven aan die functie.</a:t>
+            </a:r>
+            <a:endParaRPr lang="en-NL" dirty="0"/>
+          </a:p>
+        </p:txBody>
+      </p:sp>
+      <p:pic>
+        <p:nvPicPr>
+          <p:cNvPr id="10" name="Afbeelding 9">
+            <a:extLst>
+              <a:ext uri="{FF2B5EF4-FFF2-40B4-BE49-F238E27FC236}">
+                <a16:creationId xmlns:a16="http://schemas.microsoft.com/office/drawing/2014/main" id="{C6632583-E84C-4717-9A8D-E0418A783F4F}"/>
+              </a:ext>
+            </a:extLst>
+          </p:cNvPr>
+          <p:cNvPicPr>
+            <a:picLocks noChangeAspect="1"/>
+          </p:cNvPicPr>
+          <p:nvPr/>
+        </p:nvPicPr>
+        <p:blipFill>
+          <a:blip r:embed="rId2">
+            <a:extLst>
+              <a:ext uri="{28A0092B-C50C-407E-A947-70E740481C1C}">
+                <a14:useLocalDpi xmlns:a14="http://schemas.microsoft.com/office/drawing/2010/main" val="0"/>
+              </a:ext>
+            </a:extLst>
+          </a:blip>
+          <a:stretch>
+            <a:fillRect/>
+          </a:stretch>
+        </p:blipFill>
+        <p:spPr>
+          <a:xfrm>
+            <a:off x="6304918" y="9197"/>
+            <a:ext cx="5882117" cy="6297010"/>
+          </a:xfrm>
+          <a:prstGeom prst="rect">
+            <a:avLst/>
+          </a:prstGeom>
+        </p:spPr>
+      </p:pic>
     </p:spTree>
     <p:extLst>
       <p:ext uri="{BB962C8B-B14F-4D97-AF65-F5344CB8AC3E}">
-        <p14:creationId xmlns:p14="http://schemas.microsoft.com/office/powerpoint/2010/main" val="2023804850"/>
+        <p14:creationId xmlns:p14="http://schemas.microsoft.com/office/powerpoint/2010/main" val="3503115357"/>
       </p:ext>
     </p:extLst>
   </p:cSld>
@@ -11625,7 +12042,13 @@
       </p:grpSpPr>
       <p:sp>
         <p:nvSpPr>
-          <p:cNvPr id="2" name="Titel 1"/>
+          <p:cNvPr id="2" name="Titel 1">
+            <a:extLst>
+              <a:ext uri="{FF2B5EF4-FFF2-40B4-BE49-F238E27FC236}">
+                <a16:creationId xmlns:a16="http://schemas.microsoft.com/office/drawing/2014/main" id="{8BA8B11B-545E-4AAA-8437-5E9FB96F0B94}"/>
+              </a:ext>
+            </a:extLst>
+          </p:cNvPr>
           <p:cNvSpPr>
             <a:spLocks noGrp="1"/>
           </p:cNvSpPr>
@@ -11639,59 +12062,334 @@
           <a:lstStyle/>
           <a:p>
             <a:r>
-              <a:rPr lang="nl-NL" dirty="0"/>
-              <a:t>Templating</a:t>
-            </a:r>
-          </a:p>
-        </p:txBody>
-      </p:sp>
-      <p:sp>
-        <p:nvSpPr>
-          <p:cNvPr id="3" name="Tijdelijke aanduiding voor inhoud 2"/>
-          <p:cNvSpPr>
-            <a:spLocks noGrp="1"/>
-          </p:cNvSpPr>
-          <p:nvPr>
-            <p:ph idx="1"/>
-          </p:nvPr>
-        </p:nvSpPr>
-        <p:spPr/>
-        <p:txBody>
-          <a:bodyPr/>
+              <a:rPr lang="nl-NL" dirty="0" err="1"/>
+              <a:t>Promises</a:t>
+            </a:r>
+            <a:r>
+              <a:rPr lang="nl-NL" dirty="0"/>
+              <a:t> - </a:t>
+            </a:r>
+            <a:r>
+              <a:rPr lang="nl-NL" dirty="0" err="1"/>
+              <a:t>Reject</a:t>
+            </a:r>
+            <a:endParaRPr lang="en-NL" dirty="0"/>
+          </a:p>
+        </p:txBody>
+      </p:sp>
+      <p:sp>
+        <p:nvSpPr>
+          <p:cNvPr id="6" name="Tekstvak 5">
+            <a:extLst>
+              <a:ext uri="{FF2B5EF4-FFF2-40B4-BE49-F238E27FC236}">
+                <a16:creationId xmlns:a16="http://schemas.microsoft.com/office/drawing/2014/main" id="{D466CFCB-73BB-4B6D-9CB2-619E1DB7E896}"/>
+              </a:ext>
+            </a:extLst>
+          </p:cNvPr>
+          <p:cNvSpPr txBox="1"/>
+          <p:nvPr/>
+        </p:nvSpPr>
+        <p:spPr>
+          <a:xfrm>
+            <a:off x="283779" y="1755228"/>
+            <a:ext cx="5812221" cy="4801314"/>
+          </a:xfrm>
+          <a:prstGeom prst="rect">
+            <a:avLst/>
+          </a:prstGeom>
+          <a:noFill/>
+        </p:spPr>
+        <p:txBody>
+          <a:bodyPr wrap="square" rtlCol="0">
+            <a:spAutoFit/>
+          </a:bodyPr>
           <a:lstStyle/>
           <a:p>
-            <a:r>
-              <a:rPr lang="nl-NL" dirty="0"/>
-              <a:t>HTML5 heeft een Template Tag</a:t>
-            </a:r>
-          </a:p>
-          <a:p>
-            <a:r>
-              <a:rPr lang="nl-NL" dirty="0">
-                <a:hlinkClick r:id="rId2"/>
+            <a:pPr marL="342900" indent="-342900">
+              <a:buFont typeface="+mj-lt"/>
+              <a:buAutoNum type="arabicPeriod"/>
+            </a:pPr>
+            <a:r>
+              <a:rPr lang="nl-NL" dirty="0"/>
+              <a:t>Maak een nieuwe instantie van de </a:t>
+            </a:r>
+            <a:r>
+              <a:rPr lang="nl-NL" dirty="0" err="1"/>
+              <a:t>promise</a:t>
+            </a:r>
+            <a:endParaRPr lang="nl-NL" dirty="0"/>
+          </a:p>
+          <a:p>
+            <a:pPr marL="342900" indent="-342900">
+              <a:buFont typeface="+mj-lt"/>
+              <a:buAutoNum type="arabicPeriod"/>
+            </a:pPr>
+            <a:r>
+              <a:rPr lang="nl-NL" dirty="0"/>
+              <a:t>Geef de functie op die uitgevoerd moet worden (</a:t>
+            </a:r>
+            <a:r>
+              <a:rPr lang="nl-NL" i="1" dirty="0" err="1"/>
+              <a:t>Promise</a:t>
+            </a:r>
+            <a:r>
+              <a:rPr lang="nl-NL" i="1" dirty="0"/>
+              <a:t> body </a:t>
+            </a:r>
+            <a:r>
+              <a:rPr lang="nl-NL" i="1" dirty="0" err="1"/>
+              <a:t>function</a:t>
+            </a:r>
+            <a:r>
+              <a:rPr lang="nl-NL" dirty="0"/>
+              <a:t>)</a:t>
+            </a:r>
+          </a:p>
+          <a:p>
+            <a:pPr marL="342900" indent="-342900">
+              <a:buFont typeface="+mj-lt"/>
+              <a:buAutoNum type="arabicPeriod"/>
+            </a:pPr>
+            <a:r>
+              <a:rPr lang="nl-NL" dirty="0"/>
+              <a:t>De </a:t>
+            </a:r>
+            <a:r>
+              <a:rPr lang="nl-NL" dirty="0" err="1"/>
+              <a:t>Promise</a:t>
+            </a:r>
+            <a:r>
+              <a:rPr lang="nl-NL" dirty="0"/>
+              <a:t>-body functie wordt aangeroepen met twee parameters:</a:t>
+            </a:r>
+          </a:p>
+          <a:p>
+            <a:pPr marL="800100" lvl="1" indent="-342900">
+              <a:buFont typeface="+mj-lt"/>
+              <a:buAutoNum type="arabicPeriod"/>
+            </a:pPr>
+            <a:r>
+              <a:rPr lang="nl-NL" dirty="0"/>
+              <a:t>Een functie voor het afhandelen van data in geval van </a:t>
+            </a:r>
+            <a:r>
+              <a:rPr lang="nl-NL" dirty="0" err="1"/>
+              <a:t>success</a:t>
+            </a:r>
+            <a:r>
+              <a:rPr lang="nl-NL" dirty="0"/>
+              <a:t> (‘</a:t>
+            </a:r>
+            <a:r>
+              <a:rPr lang="nl-NL" i="1" dirty="0" err="1"/>
+              <a:t>resolve</a:t>
+            </a:r>
+            <a:r>
+              <a:rPr lang="nl-NL" dirty="0"/>
+              <a:t>’)</a:t>
+            </a:r>
+          </a:p>
+          <a:p>
+            <a:pPr marL="800100" lvl="1" indent="-342900">
+              <a:buFont typeface="+mj-lt"/>
+              <a:buAutoNum type="arabicPeriod"/>
+            </a:pPr>
+            <a:r>
+              <a:rPr lang="nl-NL" dirty="0"/>
+              <a:t>Een functie voor het afhandelen van data in geval van falen (‘</a:t>
+            </a:r>
+            <a:r>
+              <a:rPr lang="nl-NL" i="1" dirty="0" err="1"/>
+              <a:t>reject</a:t>
+            </a:r>
+            <a:r>
+              <a:rPr lang="nl-NL" dirty="0"/>
+              <a:t>’)</a:t>
+            </a:r>
+          </a:p>
+          <a:p>
+            <a:pPr marL="342900" indent="-342900">
+              <a:buFont typeface="+mj-lt"/>
+              <a:buAutoNum type="arabicPeriod"/>
+            </a:pPr>
+            <a:r>
+              <a:rPr lang="nl-NL" dirty="0"/>
+              <a:t>Wacht op het resultaat (</a:t>
+            </a:r>
+            <a:r>
+              <a:rPr lang="nl-NL" sz="1400" dirty="0" err="1">
+                <a:latin typeface="Courier New" panose="02070309020205020404" pitchFamily="49" charset="0"/>
+                <a:cs typeface="Courier New" panose="02070309020205020404" pitchFamily="49" charset="0"/>
               </a:rPr>
-              <a:t>https://developer.mozilla.org/en-US/docs/Web/HTML/Element/template</a:t>
-            </a:r>
-            <a:endParaRPr lang="nl-NL" dirty="0"/>
-          </a:p>
-          <a:p>
-            <a:r>
-              <a:rPr lang="nl-NL" dirty="0">
-                <a:hlinkClick r:id="rId3"/>
+              <a:t>myPromise.then</a:t>
+            </a:r>
+            <a:r>
+              <a:rPr lang="nl-NL" dirty="0"/>
+              <a:t>) van de uitvoering en specificeer twee functies:</a:t>
+            </a:r>
+          </a:p>
+          <a:p>
+            <a:pPr marL="800100" lvl="1" indent="-342900">
+              <a:buFont typeface="+mj-lt"/>
+              <a:buAutoNum type="arabicPeriod"/>
+            </a:pPr>
+            <a:r>
+              <a:rPr lang="nl-NL" dirty="0" err="1"/>
+              <a:t>Resolve</a:t>
+            </a:r>
+            <a:r>
+              <a:rPr lang="nl-NL" dirty="0"/>
+              <a:t> (</a:t>
+            </a:r>
+            <a:r>
+              <a:rPr lang="nl-NL" i="1" dirty="0" err="1"/>
+              <a:t>inline</a:t>
+            </a:r>
+            <a:r>
+              <a:rPr lang="nl-NL" i="1" dirty="0"/>
+              <a:t> anonieme functie</a:t>
+            </a:r>
+            <a:r>
+              <a:rPr lang="nl-NL" dirty="0"/>
+              <a:t>)</a:t>
+            </a:r>
+          </a:p>
+          <a:p>
+            <a:pPr marL="800100" lvl="1" indent="-342900">
+              <a:buFont typeface="+mj-lt"/>
+              <a:buAutoNum type="arabicPeriod"/>
+            </a:pPr>
+            <a:r>
+              <a:rPr lang="nl-NL" dirty="0" err="1"/>
+              <a:t>Reject</a:t>
+            </a:r>
+            <a:r>
+              <a:rPr lang="nl-NL" dirty="0"/>
+              <a:t>  (</a:t>
+            </a:r>
+            <a:r>
+              <a:rPr lang="nl-NL" i="1" dirty="0" err="1"/>
+              <a:t>inline</a:t>
+            </a:r>
+            <a:r>
+              <a:rPr lang="nl-NL" i="1" dirty="0"/>
+              <a:t> anonieme functie</a:t>
+            </a:r>
+            <a:r>
+              <a:rPr lang="nl-NL" dirty="0"/>
+              <a:t>)</a:t>
+            </a:r>
+          </a:p>
+          <a:p>
+            <a:pPr marL="342900" indent="-342900">
+              <a:buFont typeface="+mj-lt"/>
+              <a:buAutoNum type="arabicPeriod"/>
+            </a:pPr>
+            <a:r>
+              <a:rPr lang="nl-NL" dirty="0"/>
+              <a:t>Afhankelijk van het resultaat (</a:t>
+            </a:r>
+            <a:r>
+              <a:rPr lang="nl-NL" dirty="0" err="1"/>
+              <a:t>resolve</a:t>
+            </a:r>
+            <a:r>
+              <a:rPr lang="nl-NL" dirty="0"/>
+              <a:t> of </a:t>
+            </a:r>
+            <a:r>
+              <a:rPr lang="nl-NL" b="1" dirty="0" err="1"/>
+              <a:t>reject</a:t>
+            </a:r>
+            <a:r>
+              <a:rPr lang="nl-NL" dirty="0"/>
+              <a:t>) wordt de juiste functie aangeroepen en de gegevens die de </a:t>
+            </a:r>
+            <a:r>
+              <a:rPr lang="nl-NL" i="1" dirty="0" err="1"/>
+              <a:t>Promise</a:t>
+            </a:r>
+            <a:r>
+              <a:rPr lang="nl-NL" i="1" dirty="0"/>
+              <a:t> Body </a:t>
+            </a:r>
+            <a:r>
+              <a:rPr lang="nl-NL" i="1" dirty="0" err="1"/>
+              <a:t>Function</a:t>
+            </a:r>
+            <a:r>
+              <a:rPr lang="nl-NL" dirty="0"/>
+              <a:t> heeft bepaald </a:t>
+            </a:r>
+            <a:r>
+              <a:rPr lang="nl-NL" sz="1400" dirty="0">
+                <a:latin typeface="Courier New" panose="02070309020205020404" pitchFamily="49" charset="0"/>
+                <a:cs typeface="Courier New" panose="02070309020205020404" pitchFamily="49" charset="0"/>
               </a:rPr>
-              <a:t>https://www.w3schools.com/html/html5_intro.asp</a:t>
-            </a:r>
-            <a:endParaRPr lang="nl-NL" dirty="0"/>
-          </a:p>
-          <a:p>
-            <a:endParaRPr lang="nl-NL" dirty="0"/>
-          </a:p>
-        </p:txBody>
-      </p:sp>
+              <a:t>(‘#</a:t>
+            </a:r>
+            <a:r>
+              <a:rPr lang="nl-NL" sz="1400" dirty="0" err="1">
+                <a:latin typeface="Courier New" panose="02070309020205020404" pitchFamily="49" charset="0"/>
+                <a:cs typeface="Courier New" panose="02070309020205020404" pitchFamily="49" charset="0"/>
+              </a:rPr>
+              <a:t>err</a:t>
+            </a:r>
+            <a:r>
+              <a:rPr lang="nl-NL" sz="1400" dirty="0">
+                <a:latin typeface="Courier New" panose="02070309020205020404" pitchFamily="49" charset="0"/>
+                <a:cs typeface="Courier New" panose="02070309020205020404" pitchFamily="49" charset="0"/>
+              </a:rPr>
+              <a:t>’</a:t>
+            </a:r>
+            <a:r>
+              <a:rPr lang="nl-NL" dirty="0"/>
+              <a:t>) worden meegegeven aan die functie.</a:t>
+            </a:r>
+            <a:endParaRPr lang="en-NL" dirty="0"/>
+          </a:p>
+        </p:txBody>
+      </p:sp>
+      <p:pic>
+        <p:nvPicPr>
+          <p:cNvPr id="4" name="Afbeelding 3">
+            <a:extLst>
+              <a:ext uri="{FF2B5EF4-FFF2-40B4-BE49-F238E27FC236}">
+                <a16:creationId xmlns:a16="http://schemas.microsoft.com/office/drawing/2014/main" id="{5534A29E-4CDB-4913-AE5C-A3334D957AF7}"/>
+              </a:ext>
+            </a:extLst>
+          </p:cNvPr>
+          <p:cNvPicPr>
+            <a:picLocks noChangeAspect="1"/>
+          </p:cNvPicPr>
+          <p:nvPr/>
+        </p:nvPicPr>
+        <p:blipFill>
+          <a:blip r:embed="rId3">
+            <a:extLst>
+              <a:ext uri="{28A0092B-C50C-407E-A947-70E740481C1C}">
+                <a14:useLocalDpi xmlns:a14="http://schemas.microsoft.com/office/drawing/2010/main" val="0"/>
+              </a:ext>
+            </a:extLst>
+          </a:blip>
+          <a:stretch>
+            <a:fillRect/>
+          </a:stretch>
+        </p:blipFill>
+        <p:spPr>
+          <a:xfrm>
+            <a:off x="6096000" y="0"/>
+            <a:ext cx="6144936" cy="6858000"/>
+          </a:xfrm>
+          <a:prstGeom prst="rect">
+            <a:avLst/>
+          </a:prstGeom>
+        </p:spPr>
+      </p:pic>
     </p:spTree>
     <p:extLst>
       <p:ext uri="{BB962C8B-B14F-4D97-AF65-F5344CB8AC3E}">
-        <p14:creationId xmlns:p14="http://schemas.microsoft.com/office/powerpoint/2010/main" val="3805239925"/>
+        <p14:creationId xmlns:p14="http://schemas.microsoft.com/office/powerpoint/2010/main" val="1083659"/>
       </p:ext>
     </p:extLst>
   </p:cSld>
@@ -11720,7 +12418,13 @@
       </p:grpSpPr>
       <p:sp>
         <p:nvSpPr>
-          <p:cNvPr id="2" name="Titel 1"/>
+          <p:cNvPr id="4" name="Titel 3">
+            <a:extLst>
+              <a:ext uri="{FF2B5EF4-FFF2-40B4-BE49-F238E27FC236}">
+                <a16:creationId xmlns:a16="http://schemas.microsoft.com/office/drawing/2014/main" id="{4D66C7DA-73D5-4F2F-B307-6A06B54EF2D8}"/>
+              </a:ext>
+            </a:extLst>
+          </p:cNvPr>
           <p:cNvSpPr>
             <a:spLocks noGrp="1"/>
           </p:cNvSpPr>
@@ -11735,15 +12439,25 @@
           <a:p>
             <a:r>
               <a:rPr lang="nl-NL" dirty="0" err="1"/>
-              <a:t>Frameworks</a:t>
-            </a:r>
-            <a:endParaRPr lang="nl-NL" dirty="0"/>
-          </a:p>
-        </p:txBody>
-      </p:sp>
-      <p:sp>
-        <p:nvSpPr>
-          <p:cNvPr id="3" name="Tijdelijke aanduiding voor tekst 2"/>
+              <a:t>Animations</a:t>
+            </a:r>
+            <a:r>
+              <a:rPr lang="nl-NL" dirty="0"/>
+              <a:t>, Tekenen en Templates</a:t>
+            </a:r>
+            <a:endParaRPr lang="en-NL" dirty="0"/>
+          </a:p>
+        </p:txBody>
+      </p:sp>
+      <p:sp>
+        <p:nvSpPr>
+          <p:cNvPr id="5" name="Tijdelijke aanduiding voor tekst 4">
+            <a:extLst>
+              <a:ext uri="{FF2B5EF4-FFF2-40B4-BE49-F238E27FC236}">
+                <a16:creationId xmlns:a16="http://schemas.microsoft.com/office/drawing/2014/main" id="{F8B45FE7-A1BF-4AA2-A84C-037A841DC593}"/>
+              </a:ext>
+            </a:extLst>
+          </p:cNvPr>
           <p:cNvSpPr>
             <a:spLocks noGrp="1"/>
           </p:cNvSpPr>
@@ -11751,46 +12465,35 @@
             <p:ph type="body" sz="quarter" idx="10"/>
           </p:nvPr>
         </p:nvSpPr>
-        <p:spPr>
-          <a:xfrm>
-            <a:off x="6096000" y="3483864"/>
-            <a:ext cx="4675200" cy="2742765"/>
-          </a:xfrm>
-        </p:spPr>
+        <p:spPr/>
         <p:txBody>
           <a:bodyPr/>
           <a:lstStyle/>
           <a:p>
             <a:r>
-              <a:rPr lang="nl-NL" dirty="0" err="1"/>
-              <a:t>Angular</a:t>
-            </a:r>
-            <a:endParaRPr lang="nl-NL" dirty="0"/>
-          </a:p>
-          <a:p>
-            <a:r>
-              <a:rPr lang="nl-NL" dirty="0"/>
-              <a:t>Bootstrap</a:t>
-            </a:r>
-          </a:p>
-          <a:p>
-            <a:r>
-              <a:rPr lang="nl-NL" dirty="0"/>
-              <a:t>Development</a:t>
-            </a:r>
-          </a:p>
-          <a:p>
-            <a:r>
-              <a:rPr lang="nl-NL" dirty="0"/>
-              <a:t>Deployment</a:t>
-            </a:r>
+              <a:rPr lang="nl-NL" dirty="0"/>
+              <a:t>Hoe kun je animaties verzorgen in je GUI?</a:t>
+            </a:r>
+          </a:p>
+          <a:p>
+            <a:r>
+              <a:rPr lang="nl-NL" dirty="0"/>
+              <a:t>Tekenen met pixels en vectoren</a:t>
+            </a:r>
+          </a:p>
+          <a:p>
+            <a:r>
+              <a:rPr lang="nl-NL" dirty="0"/>
+              <a:t>Gebruik van templates in HTML5</a:t>
+            </a:r>
+            <a:endParaRPr lang="en-NL" dirty="0"/>
           </a:p>
         </p:txBody>
       </p:sp>
     </p:spTree>
     <p:extLst>
       <p:ext uri="{BB962C8B-B14F-4D97-AF65-F5344CB8AC3E}">
-        <p14:creationId xmlns:p14="http://schemas.microsoft.com/office/powerpoint/2010/main" val="2345754135"/>
+        <p14:creationId xmlns:p14="http://schemas.microsoft.com/office/powerpoint/2010/main" val="1844065527"/>
       </p:ext>
     </p:extLst>
   </p:cSld>
@@ -11911,6 +12614,459 @@
     <p:extLst>
       <p:ext uri="{BB962C8B-B14F-4D97-AF65-F5344CB8AC3E}">
         <p14:creationId xmlns:p14="http://schemas.microsoft.com/office/powerpoint/2010/main" val="3623483014"/>
+      </p:ext>
+    </p:extLst>
+  </p:cSld>
+  <p:clrMapOvr>
+    <a:masterClrMapping/>
+  </p:clrMapOvr>
+</p:sld>
+</file>
+
+<file path=ppt/slides/slide40.xml><?xml version="1.0" encoding="utf-8"?>
+<p:sld xmlns:a="http://schemas.openxmlformats.org/drawingml/2006/main" xmlns:r="http://schemas.openxmlformats.org/officeDocument/2006/relationships" xmlns:p="http://schemas.openxmlformats.org/presentationml/2006/main">
+  <p:cSld>
+    <p:spTree>
+      <p:nvGrpSpPr>
+        <p:cNvPr id="1" name=""/>
+        <p:cNvGrpSpPr/>
+        <p:nvPr/>
+      </p:nvGrpSpPr>
+      <p:grpSpPr>
+        <a:xfrm>
+          <a:off x="0" y="0"/>
+          <a:ext cx="0" cy="0"/>
+          <a:chOff x="0" y="0"/>
+          <a:chExt cx="0" cy="0"/>
+        </a:xfrm>
+      </p:grpSpPr>
+      <p:sp>
+        <p:nvSpPr>
+          <p:cNvPr id="4" name="Titel 3"/>
+          <p:cNvSpPr>
+            <a:spLocks noGrp="1"/>
+          </p:cNvSpPr>
+          <p:nvPr>
+            <p:ph type="title"/>
+          </p:nvPr>
+        </p:nvSpPr>
+        <p:spPr/>
+        <p:txBody>
+          <a:bodyPr/>
+          <a:lstStyle/>
+          <a:p>
+            <a:r>
+              <a:rPr lang="nl-NL" dirty="0"/>
+              <a:t>CSS </a:t>
+            </a:r>
+            <a:r>
+              <a:rPr lang="nl-NL" dirty="0" err="1"/>
+              <a:t>vs</a:t>
+            </a:r>
+            <a:r>
+              <a:rPr lang="nl-NL" dirty="0"/>
+              <a:t> JS</a:t>
+            </a:r>
+          </a:p>
+        </p:txBody>
+      </p:sp>
+      <p:sp>
+        <p:nvSpPr>
+          <p:cNvPr id="5" name="Tijdelijke aanduiding voor inhoud 4"/>
+          <p:cNvSpPr>
+            <a:spLocks noGrp="1"/>
+          </p:cNvSpPr>
+          <p:nvPr>
+            <p:ph idx="1"/>
+          </p:nvPr>
+        </p:nvSpPr>
+        <p:spPr/>
+        <p:txBody>
+          <a:bodyPr/>
+          <a:lstStyle/>
+          <a:p>
+            <a:r>
+              <a:rPr lang="nl-NL" dirty="0"/>
+              <a:t>Animaties via CSS of JS/</a:t>
+            </a:r>
+            <a:r>
+              <a:rPr lang="nl-NL" dirty="0" err="1"/>
+              <a:t>jQuery</a:t>
+            </a:r>
+            <a:r>
+              <a:rPr lang="nl-NL" dirty="0"/>
+              <a:t> </a:t>
+            </a:r>
+            <a:r>
+              <a:rPr lang="nl-NL" dirty="0" err="1"/>
+              <a:t>etc</a:t>
+            </a:r>
+            <a:endParaRPr lang="nl-NL" dirty="0"/>
+          </a:p>
+          <a:p>
+            <a:r>
+              <a:rPr lang="nl-NL" dirty="0"/>
+              <a:t>Performance</a:t>
+            </a:r>
+          </a:p>
+          <a:p>
+            <a:r>
+              <a:rPr lang="nl-NL" dirty="0"/>
+              <a:t>Zie ook in Google Chrome, Developer Tools, “Memory” tab en start </a:t>
+            </a:r>
+            <a:r>
+              <a:rPr lang="nl-NL" dirty="0" err="1"/>
+              <a:t>profiler</a:t>
+            </a:r>
+            <a:endParaRPr lang="nl-NL" dirty="0"/>
+          </a:p>
+          <a:p>
+            <a:endParaRPr lang="nl-NL" dirty="0"/>
+          </a:p>
+          <a:p>
+            <a:endParaRPr lang="nl-NL" dirty="0"/>
+          </a:p>
+          <a:p>
+            <a:endParaRPr lang="nl-NL" dirty="0"/>
+          </a:p>
+        </p:txBody>
+      </p:sp>
+    </p:spTree>
+    <p:extLst>
+      <p:ext uri="{BB962C8B-B14F-4D97-AF65-F5344CB8AC3E}">
+        <p14:creationId xmlns:p14="http://schemas.microsoft.com/office/powerpoint/2010/main" val="3749883609"/>
+      </p:ext>
+    </p:extLst>
+  </p:cSld>
+  <p:clrMapOvr>
+    <a:masterClrMapping/>
+  </p:clrMapOvr>
+</p:sld>
+</file>
+
+<file path=ppt/slides/slide41.xml><?xml version="1.0" encoding="utf-8"?>
+<p:sld xmlns:a="http://schemas.openxmlformats.org/drawingml/2006/main" xmlns:r="http://schemas.openxmlformats.org/officeDocument/2006/relationships" xmlns:p="http://schemas.openxmlformats.org/presentationml/2006/main">
+  <p:cSld>
+    <p:spTree>
+      <p:nvGrpSpPr>
+        <p:cNvPr id="1" name=""/>
+        <p:cNvGrpSpPr/>
+        <p:nvPr/>
+      </p:nvGrpSpPr>
+      <p:grpSpPr>
+        <a:xfrm>
+          <a:off x="0" y="0"/>
+          <a:ext cx="0" cy="0"/>
+          <a:chOff x="0" y="0"/>
+          <a:chExt cx="0" cy="0"/>
+        </a:xfrm>
+      </p:grpSpPr>
+      <p:sp>
+        <p:nvSpPr>
+          <p:cNvPr id="2" name="Titel 1"/>
+          <p:cNvSpPr>
+            <a:spLocks noGrp="1"/>
+          </p:cNvSpPr>
+          <p:nvPr>
+            <p:ph type="title"/>
+          </p:nvPr>
+        </p:nvSpPr>
+        <p:spPr/>
+        <p:txBody>
+          <a:bodyPr/>
+          <a:lstStyle/>
+          <a:p>
+            <a:r>
+              <a:rPr lang="nl-NL" dirty="0"/>
+              <a:t>SVG &amp; Canvas</a:t>
+            </a:r>
+          </a:p>
+        </p:txBody>
+      </p:sp>
+      <p:sp>
+        <p:nvSpPr>
+          <p:cNvPr id="3" name="Tijdelijke aanduiding voor inhoud 2"/>
+          <p:cNvSpPr>
+            <a:spLocks noGrp="1"/>
+          </p:cNvSpPr>
+          <p:nvPr>
+            <p:ph idx="1"/>
+          </p:nvPr>
+        </p:nvSpPr>
+        <p:spPr/>
+        <p:txBody>
+          <a:bodyPr/>
+          <a:lstStyle/>
+          <a:p>
+            <a:r>
+              <a:rPr lang="nl-NL" dirty="0"/>
+              <a:t>Tekenen van objecten</a:t>
+            </a:r>
+          </a:p>
+          <a:p>
+            <a:pPr lvl="1"/>
+            <a:r>
+              <a:rPr lang="nl-NL" dirty="0"/>
+              <a:t>Canvas </a:t>
+            </a:r>
+            <a:r>
+              <a:rPr lang="nl-NL" dirty="0">
+                <a:sym typeface="Wingdings" panose="05000000000000000000" pitchFamily="2" charset="2"/>
+              </a:rPr>
+              <a:t> javascript</a:t>
+            </a:r>
+          </a:p>
+          <a:p>
+            <a:pPr lvl="1"/>
+            <a:r>
+              <a:rPr lang="nl-NL" dirty="0">
+                <a:sym typeface="Wingdings" panose="05000000000000000000" pitchFamily="2" charset="2"/>
+              </a:rPr>
+              <a:t>SVG  </a:t>
+            </a:r>
+            <a:r>
+              <a:rPr lang="nl-NL" dirty="0" err="1">
+                <a:sym typeface="Wingdings" panose="05000000000000000000" pitchFamily="2" charset="2"/>
+              </a:rPr>
+              <a:t>xml</a:t>
+            </a:r>
+            <a:r>
+              <a:rPr lang="nl-NL" dirty="0">
+                <a:sym typeface="Wingdings" panose="05000000000000000000" pitchFamily="2" charset="2"/>
+              </a:rPr>
+              <a:t>-tekst door browser opgebouwd</a:t>
+            </a:r>
+          </a:p>
+          <a:p>
+            <a:r>
+              <a:rPr lang="nl-NL" dirty="0" err="1">
+                <a:sym typeface="Wingdings" panose="05000000000000000000" pitchFamily="2" charset="2"/>
+              </a:rPr>
+              <a:t>Frameworks</a:t>
+            </a:r>
+            <a:endParaRPr lang="nl-NL" dirty="0">
+              <a:sym typeface="Wingdings" panose="05000000000000000000" pitchFamily="2" charset="2"/>
+            </a:endParaRPr>
+          </a:p>
+          <a:p>
+            <a:r>
+              <a:rPr lang="nl-NL" dirty="0">
+                <a:sym typeface="Wingdings" panose="05000000000000000000" pitchFamily="2" charset="2"/>
+              </a:rPr>
+              <a:t>Leercurve</a:t>
+            </a:r>
+          </a:p>
+          <a:p>
+            <a:r>
+              <a:rPr lang="nl-NL" dirty="0">
+                <a:sym typeface="Wingdings" panose="05000000000000000000" pitchFamily="2" charset="2"/>
+              </a:rPr>
+              <a:t>Voorbeelden</a:t>
+            </a:r>
+          </a:p>
+          <a:p>
+            <a:endParaRPr lang="nl-NL" dirty="0"/>
+          </a:p>
+        </p:txBody>
+      </p:sp>
+    </p:spTree>
+    <p:extLst>
+      <p:ext uri="{BB962C8B-B14F-4D97-AF65-F5344CB8AC3E}">
+        <p14:creationId xmlns:p14="http://schemas.microsoft.com/office/powerpoint/2010/main" val="2023804850"/>
+      </p:ext>
+    </p:extLst>
+  </p:cSld>
+  <p:clrMapOvr>
+    <a:masterClrMapping/>
+  </p:clrMapOvr>
+</p:sld>
+</file>
+
+<file path=ppt/slides/slide42.xml><?xml version="1.0" encoding="utf-8"?>
+<p:sld xmlns:a="http://schemas.openxmlformats.org/drawingml/2006/main" xmlns:r="http://schemas.openxmlformats.org/officeDocument/2006/relationships" xmlns:p="http://schemas.openxmlformats.org/presentationml/2006/main">
+  <p:cSld>
+    <p:spTree>
+      <p:nvGrpSpPr>
+        <p:cNvPr id="1" name=""/>
+        <p:cNvGrpSpPr/>
+        <p:nvPr/>
+      </p:nvGrpSpPr>
+      <p:grpSpPr>
+        <a:xfrm>
+          <a:off x="0" y="0"/>
+          <a:ext cx="0" cy="0"/>
+          <a:chOff x="0" y="0"/>
+          <a:chExt cx="0" cy="0"/>
+        </a:xfrm>
+      </p:grpSpPr>
+      <p:sp>
+        <p:nvSpPr>
+          <p:cNvPr id="2" name="Titel 1"/>
+          <p:cNvSpPr>
+            <a:spLocks noGrp="1"/>
+          </p:cNvSpPr>
+          <p:nvPr>
+            <p:ph type="title"/>
+          </p:nvPr>
+        </p:nvSpPr>
+        <p:spPr/>
+        <p:txBody>
+          <a:bodyPr/>
+          <a:lstStyle/>
+          <a:p>
+            <a:r>
+              <a:rPr lang="nl-NL" dirty="0"/>
+              <a:t>Templating</a:t>
+            </a:r>
+          </a:p>
+        </p:txBody>
+      </p:sp>
+      <p:sp>
+        <p:nvSpPr>
+          <p:cNvPr id="3" name="Tijdelijke aanduiding voor inhoud 2"/>
+          <p:cNvSpPr>
+            <a:spLocks noGrp="1"/>
+          </p:cNvSpPr>
+          <p:nvPr>
+            <p:ph idx="1"/>
+          </p:nvPr>
+        </p:nvSpPr>
+        <p:spPr/>
+        <p:txBody>
+          <a:bodyPr/>
+          <a:lstStyle/>
+          <a:p>
+            <a:r>
+              <a:rPr lang="nl-NL" dirty="0"/>
+              <a:t>HTML5 heeft een Template Tag</a:t>
+            </a:r>
+          </a:p>
+          <a:p>
+            <a:r>
+              <a:rPr lang="nl-NL" dirty="0">
+                <a:hlinkClick r:id="rId2"/>
+              </a:rPr>
+              <a:t>https://developer.mozilla.org/en-US/docs/Web/HTML/Element/template</a:t>
+            </a:r>
+            <a:endParaRPr lang="nl-NL" dirty="0"/>
+          </a:p>
+          <a:p>
+            <a:r>
+              <a:rPr lang="nl-NL" dirty="0">
+                <a:hlinkClick r:id="rId3"/>
+              </a:rPr>
+              <a:t>https://www.w3schools.com/html/html5_intro.asp</a:t>
+            </a:r>
+            <a:endParaRPr lang="nl-NL" dirty="0"/>
+          </a:p>
+          <a:p>
+            <a:endParaRPr lang="nl-NL" dirty="0"/>
+          </a:p>
+        </p:txBody>
+      </p:sp>
+    </p:spTree>
+    <p:extLst>
+      <p:ext uri="{BB962C8B-B14F-4D97-AF65-F5344CB8AC3E}">
+        <p14:creationId xmlns:p14="http://schemas.microsoft.com/office/powerpoint/2010/main" val="3805239925"/>
+      </p:ext>
+    </p:extLst>
+  </p:cSld>
+  <p:clrMapOvr>
+    <a:masterClrMapping/>
+  </p:clrMapOvr>
+</p:sld>
+</file>
+
+<file path=ppt/slides/slide43.xml><?xml version="1.0" encoding="utf-8"?>
+<p:sld xmlns:a="http://schemas.openxmlformats.org/drawingml/2006/main" xmlns:r="http://schemas.openxmlformats.org/officeDocument/2006/relationships" xmlns:p="http://schemas.openxmlformats.org/presentationml/2006/main">
+  <p:cSld>
+    <p:spTree>
+      <p:nvGrpSpPr>
+        <p:cNvPr id="1" name=""/>
+        <p:cNvGrpSpPr/>
+        <p:nvPr/>
+      </p:nvGrpSpPr>
+      <p:grpSpPr>
+        <a:xfrm>
+          <a:off x="0" y="0"/>
+          <a:ext cx="0" cy="0"/>
+          <a:chOff x="0" y="0"/>
+          <a:chExt cx="0" cy="0"/>
+        </a:xfrm>
+      </p:grpSpPr>
+      <p:sp>
+        <p:nvSpPr>
+          <p:cNvPr id="2" name="Titel 1"/>
+          <p:cNvSpPr>
+            <a:spLocks noGrp="1"/>
+          </p:cNvSpPr>
+          <p:nvPr>
+            <p:ph type="title"/>
+          </p:nvPr>
+        </p:nvSpPr>
+        <p:spPr/>
+        <p:txBody>
+          <a:bodyPr/>
+          <a:lstStyle/>
+          <a:p>
+            <a:r>
+              <a:rPr lang="nl-NL" dirty="0" err="1"/>
+              <a:t>Frameworks</a:t>
+            </a:r>
+            <a:endParaRPr lang="nl-NL" dirty="0"/>
+          </a:p>
+        </p:txBody>
+      </p:sp>
+      <p:sp>
+        <p:nvSpPr>
+          <p:cNvPr id="3" name="Tijdelijke aanduiding voor tekst 2"/>
+          <p:cNvSpPr>
+            <a:spLocks noGrp="1"/>
+          </p:cNvSpPr>
+          <p:nvPr>
+            <p:ph type="body" sz="quarter" idx="10"/>
+          </p:nvPr>
+        </p:nvSpPr>
+        <p:spPr>
+          <a:xfrm>
+            <a:off x="6096000" y="3483864"/>
+            <a:ext cx="4675200" cy="2742765"/>
+          </a:xfrm>
+        </p:spPr>
+        <p:txBody>
+          <a:bodyPr/>
+          <a:lstStyle/>
+          <a:p>
+            <a:r>
+              <a:rPr lang="nl-NL" dirty="0" err="1"/>
+              <a:t>Angular</a:t>
+            </a:r>
+            <a:endParaRPr lang="nl-NL" dirty="0"/>
+          </a:p>
+          <a:p>
+            <a:r>
+              <a:rPr lang="nl-NL" dirty="0"/>
+              <a:t>Bootstrap</a:t>
+            </a:r>
+          </a:p>
+          <a:p>
+            <a:r>
+              <a:rPr lang="nl-NL" dirty="0"/>
+              <a:t>Development</a:t>
+            </a:r>
+          </a:p>
+          <a:p>
+            <a:r>
+              <a:rPr lang="nl-NL" dirty="0"/>
+              <a:t>Deployment</a:t>
+            </a:r>
+          </a:p>
+        </p:txBody>
+      </p:sp>
+    </p:spTree>
+    <p:extLst>
+      <p:ext uri="{BB962C8B-B14F-4D97-AF65-F5344CB8AC3E}">
+        <p14:creationId xmlns:p14="http://schemas.microsoft.com/office/powerpoint/2010/main" val="2345754135"/>
       </p:ext>
     </p:extLst>
   </p:cSld>

</xml_diff>

<commit_message>
Added some arrows in the presentation (about stores)
</commit_message>
<xml_diff>
--- a/Presentatie/Front-End Development.pptx
+++ b/Presentatie/Front-End Development.pptx
@@ -294,7 +294,7 @@
           <a:p>
             <a:fld id="{C5A381E3-FA85-4AE8-9B11-999D5E05561D}" type="datetimeFigureOut">
               <a:rPr lang="nl-NL" smtClean="0"/>
-              <a:t>30-11-2020</a:t>
+              <a:t>3-12-2020</a:t>
             </a:fld>
             <a:endParaRPr lang="nl-NL"/>
           </a:p>
@@ -15918,6 +15918,50 @@
           </a:p>
         </p:txBody>
       </p:sp>
+      <p:cxnSp>
+        <p:nvCxnSpPr>
+          <p:cNvPr id="21" name="Rechte verbindingslijn met pijl 20">
+            <a:extLst>
+              <a:ext uri="{FF2B5EF4-FFF2-40B4-BE49-F238E27FC236}">
+                <a16:creationId xmlns:a16="http://schemas.microsoft.com/office/drawing/2014/main" id="{02FB33FE-B497-43B3-972E-27C75E878E7A}"/>
+              </a:ext>
+            </a:extLst>
+          </p:cNvPr>
+          <p:cNvCxnSpPr>
+            <a:cxnSpLocks/>
+          </p:cNvCxnSpPr>
+          <p:nvPr/>
+        </p:nvCxnSpPr>
+        <p:spPr>
+          <a:xfrm flipH="1" flipV="1">
+            <a:off x="5433848" y="4961129"/>
+            <a:ext cx="1123486" cy="1709584"/>
+          </a:xfrm>
+          <a:prstGeom prst="straightConnector1">
+            <a:avLst/>
+          </a:prstGeom>
+          <a:ln w="57150">
+            <a:solidFill>
+              <a:srgbClr val="7030A0"/>
+            </a:solidFill>
+            <a:tailEnd type="triangle"/>
+          </a:ln>
+        </p:spPr>
+        <p:style>
+          <a:lnRef idx="3">
+            <a:schemeClr val="accent2"/>
+          </a:lnRef>
+          <a:fillRef idx="0">
+            <a:schemeClr val="accent2"/>
+          </a:fillRef>
+          <a:effectRef idx="2">
+            <a:schemeClr val="accent2"/>
+          </a:effectRef>
+          <a:fontRef idx="minor">
+            <a:schemeClr val="tx1"/>
+          </a:fontRef>
+        </p:style>
+      </p:cxnSp>
     </p:spTree>
     <p:extLst>
       <p:ext uri="{BB962C8B-B14F-4D97-AF65-F5344CB8AC3E}">
@@ -16416,6 +16460,33 @@
                                   </p:childTnLst>
                                 </p:cTn>
                               </p:par>
+                              <p:par>
+                                <p:cTn id="41" presetID="1" presetClass="entr" presetSubtype="0" fill="hold" nodeType="withEffect">
+                                  <p:stCondLst>
+                                    <p:cond delay="0"/>
+                                  </p:stCondLst>
+                                  <p:childTnLst>
+                                    <p:set>
+                                      <p:cBhvr>
+                                        <p:cTn id="42" dur="1" fill="hold">
+                                          <p:stCondLst>
+                                            <p:cond delay="0"/>
+                                          </p:stCondLst>
+                                        </p:cTn>
+                                        <p:tgtEl>
+                                          <p:spTgt spid="21"/>
+                                        </p:tgtEl>
+                                        <p:attrNameLst>
+                                          <p:attrName>style.visibility</p:attrName>
+                                        </p:attrNameLst>
+                                      </p:cBhvr>
+                                      <p:to>
+                                        <p:strVal val="visible"/>
+                                      </p:to>
+                                    </p:set>
+                                  </p:childTnLst>
+                                </p:cTn>
+                              </p:par>
                             </p:childTnLst>
                           </p:cTn>
                         </p:par>

</xml_diff>

<commit_message>
Nieuwe presentatie en kleine toevoegingen aan de voorbeelden
</commit_message>
<xml_diff>
--- a/Presentatie/Front-End Development.pptx
+++ b/Presentatie/Front-End Development.pptx
@@ -13276,7 +13276,7 @@
             <a:pPr lvl="1"/>
             <a:r>
               <a:rPr lang="nl-NL" dirty="0"/>
-              <a:t>Uniform gedrag</a:t>
+              <a:t>Generiek/autonoom/herbruikbaar gedrag</a:t>
             </a:r>
           </a:p>
           <a:p>
@@ -15272,6 +15272,266 @@
           </a:p>
         </p:txBody>
       </p:sp>
+      <p:graphicFrame>
+        <p:nvGraphicFramePr>
+          <p:cNvPr id="34" name="Tabel 14">
+            <a:extLst>
+              <a:ext uri="{FF2B5EF4-FFF2-40B4-BE49-F238E27FC236}">
+                <a16:creationId xmlns:a16="http://schemas.microsoft.com/office/drawing/2014/main" id="{A2FBA976-E253-41CC-917A-AFB21F569F71}"/>
+              </a:ext>
+            </a:extLst>
+          </p:cNvPr>
+          <p:cNvGraphicFramePr>
+            <a:graphicFrameLocks noGrp="1"/>
+          </p:cNvGraphicFramePr>
+          <p:nvPr>
+            <p:extLst>
+              <p:ext uri="{D42A27DB-BD31-4B8C-83A1-F6EECF244321}">
+                <p14:modId xmlns:p14="http://schemas.microsoft.com/office/powerpoint/2010/main" val="2277876114"/>
+              </p:ext>
+            </p:extLst>
+          </p:nvPr>
+        </p:nvGraphicFramePr>
+        <p:xfrm>
+          <a:off x="5101783" y="3734187"/>
+          <a:ext cx="2675872" cy="1674483"/>
+        </p:xfrm>
+        <a:graphic>
+          <a:graphicData uri="http://schemas.openxmlformats.org/drawingml/2006/table">
+            <a:tbl>
+              <a:tblPr firstCol="1" bandRow="1">
+                <a:tableStyleId>{5C22544A-7EE6-4342-B048-85BDC9FD1C3A}</a:tableStyleId>
+              </a:tblPr>
+              <a:tblGrid>
+                <a:gridCol w="1337936">
+                  <a:extLst>
+                    <a:ext uri="{9D8B030D-6E8A-4147-A177-3AD203B41FA5}">
+                      <a16:colId xmlns:a16="http://schemas.microsoft.com/office/drawing/2014/main" val="3986655731"/>
+                    </a:ext>
+                  </a:extLst>
+                </a:gridCol>
+                <a:gridCol w="1337936">
+                  <a:extLst>
+                    <a:ext uri="{9D8B030D-6E8A-4147-A177-3AD203B41FA5}">
+                      <a16:colId xmlns:a16="http://schemas.microsoft.com/office/drawing/2014/main" val="3668402625"/>
+                    </a:ext>
+                  </a:extLst>
+                </a:gridCol>
+              </a:tblGrid>
+              <a:tr h="302883">
+                <a:tc>
+                  <a:txBody>
+                    <a:bodyPr/>
+                    <a:lstStyle/>
+                    <a:p>
+                      <a:r>
+                        <a:rPr lang="nl-NL" sz="1200" dirty="0"/>
+                        <a:t>Naam</a:t>
+                      </a:r>
+                      <a:endParaRPr lang="en-NL" sz="1200" dirty="0"/>
+                    </a:p>
+                  </a:txBody>
+                  <a:tcPr/>
+                </a:tc>
+                <a:tc>
+                  <a:txBody>
+                    <a:bodyPr/>
+                    <a:lstStyle/>
+                    <a:p>
+                      <a:r>
+                        <a:rPr lang="nl-NL" sz="1200" dirty="0"/>
+                        <a:t>A</a:t>
+                      </a:r>
+                      <a:endParaRPr lang="en-NL" sz="1200" dirty="0"/>
+                    </a:p>
+                  </a:txBody>
+                  <a:tcPr/>
+                </a:tc>
+                <a:extLst>
+                  <a:ext uri="{0D108BD9-81ED-4DB2-BD59-A6C34878D82A}">
+                    <a16:rowId xmlns:a16="http://schemas.microsoft.com/office/drawing/2014/main" val="275937080"/>
+                  </a:ext>
+                </a:extLst>
+              </a:tr>
+              <a:tr h="245383">
+                <a:tc>
+                  <a:txBody>
+                    <a:bodyPr/>
+                    <a:lstStyle/>
+                    <a:p>
+                      <a:r>
+                        <a:rPr lang="nl-NL" sz="1200" dirty="0"/>
+                        <a:t>Geslacht</a:t>
+                      </a:r>
+                      <a:endParaRPr lang="en-NL" sz="1200" dirty="0"/>
+                    </a:p>
+                  </a:txBody>
+                  <a:tcPr/>
+                </a:tc>
+                <a:tc>
+                  <a:txBody>
+                    <a:bodyPr/>
+                    <a:lstStyle/>
+                    <a:p>
+                      <a:r>
+                        <a:rPr lang="nl-NL" sz="1200" dirty="0"/>
+                        <a:t>M</a:t>
+                      </a:r>
+                      <a:endParaRPr lang="en-NL" sz="1200" dirty="0"/>
+                    </a:p>
+                  </a:txBody>
+                  <a:tcPr/>
+                </a:tc>
+                <a:extLst>
+                  <a:ext uri="{0D108BD9-81ED-4DB2-BD59-A6C34878D82A}">
+                    <a16:rowId xmlns:a16="http://schemas.microsoft.com/office/drawing/2014/main" val="1312383594"/>
+                  </a:ext>
+                </a:extLst>
+              </a:tr>
+              <a:tr h="245383">
+                <a:tc>
+                  <a:txBody>
+                    <a:bodyPr/>
+                    <a:lstStyle/>
+                    <a:p>
+                      <a:r>
+                        <a:rPr lang="nl-NL" sz="1200" dirty="0"/>
+                        <a:t>Leeftijd</a:t>
+                      </a:r>
+                      <a:endParaRPr lang="en-NL" sz="1200" dirty="0"/>
+                    </a:p>
+                  </a:txBody>
+                  <a:tcPr/>
+                </a:tc>
+                <a:tc>
+                  <a:txBody>
+                    <a:bodyPr/>
+                    <a:lstStyle/>
+                    <a:p>
+                      <a:r>
+                        <a:rPr lang="nl-NL" sz="1200" dirty="0"/>
+                        <a:t>18</a:t>
+                      </a:r>
+                      <a:endParaRPr lang="en-NL" sz="1200" dirty="0"/>
+                    </a:p>
+                  </a:txBody>
+                  <a:tcPr/>
+                </a:tc>
+                <a:extLst>
+                  <a:ext uri="{0D108BD9-81ED-4DB2-BD59-A6C34878D82A}">
+                    <a16:rowId xmlns:a16="http://schemas.microsoft.com/office/drawing/2014/main" val="123423597"/>
+                  </a:ext>
+                </a:extLst>
+              </a:tr>
+              <a:tr h="245383">
+                <a:tc>
+                  <a:txBody>
+                    <a:bodyPr/>
+                    <a:lstStyle/>
+                    <a:p>
+                      <a:r>
+                        <a:rPr lang="nl-NL" sz="1200" dirty="0"/>
+                        <a:t>Woonplaats</a:t>
+                      </a:r>
+                      <a:endParaRPr lang="en-NL" sz="1200" dirty="0"/>
+                    </a:p>
+                  </a:txBody>
+                  <a:tcPr/>
+                </a:tc>
+                <a:tc>
+                  <a:txBody>
+                    <a:bodyPr/>
+                    <a:lstStyle/>
+                    <a:p>
+                      <a:r>
+                        <a:rPr lang="nl-NL" sz="1200" dirty="0"/>
+                        <a:t>Amsterdam</a:t>
+                      </a:r>
+                      <a:endParaRPr lang="en-NL" sz="1200" dirty="0"/>
+                    </a:p>
+                  </a:txBody>
+                  <a:tcPr/>
+                </a:tc>
+                <a:extLst>
+                  <a:ext uri="{0D108BD9-81ED-4DB2-BD59-A6C34878D82A}">
+                    <a16:rowId xmlns:a16="http://schemas.microsoft.com/office/drawing/2014/main" val="3920558840"/>
+                  </a:ext>
+                </a:extLst>
+              </a:tr>
+              <a:tr h="245383">
+                <a:tc>
+                  <a:txBody>
+                    <a:bodyPr/>
+                    <a:lstStyle/>
+                    <a:p>
+                      <a:r>
+                        <a:rPr lang="nl-NL" sz="1200" dirty="0"/>
+                        <a:t>Beroep</a:t>
+                      </a:r>
+                      <a:endParaRPr lang="en-NL" sz="1200" dirty="0"/>
+                    </a:p>
+                  </a:txBody>
+                  <a:tcPr/>
+                </a:tc>
+                <a:tc>
+                  <a:txBody>
+                    <a:bodyPr/>
+                    <a:lstStyle/>
+                    <a:p>
+                      <a:r>
+                        <a:rPr lang="nl-NL" sz="1200" dirty="0"/>
+                        <a:t>Student</a:t>
+                      </a:r>
+                      <a:endParaRPr lang="en-NL" sz="1200" dirty="0"/>
+                    </a:p>
+                  </a:txBody>
+                  <a:tcPr/>
+                </a:tc>
+                <a:extLst>
+                  <a:ext uri="{0D108BD9-81ED-4DB2-BD59-A6C34878D82A}">
+                    <a16:rowId xmlns:a16="http://schemas.microsoft.com/office/drawing/2014/main" val="2736647680"/>
+                  </a:ext>
+                </a:extLst>
+              </a:tr>
+              <a:tr h="245383">
+                <a:tc>
+                  <a:txBody>
+                    <a:bodyPr/>
+                    <a:lstStyle/>
+                    <a:p>
+                      <a:r>
+                        <a:rPr lang="nl-NL" sz="1200" dirty="0" err="1"/>
+                        <a:t>Hobbies</a:t>
+                      </a:r>
+                      <a:endParaRPr lang="en-NL" sz="1200" dirty="0"/>
+                    </a:p>
+                  </a:txBody>
+                  <a:tcPr/>
+                </a:tc>
+                <a:tc>
+                  <a:txBody>
+                    <a:bodyPr/>
+                    <a:lstStyle/>
+                    <a:p>
+                      <a:r>
+                        <a:rPr lang="nl-NL" sz="1200" dirty="0"/>
+                        <a:t>Lessen terugkijken</a:t>
+                      </a:r>
+                      <a:endParaRPr lang="en-NL" sz="1200" dirty="0"/>
+                    </a:p>
+                  </a:txBody>
+                  <a:tcPr/>
+                </a:tc>
+                <a:extLst>
+                  <a:ext uri="{0D108BD9-81ED-4DB2-BD59-A6C34878D82A}">
+                    <a16:rowId xmlns:a16="http://schemas.microsoft.com/office/drawing/2014/main" val="936127613"/>
+                  </a:ext>
+                </a:extLst>
+              </a:tr>
+            </a:tbl>
+          </a:graphicData>
+        </a:graphic>
+      </p:graphicFrame>
     </p:spTree>
     <p:extLst>
       <p:ext uri="{BB962C8B-B14F-4D97-AF65-F5344CB8AC3E}">
@@ -15316,7 +15576,7 @@
         </p:nvSpPr>
         <p:spPr>
           <a:xfrm>
-            <a:off x="13509" y="3262209"/>
+            <a:off x="13509" y="3115339"/>
             <a:ext cx="12178491" cy="735723"/>
           </a:xfrm>
           <a:prstGeom prst="rect">
@@ -15824,8 +16084,8 @@
         </p:nvCxnSpPr>
         <p:spPr>
           <a:xfrm>
-            <a:off x="4412466" y="3591600"/>
-            <a:ext cx="1163258" cy="875600"/>
+            <a:off x="4412466" y="3444730"/>
+            <a:ext cx="1163258" cy="1022470"/>
           </a:xfrm>
           <a:prstGeom prst="straightConnector1">
             <a:avLst/>
@@ -15940,7 +16200,7 @@
         </p:nvCxnSpPr>
         <p:spPr>
           <a:xfrm flipV="1">
-            <a:off x="6667720" y="3690372"/>
+            <a:off x="6667720" y="3543502"/>
             <a:ext cx="981415" cy="825520"/>
           </a:xfrm>
           <a:prstGeom prst="straightConnector1">
@@ -16374,7 +16634,7 @@
         </p:nvCxnSpPr>
         <p:spPr>
           <a:xfrm>
-            <a:off x="8902262" y="3690372"/>
+            <a:off x="8902262" y="3543502"/>
             <a:ext cx="1151968" cy="770405"/>
           </a:xfrm>
           <a:prstGeom prst="straightConnector1">
@@ -16609,14 +16869,14 @@
           <p:cNvCxnSpPr>
             <a:cxnSpLocks/>
             <a:stCxn id="10" idx="1"/>
-            <a:endCxn id="4" idx="0"/>
+            <a:endCxn id="86" idx="3"/>
           </p:cNvCxnSpPr>
           <p:nvPr/>
         </p:nvCxnSpPr>
         <p:spPr>
-          <a:xfrm>
-            <a:off x="869496" y="2706490"/>
-            <a:ext cx="0" cy="1123910"/>
+          <a:xfrm flipH="1">
+            <a:off x="849983" y="2706490"/>
+            <a:ext cx="19513" cy="441972"/>
           </a:xfrm>
           <a:prstGeom prst="straightConnector1">
             <a:avLst/>
@@ -16715,7 +16975,7 @@
         <p:spPr>
           <a:xfrm flipH="1" flipV="1">
             <a:off x="8264213" y="2661838"/>
-            <a:ext cx="11486" cy="789734"/>
+            <a:ext cx="11486" cy="642864"/>
           </a:xfrm>
           <a:prstGeom prst="straightConnector1">
             <a:avLst/>
@@ -16848,7 +17108,7 @@
         </p:nvSpPr>
         <p:spPr>
           <a:xfrm>
-            <a:off x="2640000" y="3352800"/>
+            <a:off x="2640000" y="3205930"/>
             <a:ext cx="1772466" cy="477599"/>
           </a:xfrm>
           <a:prstGeom prst="roundRect">
@@ -16914,7 +17174,7 @@
         </p:nvSpPr>
         <p:spPr>
           <a:xfrm>
-            <a:off x="7649135" y="3451572"/>
+            <a:off x="7649135" y="3304702"/>
             <a:ext cx="1253127" cy="477599"/>
           </a:xfrm>
           <a:prstGeom prst="roundRect">
@@ -17038,7 +17298,7 @@
         <p:spPr>
           <a:xfrm flipH="1">
             <a:off x="8902262" y="2693325"/>
-            <a:ext cx="1146329" cy="997047"/>
+            <a:ext cx="1146329" cy="850177"/>
           </a:xfrm>
           <a:prstGeom prst="straightConnector1">
             <a:avLst/>
@@ -17111,6 +17371,106 @@
           </a:fontRef>
         </p:style>
       </p:cxnSp>
+      <p:sp>
+        <p:nvSpPr>
+          <p:cNvPr id="86" name="Rechthoek: met één afgeschuinde hoek 85">
+            <a:extLst>
+              <a:ext uri="{FF2B5EF4-FFF2-40B4-BE49-F238E27FC236}">
+                <a16:creationId xmlns:a16="http://schemas.microsoft.com/office/drawing/2014/main" id="{4B104A96-771F-4D1F-8143-C4D264E6B69A}"/>
+              </a:ext>
+            </a:extLst>
+          </p:cNvPr>
+          <p:cNvSpPr/>
+          <p:nvPr/>
+        </p:nvSpPr>
+        <p:spPr>
+          <a:xfrm>
+            <a:off x="211934" y="3148462"/>
+            <a:ext cx="1276098" cy="384204"/>
+          </a:xfrm>
+          <a:prstGeom prst="snip1Rect">
+            <a:avLst/>
+          </a:prstGeom>
+          <a:solidFill>
+            <a:srgbClr val="00B050"/>
+          </a:solidFill>
+        </p:spPr>
+        <p:style>
+          <a:lnRef idx="2">
+            <a:schemeClr val="accent1">
+              <a:shade val="50000"/>
+            </a:schemeClr>
+          </a:lnRef>
+          <a:fillRef idx="1">
+            <a:schemeClr val="accent1"/>
+          </a:fillRef>
+          <a:effectRef idx="0">
+            <a:schemeClr val="accent1"/>
+          </a:effectRef>
+          <a:fontRef idx="minor">
+            <a:schemeClr val="lt1"/>
+          </a:fontRef>
+        </p:style>
+        <p:txBody>
+          <a:bodyPr rtlCol="0" anchor="ctr"/>
+          <a:lstStyle/>
+          <a:p>
+            <a:pPr algn="ctr"/>
+            <a:r>
+              <a:rPr lang="nl-NL" sz="1400" dirty="0"/>
+              <a:t>Haal Personen</a:t>
+            </a:r>
+            <a:endParaRPr lang="en-NL" sz="1400" dirty="0"/>
+          </a:p>
+        </p:txBody>
+      </p:sp>
+      <p:cxnSp>
+        <p:nvCxnSpPr>
+          <p:cNvPr id="88" name="Rechte verbindingslijn met pijl 87">
+            <a:extLst>
+              <a:ext uri="{FF2B5EF4-FFF2-40B4-BE49-F238E27FC236}">
+                <a16:creationId xmlns:a16="http://schemas.microsoft.com/office/drawing/2014/main" id="{75CE2ADD-0633-4BF1-AA78-42B86A90C0FD}"/>
+              </a:ext>
+            </a:extLst>
+          </p:cNvPr>
+          <p:cNvCxnSpPr>
+            <a:cxnSpLocks/>
+            <a:stCxn id="4" idx="0"/>
+            <a:endCxn id="86" idx="1"/>
+          </p:cNvCxnSpPr>
+          <p:nvPr/>
+        </p:nvCxnSpPr>
+        <p:spPr>
+          <a:xfrm flipH="1" flipV="1">
+            <a:off x="849983" y="3532666"/>
+            <a:ext cx="19513" cy="297734"/>
+          </a:xfrm>
+          <a:prstGeom prst="straightConnector1">
+            <a:avLst/>
+          </a:prstGeom>
+          <a:ln w="28575">
+            <a:solidFill>
+              <a:srgbClr val="00B050"/>
+            </a:solidFill>
+            <a:headEnd type="triangle" w="med" len="med"/>
+            <a:tailEnd type="triangle" w="med" len="med"/>
+          </a:ln>
+        </p:spPr>
+        <p:style>
+          <a:lnRef idx="1">
+            <a:schemeClr val="accent5"/>
+          </a:lnRef>
+          <a:fillRef idx="0">
+            <a:schemeClr val="accent5"/>
+          </a:fillRef>
+          <a:effectRef idx="0">
+            <a:schemeClr val="accent5"/>
+          </a:effectRef>
+          <a:fontRef idx="minor">
+            <a:schemeClr val="tx1"/>
+          </a:fontRef>
+        </p:style>
+      </p:cxnSp>
     </p:spTree>
     <p:extLst>
       <p:ext uri="{BB962C8B-B14F-4D97-AF65-F5344CB8AC3E}">
@@ -17439,8 +17799,29 @@
               <a:rPr lang="nl-NL" dirty="0">
                 <a:sym typeface="Wingdings" panose="05000000000000000000" pitchFamily="2" charset="2"/>
               </a:rPr>
-              <a:t>-tekst door browser opgebouwd</a:t>
-            </a:r>
+              <a:t>-tekst door browser opgebouwd (</a:t>
+            </a:r>
+            <a:r>
+              <a:rPr lang="nl-NL" dirty="0" err="1">
+                <a:sym typeface="Wingdings" panose="05000000000000000000" pitchFamily="2" charset="2"/>
+              </a:rPr>
+              <a:t>Scalable</a:t>
+            </a:r>
+            <a:r>
+              <a:rPr lang="nl-NL" dirty="0">
+                <a:sym typeface="Wingdings" panose="05000000000000000000" pitchFamily="2" charset="2"/>
+              </a:rPr>
+              <a:t> </a:t>
+            </a:r>
+            <a:r>
+              <a:rPr lang="nl-NL">
+                <a:sym typeface="Wingdings" panose="05000000000000000000" pitchFamily="2" charset="2"/>
+              </a:rPr>
+              <a:t>Vector Graphics)</a:t>
+            </a:r>
+            <a:endParaRPr lang="nl-NL" dirty="0">
+              <a:sym typeface="Wingdings" panose="05000000000000000000" pitchFamily="2" charset="2"/>
+            </a:endParaRPr>
           </a:p>
           <a:p>
             <a:r>

</xml_diff>

<commit_message>
Bijgewerkte presentatie en kleine aanpassingen in code
</commit_message>
<xml_diff>
--- a/Presentatie/Front-End Development.pptx
+++ b/Presentatie/Front-End Development.pptx
@@ -5,7 +5,7 @@
     <p:sldMasterId id="2147483660" r:id="rId1"/>
   </p:sldMasterIdLst>
   <p:notesMasterIdLst>
-    <p:notesMasterId r:id="rId50"/>
+    <p:notesMasterId r:id="rId52"/>
   </p:notesMasterIdLst>
   <p:sldIdLst>
     <p:sldId id="256" r:id="rId2"/>
@@ -52,10 +52,12 @@
     <p:sldId id="306" r:id="rId43"/>
     <p:sldId id="307" r:id="rId44"/>
     <p:sldId id="308" r:id="rId45"/>
-    <p:sldId id="299" r:id="rId46"/>
-    <p:sldId id="266" r:id="rId47"/>
-    <p:sldId id="268" r:id="rId48"/>
-    <p:sldId id="269" r:id="rId49"/>
+    <p:sldId id="310" r:id="rId46"/>
+    <p:sldId id="309" r:id="rId47"/>
+    <p:sldId id="299" r:id="rId48"/>
+    <p:sldId id="266" r:id="rId49"/>
+    <p:sldId id="268" r:id="rId50"/>
+    <p:sldId id="269" r:id="rId51"/>
   </p:sldIdLst>
   <p:sldSz cx="12192000" cy="6858000"/>
   <p:notesSz cx="6858000" cy="9144000"/>
@@ -207,6 +209,8 @@
             <p14:sldId id="306"/>
             <p14:sldId id="307"/>
             <p14:sldId id="308"/>
+            <p14:sldId id="310"/>
+            <p14:sldId id="309"/>
             <p14:sldId id="299"/>
             <p14:sldId id="266"/>
             <p14:sldId id="268"/>
@@ -304,7 +308,7 @@
           <a:p>
             <a:fld id="{C5A381E3-FA85-4AE8-9B11-999D5E05561D}" type="datetimeFigureOut">
               <a:rPr lang="nl-NL" smtClean="0"/>
-              <a:t>7-12-2020</a:t>
+              <a:t>14-12-2020</a:t>
             </a:fld>
             <a:endParaRPr lang="nl-NL"/>
           </a:p>
@@ -1440,6 +1444,90 @@
     <p:extLst>
       <p:ext uri="{BB962C8B-B14F-4D97-AF65-F5344CB8AC3E}">
         <p14:creationId xmlns:p14="http://schemas.microsoft.com/office/powerpoint/2010/main" val="4282219109"/>
+      </p:ext>
+    </p:extLst>
+  </p:cSld>
+  <p:clrMapOvr>
+    <a:masterClrMapping/>
+  </p:clrMapOvr>
+</p:notes>
+</file>
+
+<file path=ppt/notesSlides/notesSlide19.xml><?xml version="1.0" encoding="utf-8"?>
+<p:notes xmlns:a="http://schemas.openxmlformats.org/drawingml/2006/main" xmlns:r="http://schemas.openxmlformats.org/officeDocument/2006/relationships" xmlns:p="http://schemas.openxmlformats.org/presentationml/2006/main">
+  <p:cSld>
+    <p:spTree>
+      <p:nvGrpSpPr>
+        <p:cNvPr id="1" name=""/>
+        <p:cNvGrpSpPr/>
+        <p:nvPr/>
+      </p:nvGrpSpPr>
+      <p:grpSpPr>
+        <a:xfrm>
+          <a:off x="0" y="0"/>
+          <a:ext cx="0" cy="0"/>
+          <a:chOff x="0" y="0"/>
+          <a:chExt cx="0" cy="0"/>
+        </a:xfrm>
+      </p:grpSpPr>
+      <p:sp>
+        <p:nvSpPr>
+          <p:cNvPr id="2" name="Tijdelijke aanduiding voor dia-afbeelding 1"/>
+          <p:cNvSpPr>
+            <a:spLocks noGrp="1" noRot="1" noChangeAspect="1"/>
+          </p:cNvSpPr>
+          <p:nvPr>
+            <p:ph type="sldImg"/>
+          </p:nvPr>
+        </p:nvSpPr>
+        <p:spPr/>
+      </p:sp>
+      <p:sp>
+        <p:nvSpPr>
+          <p:cNvPr id="3" name="Tijdelijke aanduiding voor notities 2"/>
+          <p:cNvSpPr>
+            <a:spLocks noGrp="1"/>
+          </p:cNvSpPr>
+          <p:nvPr>
+            <p:ph type="body" idx="1"/>
+          </p:nvPr>
+        </p:nvSpPr>
+        <p:spPr/>
+        <p:txBody>
+          <a:bodyPr/>
+          <a:lstStyle/>
+          <a:p>
+            <a:endParaRPr lang="en-NL" dirty="0"/>
+          </a:p>
+        </p:txBody>
+      </p:sp>
+      <p:sp>
+        <p:nvSpPr>
+          <p:cNvPr id="4" name="Tijdelijke aanduiding voor dianummer 3"/>
+          <p:cNvSpPr>
+            <a:spLocks noGrp="1"/>
+          </p:cNvSpPr>
+          <p:nvPr>
+            <p:ph type="sldNum" sz="quarter" idx="5"/>
+          </p:nvPr>
+        </p:nvSpPr>
+        <p:spPr/>
+        <p:txBody>
+          <a:bodyPr/>
+          <a:lstStyle/>
+          <a:p>
+            <a:fld id="{A9AC6ED0-D734-4939-9338-F1A2206B4A78}" type="slidenum">
+              <a:rPr lang="nl-NL" smtClean="0"/>
+              <a:t>45</a:t>
+            </a:fld>
+            <a:endParaRPr lang="nl-NL"/>
+          </a:p>
+        </p:txBody>
+      </p:sp>
+    </p:spTree>
+    <p:extLst>
+      <p:ext uri="{BB962C8B-B14F-4D97-AF65-F5344CB8AC3E}">
+        <p14:creationId xmlns:p14="http://schemas.microsoft.com/office/powerpoint/2010/main" val="2254169371"/>
       </p:ext>
     </p:extLst>
   </p:cSld>
@@ -15532,6 +15620,62 @@
           </a:graphicData>
         </a:graphic>
       </p:graphicFrame>
+      <p:sp>
+        <p:nvSpPr>
+          <p:cNvPr id="3" name="Rechthoek: afgeronde hoeken 2">
+            <a:extLst>
+              <a:ext uri="{FF2B5EF4-FFF2-40B4-BE49-F238E27FC236}">
+                <a16:creationId xmlns:a16="http://schemas.microsoft.com/office/drawing/2014/main" id="{C80CE034-527B-4949-89B6-FA5C939A58EB}"/>
+              </a:ext>
+            </a:extLst>
+          </p:cNvPr>
+          <p:cNvSpPr/>
+          <p:nvPr/>
+        </p:nvSpPr>
+        <p:spPr>
+          <a:xfrm>
+            <a:off x="6015789" y="3315060"/>
+            <a:ext cx="885525" cy="252124"/>
+          </a:xfrm>
+          <a:prstGeom prst="roundRect">
+            <a:avLst/>
+          </a:prstGeom>
+          <a:solidFill>
+            <a:schemeClr val="tx1">
+              <a:lumMod val="50000"/>
+              <a:lumOff val="50000"/>
+            </a:schemeClr>
+          </a:solidFill>
+        </p:spPr>
+        <p:style>
+          <a:lnRef idx="2">
+            <a:schemeClr val="accent1">
+              <a:shade val="50000"/>
+            </a:schemeClr>
+          </a:lnRef>
+          <a:fillRef idx="1">
+            <a:schemeClr val="accent1"/>
+          </a:fillRef>
+          <a:effectRef idx="0">
+            <a:schemeClr val="accent1"/>
+          </a:effectRef>
+          <a:fontRef idx="minor">
+            <a:schemeClr val="lt1"/>
+          </a:fontRef>
+        </p:style>
+        <p:txBody>
+          <a:bodyPr rtlCol="0" anchor="ctr"/>
+          <a:lstStyle/>
+          <a:p>
+            <a:pPr algn="ctr"/>
+            <a:r>
+              <a:rPr lang="nl-NL" dirty="0" err="1"/>
+              <a:t>Edit</a:t>
+            </a:r>
+            <a:endParaRPr lang="en-NL" dirty="0"/>
+          </a:p>
+        </p:txBody>
+      </p:sp>
     </p:spTree>
     <p:extLst>
       <p:ext uri="{BB962C8B-B14F-4D97-AF65-F5344CB8AC3E}">
@@ -15828,7 +15972,7 @@
           <p:nvPr>
             <p:extLst>
               <p:ext uri="{D42A27DB-BD31-4B8C-83A1-F6EECF244321}">
-                <p14:modId xmlns:p14="http://schemas.microsoft.com/office/powerpoint/2010/main" val="2066974470"/>
+                <p14:modId xmlns:p14="http://schemas.microsoft.com/office/powerpoint/2010/main" val="3615855930"/>
               </p:ext>
             </p:extLst>
           </p:nvPr>
@@ -15950,10 +16094,10 @@
                     <a:lstStyle/>
                     <a:p>
                       <a:r>
-                        <a:rPr lang="nl-NL" dirty="0"/>
+                        <a:rPr lang="nl-NL" b="1" dirty="0"/>
                         <a:t>18</a:t>
                       </a:r>
-                      <a:endParaRPr lang="en-NL" dirty="0"/>
+                      <a:endParaRPr lang="en-NL" b="1" dirty="0"/>
                     </a:p>
                   </a:txBody>
                   <a:tcPr/>
@@ -16239,7 +16383,7 @@
         </p:nvSpPr>
         <p:spPr>
           <a:xfrm>
-            <a:off x="7286021" y="4192724"/>
+            <a:off x="7071398" y="3950812"/>
             <a:ext cx="1369390" cy="646331"/>
           </a:xfrm>
           <a:prstGeom prst="rect">
@@ -16338,7 +16482,7 @@
           <p:nvPr>
             <p:extLst>
               <p:ext uri="{D42A27DB-BD31-4B8C-83A1-F6EECF244321}">
-                <p14:modId xmlns:p14="http://schemas.microsoft.com/office/powerpoint/2010/main" val="3272294023"/>
+                <p14:modId xmlns:p14="http://schemas.microsoft.com/office/powerpoint/2010/main" val="2300707921"/>
               </p:ext>
             </p:extLst>
           </p:nvPr>
@@ -16460,10 +16604,10 @@
                     <a:lstStyle/>
                     <a:p>
                       <a:r>
-                        <a:rPr lang="nl-NL" dirty="0"/>
+                        <a:rPr lang="nl-NL" b="1" dirty="0"/>
                         <a:t>33</a:t>
                       </a:r>
-                      <a:endParaRPr lang="en-NL" dirty="0"/>
+                      <a:endParaRPr lang="en-NL" b="1" dirty="0"/>
                     </a:p>
                   </a:txBody>
                   <a:tcPr/>
@@ -17471,6 +17615,272 @@
           </a:fontRef>
         </p:style>
       </p:cxnSp>
+      <p:graphicFrame>
+        <p:nvGraphicFramePr>
+          <p:cNvPr id="34" name="Tabel 14">
+            <a:extLst>
+              <a:ext uri="{FF2B5EF4-FFF2-40B4-BE49-F238E27FC236}">
+                <a16:creationId xmlns:a16="http://schemas.microsoft.com/office/drawing/2014/main" id="{DF5EDE3E-2016-4811-B510-3E140158FDBA}"/>
+              </a:ext>
+            </a:extLst>
+          </p:cNvPr>
+          <p:cNvGraphicFramePr>
+            <a:graphicFrameLocks noGrp="1"/>
+          </p:cNvGraphicFramePr>
+          <p:nvPr>
+            <p:extLst>
+              <p:ext uri="{D42A27DB-BD31-4B8C-83A1-F6EECF244321}">
+                <p14:modId xmlns:p14="http://schemas.microsoft.com/office/powerpoint/2010/main" val="944972102"/>
+              </p:ext>
+            </p:extLst>
+          </p:nvPr>
+        </p:nvGraphicFramePr>
+        <p:xfrm>
+          <a:off x="5019111" y="5101472"/>
+          <a:ext cx="2858814" cy="1645920"/>
+        </p:xfrm>
+        <a:graphic>
+          <a:graphicData uri="http://schemas.openxmlformats.org/drawingml/2006/table">
+            <a:tbl>
+              <a:tblPr firstCol="1" bandRow="1">
+                <a:tableStyleId>{5C22544A-7EE6-4342-B048-85BDC9FD1C3A}</a:tableStyleId>
+              </a:tblPr>
+              <a:tblGrid>
+                <a:gridCol w="1429407">
+                  <a:extLst>
+                    <a:ext uri="{9D8B030D-6E8A-4147-A177-3AD203B41FA5}">
+                      <a16:colId xmlns:a16="http://schemas.microsoft.com/office/drawing/2014/main" val="3986655731"/>
+                    </a:ext>
+                  </a:extLst>
+                </a:gridCol>
+                <a:gridCol w="1429407">
+                  <a:extLst>
+                    <a:ext uri="{9D8B030D-6E8A-4147-A177-3AD203B41FA5}">
+                      <a16:colId xmlns:a16="http://schemas.microsoft.com/office/drawing/2014/main" val="3668402625"/>
+                    </a:ext>
+                  </a:extLst>
+                </a:gridCol>
+              </a:tblGrid>
+              <a:tr h="247640">
+                <a:tc>
+                  <a:txBody>
+                    <a:bodyPr/>
+                    <a:lstStyle/>
+                    <a:p>
+                      <a:r>
+                        <a:rPr lang="nl-NL" sz="1200" dirty="0"/>
+                        <a:t>Naam</a:t>
+                      </a:r>
+                      <a:endParaRPr lang="en-NL" sz="1200" dirty="0"/>
+                    </a:p>
+                  </a:txBody>
+                  <a:tcPr/>
+                </a:tc>
+                <a:tc>
+                  <a:txBody>
+                    <a:bodyPr/>
+                    <a:lstStyle/>
+                    <a:p>
+                      <a:r>
+                        <a:rPr lang="nl-NL" sz="1200" dirty="0"/>
+                        <a:t>A</a:t>
+                      </a:r>
+                      <a:endParaRPr lang="en-NL" sz="1200" dirty="0"/>
+                    </a:p>
+                  </a:txBody>
+                  <a:tcPr/>
+                </a:tc>
+                <a:extLst>
+                  <a:ext uri="{0D108BD9-81ED-4DB2-BD59-A6C34878D82A}">
+                    <a16:rowId xmlns:a16="http://schemas.microsoft.com/office/drawing/2014/main" val="275937080"/>
+                  </a:ext>
+                </a:extLst>
+              </a:tr>
+              <a:tr h="247640">
+                <a:tc>
+                  <a:txBody>
+                    <a:bodyPr/>
+                    <a:lstStyle/>
+                    <a:p>
+                      <a:r>
+                        <a:rPr lang="nl-NL" sz="1200" dirty="0"/>
+                        <a:t>Geslacht</a:t>
+                      </a:r>
+                      <a:endParaRPr lang="en-NL" sz="1200" dirty="0"/>
+                    </a:p>
+                  </a:txBody>
+                  <a:tcPr/>
+                </a:tc>
+                <a:tc>
+                  <a:txBody>
+                    <a:bodyPr/>
+                    <a:lstStyle/>
+                    <a:p>
+                      <a:r>
+                        <a:rPr lang="nl-NL" sz="1200" dirty="0"/>
+                        <a:t>M</a:t>
+                      </a:r>
+                      <a:endParaRPr lang="en-NL" sz="1200" dirty="0"/>
+                    </a:p>
+                  </a:txBody>
+                  <a:tcPr/>
+                </a:tc>
+                <a:extLst>
+                  <a:ext uri="{0D108BD9-81ED-4DB2-BD59-A6C34878D82A}">
+                    <a16:rowId xmlns:a16="http://schemas.microsoft.com/office/drawing/2014/main" val="1312383594"/>
+                  </a:ext>
+                </a:extLst>
+              </a:tr>
+              <a:tr h="247640">
+                <a:tc>
+                  <a:txBody>
+                    <a:bodyPr/>
+                    <a:lstStyle/>
+                    <a:p>
+                      <a:r>
+                        <a:rPr lang="nl-NL" sz="1200" dirty="0"/>
+                        <a:t>Leeftijd</a:t>
+                      </a:r>
+                      <a:endParaRPr lang="en-NL" sz="1200" dirty="0"/>
+                    </a:p>
+                  </a:txBody>
+                  <a:tcPr/>
+                </a:tc>
+                <a:tc>
+                  <a:txBody>
+                    <a:bodyPr/>
+                    <a:lstStyle/>
+                    <a:p>
+                      <a:r>
+                        <a:rPr lang="nl-NL" sz="1200" dirty="0"/>
+                        <a:t>18 </a:t>
+                      </a:r>
+                      <a:r>
+                        <a:rPr lang="nl-NL" sz="1200" dirty="0">
+                          <a:sym typeface="Wingdings" panose="05000000000000000000" pitchFamily="2" charset="2"/>
+                        </a:rPr>
+                        <a:t> 33</a:t>
+                      </a:r>
+                      <a:endParaRPr lang="en-NL" sz="1200" dirty="0"/>
+                    </a:p>
+                  </a:txBody>
+                  <a:tcPr/>
+                </a:tc>
+                <a:extLst>
+                  <a:ext uri="{0D108BD9-81ED-4DB2-BD59-A6C34878D82A}">
+                    <a16:rowId xmlns:a16="http://schemas.microsoft.com/office/drawing/2014/main" val="123423597"/>
+                  </a:ext>
+                </a:extLst>
+              </a:tr>
+              <a:tr h="247640">
+                <a:tc>
+                  <a:txBody>
+                    <a:bodyPr/>
+                    <a:lstStyle/>
+                    <a:p>
+                      <a:r>
+                        <a:rPr lang="nl-NL" sz="1200" dirty="0"/>
+                        <a:t>Woonplaats</a:t>
+                      </a:r>
+                      <a:endParaRPr lang="en-NL" sz="1200" dirty="0"/>
+                    </a:p>
+                  </a:txBody>
+                  <a:tcPr/>
+                </a:tc>
+                <a:tc>
+                  <a:txBody>
+                    <a:bodyPr/>
+                    <a:lstStyle/>
+                    <a:p>
+                      <a:r>
+                        <a:rPr lang="nl-NL" sz="1200" dirty="0" err="1"/>
+                        <a:t>Ljouwert</a:t>
+                      </a:r>
+                      <a:endParaRPr lang="en-NL" sz="1200" dirty="0"/>
+                    </a:p>
+                  </a:txBody>
+                  <a:tcPr/>
+                </a:tc>
+                <a:extLst>
+                  <a:ext uri="{0D108BD9-81ED-4DB2-BD59-A6C34878D82A}">
+                    <a16:rowId xmlns:a16="http://schemas.microsoft.com/office/drawing/2014/main" val="3920558840"/>
+                  </a:ext>
+                </a:extLst>
+              </a:tr>
+              <a:tr h="247640">
+                <a:tc>
+                  <a:txBody>
+                    <a:bodyPr/>
+                    <a:lstStyle/>
+                    <a:p>
+                      <a:r>
+                        <a:rPr lang="nl-NL" sz="1200" dirty="0"/>
+                        <a:t>Beroep</a:t>
+                      </a:r>
+                      <a:endParaRPr lang="en-NL" sz="1200" dirty="0"/>
+                    </a:p>
+                  </a:txBody>
+                  <a:tcPr/>
+                </a:tc>
+                <a:tc>
+                  <a:txBody>
+                    <a:bodyPr/>
+                    <a:lstStyle/>
+                    <a:p>
+                      <a:r>
+                        <a:rPr lang="nl-NL" sz="1200" dirty="0"/>
+                        <a:t>Docent</a:t>
+                      </a:r>
+                      <a:endParaRPr lang="en-NL" sz="1200" dirty="0"/>
+                    </a:p>
+                  </a:txBody>
+                  <a:tcPr/>
+                </a:tc>
+                <a:extLst>
+                  <a:ext uri="{0D108BD9-81ED-4DB2-BD59-A6C34878D82A}">
+                    <a16:rowId xmlns:a16="http://schemas.microsoft.com/office/drawing/2014/main" val="2736647680"/>
+                  </a:ext>
+                </a:extLst>
+              </a:tr>
+              <a:tr h="247640">
+                <a:tc>
+                  <a:txBody>
+                    <a:bodyPr/>
+                    <a:lstStyle/>
+                    <a:p>
+                      <a:r>
+                        <a:rPr lang="nl-NL" sz="1200" dirty="0" err="1"/>
+                        <a:t>Hobbies</a:t>
+                      </a:r>
+                      <a:endParaRPr lang="en-NL" sz="1200" dirty="0"/>
+                    </a:p>
+                  </a:txBody>
+                  <a:tcPr/>
+                </a:tc>
+                <a:tc>
+                  <a:txBody>
+                    <a:bodyPr/>
+                    <a:lstStyle/>
+                    <a:p>
+                      <a:r>
+                        <a:rPr lang="nl-NL" sz="1200" dirty="0"/>
+                        <a:t>Vissen</a:t>
+                      </a:r>
+                      <a:endParaRPr lang="en-NL" sz="1200" dirty="0"/>
+                    </a:p>
+                  </a:txBody>
+                  <a:tcPr/>
+                </a:tc>
+                <a:extLst>
+                  <a:ext uri="{0D108BD9-81ED-4DB2-BD59-A6C34878D82A}">
+                    <a16:rowId xmlns:a16="http://schemas.microsoft.com/office/drawing/2014/main" val="936127613"/>
+                  </a:ext>
+                </a:extLst>
+              </a:tr>
+            </a:tbl>
+          </a:graphicData>
+        </a:graphic>
+      </p:graphicFrame>
     </p:spTree>
     <p:extLst>
       <p:ext uri="{BB962C8B-B14F-4D97-AF65-F5344CB8AC3E}">
@@ -17503,10 +17913,10 @@
       </p:grpSpPr>
       <p:sp>
         <p:nvSpPr>
-          <p:cNvPr id="4" name="Titel 3">
+          <p:cNvPr id="2" name="Titel 1">
             <a:extLst>
               <a:ext uri="{FF2B5EF4-FFF2-40B4-BE49-F238E27FC236}">
-                <a16:creationId xmlns:a16="http://schemas.microsoft.com/office/drawing/2014/main" id="{4D66C7DA-73D5-4F2F-B307-6A06B54EF2D8}"/>
+                <a16:creationId xmlns:a16="http://schemas.microsoft.com/office/drawing/2014/main" id="{E0616725-AF47-4768-8061-1CA3292E79E4}"/>
               </a:ext>
             </a:extLst>
           </p:cNvPr>
@@ -17523,12 +17933,766 @@
           <a:lstStyle/>
           <a:p>
             <a:r>
+              <a:rPr lang="nl-NL" dirty="0"/>
+              <a:t>Variant 3: Master - Detail</a:t>
+            </a:r>
+            <a:endParaRPr lang="en-NL" dirty="0"/>
+          </a:p>
+        </p:txBody>
+      </p:sp>
+      <p:sp>
+        <p:nvSpPr>
+          <p:cNvPr id="4" name="Rechthoek 3">
+            <a:extLst>
+              <a:ext uri="{FF2B5EF4-FFF2-40B4-BE49-F238E27FC236}">
+                <a16:creationId xmlns:a16="http://schemas.microsoft.com/office/drawing/2014/main" id="{396FDBDB-4863-48C0-B72A-8509B4A5087D}"/>
+              </a:ext>
+            </a:extLst>
+          </p:cNvPr>
+          <p:cNvSpPr/>
+          <p:nvPr/>
+        </p:nvSpPr>
+        <p:spPr>
+          <a:xfrm>
+            <a:off x="1072055" y="2313053"/>
+            <a:ext cx="1567946" cy="1273602"/>
+          </a:xfrm>
+          <a:prstGeom prst="rect">
+            <a:avLst/>
+          </a:prstGeom>
+          <a:solidFill>
+            <a:srgbClr val="FFC000"/>
+          </a:solidFill>
+        </p:spPr>
+        <p:style>
+          <a:lnRef idx="2">
+            <a:schemeClr val="accent1">
+              <a:shade val="50000"/>
+            </a:schemeClr>
+          </a:lnRef>
+          <a:fillRef idx="1">
+            <a:schemeClr val="accent1"/>
+          </a:fillRef>
+          <a:effectRef idx="0">
+            <a:schemeClr val="accent1"/>
+          </a:effectRef>
+          <a:fontRef idx="minor">
+            <a:schemeClr val="lt1"/>
+          </a:fontRef>
+        </p:style>
+        <p:txBody>
+          <a:bodyPr rtlCol="0" anchor="ctr"/>
+          <a:lstStyle/>
+          <a:p>
+            <a:pPr algn="ctr"/>
+            <a:r>
+              <a:rPr lang="nl-NL" dirty="0">
+                <a:solidFill>
+                  <a:schemeClr val="tx1"/>
+                </a:solidFill>
+              </a:rPr>
+              <a:t>A</a:t>
+            </a:r>
+            <a:endParaRPr lang="en-NL" dirty="0">
+              <a:solidFill>
+                <a:schemeClr val="tx1"/>
+              </a:solidFill>
+            </a:endParaRPr>
+          </a:p>
+        </p:txBody>
+      </p:sp>
+      <p:sp>
+        <p:nvSpPr>
+          <p:cNvPr id="5" name="Rechthoek 4">
+            <a:extLst>
+              <a:ext uri="{FF2B5EF4-FFF2-40B4-BE49-F238E27FC236}">
+                <a16:creationId xmlns:a16="http://schemas.microsoft.com/office/drawing/2014/main" id="{5D635598-D887-488A-AB8B-CE61D5ED59D6}"/>
+              </a:ext>
+            </a:extLst>
+          </p:cNvPr>
+          <p:cNvSpPr/>
+          <p:nvPr/>
+        </p:nvSpPr>
+        <p:spPr>
+          <a:xfrm>
+            <a:off x="6668815" y="2313053"/>
+            <a:ext cx="1567946" cy="1273602"/>
+          </a:xfrm>
+          <a:prstGeom prst="rect">
+            <a:avLst/>
+          </a:prstGeom>
+          <a:solidFill>
+            <a:srgbClr val="FFC000"/>
+          </a:solidFill>
+        </p:spPr>
+        <p:style>
+          <a:lnRef idx="2">
+            <a:schemeClr val="accent1">
+              <a:shade val="50000"/>
+            </a:schemeClr>
+          </a:lnRef>
+          <a:fillRef idx="1">
+            <a:schemeClr val="accent1"/>
+          </a:fillRef>
+          <a:effectRef idx="0">
+            <a:schemeClr val="accent1"/>
+          </a:effectRef>
+          <a:fontRef idx="minor">
+            <a:schemeClr val="lt1"/>
+          </a:fontRef>
+        </p:style>
+        <p:txBody>
+          <a:bodyPr rtlCol="0" anchor="ctr"/>
+          <a:lstStyle/>
+          <a:p>
+            <a:pPr algn="ctr"/>
+            <a:r>
+              <a:rPr lang="nl-NL" dirty="0">
+                <a:solidFill>
+                  <a:schemeClr val="tx1"/>
+                </a:solidFill>
+              </a:rPr>
+              <a:t>B</a:t>
+            </a:r>
+            <a:endParaRPr lang="en-NL" dirty="0">
+              <a:solidFill>
+                <a:schemeClr val="tx1"/>
+              </a:solidFill>
+            </a:endParaRPr>
+          </a:p>
+        </p:txBody>
+      </p:sp>
+      <p:cxnSp>
+        <p:nvCxnSpPr>
+          <p:cNvPr id="8" name="Rechte verbindingslijn met pijl 7">
+            <a:extLst>
+              <a:ext uri="{FF2B5EF4-FFF2-40B4-BE49-F238E27FC236}">
+                <a16:creationId xmlns:a16="http://schemas.microsoft.com/office/drawing/2014/main" id="{758D62BC-7D60-4C57-9399-EEA7DEB9EBB7}"/>
+              </a:ext>
+            </a:extLst>
+          </p:cNvPr>
+          <p:cNvCxnSpPr>
+            <a:cxnSpLocks/>
+            <a:stCxn id="4" idx="3"/>
+            <a:endCxn id="5" idx="1"/>
+          </p:cNvCxnSpPr>
+          <p:nvPr/>
+        </p:nvCxnSpPr>
+        <p:spPr>
+          <a:xfrm>
+            <a:off x="2640001" y="2949854"/>
+            <a:ext cx="4028814" cy="0"/>
+          </a:xfrm>
+          <a:prstGeom prst="straightConnector1">
+            <a:avLst/>
+          </a:prstGeom>
+          <a:ln w="76200">
+            <a:tailEnd type="triangle"/>
+          </a:ln>
+        </p:spPr>
+        <p:style>
+          <a:lnRef idx="1">
+            <a:schemeClr val="accent5"/>
+          </a:lnRef>
+          <a:fillRef idx="0">
+            <a:schemeClr val="accent5"/>
+          </a:fillRef>
+          <a:effectRef idx="0">
+            <a:schemeClr val="accent5"/>
+          </a:effectRef>
+          <a:fontRef idx="minor">
+            <a:schemeClr val="tx1"/>
+          </a:fontRef>
+        </p:style>
+      </p:cxnSp>
+      <p:sp>
+        <p:nvSpPr>
+          <p:cNvPr id="11" name="Tekstvak 10">
+            <a:extLst>
+              <a:ext uri="{FF2B5EF4-FFF2-40B4-BE49-F238E27FC236}">
+                <a16:creationId xmlns:a16="http://schemas.microsoft.com/office/drawing/2014/main" id="{3A6F54EC-98B5-4D36-8732-9F22C7F9F692}"/>
+              </a:ext>
+            </a:extLst>
+          </p:cNvPr>
+          <p:cNvSpPr txBox="1"/>
+          <p:nvPr/>
+        </p:nvSpPr>
+        <p:spPr>
+          <a:xfrm>
+            <a:off x="4099034" y="2469931"/>
+            <a:ext cx="1123256" cy="369332"/>
+          </a:xfrm>
+          <a:prstGeom prst="rect">
+            <a:avLst/>
+          </a:prstGeom>
+          <a:noFill/>
+        </p:spPr>
+        <p:txBody>
+          <a:bodyPr wrap="none" rtlCol="0">
+            <a:spAutoFit/>
+          </a:bodyPr>
+          <a:lstStyle/>
+          <a:p>
+            <a:r>
+              <a:rPr lang="nl-NL" dirty="0"/>
+              <a:t>1 persoon</a:t>
+            </a:r>
+            <a:endParaRPr lang="en-NL" dirty="0"/>
+          </a:p>
+        </p:txBody>
+      </p:sp>
+      <p:graphicFrame>
+        <p:nvGraphicFramePr>
+          <p:cNvPr id="13" name="Tabel 13">
+            <a:extLst>
+              <a:ext uri="{FF2B5EF4-FFF2-40B4-BE49-F238E27FC236}">
+                <a16:creationId xmlns:a16="http://schemas.microsoft.com/office/drawing/2014/main" id="{4A38CF11-DC9C-489E-9428-9E23BF56BCF4}"/>
+              </a:ext>
+            </a:extLst>
+          </p:cNvPr>
+          <p:cNvGraphicFramePr>
+            <a:graphicFrameLocks noGrp="1"/>
+          </p:cNvGraphicFramePr>
+          <p:nvPr/>
+        </p:nvGraphicFramePr>
+        <p:xfrm>
+          <a:off x="426621" y="3697246"/>
+          <a:ext cx="2858814" cy="2549048"/>
+        </p:xfrm>
+        <a:graphic>
+          <a:graphicData uri="http://schemas.openxmlformats.org/drawingml/2006/table">
+            <a:tbl>
+              <a:tblPr firstRow="1" bandRow="1">
+                <a:tableStyleId>{5C22544A-7EE6-4342-B048-85BDC9FD1C3A}</a:tableStyleId>
+              </a:tblPr>
+              <a:tblGrid>
+                <a:gridCol w="781970">
+                  <a:extLst>
+                    <a:ext uri="{9D8B030D-6E8A-4147-A177-3AD203B41FA5}">
+                      <a16:colId xmlns:a16="http://schemas.microsoft.com/office/drawing/2014/main" val="3588310536"/>
+                    </a:ext>
+                  </a:extLst>
+                </a:gridCol>
+                <a:gridCol w="1046830">
+                  <a:extLst>
+                    <a:ext uri="{9D8B030D-6E8A-4147-A177-3AD203B41FA5}">
+                      <a16:colId xmlns:a16="http://schemas.microsoft.com/office/drawing/2014/main" val="1088805520"/>
+                    </a:ext>
+                  </a:extLst>
+                </a:gridCol>
+                <a:gridCol w="1030014">
+                  <a:extLst>
+                    <a:ext uri="{9D8B030D-6E8A-4147-A177-3AD203B41FA5}">
+                      <a16:colId xmlns:a16="http://schemas.microsoft.com/office/drawing/2014/main" val="3455484703"/>
+                    </a:ext>
+                  </a:extLst>
+                </a:gridCol>
+              </a:tblGrid>
+              <a:tr h="637262">
+                <a:tc>
+                  <a:txBody>
+                    <a:bodyPr/>
+                    <a:lstStyle/>
+                    <a:p>
+                      <a:r>
+                        <a:rPr lang="nl-NL" dirty="0"/>
+                        <a:t>Naam</a:t>
+                      </a:r>
+                      <a:endParaRPr lang="en-NL" dirty="0"/>
+                    </a:p>
+                  </a:txBody>
+                  <a:tcPr/>
+                </a:tc>
+                <a:tc>
+                  <a:txBody>
+                    <a:bodyPr/>
+                    <a:lstStyle/>
+                    <a:p>
+                      <a:r>
+                        <a:rPr lang="nl-NL" dirty="0"/>
+                        <a:t>Geslacht</a:t>
+                      </a:r>
+                      <a:endParaRPr lang="en-NL" dirty="0"/>
+                    </a:p>
+                  </a:txBody>
+                  <a:tcPr/>
+                </a:tc>
+                <a:tc>
+                  <a:txBody>
+                    <a:bodyPr/>
+                    <a:lstStyle/>
+                    <a:p>
+                      <a:r>
+                        <a:rPr lang="nl-NL" dirty="0"/>
+                        <a:t>Leeftijd</a:t>
+                      </a:r>
+                      <a:endParaRPr lang="en-NL" dirty="0"/>
+                    </a:p>
+                  </a:txBody>
+                  <a:tcPr/>
+                </a:tc>
+                <a:extLst>
+                  <a:ext uri="{0D108BD9-81ED-4DB2-BD59-A6C34878D82A}">
+                    <a16:rowId xmlns:a16="http://schemas.microsoft.com/office/drawing/2014/main" val="500692780"/>
+                  </a:ext>
+                </a:extLst>
+              </a:tr>
+              <a:tr h="637262">
+                <a:tc>
+                  <a:txBody>
+                    <a:bodyPr/>
+                    <a:lstStyle/>
+                    <a:p>
+                      <a:r>
+                        <a:rPr lang="nl-NL" dirty="0"/>
+                        <a:t>A</a:t>
+                      </a:r>
+                      <a:endParaRPr lang="en-NL" dirty="0"/>
+                    </a:p>
+                  </a:txBody>
+                  <a:tcPr/>
+                </a:tc>
+                <a:tc>
+                  <a:txBody>
+                    <a:bodyPr/>
+                    <a:lstStyle/>
+                    <a:p>
+                      <a:r>
+                        <a:rPr lang="nl-NL" dirty="0"/>
+                        <a:t>M</a:t>
+                      </a:r>
+                      <a:endParaRPr lang="en-NL" dirty="0"/>
+                    </a:p>
+                  </a:txBody>
+                  <a:tcPr/>
+                </a:tc>
+                <a:tc>
+                  <a:txBody>
+                    <a:bodyPr/>
+                    <a:lstStyle/>
+                    <a:p>
+                      <a:r>
+                        <a:rPr lang="nl-NL" dirty="0"/>
+                        <a:t>18</a:t>
+                      </a:r>
+                      <a:endParaRPr lang="en-NL" dirty="0"/>
+                    </a:p>
+                  </a:txBody>
+                  <a:tcPr/>
+                </a:tc>
+                <a:extLst>
+                  <a:ext uri="{0D108BD9-81ED-4DB2-BD59-A6C34878D82A}">
+                    <a16:rowId xmlns:a16="http://schemas.microsoft.com/office/drawing/2014/main" val="338809826"/>
+                  </a:ext>
+                </a:extLst>
+              </a:tr>
+              <a:tr h="637262">
+                <a:tc>
+                  <a:txBody>
+                    <a:bodyPr/>
+                    <a:lstStyle/>
+                    <a:p>
+                      <a:r>
+                        <a:rPr lang="nl-NL" dirty="0"/>
+                        <a:t>B</a:t>
+                      </a:r>
+                      <a:endParaRPr lang="en-NL" dirty="0"/>
+                    </a:p>
+                  </a:txBody>
+                  <a:tcPr/>
+                </a:tc>
+                <a:tc>
+                  <a:txBody>
+                    <a:bodyPr/>
+                    <a:lstStyle/>
+                    <a:p>
+                      <a:r>
+                        <a:rPr lang="nl-NL" dirty="0"/>
+                        <a:t>M</a:t>
+                      </a:r>
+                      <a:endParaRPr lang="en-NL" dirty="0"/>
+                    </a:p>
+                  </a:txBody>
+                  <a:tcPr/>
+                </a:tc>
+                <a:tc>
+                  <a:txBody>
+                    <a:bodyPr/>
+                    <a:lstStyle/>
+                    <a:p>
+                      <a:r>
+                        <a:rPr lang="nl-NL" dirty="0"/>
+                        <a:t>23</a:t>
+                      </a:r>
+                      <a:endParaRPr lang="en-NL" dirty="0"/>
+                    </a:p>
+                  </a:txBody>
+                  <a:tcPr/>
+                </a:tc>
+                <a:extLst>
+                  <a:ext uri="{0D108BD9-81ED-4DB2-BD59-A6C34878D82A}">
+                    <a16:rowId xmlns:a16="http://schemas.microsoft.com/office/drawing/2014/main" val="3368142923"/>
+                  </a:ext>
+                </a:extLst>
+              </a:tr>
+              <a:tr h="637262">
+                <a:tc>
+                  <a:txBody>
+                    <a:bodyPr/>
+                    <a:lstStyle/>
+                    <a:p>
+                      <a:r>
+                        <a:rPr lang="nl-NL" dirty="0"/>
+                        <a:t>C</a:t>
+                      </a:r>
+                      <a:endParaRPr lang="en-NL" dirty="0"/>
+                    </a:p>
+                  </a:txBody>
+                  <a:tcPr/>
+                </a:tc>
+                <a:tc>
+                  <a:txBody>
+                    <a:bodyPr/>
+                    <a:lstStyle/>
+                    <a:p>
+                      <a:r>
+                        <a:rPr lang="nl-NL" dirty="0"/>
+                        <a:t>V</a:t>
+                      </a:r>
+                      <a:endParaRPr lang="en-NL" dirty="0"/>
+                    </a:p>
+                  </a:txBody>
+                  <a:tcPr/>
+                </a:tc>
+                <a:tc>
+                  <a:txBody>
+                    <a:bodyPr/>
+                    <a:lstStyle/>
+                    <a:p>
+                      <a:r>
+                        <a:rPr lang="nl-NL" dirty="0"/>
+                        <a:t>55</a:t>
+                      </a:r>
+                      <a:endParaRPr lang="en-NL" dirty="0"/>
+                    </a:p>
+                  </a:txBody>
+                  <a:tcPr/>
+                </a:tc>
+                <a:extLst>
+                  <a:ext uri="{0D108BD9-81ED-4DB2-BD59-A6C34878D82A}">
+                    <a16:rowId xmlns:a16="http://schemas.microsoft.com/office/drawing/2014/main" val="840171502"/>
+                  </a:ext>
+                </a:extLst>
+              </a:tr>
+            </a:tbl>
+          </a:graphicData>
+        </a:graphic>
+      </p:graphicFrame>
+      <p:graphicFrame>
+        <p:nvGraphicFramePr>
+          <p:cNvPr id="14" name="Tabel 14">
+            <a:extLst>
+              <a:ext uri="{FF2B5EF4-FFF2-40B4-BE49-F238E27FC236}">
+                <a16:creationId xmlns:a16="http://schemas.microsoft.com/office/drawing/2014/main" id="{8356E9DA-70A4-488F-A3D9-A02C2B68371D}"/>
+              </a:ext>
+            </a:extLst>
+          </p:cNvPr>
+          <p:cNvGraphicFramePr>
+            <a:graphicFrameLocks noGrp="1"/>
+          </p:cNvGraphicFramePr>
+          <p:nvPr/>
+        </p:nvGraphicFramePr>
+        <p:xfrm>
+          <a:off x="5536002" y="3703468"/>
+          <a:ext cx="3833572" cy="2335080"/>
+        </p:xfrm>
+        <a:graphic>
+          <a:graphicData uri="http://schemas.openxmlformats.org/drawingml/2006/table">
+            <a:tbl>
+              <a:tblPr firstCol="1" bandRow="1">
+                <a:tableStyleId>{5C22544A-7EE6-4342-B048-85BDC9FD1C3A}</a:tableStyleId>
+              </a:tblPr>
+              <a:tblGrid>
+                <a:gridCol w="1916786">
+                  <a:extLst>
+                    <a:ext uri="{9D8B030D-6E8A-4147-A177-3AD203B41FA5}">
+                      <a16:colId xmlns:a16="http://schemas.microsoft.com/office/drawing/2014/main" val="3986655731"/>
+                    </a:ext>
+                  </a:extLst>
+                </a:gridCol>
+                <a:gridCol w="1916786">
+                  <a:extLst>
+                    <a:ext uri="{9D8B030D-6E8A-4147-A177-3AD203B41FA5}">
+                      <a16:colId xmlns:a16="http://schemas.microsoft.com/office/drawing/2014/main" val="3668402625"/>
+                    </a:ext>
+                  </a:extLst>
+                </a:gridCol>
+              </a:tblGrid>
+              <a:tr h="389180">
+                <a:tc>
+                  <a:txBody>
+                    <a:bodyPr/>
+                    <a:lstStyle/>
+                    <a:p>
+                      <a:r>
+                        <a:rPr lang="nl-NL" dirty="0"/>
+                        <a:t>Naam</a:t>
+                      </a:r>
+                      <a:endParaRPr lang="en-NL" dirty="0"/>
+                    </a:p>
+                  </a:txBody>
+                  <a:tcPr/>
+                </a:tc>
+                <a:tc>
+                  <a:txBody>
+                    <a:bodyPr/>
+                    <a:lstStyle/>
+                    <a:p>
+                      <a:r>
+                        <a:rPr lang="nl-NL" dirty="0"/>
+                        <a:t>B</a:t>
+                      </a:r>
+                      <a:endParaRPr lang="en-NL" dirty="0"/>
+                    </a:p>
+                  </a:txBody>
+                  <a:tcPr/>
+                </a:tc>
+                <a:extLst>
+                  <a:ext uri="{0D108BD9-81ED-4DB2-BD59-A6C34878D82A}">
+                    <a16:rowId xmlns:a16="http://schemas.microsoft.com/office/drawing/2014/main" val="275937080"/>
+                  </a:ext>
+                </a:extLst>
+              </a:tr>
+              <a:tr h="389180">
+                <a:tc>
+                  <a:txBody>
+                    <a:bodyPr/>
+                    <a:lstStyle/>
+                    <a:p>
+                      <a:r>
+                        <a:rPr lang="nl-NL" dirty="0"/>
+                        <a:t>Geslacht</a:t>
+                      </a:r>
+                      <a:endParaRPr lang="en-NL" dirty="0"/>
+                    </a:p>
+                  </a:txBody>
+                  <a:tcPr/>
+                </a:tc>
+                <a:tc>
+                  <a:txBody>
+                    <a:bodyPr/>
+                    <a:lstStyle/>
+                    <a:p>
+                      <a:r>
+                        <a:rPr lang="nl-NL" dirty="0"/>
+                        <a:t>M</a:t>
+                      </a:r>
+                      <a:endParaRPr lang="en-NL" dirty="0"/>
+                    </a:p>
+                  </a:txBody>
+                  <a:tcPr/>
+                </a:tc>
+                <a:extLst>
+                  <a:ext uri="{0D108BD9-81ED-4DB2-BD59-A6C34878D82A}">
+                    <a16:rowId xmlns:a16="http://schemas.microsoft.com/office/drawing/2014/main" val="1312383594"/>
+                  </a:ext>
+                </a:extLst>
+              </a:tr>
+              <a:tr h="389180">
+                <a:tc>
+                  <a:txBody>
+                    <a:bodyPr/>
+                    <a:lstStyle/>
+                    <a:p>
+                      <a:r>
+                        <a:rPr lang="nl-NL" dirty="0"/>
+                        <a:t>Leeftijd</a:t>
+                      </a:r>
+                      <a:endParaRPr lang="en-NL" dirty="0"/>
+                    </a:p>
+                  </a:txBody>
+                  <a:tcPr/>
+                </a:tc>
+                <a:tc>
+                  <a:txBody>
+                    <a:bodyPr/>
+                    <a:lstStyle/>
+                    <a:p>
+                      <a:r>
+                        <a:rPr lang="nl-NL" dirty="0"/>
+                        <a:t>23</a:t>
+                      </a:r>
+                      <a:endParaRPr lang="en-NL" dirty="0"/>
+                    </a:p>
+                  </a:txBody>
+                  <a:tcPr/>
+                </a:tc>
+                <a:extLst>
+                  <a:ext uri="{0D108BD9-81ED-4DB2-BD59-A6C34878D82A}">
+                    <a16:rowId xmlns:a16="http://schemas.microsoft.com/office/drawing/2014/main" val="123423597"/>
+                  </a:ext>
+                </a:extLst>
+              </a:tr>
+              <a:tr h="389180">
+                <a:tc>
+                  <a:txBody>
+                    <a:bodyPr/>
+                    <a:lstStyle/>
+                    <a:p>
+                      <a:r>
+                        <a:rPr lang="nl-NL" dirty="0"/>
+                        <a:t>Woonplaats</a:t>
+                      </a:r>
+                      <a:endParaRPr lang="en-NL" dirty="0"/>
+                    </a:p>
+                  </a:txBody>
+                  <a:tcPr/>
+                </a:tc>
+                <a:tc>
+                  <a:txBody>
+                    <a:bodyPr/>
+                    <a:lstStyle/>
+                    <a:p>
+                      <a:r>
+                        <a:rPr lang="nl-NL" dirty="0"/>
+                        <a:t>Amsterdam</a:t>
+                      </a:r>
+                      <a:endParaRPr lang="en-NL" dirty="0"/>
+                    </a:p>
+                  </a:txBody>
+                  <a:tcPr/>
+                </a:tc>
+                <a:extLst>
+                  <a:ext uri="{0D108BD9-81ED-4DB2-BD59-A6C34878D82A}">
+                    <a16:rowId xmlns:a16="http://schemas.microsoft.com/office/drawing/2014/main" val="3920558840"/>
+                  </a:ext>
+                </a:extLst>
+              </a:tr>
+              <a:tr h="389180">
+                <a:tc>
+                  <a:txBody>
+                    <a:bodyPr/>
+                    <a:lstStyle/>
+                    <a:p>
+                      <a:r>
+                        <a:rPr lang="nl-NL" dirty="0"/>
+                        <a:t>Beroep</a:t>
+                      </a:r>
+                      <a:endParaRPr lang="en-NL" dirty="0"/>
+                    </a:p>
+                  </a:txBody>
+                  <a:tcPr/>
+                </a:tc>
+                <a:tc>
+                  <a:txBody>
+                    <a:bodyPr/>
+                    <a:lstStyle/>
+                    <a:p>
+                      <a:r>
+                        <a:rPr lang="nl-NL" dirty="0"/>
+                        <a:t>Docent</a:t>
+                      </a:r>
+                      <a:endParaRPr lang="en-NL" dirty="0"/>
+                    </a:p>
+                  </a:txBody>
+                  <a:tcPr/>
+                </a:tc>
+                <a:extLst>
+                  <a:ext uri="{0D108BD9-81ED-4DB2-BD59-A6C34878D82A}">
+                    <a16:rowId xmlns:a16="http://schemas.microsoft.com/office/drawing/2014/main" val="2736647680"/>
+                  </a:ext>
+                </a:extLst>
+              </a:tr>
+              <a:tr h="389180">
+                <a:tc>
+                  <a:txBody>
+                    <a:bodyPr/>
+                    <a:lstStyle/>
+                    <a:p>
+                      <a:r>
+                        <a:rPr lang="nl-NL" dirty="0" err="1"/>
+                        <a:t>Hobbies</a:t>
+                      </a:r>
+                      <a:endParaRPr lang="en-NL" dirty="0"/>
+                    </a:p>
+                  </a:txBody>
+                  <a:tcPr/>
+                </a:tc>
+                <a:tc>
+                  <a:txBody>
+                    <a:bodyPr/>
+                    <a:lstStyle/>
+                    <a:p>
+                      <a:r>
+                        <a:rPr lang="nl-NL" dirty="0"/>
+                        <a:t>Motorrijden</a:t>
+                      </a:r>
+                      <a:endParaRPr lang="en-NL" dirty="0"/>
+                    </a:p>
+                  </a:txBody>
+                  <a:tcPr/>
+                </a:tc>
+                <a:extLst>
+                  <a:ext uri="{0D108BD9-81ED-4DB2-BD59-A6C34878D82A}">
+                    <a16:rowId xmlns:a16="http://schemas.microsoft.com/office/drawing/2014/main" val="936127613"/>
+                  </a:ext>
+                </a:extLst>
+              </a:tr>
+            </a:tbl>
+          </a:graphicData>
+        </a:graphic>
+      </p:graphicFrame>
+      <p:sp>
+        <p:nvSpPr>
+          <p:cNvPr id="9" name="Rechthoek: afgeronde hoeken 8">
+            <a:extLst>
+              <a:ext uri="{FF2B5EF4-FFF2-40B4-BE49-F238E27FC236}">
+                <a16:creationId xmlns:a16="http://schemas.microsoft.com/office/drawing/2014/main" id="{A7F0C998-4698-4EB7-BAFD-9114315910E8}"/>
+              </a:ext>
+            </a:extLst>
+          </p:cNvPr>
+          <p:cNvSpPr/>
+          <p:nvPr/>
+        </p:nvSpPr>
+        <p:spPr>
+          <a:xfrm>
+            <a:off x="1674796" y="3263765"/>
+            <a:ext cx="885525" cy="252124"/>
+          </a:xfrm>
+          <a:prstGeom prst="roundRect">
+            <a:avLst/>
+          </a:prstGeom>
+          <a:solidFill>
+            <a:schemeClr val="tx1">
+              <a:lumMod val="50000"/>
+              <a:lumOff val="50000"/>
+            </a:schemeClr>
+          </a:solidFill>
+        </p:spPr>
+        <p:style>
+          <a:lnRef idx="2">
+            <a:schemeClr val="accent1">
+              <a:shade val="50000"/>
+            </a:schemeClr>
+          </a:lnRef>
+          <a:fillRef idx="1">
+            <a:schemeClr val="accent1"/>
+          </a:fillRef>
+          <a:effectRef idx="0">
+            <a:schemeClr val="accent1"/>
+          </a:effectRef>
+          <a:fontRef idx="minor">
+            <a:schemeClr val="lt1"/>
+          </a:fontRef>
+        </p:style>
+        <p:txBody>
+          <a:bodyPr rtlCol="0" anchor="ctr"/>
+          <a:lstStyle/>
+          <a:p>
+            <a:pPr algn="ctr"/>
+            <a:r>
               <a:rPr lang="nl-NL" dirty="0" err="1"/>
-              <a:t>Animations</a:t>
-            </a:r>
-            <a:r>
-              <a:rPr lang="nl-NL" dirty="0"/>
-              <a:t>, Tekenen en Templates</a:t>
+              <a:t>Edit</a:t>
             </a:r>
             <a:endParaRPr lang="en-NL" dirty="0"/>
           </a:p>
@@ -17536,40 +18700,43 @@
       </p:sp>
       <p:sp>
         <p:nvSpPr>
-          <p:cNvPr id="5" name="Tijdelijke aanduiding voor tekst 4">
+          <p:cNvPr id="3" name="Tekstvak 2">
             <a:extLst>
               <a:ext uri="{FF2B5EF4-FFF2-40B4-BE49-F238E27FC236}">
-                <a16:creationId xmlns:a16="http://schemas.microsoft.com/office/drawing/2014/main" id="{F8B45FE7-A1BF-4AA2-A84C-037A841DC593}"/>
+                <a16:creationId xmlns:a16="http://schemas.microsoft.com/office/drawing/2014/main" id="{3BA5868F-2BEA-4A2A-81D0-0E464E36A71A}"/>
               </a:ext>
             </a:extLst>
           </p:cNvPr>
-          <p:cNvSpPr>
-            <a:spLocks noGrp="1"/>
-          </p:cNvSpPr>
-          <p:nvPr>
-            <p:ph type="body" sz="quarter" idx="10"/>
-          </p:nvPr>
-        </p:nvSpPr>
-        <p:spPr/>
-        <p:txBody>
-          <a:bodyPr/>
+          <p:cNvSpPr txBox="1"/>
+          <p:nvPr/>
+        </p:nvSpPr>
+        <p:spPr>
+          <a:xfrm>
+            <a:off x="1072055" y="1607419"/>
+            <a:ext cx="4539473" cy="646331"/>
+          </a:xfrm>
+          <a:prstGeom prst="rect">
+            <a:avLst/>
+          </a:prstGeom>
+          <a:noFill/>
+        </p:spPr>
+        <p:txBody>
+          <a:bodyPr wrap="square" rtlCol="0">
+            <a:spAutoFit/>
+          </a:bodyPr>
           <a:lstStyle/>
           <a:p>
             <a:r>
               <a:rPr lang="nl-NL" dirty="0"/>
-              <a:t>Hoe kun je animaties verzorgen in je GUI?</a:t>
-            </a:r>
-          </a:p>
-          <a:p>
-            <a:r>
-              <a:rPr lang="nl-NL" dirty="0"/>
-              <a:t>Tekenen met pixels en vectoren</a:t>
-            </a:r>
-          </a:p>
-          <a:p>
-            <a:r>
-              <a:rPr lang="nl-NL" dirty="0"/>
-              <a:t>Gebruik van templates in HTML5</a:t>
+              <a:t>Zet de </a:t>
+            </a:r>
+            <a:r>
+              <a:rPr lang="nl-NL" dirty="0" err="1"/>
+              <a:t>Edit</a:t>
+            </a:r>
+            <a:r>
+              <a:rPr lang="nl-NL" dirty="0"/>
+              <a:t> button in component A zodat component A altijd weet wat er veranderd is.</a:t>
             </a:r>
             <a:endParaRPr lang="en-NL" dirty="0"/>
           </a:p>
@@ -17578,7 +18745,7 @@
     </p:spTree>
     <p:extLst>
       <p:ext uri="{BB962C8B-B14F-4D97-AF65-F5344CB8AC3E}">
-        <p14:creationId xmlns:p14="http://schemas.microsoft.com/office/powerpoint/2010/main" val="1844065527"/>
+        <p14:creationId xmlns:p14="http://schemas.microsoft.com/office/powerpoint/2010/main" val="1371347547"/>
       </p:ext>
     </p:extLst>
   </p:cSld>
@@ -17607,7 +18774,13 @@
       </p:grpSpPr>
       <p:sp>
         <p:nvSpPr>
-          <p:cNvPr id="4" name="Titel 3"/>
+          <p:cNvPr id="2" name="Titel 1">
+            <a:extLst>
+              <a:ext uri="{FF2B5EF4-FFF2-40B4-BE49-F238E27FC236}">
+                <a16:creationId xmlns:a16="http://schemas.microsoft.com/office/drawing/2014/main" id="{BA228D91-C50F-4455-A25B-CA4722A9123A}"/>
+              </a:ext>
+            </a:extLst>
+          </p:cNvPr>
           <p:cNvSpPr>
             <a:spLocks noGrp="1"/>
           </p:cNvSpPr>
@@ -17622,84 +18795,958 @@
           <a:p>
             <a:r>
               <a:rPr lang="nl-NL" dirty="0"/>
-              <a:t>CSS </a:t>
-            </a:r>
+              <a:t>Initialisatie van een component</a:t>
+            </a:r>
+            <a:endParaRPr lang="en-NL" dirty="0"/>
+          </a:p>
+        </p:txBody>
+      </p:sp>
+      <p:sp>
+        <p:nvSpPr>
+          <p:cNvPr id="4" name="Rechthoek: afgeronde hoeken 3">
+            <a:extLst>
+              <a:ext uri="{FF2B5EF4-FFF2-40B4-BE49-F238E27FC236}">
+                <a16:creationId xmlns:a16="http://schemas.microsoft.com/office/drawing/2014/main" id="{0F185C71-F55C-43D8-8FD8-9D3B8BFB90F2}"/>
+              </a:ext>
+            </a:extLst>
+          </p:cNvPr>
+          <p:cNvSpPr/>
+          <p:nvPr/>
+        </p:nvSpPr>
+        <p:spPr>
+          <a:xfrm>
+            <a:off x="1185512" y="3429000"/>
+            <a:ext cx="1511166" cy="779647"/>
+          </a:xfrm>
+          <a:prstGeom prst="roundRect">
+            <a:avLst/>
+          </a:prstGeom>
+        </p:spPr>
+        <p:style>
+          <a:lnRef idx="2">
+            <a:schemeClr val="accent1">
+              <a:shade val="50000"/>
+            </a:schemeClr>
+          </a:lnRef>
+          <a:fillRef idx="1">
+            <a:schemeClr val="accent1"/>
+          </a:fillRef>
+          <a:effectRef idx="0">
+            <a:schemeClr val="accent1"/>
+          </a:effectRef>
+          <a:fontRef idx="minor">
+            <a:schemeClr val="lt1"/>
+          </a:fontRef>
+        </p:style>
+        <p:txBody>
+          <a:bodyPr rtlCol="0" anchor="ctr"/>
+          <a:lstStyle/>
+          <a:p>
+            <a:pPr algn="ctr"/>
             <a:r>
               <a:rPr lang="nl-NL" dirty="0" err="1"/>
-              <a:t>vs</a:t>
-            </a:r>
-            <a:r>
-              <a:rPr lang="nl-NL" dirty="0"/>
-              <a:t> JS</a:t>
-            </a:r>
-          </a:p>
-        </p:txBody>
-      </p:sp>
-      <p:sp>
-        <p:nvSpPr>
-          <p:cNvPr id="5" name="Tijdelijke aanduiding voor inhoud 4"/>
-          <p:cNvSpPr>
-            <a:spLocks noGrp="1"/>
-          </p:cNvSpPr>
-          <p:nvPr>
-            <p:ph idx="1"/>
-          </p:nvPr>
-        </p:nvSpPr>
-        <p:spPr/>
-        <p:txBody>
-          <a:bodyPr/>
+              <a:t>Constructor</a:t>
+            </a:r>
+            <a:endParaRPr lang="en-NL" dirty="0"/>
+          </a:p>
+        </p:txBody>
+      </p:sp>
+      <p:sp>
+        <p:nvSpPr>
+          <p:cNvPr id="5" name="Rechthoek: afgeronde hoeken 4">
+            <a:extLst>
+              <a:ext uri="{FF2B5EF4-FFF2-40B4-BE49-F238E27FC236}">
+                <a16:creationId xmlns:a16="http://schemas.microsoft.com/office/drawing/2014/main" id="{D681C2F8-7789-4741-9F49-8323ADCF453B}"/>
+              </a:ext>
+            </a:extLst>
+          </p:cNvPr>
+          <p:cNvSpPr/>
+          <p:nvPr/>
+        </p:nvSpPr>
+        <p:spPr>
+          <a:xfrm>
+            <a:off x="3367238" y="3432210"/>
+            <a:ext cx="1511166" cy="779647"/>
+          </a:xfrm>
+          <a:prstGeom prst="roundRect">
+            <a:avLst/>
+          </a:prstGeom>
+        </p:spPr>
+        <p:style>
+          <a:lnRef idx="2">
+            <a:schemeClr val="accent1">
+              <a:shade val="50000"/>
+            </a:schemeClr>
+          </a:lnRef>
+          <a:fillRef idx="1">
+            <a:schemeClr val="accent1"/>
+          </a:fillRef>
+          <a:effectRef idx="0">
+            <a:schemeClr val="accent1"/>
+          </a:effectRef>
+          <a:fontRef idx="minor">
+            <a:schemeClr val="lt1"/>
+          </a:fontRef>
+        </p:style>
+        <p:txBody>
+          <a:bodyPr rtlCol="0" anchor="ctr"/>
           <a:lstStyle/>
           <a:p>
-            <a:r>
-              <a:rPr lang="nl-NL" dirty="0"/>
-              <a:t>Animaties via CSS of JS/</a:t>
-            </a:r>
+            <a:pPr algn="ctr"/>
             <a:r>
               <a:rPr lang="nl-NL" dirty="0" err="1"/>
-              <a:t>jQuery</a:t>
-            </a:r>
-            <a:r>
-              <a:rPr lang="nl-NL" dirty="0"/>
-              <a:t> </a:t>
+              <a:t>OnInit</a:t>
+            </a:r>
+            <a:endParaRPr lang="en-NL" dirty="0"/>
+          </a:p>
+        </p:txBody>
+      </p:sp>
+      <p:sp>
+        <p:nvSpPr>
+          <p:cNvPr id="6" name="Rechthoek: afgeronde hoeken 5">
+            <a:extLst>
+              <a:ext uri="{FF2B5EF4-FFF2-40B4-BE49-F238E27FC236}">
+                <a16:creationId xmlns:a16="http://schemas.microsoft.com/office/drawing/2014/main" id="{71E877AE-7EA7-480E-B1BF-C9EBDCC8D180}"/>
+              </a:ext>
+            </a:extLst>
+          </p:cNvPr>
+          <p:cNvSpPr/>
+          <p:nvPr/>
+        </p:nvSpPr>
+        <p:spPr>
+          <a:xfrm>
+            <a:off x="5582653" y="3429001"/>
+            <a:ext cx="1511166" cy="779647"/>
+          </a:xfrm>
+          <a:prstGeom prst="roundRect">
+            <a:avLst/>
+          </a:prstGeom>
+        </p:spPr>
+        <p:style>
+          <a:lnRef idx="2">
+            <a:schemeClr val="accent1">
+              <a:shade val="50000"/>
+            </a:schemeClr>
+          </a:lnRef>
+          <a:fillRef idx="1">
+            <a:schemeClr val="accent1"/>
+          </a:fillRef>
+          <a:effectRef idx="0">
+            <a:schemeClr val="accent1"/>
+          </a:effectRef>
+          <a:fontRef idx="minor">
+            <a:schemeClr val="lt1"/>
+          </a:fontRef>
+        </p:style>
+        <p:txBody>
+          <a:bodyPr rtlCol="0" anchor="ctr"/>
+          <a:lstStyle/>
+          <a:p>
+            <a:pPr algn="ctr"/>
+            <a:r>
+              <a:rPr lang="nl-NL" sz="1400" dirty="0" err="1"/>
+              <a:t>ngAfterViewInit</a:t>
+            </a:r>
+            <a:endParaRPr lang="en-NL" sz="1400" dirty="0"/>
+          </a:p>
+        </p:txBody>
+      </p:sp>
+      <p:sp>
+        <p:nvSpPr>
+          <p:cNvPr id="7" name="Rechthoek: afgeronde hoeken 6">
+            <a:extLst>
+              <a:ext uri="{FF2B5EF4-FFF2-40B4-BE49-F238E27FC236}">
+                <a16:creationId xmlns:a16="http://schemas.microsoft.com/office/drawing/2014/main" id="{EFD25DF2-E2DF-4A82-B6CD-A5ABC0F4B69E}"/>
+              </a:ext>
+            </a:extLst>
+          </p:cNvPr>
+          <p:cNvSpPr/>
+          <p:nvPr/>
+        </p:nvSpPr>
+        <p:spPr>
+          <a:xfrm>
+            <a:off x="7812237" y="3429000"/>
+            <a:ext cx="1511166" cy="779647"/>
+          </a:xfrm>
+          <a:prstGeom prst="roundRect">
+            <a:avLst/>
+          </a:prstGeom>
+        </p:spPr>
+        <p:style>
+          <a:lnRef idx="2">
+            <a:schemeClr val="accent1">
+              <a:shade val="50000"/>
+            </a:schemeClr>
+          </a:lnRef>
+          <a:fillRef idx="1">
+            <a:schemeClr val="accent1"/>
+          </a:fillRef>
+          <a:effectRef idx="0">
+            <a:schemeClr val="accent1"/>
+          </a:effectRef>
+          <a:fontRef idx="minor">
+            <a:schemeClr val="lt1"/>
+          </a:fontRef>
+        </p:style>
+        <p:txBody>
+          <a:bodyPr rtlCol="0" anchor="ctr"/>
+          <a:lstStyle/>
+          <a:p>
+            <a:pPr algn="ctr"/>
+            <a:r>
+              <a:rPr lang="nl-NL" dirty="0"/>
+              <a:t>On Changes</a:t>
+            </a:r>
+            <a:endParaRPr lang="en-NL" dirty="0"/>
+          </a:p>
+        </p:txBody>
+      </p:sp>
+      <p:cxnSp>
+        <p:nvCxnSpPr>
+          <p:cNvPr id="10" name="Rechte verbindingslijn met pijl 9">
+            <a:extLst>
+              <a:ext uri="{FF2B5EF4-FFF2-40B4-BE49-F238E27FC236}">
+                <a16:creationId xmlns:a16="http://schemas.microsoft.com/office/drawing/2014/main" id="{22C8F60E-E397-41BC-AFFD-87D076B516EF}"/>
+              </a:ext>
+            </a:extLst>
+          </p:cNvPr>
+          <p:cNvCxnSpPr>
+            <a:cxnSpLocks/>
+            <a:stCxn id="4" idx="3"/>
+            <a:endCxn id="5" idx="1"/>
+          </p:cNvCxnSpPr>
+          <p:nvPr/>
+        </p:nvCxnSpPr>
+        <p:spPr>
+          <a:xfrm>
+            <a:off x="2696678" y="3818824"/>
+            <a:ext cx="670560" cy="3210"/>
+          </a:xfrm>
+          <a:prstGeom prst="straightConnector1">
+            <a:avLst/>
+          </a:prstGeom>
+          <a:ln>
+            <a:tailEnd type="triangle"/>
+          </a:ln>
+        </p:spPr>
+        <p:style>
+          <a:lnRef idx="1">
+            <a:schemeClr val="accent1"/>
+          </a:lnRef>
+          <a:fillRef idx="0">
+            <a:schemeClr val="accent1"/>
+          </a:fillRef>
+          <a:effectRef idx="0">
+            <a:schemeClr val="accent1"/>
+          </a:effectRef>
+          <a:fontRef idx="minor">
+            <a:schemeClr val="tx1"/>
+          </a:fontRef>
+        </p:style>
+      </p:cxnSp>
+      <p:cxnSp>
+        <p:nvCxnSpPr>
+          <p:cNvPr id="12" name="Rechte verbindingslijn met pijl 11">
+            <a:extLst>
+              <a:ext uri="{FF2B5EF4-FFF2-40B4-BE49-F238E27FC236}">
+                <a16:creationId xmlns:a16="http://schemas.microsoft.com/office/drawing/2014/main" id="{3686D336-3CA1-44C7-AFFE-52EA84D52E37}"/>
+              </a:ext>
+            </a:extLst>
+          </p:cNvPr>
+          <p:cNvCxnSpPr>
+            <a:cxnSpLocks/>
+            <a:stCxn id="5" idx="3"/>
+            <a:endCxn id="6" idx="1"/>
+          </p:cNvCxnSpPr>
+          <p:nvPr/>
+        </p:nvCxnSpPr>
+        <p:spPr>
+          <a:xfrm flipV="1">
+            <a:off x="4878404" y="3818825"/>
+            <a:ext cx="704249" cy="3209"/>
+          </a:xfrm>
+          <a:prstGeom prst="straightConnector1">
+            <a:avLst/>
+          </a:prstGeom>
+          <a:ln>
+            <a:tailEnd type="triangle"/>
+          </a:ln>
+        </p:spPr>
+        <p:style>
+          <a:lnRef idx="1">
+            <a:schemeClr val="accent1"/>
+          </a:lnRef>
+          <a:fillRef idx="0">
+            <a:schemeClr val="accent1"/>
+          </a:fillRef>
+          <a:effectRef idx="0">
+            <a:schemeClr val="accent1"/>
+          </a:effectRef>
+          <a:fontRef idx="minor">
+            <a:schemeClr val="tx1"/>
+          </a:fontRef>
+        </p:style>
+      </p:cxnSp>
+      <p:cxnSp>
+        <p:nvCxnSpPr>
+          <p:cNvPr id="15" name="Rechte verbindingslijn met pijl 14">
+            <a:extLst>
+              <a:ext uri="{FF2B5EF4-FFF2-40B4-BE49-F238E27FC236}">
+                <a16:creationId xmlns:a16="http://schemas.microsoft.com/office/drawing/2014/main" id="{FFB18379-F5E8-450C-8360-30805D1D034A}"/>
+              </a:ext>
+            </a:extLst>
+          </p:cNvPr>
+          <p:cNvCxnSpPr>
+            <a:cxnSpLocks/>
+            <a:stCxn id="6" idx="3"/>
+            <a:endCxn id="7" idx="1"/>
+          </p:cNvCxnSpPr>
+          <p:nvPr/>
+        </p:nvCxnSpPr>
+        <p:spPr>
+          <a:xfrm flipV="1">
+            <a:off x="7093819" y="3818824"/>
+            <a:ext cx="718418" cy="1"/>
+          </a:xfrm>
+          <a:prstGeom prst="straightConnector1">
+            <a:avLst/>
+          </a:prstGeom>
+          <a:ln>
+            <a:tailEnd type="triangle"/>
+          </a:ln>
+        </p:spPr>
+        <p:style>
+          <a:lnRef idx="1">
+            <a:schemeClr val="accent1"/>
+          </a:lnRef>
+          <a:fillRef idx="0">
+            <a:schemeClr val="accent1"/>
+          </a:fillRef>
+          <a:effectRef idx="0">
+            <a:schemeClr val="accent1"/>
+          </a:effectRef>
+          <a:fontRef idx="minor">
+            <a:schemeClr val="tx1"/>
+          </a:fontRef>
+        </p:style>
+      </p:cxnSp>
+      <p:sp>
+        <p:nvSpPr>
+          <p:cNvPr id="18" name="Ovaal 17">
+            <a:extLst>
+              <a:ext uri="{FF2B5EF4-FFF2-40B4-BE49-F238E27FC236}">
+                <a16:creationId xmlns:a16="http://schemas.microsoft.com/office/drawing/2014/main" id="{70E44FB3-AA0C-4F87-B1D1-93F0EDC7786E}"/>
+              </a:ext>
+            </a:extLst>
+          </p:cNvPr>
+          <p:cNvSpPr/>
+          <p:nvPr/>
+        </p:nvSpPr>
+        <p:spPr>
+          <a:xfrm>
+            <a:off x="1213851" y="2194559"/>
+            <a:ext cx="1454488" cy="779647"/>
+          </a:xfrm>
+          <a:prstGeom prst="ellipse">
+            <a:avLst/>
+          </a:prstGeom>
+        </p:spPr>
+        <p:style>
+          <a:lnRef idx="3">
+            <a:schemeClr val="lt1"/>
+          </a:lnRef>
+          <a:fillRef idx="1">
+            <a:schemeClr val="accent2"/>
+          </a:fillRef>
+          <a:effectRef idx="1">
+            <a:schemeClr val="accent2"/>
+          </a:effectRef>
+          <a:fontRef idx="minor">
+            <a:schemeClr val="lt1"/>
+          </a:fontRef>
+        </p:style>
+        <p:txBody>
+          <a:bodyPr rtlCol="0" anchor="ctr"/>
+          <a:lstStyle/>
+          <a:p>
+            <a:pPr algn="ctr"/>
+            <a:r>
+              <a:rPr lang="nl-NL" sz="1200" dirty="0"/>
+              <a:t>1</a:t>
+            </a:r>
+            <a:r>
+              <a:rPr lang="nl-NL" sz="1200" baseline="30000" dirty="0"/>
+              <a:t>e</a:t>
+            </a:r>
+            <a:r>
+              <a:rPr lang="nl-NL" sz="1200" dirty="0"/>
+              <a:t> keer dat component </a:t>
+            </a:r>
+            <a:r>
+              <a:rPr lang="nl-NL" sz="1200" b="1" dirty="0"/>
+              <a:t>geladen</a:t>
+            </a:r>
+            <a:r>
+              <a:rPr lang="nl-NL" sz="1200" dirty="0"/>
+              <a:t> wordt</a:t>
+            </a:r>
+            <a:endParaRPr lang="en-NL" sz="1200" dirty="0"/>
+          </a:p>
+        </p:txBody>
+      </p:sp>
+      <p:cxnSp>
+        <p:nvCxnSpPr>
+          <p:cNvPr id="19" name="Rechte verbindingslijn met pijl 18">
+            <a:extLst>
+              <a:ext uri="{FF2B5EF4-FFF2-40B4-BE49-F238E27FC236}">
+                <a16:creationId xmlns:a16="http://schemas.microsoft.com/office/drawing/2014/main" id="{102ACE16-0EAC-422E-B2DE-4EC20A01F1AB}"/>
+              </a:ext>
+            </a:extLst>
+          </p:cNvPr>
+          <p:cNvCxnSpPr>
+            <a:cxnSpLocks/>
+          </p:cNvCxnSpPr>
+          <p:nvPr/>
+        </p:nvCxnSpPr>
+        <p:spPr>
+          <a:xfrm>
+            <a:off x="1934010" y="2974206"/>
+            <a:ext cx="0" cy="454794"/>
+          </a:xfrm>
+          <a:prstGeom prst="straightConnector1">
+            <a:avLst/>
+          </a:prstGeom>
+          <a:ln>
+            <a:tailEnd type="triangle"/>
+          </a:ln>
+        </p:spPr>
+        <p:style>
+          <a:lnRef idx="3">
+            <a:schemeClr val="accent5"/>
+          </a:lnRef>
+          <a:fillRef idx="0">
+            <a:schemeClr val="accent5"/>
+          </a:fillRef>
+          <a:effectRef idx="2">
+            <a:schemeClr val="accent5"/>
+          </a:effectRef>
+          <a:fontRef idx="minor">
+            <a:schemeClr val="tx1"/>
+          </a:fontRef>
+        </p:style>
+      </p:cxnSp>
+      <p:sp>
+        <p:nvSpPr>
+          <p:cNvPr id="23" name="Ovaal 22">
+            <a:extLst>
+              <a:ext uri="{FF2B5EF4-FFF2-40B4-BE49-F238E27FC236}">
+                <a16:creationId xmlns:a16="http://schemas.microsoft.com/office/drawing/2014/main" id="{933635A6-B87A-4687-8B7F-9124D0FEA117}"/>
+              </a:ext>
+            </a:extLst>
+          </p:cNvPr>
+          <p:cNvSpPr/>
+          <p:nvPr/>
+        </p:nvSpPr>
+        <p:spPr>
+          <a:xfrm>
+            <a:off x="3395577" y="2213809"/>
+            <a:ext cx="1454488" cy="779647"/>
+          </a:xfrm>
+          <a:prstGeom prst="ellipse">
+            <a:avLst/>
+          </a:prstGeom>
+        </p:spPr>
+        <p:style>
+          <a:lnRef idx="3">
+            <a:schemeClr val="lt1"/>
+          </a:lnRef>
+          <a:fillRef idx="1">
+            <a:schemeClr val="accent2"/>
+          </a:fillRef>
+          <a:effectRef idx="1">
+            <a:schemeClr val="accent2"/>
+          </a:effectRef>
+          <a:fontRef idx="minor">
+            <a:schemeClr val="lt1"/>
+          </a:fontRef>
+        </p:style>
+        <p:txBody>
+          <a:bodyPr rtlCol="0" anchor="ctr"/>
+          <a:lstStyle/>
+          <a:p>
+            <a:pPr algn="ctr"/>
+            <a:r>
+              <a:rPr lang="nl-NL" sz="1200" dirty="0"/>
+              <a:t>1</a:t>
+            </a:r>
+            <a:r>
+              <a:rPr lang="nl-NL" sz="1200" baseline="30000" dirty="0"/>
+              <a:t>e</a:t>
+            </a:r>
+            <a:r>
+              <a:rPr lang="nl-NL" sz="1200" dirty="0"/>
+              <a:t> keer dat component </a:t>
+            </a:r>
+            <a:r>
+              <a:rPr lang="nl-NL" sz="1200" b="1" dirty="0"/>
+              <a:t>getoond</a:t>
+            </a:r>
+            <a:r>
+              <a:rPr lang="nl-NL" sz="1200" dirty="0"/>
+              <a:t> wordt</a:t>
+            </a:r>
+            <a:endParaRPr lang="en-NL" sz="1200" dirty="0"/>
+          </a:p>
+        </p:txBody>
+      </p:sp>
+      <p:sp>
+        <p:nvSpPr>
+          <p:cNvPr id="24" name="Ovaal 23">
+            <a:extLst>
+              <a:ext uri="{FF2B5EF4-FFF2-40B4-BE49-F238E27FC236}">
+                <a16:creationId xmlns:a16="http://schemas.microsoft.com/office/drawing/2014/main" id="{DDAD331E-34A6-484B-83F3-731336951879}"/>
+              </a:ext>
+            </a:extLst>
+          </p:cNvPr>
+          <p:cNvSpPr/>
+          <p:nvPr/>
+        </p:nvSpPr>
+        <p:spPr>
+          <a:xfrm>
+            <a:off x="7840576" y="2213809"/>
+            <a:ext cx="1454488" cy="779647"/>
+          </a:xfrm>
+          <a:prstGeom prst="ellipse">
+            <a:avLst/>
+          </a:prstGeom>
+        </p:spPr>
+        <p:style>
+          <a:lnRef idx="3">
+            <a:schemeClr val="lt1"/>
+          </a:lnRef>
+          <a:fillRef idx="1">
+            <a:schemeClr val="accent2"/>
+          </a:fillRef>
+          <a:effectRef idx="1">
+            <a:schemeClr val="accent2"/>
+          </a:effectRef>
+          <a:fontRef idx="minor">
+            <a:schemeClr val="lt1"/>
+          </a:fontRef>
+        </p:style>
+        <p:txBody>
+          <a:bodyPr rtlCol="0" anchor="ctr"/>
+          <a:lstStyle/>
+          <a:p>
+            <a:pPr algn="ctr"/>
+            <a:r>
+              <a:rPr lang="nl-NL" sz="1200" dirty="0"/>
+              <a:t>Wijziging van @Input</a:t>
+            </a:r>
+            <a:endParaRPr lang="en-NL" sz="1200" dirty="0"/>
+          </a:p>
+        </p:txBody>
+      </p:sp>
+      <p:sp>
+        <p:nvSpPr>
+          <p:cNvPr id="25" name="Ovaal 24">
+            <a:extLst>
+              <a:ext uri="{FF2B5EF4-FFF2-40B4-BE49-F238E27FC236}">
+                <a16:creationId xmlns:a16="http://schemas.microsoft.com/office/drawing/2014/main" id="{55358904-280D-4F3B-A9B2-FF1F1881B0FA}"/>
+              </a:ext>
+            </a:extLst>
+          </p:cNvPr>
+          <p:cNvSpPr/>
+          <p:nvPr/>
+        </p:nvSpPr>
+        <p:spPr>
+          <a:xfrm>
+            <a:off x="5610992" y="2194558"/>
+            <a:ext cx="1454488" cy="779647"/>
+          </a:xfrm>
+          <a:prstGeom prst="ellipse">
+            <a:avLst/>
+          </a:prstGeom>
+        </p:spPr>
+        <p:style>
+          <a:lnRef idx="3">
+            <a:schemeClr val="lt1"/>
+          </a:lnRef>
+          <a:fillRef idx="1">
+            <a:schemeClr val="accent2"/>
+          </a:fillRef>
+          <a:effectRef idx="1">
+            <a:schemeClr val="accent2"/>
+          </a:effectRef>
+          <a:fontRef idx="minor">
+            <a:schemeClr val="lt1"/>
+          </a:fontRef>
+        </p:style>
+        <p:txBody>
+          <a:bodyPr rtlCol="0" anchor="ctr"/>
+          <a:lstStyle/>
+          <a:p>
+            <a:pPr algn="ctr"/>
+            <a:r>
+              <a:rPr lang="nl-NL" sz="1200" dirty="0"/>
+              <a:t>Component is geladen</a:t>
+            </a:r>
+            <a:endParaRPr lang="en-NL" sz="1200" dirty="0"/>
+          </a:p>
+        </p:txBody>
+      </p:sp>
+      <p:cxnSp>
+        <p:nvCxnSpPr>
+          <p:cNvPr id="26" name="Rechte verbindingslijn met pijl 25">
+            <a:extLst>
+              <a:ext uri="{FF2B5EF4-FFF2-40B4-BE49-F238E27FC236}">
+                <a16:creationId xmlns:a16="http://schemas.microsoft.com/office/drawing/2014/main" id="{81B9A7F7-AE47-4DCD-BF14-160DB456F4E1}"/>
+              </a:ext>
+            </a:extLst>
+          </p:cNvPr>
+          <p:cNvCxnSpPr>
+            <a:cxnSpLocks/>
+          </p:cNvCxnSpPr>
+          <p:nvPr/>
+        </p:nvCxnSpPr>
+        <p:spPr>
+          <a:xfrm>
+            <a:off x="4113063" y="2993456"/>
+            <a:ext cx="0" cy="438754"/>
+          </a:xfrm>
+          <a:prstGeom prst="straightConnector1">
+            <a:avLst/>
+          </a:prstGeom>
+          <a:ln>
+            <a:tailEnd type="triangle"/>
+          </a:ln>
+        </p:spPr>
+        <p:style>
+          <a:lnRef idx="3">
+            <a:schemeClr val="accent5"/>
+          </a:lnRef>
+          <a:fillRef idx="0">
+            <a:schemeClr val="accent5"/>
+          </a:fillRef>
+          <a:effectRef idx="2">
+            <a:schemeClr val="accent5"/>
+          </a:effectRef>
+          <a:fontRef idx="minor">
+            <a:schemeClr val="tx1"/>
+          </a:fontRef>
+        </p:style>
+      </p:cxnSp>
+      <p:cxnSp>
+        <p:nvCxnSpPr>
+          <p:cNvPr id="29" name="Rechte verbindingslijn met pijl 28">
+            <a:extLst>
+              <a:ext uri="{FF2B5EF4-FFF2-40B4-BE49-F238E27FC236}">
+                <a16:creationId xmlns:a16="http://schemas.microsoft.com/office/drawing/2014/main" id="{C7D2286A-E5AE-40AF-854F-269294BB7459}"/>
+              </a:ext>
+            </a:extLst>
+          </p:cNvPr>
+          <p:cNvCxnSpPr>
+            <a:cxnSpLocks/>
+          </p:cNvCxnSpPr>
+          <p:nvPr/>
+        </p:nvCxnSpPr>
+        <p:spPr>
+          <a:xfrm>
+            <a:off x="6324067" y="2974205"/>
+            <a:ext cx="0" cy="454796"/>
+          </a:xfrm>
+          <a:prstGeom prst="straightConnector1">
+            <a:avLst/>
+          </a:prstGeom>
+          <a:ln>
+            <a:tailEnd type="triangle"/>
+          </a:ln>
+        </p:spPr>
+        <p:style>
+          <a:lnRef idx="3">
+            <a:schemeClr val="accent5"/>
+          </a:lnRef>
+          <a:fillRef idx="0">
+            <a:schemeClr val="accent5"/>
+          </a:fillRef>
+          <a:effectRef idx="2">
+            <a:schemeClr val="accent5"/>
+          </a:effectRef>
+          <a:fontRef idx="minor">
+            <a:schemeClr val="tx1"/>
+          </a:fontRef>
+        </p:style>
+      </p:cxnSp>
+      <p:cxnSp>
+        <p:nvCxnSpPr>
+          <p:cNvPr id="32" name="Rechte verbindingslijn met pijl 31">
+            <a:extLst>
+              <a:ext uri="{FF2B5EF4-FFF2-40B4-BE49-F238E27FC236}">
+                <a16:creationId xmlns:a16="http://schemas.microsoft.com/office/drawing/2014/main" id="{C1180D3D-93CE-49A5-97BB-CFF03A8F6E98}"/>
+              </a:ext>
+            </a:extLst>
+          </p:cNvPr>
+          <p:cNvCxnSpPr>
+            <a:cxnSpLocks/>
+          </p:cNvCxnSpPr>
+          <p:nvPr/>
+        </p:nvCxnSpPr>
+        <p:spPr>
+          <a:xfrm>
+            <a:off x="8539482" y="2993456"/>
+            <a:ext cx="0" cy="435544"/>
+          </a:xfrm>
+          <a:prstGeom prst="straightConnector1">
+            <a:avLst/>
+          </a:prstGeom>
+          <a:ln>
+            <a:tailEnd type="triangle"/>
+          </a:ln>
+        </p:spPr>
+        <p:style>
+          <a:lnRef idx="3">
+            <a:schemeClr val="accent5"/>
+          </a:lnRef>
+          <a:fillRef idx="0">
+            <a:schemeClr val="accent5"/>
+          </a:fillRef>
+          <a:effectRef idx="2">
+            <a:schemeClr val="accent5"/>
+          </a:effectRef>
+          <a:fontRef idx="minor">
+            <a:schemeClr val="tx1"/>
+          </a:fontRef>
+        </p:style>
+      </p:cxnSp>
+      <p:sp>
+        <p:nvSpPr>
+          <p:cNvPr id="36" name="Rechthoek: afgeronde hoeken 35">
+            <a:extLst>
+              <a:ext uri="{FF2B5EF4-FFF2-40B4-BE49-F238E27FC236}">
+                <a16:creationId xmlns:a16="http://schemas.microsoft.com/office/drawing/2014/main" id="{31D045DD-7CAB-425F-B581-DD9D34DE0806}"/>
+              </a:ext>
+            </a:extLst>
+          </p:cNvPr>
+          <p:cNvSpPr/>
+          <p:nvPr/>
+        </p:nvSpPr>
+        <p:spPr>
+          <a:xfrm>
+            <a:off x="7812237" y="5049653"/>
+            <a:ext cx="1511166" cy="779647"/>
+          </a:xfrm>
+          <a:prstGeom prst="roundRect">
+            <a:avLst/>
+          </a:prstGeom>
+        </p:spPr>
+        <p:style>
+          <a:lnRef idx="2">
+            <a:schemeClr val="accent1">
+              <a:shade val="50000"/>
+            </a:schemeClr>
+          </a:lnRef>
+          <a:fillRef idx="1">
+            <a:schemeClr val="accent1"/>
+          </a:fillRef>
+          <a:effectRef idx="0">
+            <a:schemeClr val="accent1"/>
+          </a:effectRef>
+          <a:fontRef idx="minor">
+            <a:schemeClr val="lt1"/>
+          </a:fontRef>
+        </p:style>
+        <p:txBody>
+          <a:bodyPr rtlCol="0" anchor="ctr"/>
+          <a:lstStyle/>
+          <a:p>
+            <a:pPr algn="ctr"/>
+            <a:r>
+              <a:rPr lang="nl-NL" dirty="0"/>
+              <a:t>On </a:t>
             </a:r>
             <a:r>
               <a:rPr lang="nl-NL" dirty="0" err="1"/>
-              <a:t>etc</a:t>
-            </a:r>
-            <a:endParaRPr lang="nl-NL" dirty="0"/>
-          </a:p>
-          <a:p>
-            <a:r>
-              <a:rPr lang="nl-NL" dirty="0"/>
-              <a:t>Performance</a:t>
-            </a:r>
-          </a:p>
-          <a:p>
-            <a:r>
-              <a:rPr lang="nl-NL" dirty="0"/>
-              <a:t>Zie ook in Google Chrome, Developer Tools, “Memory” tab en start </a:t>
-            </a:r>
-            <a:r>
-              <a:rPr lang="nl-NL" dirty="0" err="1"/>
-              <a:t>profiler</a:t>
-            </a:r>
-            <a:endParaRPr lang="nl-NL" dirty="0"/>
-          </a:p>
-          <a:p>
-            <a:endParaRPr lang="nl-NL" dirty="0"/>
-          </a:p>
-          <a:p>
-            <a:endParaRPr lang="nl-NL" dirty="0"/>
-          </a:p>
-          <a:p>
-            <a:endParaRPr lang="nl-NL" dirty="0"/>
+              <a:t>Destroy</a:t>
+            </a:r>
+            <a:endParaRPr lang="en-NL" dirty="0"/>
+          </a:p>
+        </p:txBody>
+      </p:sp>
+      <p:cxnSp>
+        <p:nvCxnSpPr>
+          <p:cNvPr id="37" name="Rechte verbindingslijn met pijl 36">
+            <a:extLst>
+              <a:ext uri="{FF2B5EF4-FFF2-40B4-BE49-F238E27FC236}">
+                <a16:creationId xmlns:a16="http://schemas.microsoft.com/office/drawing/2014/main" id="{7E42F329-C95A-4A8E-A6FA-7BE4A3FF71DF}"/>
+              </a:ext>
+            </a:extLst>
+          </p:cNvPr>
+          <p:cNvCxnSpPr>
+            <a:cxnSpLocks/>
+            <a:stCxn id="7" idx="2"/>
+            <a:endCxn id="36" idx="0"/>
+          </p:cNvCxnSpPr>
+          <p:nvPr/>
+        </p:nvCxnSpPr>
+        <p:spPr>
+          <a:xfrm>
+            <a:off x="8567820" y="4208647"/>
+            <a:ext cx="0" cy="841006"/>
+          </a:xfrm>
+          <a:prstGeom prst="straightConnector1">
+            <a:avLst/>
+          </a:prstGeom>
+          <a:ln>
+            <a:tailEnd type="triangle"/>
+          </a:ln>
+        </p:spPr>
+        <p:style>
+          <a:lnRef idx="1">
+            <a:schemeClr val="accent1"/>
+          </a:lnRef>
+          <a:fillRef idx="0">
+            <a:schemeClr val="accent1"/>
+          </a:fillRef>
+          <a:effectRef idx="0">
+            <a:schemeClr val="accent1"/>
+          </a:effectRef>
+          <a:fontRef idx="minor">
+            <a:schemeClr val="tx1"/>
+          </a:fontRef>
+        </p:style>
+      </p:cxnSp>
+      <p:sp>
+        <p:nvSpPr>
+          <p:cNvPr id="40" name="Ovaal 39">
+            <a:extLst>
+              <a:ext uri="{FF2B5EF4-FFF2-40B4-BE49-F238E27FC236}">
+                <a16:creationId xmlns:a16="http://schemas.microsoft.com/office/drawing/2014/main" id="{AAF48471-5D36-40CC-BA97-AE89C64462BF}"/>
+              </a:ext>
+            </a:extLst>
+          </p:cNvPr>
+          <p:cNvSpPr/>
+          <p:nvPr/>
+        </p:nvSpPr>
+        <p:spPr>
+          <a:xfrm>
+            <a:off x="9961611" y="5049653"/>
+            <a:ext cx="1454488" cy="779647"/>
+          </a:xfrm>
+          <a:prstGeom prst="ellipse">
+            <a:avLst/>
+          </a:prstGeom>
+        </p:spPr>
+        <p:style>
+          <a:lnRef idx="3">
+            <a:schemeClr val="lt1"/>
+          </a:lnRef>
+          <a:fillRef idx="1">
+            <a:schemeClr val="accent2"/>
+          </a:fillRef>
+          <a:effectRef idx="1">
+            <a:schemeClr val="accent2"/>
+          </a:effectRef>
+          <a:fontRef idx="minor">
+            <a:schemeClr val="lt1"/>
+          </a:fontRef>
+        </p:style>
+        <p:txBody>
+          <a:bodyPr rtlCol="0" anchor="ctr"/>
+          <a:lstStyle/>
+          <a:p>
+            <a:pPr algn="ctr"/>
+            <a:r>
+              <a:rPr lang="nl-NL" sz="1200" dirty="0"/>
+              <a:t>Component wordt opgeruimd</a:t>
+            </a:r>
+            <a:endParaRPr lang="en-NL" sz="1200" dirty="0"/>
+          </a:p>
+        </p:txBody>
+      </p:sp>
+      <p:cxnSp>
+        <p:nvCxnSpPr>
+          <p:cNvPr id="41" name="Rechte verbindingslijn met pijl 40">
+            <a:extLst>
+              <a:ext uri="{FF2B5EF4-FFF2-40B4-BE49-F238E27FC236}">
+                <a16:creationId xmlns:a16="http://schemas.microsoft.com/office/drawing/2014/main" id="{6B5665D3-2104-4D33-91D4-E12EB61786FC}"/>
+              </a:ext>
+            </a:extLst>
+          </p:cNvPr>
+          <p:cNvCxnSpPr>
+            <a:cxnSpLocks/>
+            <a:stCxn id="40" idx="2"/>
+            <a:endCxn id="36" idx="3"/>
+          </p:cNvCxnSpPr>
+          <p:nvPr/>
+        </p:nvCxnSpPr>
+        <p:spPr>
+          <a:xfrm flipH="1">
+            <a:off x="9323403" y="5439477"/>
+            <a:ext cx="638208" cy="0"/>
+          </a:xfrm>
+          <a:prstGeom prst="straightConnector1">
+            <a:avLst/>
+          </a:prstGeom>
+          <a:ln>
+            <a:tailEnd type="triangle"/>
+          </a:ln>
+        </p:spPr>
+        <p:style>
+          <a:lnRef idx="3">
+            <a:schemeClr val="accent5"/>
+          </a:lnRef>
+          <a:fillRef idx="0">
+            <a:schemeClr val="accent5"/>
+          </a:fillRef>
+          <a:effectRef idx="2">
+            <a:schemeClr val="accent5"/>
+          </a:effectRef>
+          <a:fontRef idx="minor">
+            <a:schemeClr val="tx1"/>
+          </a:fontRef>
+        </p:style>
+      </p:cxnSp>
+      <p:sp>
+        <p:nvSpPr>
+          <p:cNvPr id="44" name="Tekstvak 43">
+            <a:extLst>
+              <a:ext uri="{FF2B5EF4-FFF2-40B4-BE49-F238E27FC236}">
+                <a16:creationId xmlns:a16="http://schemas.microsoft.com/office/drawing/2014/main" id="{825C76F6-E3B2-4F2F-BF61-C94F1AAFBBA2}"/>
+              </a:ext>
+            </a:extLst>
+          </p:cNvPr>
+          <p:cNvSpPr txBox="1"/>
+          <p:nvPr/>
+        </p:nvSpPr>
+        <p:spPr>
+          <a:xfrm>
+            <a:off x="3494240" y="4208647"/>
+            <a:ext cx="1183899" cy="646331"/>
+          </a:xfrm>
+          <a:prstGeom prst="rect">
+            <a:avLst/>
+          </a:prstGeom>
+          <a:noFill/>
+        </p:spPr>
+        <p:txBody>
+          <a:bodyPr wrap="square" rtlCol="0">
+            <a:spAutoFit/>
+          </a:bodyPr>
+          <a:lstStyle/>
+          <a:p>
+            <a:pPr algn="ctr"/>
+            <a:r>
+              <a:rPr lang="nl-NL" dirty="0"/>
+              <a:t>Zelf data ophalen</a:t>
+            </a:r>
+            <a:endParaRPr lang="en-NL" dirty="0"/>
           </a:p>
         </p:txBody>
       </p:sp>
     </p:spTree>
     <p:extLst>
       <p:ext uri="{BB962C8B-B14F-4D97-AF65-F5344CB8AC3E}">
-        <p14:creationId xmlns:p14="http://schemas.microsoft.com/office/powerpoint/2010/main" val="3749883609"/>
+        <p14:creationId xmlns:p14="http://schemas.microsoft.com/office/powerpoint/2010/main" val="2780855909"/>
       </p:ext>
     </p:extLst>
   </p:cSld>
@@ -17728,7 +19775,13 @@
       </p:grpSpPr>
       <p:sp>
         <p:nvSpPr>
-          <p:cNvPr id="2" name="Titel 1"/>
+          <p:cNvPr id="4" name="Titel 3">
+            <a:extLst>
+              <a:ext uri="{FF2B5EF4-FFF2-40B4-BE49-F238E27FC236}">
+                <a16:creationId xmlns:a16="http://schemas.microsoft.com/office/drawing/2014/main" id="{4D66C7DA-73D5-4F2F-B307-6A06B54EF2D8}"/>
+              </a:ext>
+            </a:extLst>
+          </p:cNvPr>
           <p:cNvSpPr>
             <a:spLocks noGrp="1"/>
           </p:cNvSpPr>
@@ -17742,20 +19795,31 @@
           <a:lstStyle/>
           <a:p>
             <a:r>
-              <a:rPr lang="nl-NL" dirty="0"/>
-              <a:t>SVG &amp; Canvas</a:t>
-            </a:r>
-          </a:p>
-        </p:txBody>
-      </p:sp>
-      <p:sp>
-        <p:nvSpPr>
-          <p:cNvPr id="3" name="Tijdelijke aanduiding voor inhoud 2"/>
+              <a:rPr lang="nl-NL" dirty="0" err="1"/>
+              <a:t>Animations</a:t>
+            </a:r>
+            <a:r>
+              <a:rPr lang="nl-NL" dirty="0"/>
+              <a:t>, Tekenen en Templates</a:t>
+            </a:r>
+            <a:endParaRPr lang="en-NL" dirty="0"/>
+          </a:p>
+        </p:txBody>
+      </p:sp>
+      <p:sp>
+        <p:nvSpPr>
+          <p:cNvPr id="5" name="Tijdelijke aanduiding voor tekst 4">
+            <a:extLst>
+              <a:ext uri="{FF2B5EF4-FFF2-40B4-BE49-F238E27FC236}">
+                <a16:creationId xmlns:a16="http://schemas.microsoft.com/office/drawing/2014/main" id="{F8B45FE7-A1BF-4AA2-A84C-037A841DC593}"/>
+              </a:ext>
+            </a:extLst>
+          </p:cNvPr>
           <p:cNvSpPr>
             <a:spLocks noGrp="1"/>
           </p:cNvSpPr>
           <p:nvPr>
-            <p:ph idx="1"/>
+            <p:ph type="body" sz="quarter" idx="10"/>
           </p:nvPr>
         </p:nvSpPr>
         <p:spPr/>
@@ -17765,100 +19829,28 @@
           <a:p>
             <a:r>
               <a:rPr lang="nl-NL" dirty="0"/>
-              <a:t>Tekenen van objecten</a:t>
-            </a:r>
-          </a:p>
-          <a:p>
-            <a:pPr lvl="1"/>
-            <a:r>
-              <a:rPr lang="nl-NL" dirty="0"/>
-              <a:t>Canvas </a:t>
-            </a:r>
-            <a:r>
-              <a:rPr lang="nl-NL" dirty="0">
-                <a:sym typeface="Wingdings" panose="05000000000000000000" pitchFamily="2" charset="2"/>
-              </a:rPr>
-              <a:t> javascript</a:t>
-            </a:r>
-          </a:p>
-          <a:p>
-            <a:pPr lvl="1"/>
-            <a:r>
-              <a:rPr lang="nl-NL" dirty="0">
-                <a:sym typeface="Wingdings" panose="05000000000000000000" pitchFamily="2" charset="2"/>
-              </a:rPr>
-              <a:t>SVG  </a:t>
-            </a:r>
-            <a:r>
-              <a:rPr lang="nl-NL" dirty="0" err="1">
-                <a:sym typeface="Wingdings" panose="05000000000000000000" pitchFamily="2" charset="2"/>
-              </a:rPr>
-              <a:t>xml</a:t>
-            </a:r>
-            <a:r>
-              <a:rPr lang="nl-NL" dirty="0">
-                <a:sym typeface="Wingdings" panose="05000000000000000000" pitchFamily="2" charset="2"/>
-              </a:rPr>
-              <a:t>-tekst door browser opgebouwd (</a:t>
-            </a:r>
-            <a:r>
-              <a:rPr lang="nl-NL" dirty="0" err="1">
-                <a:sym typeface="Wingdings" panose="05000000000000000000" pitchFamily="2" charset="2"/>
-              </a:rPr>
-              <a:t>Scalable</a:t>
-            </a:r>
-            <a:r>
-              <a:rPr lang="nl-NL" dirty="0">
-                <a:sym typeface="Wingdings" panose="05000000000000000000" pitchFamily="2" charset="2"/>
-              </a:rPr>
-              <a:t> </a:t>
-            </a:r>
-            <a:r>
-              <a:rPr lang="nl-NL">
-                <a:sym typeface="Wingdings" panose="05000000000000000000" pitchFamily="2" charset="2"/>
-              </a:rPr>
-              <a:t>Vector Graphics)</a:t>
-            </a:r>
-            <a:endParaRPr lang="nl-NL" dirty="0">
-              <a:sym typeface="Wingdings" panose="05000000000000000000" pitchFamily="2" charset="2"/>
-            </a:endParaRPr>
-          </a:p>
-          <a:p>
-            <a:r>
-              <a:rPr lang="nl-NL" dirty="0" err="1">
-                <a:sym typeface="Wingdings" panose="05000000000000000000" pitchFamily="2" charset="2"/>
-              </a:rPr>
-              <a:t>Frameworks</a:t>
-            </a:r>
-            <a:endParaRPr lang="nl-NL" dirty="0">
-              <a:sym typeface="Wingdings" panose="05000000000000000000" pitchFamily="2" charset="2"/>
-            </a:endParaRPr>
-          </a:p>
-          <a:p>
-            <a:r>
-              <a:rPr lang="nl-NL" dirty="0">
-                <a:sym typeface="Wingdings" panose="05000000000000000000" pitchFamily="2" charset="2"/>
-              </a:rPr>
-              <a:t>Leercurve</a:t>
-            </a:r>
-          </a:p>
-          <a:p>
-            <a:r>
-              <a:rPr lang="nl-NL" dirty="0">
-                <a:sym typeface="Wingdings" panose="05000000000000000000" pitchFamily="2" charset="2"/>
-              </a:rPr>
-              <a:t>Voorbeelden</a:t>
-            </a:r>
-          </a:p>
-          <a:p>
-            <a:endParaRPr lang="nl-NL" dirty="0"/>
+              <a:t>Hoe kun je animaties verzorgen in je GUI?</a:t>
+            </a:r>
+          </a:p>
+          <a:p>
+            <a:r>
+              <a:rPr lang="nl-NL" dirty="0"/>
+              <a:t>Tekenen met pixels en vectoren</a:t>
+            </a:r>
+          </a:p>
+          <a:p>
+            <a:r>
+              <a:rPr lang="nl-NL" dirty="0"/>
+              <a:t>Gebruik van templates in HTML5</a:t>
+            </a:r>
+            <a:endParaRPr lang="en-NL" dirty="0"/>
           </a:p>
         </p:txBody>
       </p:sp>
     </p:spTree>
     <p:extLst>
       <p:ext uri="{BB962C8B-B14F-4D97-AF65-F5344CB8AC3E}">
-        <p14:creationId xmlns:p14="http://schemas.microsoft.com/office/powerpoint/2010/main" val="2023804850"/>
+        <p14:creationId xmlns:p14="http://schemas.microsoft.com/office/powerpoint/2010/main" val="1844065527"/>
       </p:ext>
     </p:extLst>
   </p:cSld>
@@ -17887,6 +19879,127 @@
       </p:grpSpPr>
       <p:sp>
         <p:nvSpPr>
+          <p:cNvPr id="4" name="Titel 3"/>
+          <p:cNvSpPr>
+            <a:spLocks noGrp="1"/>
+          </p:cNvSpPr>
+          <p:nvPr>
+            <p:ph type="title"/>
+          </p:nvPr>
+        </p:nvSpPr>
+        <p:spPr/>
+        <p:txBody>
+          <a:bodyPr/>
+          <a:lstStyle/>
+          <a:p>
+            <a:r>
+              <a:rPr lang="nl-NL" dirty="0"/>
+              <a:t>CSS </a:t>
+            </a:r>
+            <a:r>
+              <a:rPr lang="nl-NL" dirty="0" err="1"/>
+              <a:t>vs</a:t>
+            </a:r>
+            <a:r>
+              <a:rPr lang="nl-NL" dirty="0"/>
+              <a:t> JS</a:t>
+            </a:r>
+          </a:p>
+        </p:txBody>
+      </p:sp>
+      <p:sp>
+        <p:nvSpPr>
+          <p:cNvPr id="5" name="Tijdelijke aanduiding voor inhoud 4"/>
+          <p:cNvSpPr>
+            <a:spLocks noGrp="1"/>
+          </p:cNvSpPr>
+          <p:nvPr>
+            <p:ph idx="1"/>
+          </p:nvPr>
+        </p:nvSpPr>
+        <p:spPr/>
+        <p:txBody>
+          <a:bodyPr/>
+          <a:lstStyle/>
+          <a:p>
+            <a:r>
+              <a:rPr lang="nl-NL" dirty="0"/>
+              <a:t>Animaties via CSS of JS/</a:t>
+            </a:r>
+            <a:r>
+              <a:rPr lang="nl-NL" dirty="0" err="1"/>
+              <a:t>jQuery</a:t>
+            </a:r>
+            <a:r>
+              <a:rPr lang="nl-NL" dirty="0"/>
+              <a:t> </a:t>
+            </a:r>
+            <a:r>
+              <a:rPr lang="nl-NL" dirty="0" err="1"/>
+              <a:t>etc</a:t>
+            </a:r>
+            <a:endParaRPr lang="nl-NL" dirty="0"/>
+          </a:p>
+          <a:p>
+            <a:r>
+              <a:rPr lang="nl-NL" dirty="0"/>
+              <a:t>Performance</a:t>
+            </a:r>
+          </a:p>
+          <a:p>
+            <a:r>
+              <a:rPr lang="nl-NL" dirty="0"/>
+              <a:t>Zie ook in Google Chrome, Developer Tools, “Memory” tab en start </a:t>
+            </a:r>
+            <a:r>
+              <a:rPr lang="nl-NL" dirty="0" err="1"/>
+              <a:t>profiler</a:t>
+            </a:r>
+            <a:endParaRPr lang="nl-NL" dirty="0"/>
+          </a:p>
+          <a:p>
+            <a:endParaRPr lang="nl-NL" dirty="0"/>
+          </a:p>
+          <a:p>
+            <a:endParaRPr lang="nl-NL" dirty="0"/>
+          </a:p>
+          <a:p>
+            <a:endParaRPr lang="nl-NL" dirty="0"/>
+          </a:p>
+        </p:txBody>
+      </p:sp>
+    </p:spTree>
+    <p:extLst>
+      <p:ext uri="{BB962C8B-B14F-4D97-AF65-F5344CB8AC3E}">
+        <p14:creationId xmlns:p14="http://schemas.microsoft.com/office/powerpoint/2010/main" val="3749883609"/>
+      </p:ext>
+    </p:extLst>
+  </p:cSld>
+  <p:clrMapOvr>
+    <a:masterClrMapping/>
+  </p:clrMapOvr>
+</p:sld>
+</file>
+
+<file path=ppt/slides/slide49.xml><?xml version="1.0" encoding="utf-8"?>
+<p:sld xmlns:a="http://schemas.openxmlformats.org/drawingml/2006/main" xmlns:r="http://schemas.openxmlformats.org/officeDocument/2006/relationships" xmlns:p="http://schemas.openxmlformats.org/presentationml/2006/main">
+  <p:cSld>
+    <p:spTree>
+      <p:nvGrpSpPr>
+        <p:cNvPr id="1" name=""/>
+        <p:cNvGrpSpPr/>
+        <p:nvPr/>
+      </p:nvGrpSpPr>
+      <p:grpSpPr>
+        <a:xfrm>
+          <a:off x="0" y="0"/>
+          <a:ext cx="0" cy="0"/>
+          <a:chOff x="0" y="0"/>
+          <a:chExt cx="0" cy="0"/>
+        </a:xfrm>
+      </p:grpSpPr>
+      <p:sp>
+        <p:nvSpPr>
           <p:cNvPr id="2" name="Titel 1"/>
           <p:cNvSpPr>
             <a:spLocks noGrp="1"/>
@@ -17902,7 +20015,7 @@
           <a:p>
             <a:r>
               <a:rPr lang="nl-NL" dirty="0"/>
-              <a:t>Templating</a:t>
+              <a:t>SVG &amp; Canvas</a:t>
             </a:r>
           </a:p>
         </p:txBody>
@@ -17924,26 +20037,90 @@
           <a:p>
             <a:r>
               <a:rPr lang="nl-NL" dirty="0"/>
-              <a:t>HTML5 heeft een Template Tag</a:t>
-            </a:r>
-          </a:p>
-          <a:p>
+              <a:t>Tekenen van objecten</a:t>
+            </a:r>
+          </a:p>
+          <a:p>
+            <a:pPr lvl="1"/>
+            <a:r>
+              <a:rPr lang="nl-NL" dirty="0"/>
+              <a:t>Canvas </a:t>
+            </a:r>
             <a:r>
               <a:rPr lang="nl-NL" dirty="0">
-                <a:hlinkClick r:id="rId2"/>
+                <a:sym typeface="Wingdings" panose="05000000000000000000" pitchFamily="2" charset="2"/>
               </a:rPr>
-              <a:t>https://developer.mozilla.org/en-US/docs/Web/HTML/Element/template</a:t>
-            </a:r>
-            <a:endParaRPr lang="nl-NL" dirty="0"/>
-          </a:p>
-          <a:p>
+              <a:t> javascript</a:t>
+            </a:r>
+          </a:p>
+          <a:p>
+            <a:pPr lvl="1"/>
             <a:r>
               <a:rPr lang="nl-NL" dirty="0">
-                <a:hlinkClick r:id="rId3"/>
+                <a:sym typeface="Wingdings" panose="05000000000000000000" pitchFamily="2" charset="2"/>
               </a:rPr>
-              <a:t>https://www.w3schools.com/html/html5_intro.asp</a:t>
-            </a:r>
-            <a:endParaRPr lang="nl-NL" dirty="0"/>
+              <a:t>SVG  </a:t>
+            </a:r>
+            <a:r>
+              <a:rPr lang="nl-NL" dirty="0" err="1">
+                <a:sym typeface="Wingdings" panose="05000000000000000000" pitchFamily="2" charset="2"/>
+              </a:rPr>
+              <a:t>xml</a:t>
+            </a:r>
+            <a:r>
+              <a:rPr lang="nl-NL" dirty="0">
+                <a:sym typeface="Wingdings" panose="05000000000000000000" pitchFamily="2" charset="2"/>
+              </a:rPr>
+              <a:t>-tekst door browser opgebouwd (</a:t>
+            </a:r>
+            <a:r>
+              <a:rPr lang="nl-NL" dirty="0" err="1">
+                <a:sym typeface="Wingdings" panose="05000000000000000000" pitchFamily="2" charset="2"/>
+              </a:rPr>
+              <a:t>Scalable</a:t>
+            </a:r>
+            <a:r>
+              <a:rPr lang="nl-NL" dirty="0">
+                <a:sym typeface="Wingdings" panose="05000000000000000000" pitchFamily="2" charset="2"/>
+              </a:rPr>
+              <a:t> </a:t>
+            </a:r>
+            <a:r>
+              <a:rPr lang="nl-NL">
+                <a:sym typeface="Wingdings" panose="05000000000000000000" pitchFamily="2" charset="2"/>
+              </a:rPr>
+              <a:t>Vector Graphics)</a:t>
+            </a:r>
+            <a:endParaRPr lang="nl-NL" dirty="0">
+              <a:sym typeface="Wingdings" panose="05000000000000000000" pitchFamily="2" charset="2"/>
+            </a:endParaRPr>
+          </a:p>
+          <a:p>
+            <a:r>
+              <a:rPr lang="nl-NL" dirty="0" err="1">
+                <a:sym typeface="Wingdings" panose="05000000000000000000" pitchFamily="2" charset="2"/>
+              </a:rPr>
+              <a:t>Frameworks</a:t>
+            </a:r>
+            <a:endParaRPr lang="nl-NL" dirty="0">
+              <a:sym typeface="Wingdings" panose="05000000000000000000" pitchFamily="2" charset="2"/>
+            </a:endParaRPr>
+          </a:p>
+          <a:p>
+            <a:r>
+              <a:rPr lang="nl-NL" dirty="0">
+                <a:sym typeface="Wingdings" panose="05000000000000000000" pitchFamily="2" charset="2"/>
+              </a:rPr>
+              <a:t>Leercurve</a:t>
+            </a:r>
+          </a:p>
+          <a:p>
+            <a:r>
+              <a:rPr lang="nl-NL" dirty="0">
+                <a:sym typeface="Wingdings" panose="05000000000000000000" pitchFamily="2" charset="2"/>
+              </a:rPr>
+              <a:t>Voorbeelden</a:t>
+            </a:r>
           </a:p>
           <a:p>
             <a:endParaRPr lang="nl-NL" dirty="0"/>
@@ -17953,7 +20130,7 @@
     </p:spTree>
     <p:extLst>
       <p:ext uri="{BB962C8B-B14F-4D97-AF65-F5344CB8AC3E}">
-        <p14:creationId xmlns:p14="http://schemas.microsoft.com/office/powerpoint/2010/main" val="3805239925"/>
+        <p14:creationId xmlns:p14="http://schemas.microsoft.com/office/powerpoint/2010/main" val="2023804850"/>
       </p:ext>
     </p:extLst>
   </p:cSld>
@@ -18199,6 +20376,101 @@
     <p:extLst>
       <p:ext uri="{BB962C8B-B14F-4D97-AF65-F5344CB8AC3E}">
         <p14:creationId xmlns:p14="http://schemas.microsoft.com/office/powerpoint/2010/main" val="2247677817"/>
+      </p:ext>
+    </p:extLst>
+  </p:cSld>
+  <p:clrMapOvr>
+    <a:masterClrMapping/>
+  </p:clrMapOvr>
+</p:sld>
+</file>
+
+<file path=ppt/slides/slide50.xml><?xml version="1.0" encoding="utf-8"?>
+<p:sld xmlns:a="http://schemas.openxmlformats.org/drawingml/2006/main" xmlns:r="http://schemas.openxmlformats.org/officeDocument/2006/relationships" xmlns:p="http://schemas.openxmlformats.org/presentationml/2006/main">
+  <p:cSld>
+    <p:spTree>
+      <p:nvGrpSpPr>
+        <p:cNvPr id="1" name=""/>
+        <p:cNvGrpSpPr/>
+        <p:nvPr/>
+      </p:nvGrpSpPr>
+      <p:grpSpPr>
+        <a:xfrm>
+          <a:off x="0" y="0"/>
+          <a:ext cx="0" cy="0"/>
+          <a:chOff x="0" y="0"/>
+          <a:chExt cx="0" cy="0"/>
+        </a:xfrm>
+      </p:grpSpPr>
+      <p:sp>
+        <p:nvSpPr>
+          <p:cNvPr id="2" name="Titel 1"/>
+          <p:cNvSpPr>
+            <a:spLocks noGrp="1"/>
+          </p:cNvSpPr>
+          <p:nvPr>
+            <p:ph type="title"/>
+          </p:nvPr>
+        </p:nvSpPr>
+        <p:spPr/>
+        <p:txBody>
+          <a:bodyPr/>
+          <a:lstStyle/>
+          <a:p>
+            <a:r>
+              <a:rPr lang="nl-NL" dirty="0"/>
+              <a:t>Templating</a:t>
+            </a:r>
+          </a:p>
+        </p:txBody>
+      </p:sp>
+      <p:sp>
+        <p:nvSpPr>
+          <p:cNvPr id="3" name="Tijdelijke aanduiding voor inhoud 2"/>
+          <p:cNvSpPr>
+            <a:spLocks noGrp="1"/>
+          </p:cNvSpPr>
+          <p:nvPr>
+            <p:ph idx="1"/>
+          </p:nvPr>
+        </p:nvSpPr>
+        <p:spPr/>
+        <p:txBody>
+          <a:bodyPr/>
+          <a:lstStyle/>
+          <a:p>
+            <a:r>
+              <a:rPr lang="nl-NL" dirty="0"/>
+              <a:t>HTML5 heeft een Template Tag</a:t>
+            </a:r>
+          </a:p>
+          <a:p>
+            <a:r>
+              <a:rPr lang="nl-NL" dirty="0">
+                <a:hlinkClick r:id="rId2"/>
+              </a:rPr>
+              <a:t>https://developer.mozilla.org/en-US/docs/Web/HTML/Element/template</a:t>
+            </a:r>
+            <a:endParaRPr lang="nl-NL" dirty="0"/>
+          </a:p>
+          <a:p>
+            <a:r>
+              <a:rPr lang="nl-NL" dirty="0">
+                <a:hlinkClick r:id="rId3"/>
+              </a:rPr>
+              <a:t>https://www.w3schools.com/html/html5_intro.asp</a:t>
+            </a:r>
+            <a:endParaRPr lang="nl-NL" dirty="0"/>
+          </a:p>
+          <a:p>
+            <a:endParaRPr lang="nl-NL" dirty="0"/>
+          </a:p>
+        </p:txBody>
+      </p:sp>
+    </p:spTree>
+    <p:extLst>
+      <p:ext uri="{BB962C8B-B14F-4D97-AF65-F5344CB8AC3E}">
+        <p14:creationId xmlns:p14="http://schemas.microsoft.com/office/powerpoint/2010/main" val="3805239925"/>
       </p:ext>
     </p:extLst>
   </p:cSld>

</xml_diff>

<commit_message>
Updated links to github repo (first lessons) - new stats on HTML5
</commit_message>
<xml_diff>
--- a/Presentatie/Front-End Development.pptx
+++ b/Presentatie/Front-End Development.pptx
@@ -23,11 +23,11 @@
     <p:sldId id="278" r:id="rId14"/>
     <p:sldId id="279" r:id="rId15"/>
     <p:sldId id="280" r:id="rId16"/>
-    <p:sldId id="281" r:id="rId17"/>
-    <p:sldId id="282" r:id="rId18"/>
-    <p:sldId id="283" r:id="rId19"/>
-    <p:sldId id="284" r:id="rId20"/>
-    <p:sldId id="288" r:id="rId21"/>
+    <p:sldId id="282" r:id="rId17"/>
+    <p:sldId id="283" r:id="rId18"/>
+    <p:sldId id="284" r:id="rId19"/>
+    <p:sldId id="288" r:id="rId20"/>
+    <p:sldId id="311" r:id="rId21"/>
     <p:sldId id="285" r:id="rId22"/>
     <p:sldId id="286" r:id="rId23"/>
     <p:sldId id="287" r:id="rId24"/>
@@ -180,11 +180,11 @@
             <p14:sldId id="278"/>
             <p14:sldId id="279"/>
             <p14:sldId id="280"/>
-            <p14:sldId id="281"/>
             <p14:sldId id="282"/>
             <p14:sldId id="283"/>
             <p14:sldId id="284"/>
             <p14:sldId id="288"/>
+            <p14:sldId id="311"/>
             <p14:sldId id="285"/>
             <p14:sldId id="286"/>
             <p14:sldId id="287"/>
@@ -308,7 +308,7 @@
           <a:p>
             <a:fld id="{C5A381E3-FA85-4AE8-9B11-999D5E05561D}" type="datetimeFigureOut">
               <a:rPr lang="nl-NL" smtClean="0"/>
-              <a:t>14-12-2020</a:t>
+              <a:t>24-10-2022</a:t>
             </a:fld>
             <a:endParaRPr lang="nl-NL"/>
           </a:p>
@@ -762,7 +762,7 @@
           <a:p>
             <a:fld id="{A9AC6ED0-D734-4939-9338-F1A2206B4A78}" type="slidenum">
               <a:rPr lang="nl-NL" smtClean="0"/>
-              <a:t>20</a:t>
+              <a:t>19</a:t>
             </a:fld>
             <a:endParaRPr lang="nl-NL"/>
           </a:p>
@@ -2228,7 +2228,7 @@
           <a:p>
             <a:fld id="{A9AC6ED0-D734-4939-9338-F1A2206B4A78}" type="slidenum">
               <a:rPr lang="nl-NL" smtClean="0"/>
-              <a:t>18</a:t>
+              <a:t>17</a:t>
             </a:fld>
             <a:endParaRPr lang="nl-NL"/>
           </a:p>
@@ -9125,118 +9125,13 @@
       </p:grpSpPr>
       <p:pic>
         <p:nvPicPr>
-          <p:cNvPr id="2" name="Afbeelding 1"/>
-          <p:cNvPicPr>
-            <a:picLocks noChangeAspect="1"/>
-          </p:cNvPicPr>
-          <p:nvPr/>
-        </p:nvPicPr>
-        <p:blipFill>
-          <a:blip r:embed="rId2">
-            <a:extLst>
-              <a:ext uri="{28A0092B-C50C-407E-A947-70E740481C1C}">
-                <a14:useLocalDpi xmlns:a14="http://schemas.microsoft.com/office/drawing/2010/main" val="0"/>
-              </a:ext>
-            </a:extLst>
-          </a:blip>
-          <a:stretch>
-            <a:fillRect/>
-          </a:stretch>
-        </p:blipFill>
-        <p:spPr>
-          <a:xfrm>
-            <a:off x="1713888" y="952154"/>
-            <a:ext cx="8764223" cy="4953691"/>
-          </a:xfrm>
-          <a:prstGeom prst="rect">
-            <a:avLst/>
-          </a:prstGeom>
-        </p:spPr>
-      </p:pic>
-      <p:sp>
-        <p:nvSpPr>
-          <p:cNvPr id="6" name="Tekstvak 5"/>
-          <p:cNvSpPr txBox="1"/>
-          <p:nvPr/>
-        </p:nvSpPr>
-        <p:spPr>
-          <a:xfrm>
-            <a:off x="8313309" y="6232690"/>
-            <a:ext cx="3878691" cy="523220"/>
-          </a:xfrm>
-          <a:prstGeom prst="rect">
-            <a:avLst/>
-          </a:prstGeom>
-          <a:noFill/>
-        </p:spPr>
-        <p:txBody>
-          <a:bodyPr wrap="none" rtlCol="0">
-            <a:spAutoFit/>
-          </a:bodyPr>
-          <a:lstStyle/>
-          <a:p>
-            <a:r>
-              <a:rPr lang="nl-NL" sz="1400" dirty="0"/>
-              <a:t>Bron: </a:t>
-            </a:r>
-            <a:r>
-              <a:rPr lang="nl-NL" sz="1400" dirty="0">
-                <a:hlinkClick r:id="rId3"/>
-              </a:rPr>
-              <a:t>https://html5test.com/results/desktop.html</a:t>
-            </a:r>
-            <a:r>
-              <a:rPr lang="nl-NL" sz="1400" dirty="0"/>
-              <a:t> </a:t>
-            </a:r>
-          </a:p>
-          <a:p>
-            <a:r>
-              <a:rPr lang="nl-NL" sz="1400" dirty="0"/>
-              <a:t>2018-11-16</a:t>
-            </a:r>
-          </a:p>
-        </p:txBody>
-      </p:sp>
-    </p:spTree>
-    <p:extLst>
-      <p:ext uri="{BB962C8B-B14F-4D97-AF65-F5344CB8AC3E}">
-        <p14:creationId xmlns:p14="http://schemas.microsoft.com/office/powerpoint/2010/main" val="35008013"/>
-      </p:ext>
-    </p:extLst>
-  </p:cSld>
-  <p:clrMapOvr>
-    <a:masterClrMapping/>
-  </p:clrMapOvr>
-</p:sld>
-</file>
-
-<file path=ppt/slides/slide17.xml><?xml version="1.0" encoding="utf-8"?>
-<p:sld xmlns:a="http://schemas.openxmlformats.org/drawingml/2006/main" xmlns:r="http://schemas.openxmlformats.org/officeDocument/2006/relationships" xmlns:p="http://schemas.openxmlformats.org/presentationml/2006/main">
-  <p:cSld>
-    <p:spTree>
-      <p:nvGrpSpPr>
-        <p:cNvPr id="1" name=""/>
-        <p:cNvGrpSpPr/>
-        <p:nvPr/>
-      </p:nvGrpSpPr>
-      <p:grpSpPr>
-        <a:xfrm>
-          <a:off x="0" y="0"/>
-          <a:ext cx="0" cy="0"/>
-          <a:chOff x="0" y="0"/>
-          <a:chExt cx="0" cy="0"/>
-        </a:xfrm>
-      </p:grpSpPr>
-      <p:pic>
-        <p:nvPicPr>
           <p:cNvPr id="4" name="Afbeelding 3"/>
           <p:cNvPicPr>
             <a:picLocks noChangeAspect="1"/>
           </p:cNvPicPr>
           <p:nvPr/>
         </p:nvPicPr>
-        <p:blipFill>
+        <p:blipFill rotWithShape="1">
           <a:blip r:embed="rId2">
             <a:extLst>
               <a:ext uri="{28A0092B-C50C-407E-A947-70E740481C1C}">
@@ -9244,14 +9139,13 @@
               </a:ext>
             </a:extLst>
           </a:blip>
-          <a:stretch>
-            <a:fillRect/>
-          </a:stretch>
+          <a:srcRect r="30853"/>
+          <a:stretch/>
         </p:blipFill>
         <p:spPr>
           <a:xfrm>
-            <a:off x="231228" y="153344"/>
-            <a:ext cx="7353035" cy="6443046"/>
+            <a:off x="231229" y="153344"/>
+            <a:ext cx="5084350" cy="6443046"/>
           </a:xfrm>
           <a:prstGeom prst="rect">
             <a:avLst/>
@@ -9300,6 +9194,71 @@
               <a:rPr lang="nl-NL" sz="1400" dirty="0"/>
               <a:t>2018-11-16</a:t>
             </a:r>
+          </a:p>
+        </p:txBody>
+      </p:sp>
+      <p:pic>
+        <p:nvPicPr>
+          <p:cNvPr id="3" name="Afbeelding 2">
+            <a:extLst>
+              <a:ext uri="{FF2B5EF4-FFF2-40B4-BE49-F238E27FC236}">
+                <a16:creationId xmlns:a16="http://schemas.microsoft.com/office/drawing/2014/main" id="{4C9392AB-69D9-F580-7B57-766FCDDDC4DD}"/>
+              </a:ext>
+            </a:extLst>
+          </p:cNvPr>
+          <p:cNvPicPr>
+            <a:picLocks noChangeAspect="1"/>
+          </p:cNvPicPr>
+          <p:nvPr/>
+        </p:nvPicPr>
+        <p:blipFill rotWithShape="1">
+          <a:blip r:embed="rId4"/>
+          <a:srcRect l="26045" t="22835" r="44807"/>
+          <a:stretch/>
+        </p:blipFill>
+        <p:spPr>
+          <a:xfrm>
+            <a:off x="6876423" y="153344"/>
+            <a:ext cx="3553768" cy="5144965"/>
+          </a:xfrm>
+          <a:prstGeom prst="rect">
+            <a:avLst/>
+          </a:prstGeom>
+        </p:spPr>
+      </p:pic>
+      <p:sp>
+        <p:nvSpPr>
+          <p:cNvPr id="6" name="Tekstvak 5">
+            <a:extLst>
+              <a:ext uri="{FF2B5EF4-FFF2-40B4-BE49-F238E27FC236}">
+                <a16:creationId xmlns:a16="http://schemas.microsoft.com/office/drawing/2014/main" id="{5E954D72-4D67-51A9-88FF-D7483DE62CF0}"/>
+              </a:ext>
+            </a:extLst>
+          </p:cNvPr>
+          <p:cNvSpPr txBox="1"/>
+          <p:nvPr/>
+        </p:nvSpPr>
+        <p:spPr>
+          <a:xfrm>
+            <a:off x="7877908" y="5566787"/>
+            <a:ext cx="1768510" cy="369332"/>
+          </a:xfrm>
+          <a:prstGeom prst="rect">
+            <a:avLst/>
+          </a:prstGeom>
+          <a:noFill/>
+        </p:spPr>
+        <p:txBody>
+          <a:bodyPr wrap="square" rtlCol="0">
+            <a:spAutoFit/>
+          </a:bodyPr>
+          <a:lstStyle/>
+          <a:p>
+            <a:r>
+              <a:rPr lang="nl-NL" dirty="0"/>
+              <a:t>24 okt 2022</a:t>
+            </a:r>
+            <a:endParaRPr lang="en-NL" dirty="0"/>
           </a:p>
         </p:txBody>
       </p:sp>
@@ -9316,7 +9275,7 @@
 </p:sld>
 </file>
 
-<file path=ppt/slides/slide18.xml><?xml version="1.0" encoding="utf-8"?>
+<file path=ppt/slides/slide17.xml><?xml version="1.0" encoding="utf-8"?>
 <p:sld xmlns:a="http://schemas.openxmlformats.org/drawingml/2006/main" xmlns:r="http://schemas.openxmlformats.org/officeDocument/2006/relationships" xmlns:p="http://schemas.openxmlformats.org/presentationml/2006/main">
   <p:cSld>
     <p:spTree>
@@ -9421,7 +9380,7 @@
 </p:sld>
 </file>
 
-<file path=ppt/slides/slide19.xml><?xml version="1.0" encoding="utf-8"?>
+<file path=ppt/slides/slide18.xml><?xml version="1.0" encoding="utf-8"?>
 <p:sld xmlns:a="http://schemas.openxmlformats.org/drawingml/2006/main" xmlns:r="http://schemas.openxmlformats.org/officeDocument/2006/relationships" xmlns:p="http://schemas.openxmlformats.org/presentationml/2006/main">
   <p:cSld>
     <p:spTree>
@@ -9536,130 +9495,7 @@
 </p:sld>
 </file>
 
-<file path=ppt/slides/slide2.xml><?xml version="1.0" encoding="utf-8"?>
-<p:sld xmlns:a="http://schemas.openxmlformats.org/drawingml/2006/main" xmlns:r="http://schemas.openxmlformats.org/officeDocument/2006/relationships" xmlns:p="http://schemas.openxmlformats.org/presentationml/2006/main">
-  <p:cSld>
-    <p:spTree>
-      <p:nvGrpSpPr>
-        <p:cNvPr id="1" name=""/>
-        <p:cNvGrpSpPr/>
-        <p:nvPr/>
-      </p:nvGrpSpPr>
-      <p:grpSpPr>
-        <a:xfrm>
-          <a:off x="0" y="0"/>
-          <a:ext cx="0" cy="0"/>
-          <a:chOff x="0" y="0"/>
-          <a:chExt cx="0" cy="0"/>
-        </a:xfrm>
-      </p:grpSpPr>
-      <p:sp>
-        <p:nvSpPr>
-          <p:cNvPr id="2" name="Tijdelijke aanduiding voor afbeelding 1">
-            <a:extLst>
-              <a:ext uri="{FF2B5EF4-FFF2-40B4-BE49-F238E27FC236}">
-                <a16:creationId xmlns:a16="http://schemas.microsoft.com/office/drawing/2014/main" id="{45DAC9F6-3738-4460-8688-6326A9BE3FE6}"/>
-              </a:ext>
-            </a:extLst>
-          </p:cNvPr>
-          <p:cNvSpPr>
-            <a:spLocks noGrp="1"/>
-          </p:cNvSpPr>
-          <p:nvPr>
-            <p:ph type="pic" sz="quarter" idx="10"/>
-          </p:nvPr>
-        </p:nvSpPr>
-        <p:spPr/>
-      </p:sp>
-      <p:sp>
-        <p:nvSpPr>
-          <p:cNvPr id="3" name="Titel 2">
-            <a:extLst>
-              <a:ext uri="{FF2B5EF4-FFF2-40B4-BE49-F238E27FC236}">
-                <a16:creationId xmlns:a16="http://schemas.microsoft.com/office/drawing/2014/main" id="{9A45B11F-5214-4B9D-8CB6-7FCD1631B189}"/>
-              </a:ext>
-            </a:extLst>
-          </p:cNvPr>
-          <p:cNvSpPr>
-            <a:spLocks noGrp="1"/>
-          </p:cNvSpPr>
-          <p:nvPr>
-            <p:ph type="ctrTitle"/>
-          </p:nvPr>
-        </p:nvSpPr>
-        <p:spPr/>
-        <p:txBody>
-          <a:bodyPr/>
-          <a:lstStyle/>
-          <a:p>
-            <a:endParaRPr lang="nl-NL"/>
-          </a:p>
-        </p:txBody>
-      </p:sp>
-      <p:sp>
-        <p:nvSpPr>
-          <p:cNvPr id="4" name="Ondertitel 3">
-            <a:extLst>
-              <a:ext uri="{FF2B5EF4-FFF2-40B4-BE49-F238E27FC236}">
-                <a16:creationId xmlns:a16="http://schemas.microsoft.com/office/drawing/2014/main" id="{382C83AC-5D3A-4B0A-80CF-45CB817DD86B}"/>
-              </a:ext>
-            </a:extLst>
-          </p:cNvPr>
-          <p:cNvSpPr>
-            <a:spLocks noGrp="1"/>
-          </p:cNvSpPr>
-          <p:nvPr>
-            <p:ph type="subTitle" idx="1"/>
-          </p:nvPr>
-        </p:nvSpPr>
-        <p:spPr/>
-        <p:txBody>
-          <a:bodyPr/>
-          <a:lstStyle/>
-          <a:p>
-            <a:endParaRPr lang="nl-NL"/>
-          </a:p>
-        </p:txBody>
-      </p:sp>
-      <p:sp>
-        <p:nvSpPr>
-          <p:cNvPr id="5" name="Tijdelijke aanduiding voor tekst 4">
-            <a:extLst>
-              <a:ext uri="{FF2B5EF4-FFF2-40B4-BE49-F238E27FC236}">
-                <a16:creationId xmlns:a16="http://schemas.microsoft.com/office/drawing/2014/main" id="{4BC0AFAE-23FE-4BE4-878D-AB8587E157CC}"/>
-              </a:ext>
-            </a:extLst>
-          </p:cNvPr>
-          <p:cNvSpPr>
-            <a:spLocks noGrp="1"/>
-          </p:cNvSpPr>
-          <p:nvPr>
-            <p:ph type="body" sz="quarter" idx="13"/>
-          </p:nvPr>
-        </p:nvSpPr>
-        <p:spPr/>
-        <p:txBody>
-          <a:bodyPr/>
-          <a:lstStyle/>
-          <a:p>
-            <a:endParaRPr lang="nl-NL"/>
-          </a:p>
-        </p:txBody>
-      </p:sp>
-    </p:spTree>
-    <p:extLst>
-      <p:ext uri="{BB962C8B-B14F-4D97-AF65-F5344CB8AC3E}">
-        <p14:creationId xmlns:p14="http://schemas.microsoft.com/office/powerpoint/2010/main" val="1364180950"/>
-      </p:ext>
-    </p:extLst>
-  </p:cSld>
-  <p:clrMapOvr>
-    <a:masterClrMapping/>
-  </p:clrMapOvr>
-</p:sld>
-</file>
-
-<file path=ppt/slides/slide20.xml><?xml version="1.0" encoding="utf-8"?>
+<file path=ppt/slides/slide19.xml><?xml version="1.0" encoding="utf-8"?>
 <p:sld xmlns:a="http://schemas.openxmlformats.org/drawingml/2006/main" xmlns:r="http://schemas.openxmlformats.org/officeDocument/2006/relationships" xmlns:p="http://schemas.openxmlformats.org/presentationml/2006/main">
   <p:cSld>
     <p:spTree>
@@ -9743,6 +9579,219 @@
 </p:sld>
 </file>
 
+<file path=ppt/slides/slide2.xml><?xml version="1.0" encoding="utf-8"?>
+<p:sld xmlns:a="http://schemas.openxmlformats.org/drawingml/2006/main" xmlns:r="http://schemas.openxmlformats.org/officeDocument/2006/relationships" xmlns:p="http://schemas.openxmlformats.org/presentationml/2006/main">
+  <p:cSld>
+    <p:spTree>
+      <p:nvGrpSpPr>
+        <p:cNvPr id="1" name=""/>
+        <p:cNvGrpSpPr/>
+        <p:nvPr/>
+      </p:nvGrpSpPr>
+      <p:grpSpPr>
+        <a:xfrm>
+          <a:off x="0" y="0"/>
+          <a:ext cx="0" cy="0"/>
+          <a:chOff x="0" y="0"/>
+          <a:chExt cx="0" cy="0"/>
+        </a:xfrm>
+      </p:grpSpPr>
+      <p:pic>
+        <p:nvPicPr>
+          <p:cNvPr id="1026" name="Picture 2" descr="Book Cover">
+            <a:extLst>
+              <a:ext uri="{FF2B5EF4-FFF2-40B4-BE49-F238E27FC236}">
+                <a16:creationId xmlns:a16="http://schemas.microsoft.com/office/drawing/2014/main" id="{E058DB4C-2490-472E-838C-C803DABC065E}"/>
+              </a:ext>
+            </a:extLst>
+          </p:cNvPr>
+          <p:cNvPicPr>
+            <a:picLocks noChangeAspect="1" noChangeArrowheads="1"/>
+          </p:cNvPicPr>
+          <p:nvPr/>
+        </p:nvPicPr>
+        <p:blipFill>
+          <a:blip r:embed="rId2">
+            <a:extLst>
+              <a:ext uri="{28A0092B-C50C-407E-A947-70E740481C1C}">
+                <a14:useLocalDpi xmlns:a14="http://schemas.microsoft.com/office/drawing/2010/main" val="0"/>
+              </a:ext>
+            </a:extLst>
+          </a:blip>
+          <a:srcRect/>
+          <a:stretch>
+            <a:fillRect/>
+          </a:stretch>
+        </p:blipFill>
+        <p:spPr bwMode="auto">
+          <a:xfrm>
+            <a:off x="0" y="95250"/>
+            <a:ext cx="5222875" cy="6858000"/>
+          </a:xfrm>
+          <a:prstGeom prst="rect">
+            <a:avLst/>
+          </a:prstGeom>
+          <a:noFill/>
+          <a:extLst>
+            <a:ext uri="{909E8E84-426E-40DD-AFC4-6F175D3DCCD1}">
+              <a14:hiddenFill xmlns:a14="http://schemas.microsoft.com/office/drawing/2010/main">
+                <a:solidFill>
+                  <a:srgbClr val="FFFFFF"/>
+                </a:solidFill>
+              </a14:hiddenFill>
+            </a:ext>
+          </a:extLst>
+        </p:spPr>
+      </p:pic>
+      <p:pic>
+        <p:nvPicPr>
+          <p:cNvPr id="1028" name="Picture 4" descr="Book Cover">
+            <a:extLst>
+              <a:ext uri="{FF2B5EF4-FFF2-40B4-BE49-F238E27FC236}">
+                <a16:creationId xmlns:a16="http://schemas.microsoft.com/office/drawing/2014/main" id="{23EE6010-6A54-404C-974D-1EDA9BF72EAC}"/>
+              </a:ext>
+            </a:extLst>
+          </p:cNvPr>
+          <p:cNvPicPr>
+            <a:picLocks noChangeAspect="1" noChangeArrowheads="1"/>
+          </p:cNvPicPr>
+          <p:nvPr/>
+        </p:nvPicPr>
+        <p:blipFill>
+          <a:blip r:embed="rId3">
+            <a:extLst>
+              <a:ext uri="{28A0092B-C50C-407E-A947-70E740481C1C}">
+                <a14:useLocalDpi xmlns:a14="http://schemas.microsoft.com/office/drawing/2010/main" val="0"/>
+              </a:ext>
+            </a:extLst>
+          </a:blip>
+          <a:srcRect/>
+          <a:stretch>
+            <a:fillRect/>
+          </a:stretch>
+        </p:blipFill>
+        <p:spPr bwMode="auto">
+          <a:xfrm>
+            <a:off x="7429500" y="0"/>
+            <a:ext cx="4762500" cy="6667500"/>
+          </a:xfrm>
+          <a:prstGeom prst="rect">
+            <a:avLst/>
+          </a:prstGeom>
+          <a:noFill/>
+          <a:extLst>
+            <a:ext uri="{909E8E84-426E-40DD-AFC4-6F175D3DCCD1}">
+              <a14:hiddenFill xmlns:a14="http://schemas.microsoft.com/office/drawing/2010/main">
+                <a:solidFill>
+                  <a:srgbClr val="FFFFFF"/>
+                </a:solidFill>
+              </a14:hiddenFill>
+            </a:ext>
+          </a:extLst>
+        </p:spPr>
+      </p:pic>
+    </p:spTree>
+    <p:extLst>
+      <p:ext uri="{BB962C8B-B14F-4D97-AF65-F5344CB8AC3E}">
+        <p14:creationId xmlns:p14="http://schemas.microsoft.com/office/powerpoint/2010/main" val="1364180950"/>
+      </p:ext>
+    </p:extLst>
+  </p:cSld>
+  <p:clrMapOvr>
+    <a:masterClrMapping/>
+  </p:clrMapOvr>
+</p:sld>
+</file>
+
+<file path=ppt/slides/slide20.xml><?xml version="1.0" encoding="utf-8"?>
+<p:sld xmlns:a="http://schemas.openxmlformats.org/drawingml/2006/main" xmlns:r="http://schemas.openxmlformats.org/officeDocument/2006/relationships" xmlns:p="http://schemas.openxmlformats.org/presentationml/2006/main">
+  <p:cSld>
+    <p:spTree>
+      <p:nvGrpSpPr>
+        <p:cNvPr id="1" name=""/>
+        <p:cNvGrpSpPr/>
+        <p:nvPr/>
+      </p:nvGrpSpPr>
+      <p:grpSpPr>
+        <a:xfrm>
+          <a:off x="0" y="0"/>
+          <a:ext cx="0" cy="0"/>
+          <a:chOff x="0" y="0"/>
+          <a:chExt cx="0" cy="0"/>
+        </a:xfrm>
+      </p:grpSpPr>
+      <p:sp>
+        <p:nvSpPr>
+          <p:cNvPr id="2" name="Titel 1">
+            <a:extLst>
+              <a:ext uri="{FF2B5EF4-FFF2-40B4-BE49-F238E27FC236}">
+                <a16:creationId xmlns:a16="http://schemas.microsoft.com/office/drawing/2014/main" id="{553F0B14-3652-049A-14D3-558518A0510E}"/>
+              </a:ext>
+            </a:extLst>
+          </p:cNvPr>
+          <p:cNvSpPr>
+            <a:spLocks noGrp="1"/>
+          </p:cNvSpPr>
+          <p:nvPr>
+            <p:ph type="title"/>
+          </p:nvPr>
+        </p:nvSpPr>
+        <p:spPr/>
+        <p:txBody>
+          <a:bodyPr/>
+          <a:lstStyle/>
+          <a:p>
+            <a:r>
+              <a:rPr lang="nl-NL" dirty="0"/>
+              <a:t>Voorbeeld Postman</a:t>
+            </a:r>
+            <a:endParaRPr lang="en-NL" dirty="0"/>
+          </a:p>
+        </p:txBody>
+      </p:sp>
+      <p:pic>
+        <p:nvPicPr>
+          <p:cNvPr id="5" name="Afbeelding 4">
+            <a:extLst>
+              <a:ext uri="{FF2B5EF4-FFF2-40B4-BE49-F238E27FC236}">
+                <a16:creationId xmlns:a16="http://schemas.microsoft.com/office/drawing/2014/main" id="{DEB6B2AE-5CDC-722E-C89D-44E9144E06FE}"/>
+              </a:ext>
+            </a:extLst>
+          </p:cNvPr>
+          <p:cNvPicPr>
+            <a:picLocks noChangeAspect="1"/>
+          </p:cNvPicPr>
+          <p:nvPr/>
+        </p:nvPicPr>
+        <p:blipFill>
+          <a:blip r:embed="rId2"/>
+          <a:stretch>
+            <a:fillRect/>
+          </a:stretch>
+        </p:blipFill>
+        <p:spPr>
+          <a:xfrm>
+            <a:off x="1185705" y="1529024"/>
+            <a:ext cx="9257881" cy="5062904"/>
+          </a:xfrm>
+          <a:prstGeom prst="rect">
+            <a:avLst/>
+          </a:prstGeom>
+        </p:spPr>
+      </p:pic>
+    </p:spTree>
+    <p:extLst>
+      <p:ext uri="{BB962C8B-B14F-4D97-AF65-F5344CB8AC3E}">
+        <p14:creationId xmlns:p14="http://schemas.microsoft.com/office/powerpoint/2010/main" val="918946878"/>
+      </p:ext>
+    </p:extLst>
+  </p:cSld>
+  <p:clrMapOvr>
+    <a:masterClrMapping/>
+  </p:clrMapOvr>
+</p:sld>
+</file>
+
 <file path=ppt/slides/slide21.xml><?xml version="1.0" encoding="utf-8"?>
 <p:sld xmlns:a="http://schemas.openxmlformats.org/drawingml/2006/main" xmlns:r="http://schemas.openxmlformats.org/officeDocument/2006/relationships" xmlns:p="http://schemas.openxmlformats.org/presentationml/2006/main">
   <p:cSld>
@@ -10420,7 +10469,7 @@
               <a:rPr lang="nl-NL" dirty="0">
                 <a:hlinkClick r:id="rId2"/>
               </a:rPr>
-              <a:t>https://github.com/NHLStenden/Flex-WebDevelopment-FrontEndDevelopment/tree/master/WebDevelopment/content/examples/Fase01</a:t>
+              <a:t>https://github.com/NHLStenden/Flex-WebDevelopment-FrontEndDevelopment/tree/master/WebDevelopment/content/assignments/01</a:t>
             </a:r>
             <a:endParaRPr lang="nl-NL" dirty="0"/>
           </a:p>
@@ -10432,21 +10481,12 @@
               <a:rPr lang="nl-NL" dirty="0">
                 <a:hlinkClick r:id="rId3"/>
               </a:rPr>
-              <a:t>https://github.com/NHLStenden/Flex-WebDevelopment-FrontEndDevelopment/tree/master/WebDevelopment/content/assignments/01</a:t>
+              <a:t>https://github.com/NHLStenden/Flex-WebDevelopment-FrontEndDevelopment/tree/master/WebDevelopment/content/examples/Javascript/Example01</a:t>
             </a:r>
             <a:endParaRPr lang="nl-NL" dirty="0"/>
           </a:p>
           <a:p>
             <a:endParaRPr lang="nl-NL" dirty="0"/>
-          </a:p>
-          <a:p>
-            <a:r>
-              <a:rPr lang="nl-NL">
-                <a:hlinkClick r:id="rId4"/>
-              </a:rPr>
-              <a:t>https://github.com/NHLStenden/Flex-WebDevelopment-FrontEndDevelopment/tree/master/WebDevelopment/content/solutions/opdracht01</a:t>
-            </a:r>
-            <a:endParaRPr lang="nl-NL"/>
           </a:p>
           <a:p>
             <a:endParaRPr lang="nl-NL" dirty="0"/>
@@ -10538,12 +10578,9 @@
           </a:p>
           <a:p>
             <a:r>
-              <a:rPr lang="nl-NL" dirty="0">
-                <a:hlinkClick r:id="rId2"/>
-              </a:rPr>
-              <a:t>https://github.com/NHLStenden/Flex-WebDevelopment-FrontEndDevelopment/tree/master/WebDevelopment/content/examples/Fase02</a:t>
-            </a:r>
-            <a:endParaRPr lang="nl-NL" dirty="0"/>
+              <a:rPr lang="nl-NL" dirty="0"/>
+              <a:t>https://github.com/NHLStenden/Flex-WebDevelopment-FrontEndDevelopment/tree/master/WebDevelopment/content/examples/Javascript/Example02</a:t>
+            </a:r>
           </a:p>
           <a:p>
             <a:pPr marL="0" indent="0">
@@ -13125,7 +13162,15 @@
           <a:p>
             <a:r>
               <a:rPr lang="nl-NL" dirty="0"/>
-              <a:t>Huidige versie: 11.x</a:t>
+              <a:t>Huidige versie</a:t>
+            </a:r>
+            <a:r>
+              <a:rPr lang="nl-NL"/>
+              <a:t>: 14.</a:t>
+            </a:r>
+            <a:r>
+              <a:rPr lang="nl-NL" dirty="0"/>
+              <a:t>x</a:t>
             </a:r>
           </a:p>
           <a:p>

</xml_diff>